<commit_message>
V0.1 - UI Details - almost done with Details view
</commit_message>
<xml_diff>
--- a/PowerPoints/ScreenLayouts.pptx
+++ b/PowerPoints/ScreenLayouts.pptx
@@ -6,6 +6,7 @@
   </p:sldMasterIdLst>
   <p:sldIdLst>
     <p:sldId id="256" r:id="rId2"/>
+    <p:sldId id="257" r:id="rId3"/>
   </p:sldIdLst>
   <p:sldSz cx="6858000" cy="9906000" type="A4"/>
   <p:notesSz cx="6858000" cy="9144000"/>
@@ -254,7 +255,7 @@
           <a:p>
             <a:fld id="{BD91CD0C-10B1-6E41-8640-8B762291B572}" type="datetimeFigureOut">
               <a:rPr lang="en-US" smtClean="0"/>
-              <a:t>11/29/20</a:t>
+              <a:t>12/1/20</a:t>
             </a:fld>
             <a:endParaRPr lang="en-US"/>
           </a:p>
@@ -424,7 +425,7 @@
           <a:p>
             <a:fld id="{BD91CD0C-10B1-6E41-8640-8B762291B572}" type="datetimeFigureOut">
               <a:rPr lang="en-US" smtClean="0"/>
-              <a:t>11/29/20</a:t>
+              <a:t>12/1/20</a:t>
             </a:fld>
             <a:endParaRPr lang="en-US"/>
           </a:p>
@@ -604,7 +605,7 @@
           <a:p>
             <a:fld id="{BD91CD0C-10B1-6E41-8640-8B762291B572}" type="datetimeFigureOut">
               <a:rPr lang="en-US" smtClean="0"/>
-              <a:t>11/29/20</a:t>
+              <a:t>12/1/20</a:t>
             </a:fld>
             <a:endParaRPr lang="en-US"/>
           </a:p>
@@ -774,7 +775,7 @@
           <a:p>
             <a:fld id="{BD91CD0C-10B1-6E41-8640-8B762291B572}" type="datetimeFigureOut">
               <a:rPr lang="en-US" smtClean="0"/>
-              <a:t>11/29/20</a:t>
+              <a:t>12/1/20</a:t>
             </a:fld>
             <a:endParaRPr lang="en-US"/>
           </a:p>
@@ -1018,7 +1019,7 @@
           <a:p>
             <a:fld id="{BD91CD0C-10B1-6E41-8640-8B762291B572}" type="datetimeFigureOut">
               <a:rPr lang="en-US" smtClean="0"/>
-              <a:t>11/29/20</a:t>
+              <a:t>12/1/20</a:t>
             </a:fld>
             <a:endParaRPr lang="en-US"/>
           </a:p>
@@ -1250,7 +1251,7 @@
           <a:p>
             <a:fld id="{BD91CD0C-10B1-6E41-8640-8B762291B572}" type="datetimeFigureOut">
               <a:rPr lang="en-US" smtClean="0"/>
-              <a:t>11/29/20</a:t>
+              <a:t>12/1/20</a:t>
             </a:fld>
             <a:endParaRPr lang="en-US"/>
           </a:p>
@@ -1617,7 +1618,7 @@
           <a:p>
             <a:fld id="{BD91CD0C-10B1-6E41-8640-8B762291B572}" type="datetimeFigureOut">
               <a:rPr lang="en-US" smtClean="0"/>
-              <a:t>11/29/20</a:t>
+              <a:t>12/1/20</a:t>
             </a:fld>
             <a:endParaRPr lang="en-US"/>
           </a:p>
@@ -1735,7 +1736,7 @@
           <a:p>
             <a:fld id="{BD91CD0C-10B1-6E41-8640-8B762291B572}" type="datetimeFigureOut">
               <a:rPr lang="en-US" smtClean="0"/>
-              <a:t>11/29/20</a:t>
+              <a:t>12/1/20</a:t>
             </a:fld>
             <a:endParaRPr lang="en-US"/>
           </a:p>
@@ -1830,7 +1831,7 @@
           <a:p>
             <a:fld id="{BD91CD0C-10B1-6E41-8640-8B762291B572}" type="datetimeFigureOut">
               <a:rPr lang="en-US" smtClean="0"/>
-              <a:t>11/29/20</a:t>
+              <a:t>12/1/20</a:t>
             </a:fld>
             <a:endParaRPr lang="en-US"/>
           </a:p>
@@ -2107,7 +2108,7 @@
           <a:p>
             <a:fld id="{BD91CD0C-10B1-6E41-8640-8B762291B572}" type="datetimeFigureOut">
               <a:rPr lang="en-US" smtClean="0"/>
-              <a:t>11/29/20</a:t>
+              <a:t>12/1/20</a:t>
             </a:fld>
             <a:endParaRPr lang="en-US"/>
           </a:p>
@@ -2364,7 +2365,7 @@
           <a:p>
             <a:fld id="{BD91CD0C-10B1-6E41-8640-8B762291B572}" type="datetimeFigureOut">
               <a:rPr lang="en-US" smtClean="0"/>
-              <a:t>11/29/20</a:t>
+              <a:t>12/1/20</a:t>
             </a:fld>
             <a:endParaRPr lang="en-US"/>
           </a:p>
@@ -2577,7 +2578,7 @@
           <a:p>
             <a:fld id="{BD91CD0C-10B1-6E41-8640-8B762291B572}" type="datetimeFigureOut">
               <a:rPr lang="en-US" smtClean="0"/>
-              <a:t>11/29/20</a:t>
+              <a:t>12/1/20</a:t>
             </a:fld>
             <a:endParaRPr lang="en-US"/>
           </a:p>
@@ -3792,7 +3793,7 @@
         </p:nvSpPr>
         <p:spPr>
           <a:xfrm>
-            <a:off x="775327" y="621437"/>
+            <a:off x="601589" y="758886"/>
             <a:ext cx="2958310" cy="369332"/>
           </a:xfrm>
           <a:prstGeom prst="rect">
@@ -3808,13 +3809,8 @@
           <a:p>
             <a:r>
               <a:rPr lang="en-US" dirty="0"/>
-              <a:t>Show Details of RKI </a:t>
-            </a:r>
-            <a:r>
-              <a:rPr lang="en-US"/>
-              <a:t>Data item</a:t>
-            </a:r>
-            <a:endParaRPr lang="en-US" dirty="0"/>
+              <a:t>Show Details of RKI Data item</a:t>
+            </a:r>
           </a:p>
         </p:txBody>
       </p:sp>
@@ -3822,6 +3818,829 @@
     <p:extLst>
       <p:ext uri="{BB962C8B-B14F-4D97-AF65-F5344CB8AC3E}">
         <p14:creationId xmlns:p14="http://schemas.microsoft.com/office/powerpoint/2010/main" val="2824511047"/>
+      </p:ext>
+    </p:extLst>
+  </p:cSld>
+  <p:clrMapOvr>
+    <a:masterClrMapping/>
+  </p:clrMapOvr>
+</p:sld>
+</file>
+
+<file path=ppt/slides/slide2.xml><?xml version="1.0" encoding="utf-8"?>
+<p:sld xmlns:a="http://schemas.openxmlformats.org/drawingml/2006/main" xmlns:r="http://schemas.openxmlformats.org/officeDocument/2006/relationships" xmlns:p="http://schemas.openxmlformats.org/presentationml/2006/main">
+  <p:cSld>
+    <p:spTree>
+      <p:nvGrpSpPr>
+        <p:cNvPr id="1" name=""/>
+        <p:cNvGrpSpPr/>
+        <p:nvPr/>
+      </p:nvGrpSpPr>
+      <p:grpSpPr>
+        <a:xfrm>
+          <a:off x="0" y="0"/>
+          <a:ext cx="0" cy="0"/>
+          <a:chOff x="0" y="0"/>
+          <a:chExt cx="0" cy="0"/>
+        </a:xfrm>
+      </p:grpSpPr>
+      <p:sp>
+        <p:nvSpPr>
+          <p:cNvPr id="4" name="Rechteck 3">
+            <a:extLst>
+              <a:ext uri="{FF2B5EF4-FFF2-40B4-BE49-F238E27FC236}">
+                <a16:creationId xmlns:a16="http://schemas.microsoft.com/office/drawing/2014/main" id="{33CB71DC-6146-3348-8296-1672B3189093}"/>
+              </a:ext>
+            </a:extLst>
+          </p:cNvPr>
+          <p:cNvSpPr/>
+          <p:nvPr/>
+        </p:nvSpPr>
+        <p:spPr>
+          <a:xfrm>
+            <a:off x="601591" y="1948304"/>
+            <a:ext cx="2359325" cy="3986842"/>
+          </a:xfrm>
+          <a:prstGeom prst="rect">
+            <a:avLst/>
+          </a:prstGeom>
+          <a:noFill/>
+          <a:ln w="12700"/>
+        </p:spPr>
+        <p:style>
+          <a:lnRef idx="2">
+            <a:schemeClr val="accent1">
+              <a:shade val="50000"/>
+            </a:schemeClr>
+          </a:lnRef>
+          <a:fillRef idx="1">
+            <a:schemeClr val="accent1"/>
+          </a:fillRef>
+          <a:effectRef idx="0">
+            <a:schemeClr val="accent1"/>
+          </a:effectRef>
+          <a:fontRef idx="minor">
+            <a:schemeClr val="lt1"/>
+          </a:fontRef>
+        </p:style>
+        <p:txBody>
+          <a:bodyPr rtlCol="0" anchor="ctr"/>
+          <a:lstStyle/>
+          <a:p>
+            <a:pPr algn="ctr"/>
+            <a:endParaRPr lang="en-US"/>
+          </a:p>
+        </p:txBody>
+      </p:sp>
+      <p:sp>
+        <p:nvSpPr>
+          <p:cNvPr id="6" name="Rechteck 5">
+            <a:extLst>
+              <a:ext uri="{FF2B5EF4-FFF2-40B4-BE49-F238E27FC236}">
+                <a16:creationId xmlns:a16="http://schemas.microsoft.com/office/drawing/2014/main" id="{896B6C08-D9A0-FB4B-BA60-FC969E61AAD9}"/>
+              </a:ext>
+            </a:extLst>
+          </p:cNvPr>
+          <p:cNvSpPr/>
+          <p:nvPr/>
+        </p:nvSpPr>
+        <p:spPr>
+          <a:xfrm>
+            <a:off x="601591" y="1948304"/>
+            <a:ext cx="2359325" cy="531962"/>
+          </a:xfrm>
+          <a:prstGeom prst="rect">
+            <a:avLst/>
+          </a:prstGeom>
+          <a:solidFill>
+            <a:schemeClr val="bg1">
+              <a:lumMod val="85000"/>
+            </a:schemeClr>
+          </a:solidFill>
+        </p:spPr>
+        <p:style>
+          <a:lnRef idx="2">
+            <a:schemeClr val="accent1">
+              <a:shade val="50000"/>
+            </a:schemeClr>
+          </a:lnRef>
+          <a:fillRef idx="1">
+            <a:schemeClr val="accent1"/>
+          </a:fillRef>
+          <a:effectRef idx="0">
+            <a:schemeClr val="accent1"/>
+          </a:effectRef>
+          <a:fontRef idx="minor">
+            <a:schemeClr val="lt1"/>
+          </a:fontRef>
+        </p:style>
+        <p:txBody>
+          <a:bodyPr rtlCol="0" anchor="ctr"/>
+          <a:lstStyle/>
+          <a:p>
+            <a:pPr algn="ctr"/>
+            <a:r>
+              <a:rPr lang="en-US" dirty="0">
+                <a:solidFill>
+                  <a:schemeClr val="tx1"/>
+                </a:solidFill>
+              </a:rPr>
+              <a:t>Deutschland</a:t>
+            </a:r>
+          </a:p>
+        </p:txBody>
+      </p:sp>
+      <p:sp>
+        <p:nvSpPr>
+          <p:cNvPr id="7" name="Textfeld 6">
+            <a:extLst>
+              <a:ext uri="{FF2B5EF4-FFF2-40B4-BE49-F238E27FC236}">
+                <a16:creationId xmlns:a16="http://schemas.microsoft.com/office/drawing/2014/main" id="{7638E573-EFE5-594D-B3E0-E4F71BFC06BD}"/>
+              </a:ext>
+            </a:extLst>
+          </p:cNvPr>
+          <p:cNvSpPr txBox="1"/>
+          <p:nvPr/>
+        </p:nvSpPr>
+        <p:spPr>
+          <a:xfrm>
+            <a:off x="601591" y="2029619"/>
+            <a:ext cx="173736" cy="369332"/>
+          </a:xfrm>
+          <a:prstGeom prst="rect">
+            <a:avLst/>
+          </a:prstGeom>
+          <a:noFill/>
+        </p:spPr>
+        <p:txBody>
+          <a:bodyPr wrap="square" rtlCol="0">
+            <a:spAutoFit/>
+          </a:bodyPr>
+          <a:lstStyle/>
+          <a:p>
+            <a:r>
+              <a:rPr lang="en-US" dirty="0"/>
+              <a:t>&lt;</a:t>
+            </a:r>
+          </a:p>
+        </p:txBody>
+      </p:sp>
+      <p:sp>
+        <p:nvSpPr>
+          <p:cNvPr id="8" name="Textfeld 7">
+            <a:extLst>
+              <a:ext uri="{FF2B5EF4-FFF2-40B4-BE49-F238E27FC236}">
+                <a16:creationId xmlns:a16="http://schemas.microsoft.com/office/drawing/2014/main" id="{4A8CA998-EF46-8845-A16C-0AB9F6B4A886}"/>
+              </a:ext>
+            </a:extLst>
+          </p:cNvPr>
+          <p:cNvSpPr txBox="1"/>
+          <p:nvPr/>
+        </p:nvSpPr>
+        <p:spPr>
+          <a:xfrm>
+            <a:off x="601590" y="2850721"/>
+            <a:ext cx="2359325" cy="846386"/>
+          </a:xfrm>
+          <a:prstGeom prst="rect">
+            <a:avLst/>
+          </a:prstGeom>
+          <a:noFill/>
+          <a:ln>
+            <a:solidFill>
+              <a:schemeClr val="accent1">
+                <a:shade val="50000"/>
+              </a:schemeClr>
+            </a:solidFill>
+          </a:ln>
+        </p:spPr>
+        <p:txBody>
+          <a:bodyPr wrap="square" rtlCol="0">
+            <a:spAutoFit/>
+          </a:bodyPr>
+          <a:lstStyle/>
+          <a:p>
+            <a:pPr algn="ctr"/>
+            <a:r>
+              <a:rPr lang="en-US" sz="1000" dirty="0"/>
+              <a:t>Sunday, 29.11.2020 00:00</a:t>
+            </a:r>
+          </a:p>
+          <a:p>
+            <a:pPr algn="ctr"/>
+            <a:endParaRPr lang="en-US" sz="400" dirty="0"/>
+          </a:p>
+          <a:p>
+            <a:pPr algn="r"/>
+            <a:r>
+              <a:rPr lang="en-US" sz="800" dirty="0"/>
+              <a:t>total               per 100,000</a:t>
+            </a:r>
+          </a:p>
+          <a:p>
+            <a:r>
+              <a:rPr lang="en-US" sz="900" dirty="0"/>
+              <a:t>Cases                         1,042,700                  1,250.2</a:t>
+            </a:r>
+          </a:p>
+          <a:p>
+            <a:r>
+              <a:rPr lang="en-US" sz="900" dirty="0"/>
+              <a:t>Deaths		     20,000                     160.6</a:t>
+            </a:r>
+          </a:p>
+          <a:p>
+            <a:r>
+              <a:rPr lang="en-US" sz="900" dirty="0"/>
+              <a:t>Cases last 7 days             1,500                     150.0</a:t>
+            </a:r>
+          </a:p>
+        </p:txBody>
+      </p:sp>
+      <p:sp>
+        <p:nvSpPr>
+          <p:cNvPr id="9" name="Textfeld 8">
+            <a:extLst>
+              <a:ext uri="{FF2B5EF4-FFF2-40B4-BE49-F238E27FC236}">
+                <a16:creationId xmlns:a16="http://schemas.microsoft.com/office/drawing/2014/main" id="{952B5622-69F6-2145-86BA-249A46B12932}"/>
+              </a:ext>
+            </a:extLst>
+          </p:cNvPr>
+          <p:cNvSpPr txBox="1"/>
+          <p:nvPr/>
+        </p:nvSpPr>
+        <p:spPr>
+          <a:xfrm>
+            <a:off x="601589" y="3697107"/>
+            <a:ext cx="2359325" cy="846386"/>
+          </a:xfrm>
+          <a:prstGeom prst="rect">
+            <a:avLst/>
+          </a:prstGeom>
+          <a:noFill/>
+          <a:ln>
+            <a:solidFill>
+              <a:schemeClr val="accent1">
+                <a:shade val="50000"/>
+              </a:schemeClr>
+            </a:solidFill>
+          </a:ln>
+        </p:spPr>
+        <p:txBody>
+          <a:bodyPr wrap="square" rtlCol="0">
+            <a:spAutoFit/>
+          </a:bodyPr>
+          <a:lstStyle/>
+          <a:p>
+            <a:pPr algn="ctr"/>
+            <a:r>
+              <a:rPr lang="en-US" sz="1000" dirty="0"/>
+              <a:t>Changes: Sa 28.11.20 -&gt; So 29.11.20</a:t>
+            </a:r>
+          </a:p>
+          <a:p>
+            <a:pPr algn="r"/>
+            <a:endParaRPr lang="en-US" sz="400" dirty="0"/>
+          </a:p>
+          <a:p>
+            <a:pPr algn="r"/>
+            <a:r>
+              <a:rPr lang="en-US" sz="800" dirty="0"/>
+              <a:t>total                   per 100,000</a:t>
+            </a:r>
+          </a:p>
+          <a:p>
+            <a:r>
+              <a:rPr lang="en-US" sz="900" dirty="0"/>
+              <a:t>Cases                         +14,611                       +176.9</a:t>
+            </a:r>
+          </a:p>
+          <a:p>
+            <a:r>
+              <a:rPr lang="en-US" sz="900" dirty="0"/>
+              <a:t>Deaths		     +500                           +0.5</a:t>
+            </a:r>
+          </a:p>
+          <a:p>
+            <a:r>
+              <a:rPr lang="en-US" sz="900" dirty="0"/>
+              <a:t>Cases last 7 days             +50                            -0.3</a:t>
+            </a:r>
+          </a:p>
+        </p:txBody>
+      </p:sp>
+      <p:sp>
+        <p:nvSpPr>
+          <p:cNvPr id="10" name="Textfeld 9">
+            <a:extLst>
+              <a:ext uri="{FF2B5EF4-FFF2-40B4-BE49-F238E27FC236}">
+                <a16:creationId xmlns:a16="http://schemas.microsoft.com/office/drawing/2014/main" id="{00978CA3-4C87-D945-A71A-36BC4E12F06A}"/>
+              </a:ext>
+            </a:extLst>
+          </p:cNvPr>
+          <p:cNvSpPr txBox="1"/>
+          <p:nvPr/>
+        </p:nvSpPr>
+        <p:spPr>
+          <a:xfrm>
+            <a:off x="601589" y="4543493"/>
+            <a:ext cx="2359325" cy="846386"/>
+          </a:xfrm>
+          <a:prstGeom prst="rect">
+            <a:avLst/>
+          </a:prstGeom>
+          <a:noFill/>
+          <a:ln>
+            <a:solidFill>
+              <a:schemeClr val="accent1">
+                <a:shade val="50000"/>
+              </a:schemeClr>
+            </a:solidFill>
+          </a:ln>
+        </p:spPr>
+        <p:txBody>
+          <a:bodyPr wrap="square" rtlCol="0">
+            <a:spAutoFit/>
+          </a:bodyPr>
+          <a:lstStyle/>
+          <a:p>
+            <a:pPr algn="ctr"/>
+            <a:r>
+              <a:rPr lang="en-US" sz="1000" dirty="0"/>
+              <a:t>Saturday, 28.11.2020 00:00</a:t>
+            </a:r>
+          </a:p>
+          <a:p>
+            <a:pPr algn="ctr"/>
+            <a:endParaRPr lang="en-US" sz="400" dirty="0"/>
+          </a:p>
+          <a:p>
+            <a:pPr algn="r"/>
+            <a:r>
+              <a:rPr lang="en-US" sz="800" dirty="0"/>
+              <a:t>total               per 100,000</a:t>
+            </a:r>
+          </a:p>
+          <a:p>
+            <a:r>
+              <a:rPr lang="en-US" sz="900" dirty="0"/>
+              <a:t>Cases                         1,020,700                  1,250.2</a:t>
+            </a:r>
+          </a:p>
+          <a:p>
+            <a:r>
+              <a:rPr lang="en-US" sz="900" dirty="0"/>
+              <a:t>Deaths		     19,000                     160.6</a:t>
+            </a:r>
+          </a:p>
+          <a:p>
+            <a:r>
+              <a:rPr lang="en-US" sz="900" dirty="0"/>
+              <a:t>Cases last 7 days             1,500                     150.0</a:t>
+            </a:r>
+          </a:p>
+        </p:txBody>
+      </p:sp>
+      <p:sp>
+        <p:nvSpPr>
+          <p:cNvPr id="11" name="Textfeld 10">
+            <a:extLst>
+              <a:ext uri="{FF2B5EF4-FFF2-40B4-BE49-F238E27FC236}">
+                <a16:creationId xmlns:a16="http://schemas.microsoft.com/office/drawing/2014/main" id="{B5168B12-2105-D544-9FBC-61E535A43081}"/>
+              </a:ext>
+            </a:extLst>
+          </p:cNvPr>
+          <p:cNvSpPr txBox="1"/>
+          <p:nvPr/>
+        </p:nvSpPr>
+        <p:spPr>
+          <a:xfrm>
+            <a:off x="601589" y="2480266"/>
+            <a:ext cx="2359325" cy="369332"/>
+          </a:xfrm>
+          <a:prstGeom prst="rect">
+            <a:avLst/>
+          </a:prstGeom>
+          <a:noFill/>
+          <a:ln>
+            <a:solidFill>
+              <a:schemeClr val="accent1">
+                <a:shade val="50000"/>
+              </a:schemeClr>
+            </a:solidFill>
+          </a:ln>
+        </p:spPr>
+        <p:txBody>
+          <a:bodyPr wrap="square" rtlCol="0">
+            <a:spAutoFit/>
+          </a:bodyPr>
+          <a:lstStyle/>
+          <a:p>
+            <a:pPr algn="ctr"/>
+            <a:r>
+              <a:rPr lang="en-US" sz="900" dirty="0"/>
+              <a:t>Country</a:t>
+            </a:r>
+          </a:p>
+          <a:p>
+            <a:pPr algn="ctr"/>
+            <a:r>
+              <a:rPr lang="en-US" sz="900" dirty="0"/>
+              <a:t>Inhabitants:                                           83,400,000</a:t>
+            </a:r>
+          </a:p>
+        </p:txBody>
+      </p:sp>
+      <p:sp>
+        <p:nvSpPr>
+          <p:cNvPr id="15" name="Rechteck 14">
+            <a:extLst>
+              <a:ext uri="{FF2B5EF4-FFF2-40B4-BE49-F238E27FC236}">
+                <a16:creationId xmlns:a16="http://schemas.microsoft.com/office/drawing/2014/main" id="{B164EDD3-E9CE-A446-9066-7C4BF3B56A17}"/>
+              </a:ext>
+            </a:extLst>
+          </p:cNvPr>
+          <p:cNvSpPr/>
+          <p:nvPr/>
+        </p:nvSpPr>
+        <p:spPr>
+          <a:xfrm>
+            <a:off x="3889077" y="1948300"/>
+            <a:ext cx="2359325" cy="3986842"/>
+          </a:xfrm>
+          <a:prstGeom prst="rect">
+            <a:avLst/>
+          </a:prstGeom>
+          <a:noFill/>
+          <a:ln w="12700"/>
+        </p:spPr>
+        <p:style>
+          <a:lnRef idx="2">
+            <a:schemeClr val="accent1">
+              <a:shade val="50000"/>
+            </a:schemeClr>
+          </a:lnRef>
+          <a:fillRef idx="1">
+            <a:schemeClr val="accent1"/>
+          </a:fillRef>
+          <a:effectRef idx="0">
+            <a:schemeClr val="accent1"/>
+          </a:effectRef>
+          <a:fontRef idx="minor">
+            <a:schemeClr val="lt1"/>
+          </a:fontRef>
+        </p:style>
+        <p:txBody>
+          <a:bodyPr rtlCol="0" anchor="ctr"/>
+          <a:lstStyle/>
+          <a:p>
+            <a:pPr algn="ctr"/>
+            <a:endParaRPr lang="en-US"/>
+          </a:p>
+        </p:txBody>
+      </p:sp>
+      <p:sp>
+        <p:nvSpPr>
+          <p:cNvPr id="16" name="Rechteck 15">
+            <a:extLst>
+              <a:ext uri="{FF2B5EF4-FFF2-40B4-BE49-F238E27FC236}">
+                <a16:creationId xmlns:a16="http://schemas.microsoft.com/office/drawing/2014/main" id="{D84EF9BC-3A58-BD45-8532-FF147965FE42}"/>
+              </a:ext>
+            </a:extLst>
+          </p:cNvPr>
+          <p:cNvSpPr/>
+          <p:nvPr/>
+        </p:nvSpPr>
+        <p:spPr>
+          <a:xfrm>
+            <a:off x="3889077" y="1948300"/>
+            <a:ext cx="2359325" cy="531962"/>
+          </a:xfrm>
+          <a:prstGeom prst="rect">
+            <a:avLst/>
+          </a:prstGeom>
+          <a:solidFill>
+            <a:schemeClr val="bg1">
+              <a:lumMod val="85000"/>
+            </a:schemeClr>
+          </a:solidFill>
+        </p:spPr>
+        <p:style>
+          <a:lnRef idx="2">
+            <a:schemeClr val="accent1">
+              <a:shade val="50000"/>
+            </a:schemeClr>
+          </a:lnRef>
+          <a:fillRef idx="1">
+            <a:schemeClr val="accent1"/>
+          </a:fillRef>
+          <a:effectRef idx="0">
+            <a:schemeClr val="accent1"/>
+          </a:effectRef>
+          <a:fontRef idx="minor">
+            <a:schemeClr val="lt1"/>
+          </a:fontRef>
+        </p:style>
+        <p:txBody>
+          <a:bodyPr rtlCol="0" anchor="ctr"/>
+          <a:lstStyle/>
+          <a:p>
+            <a:pPr algn="ctr"/>
+            <a:r>
+              <a:rPr lang="en-US" dirty="0">
+                <a:solidFill>
+                  <a:schemeClr val="tx1"/>
+                </a:solidFill>
+              </a:rPr>
+              <a:t>&lt; title &gt;</a:t>
+            </a:r>
+          </a:p>
+        </p:txBody>
+      </p:sp>
+      <p:sp>
+        <p:nvSpPr>
+          <p:cNvPr id="17" name="Textfeld 16">
+            <a:extLst>
+              <a:ext uri="{FF2B5EF4-FFF2-40B4-BE49-F238E27FC236}">
+                <a16:creationId xmlns:a16="http://schemas.microsoft.com/office/drawing/2014/main" id="{9E478D9E-1CE0-4E41-99E5-DE24F3A76FDA}"/>
+              </a:ext>
+            </a:extLst>
+          </p:cNvPr>
+          <p:cNvSpPr txBox="1"/>
+          <p:nvPr/>
+        </p:nvSpPr>
+        <p:spPr>
+          <a:xfrm>
+            <a:off x="3889077" y="2029615"/>
+            <a:ext cx="173736" cy="369332"/>
+          </a:xfrm>
+          <a:prstGeom prst="rect">
+            <a:avLst/>
+          </a:prstGeom>
+          <a:noFill/>
+        </p:spPr>
+        <p:txBody>
+          <a:bodyPr wrap="square" rtlCol="0">
+            <a:spAutoFit/>
+          </a:bodyPr>
+          <a:lstStyle/>
+          <a:p>
+            <a:r>
+              <a:rPr lang="en-US" dirty="0"/>
+              <a:t>&lt;</a:t>
+            </a:r>
+          </a:p>
+        </p:txBody>
+      </p:sp>
+      <p:sp>
+        <p:nvSpPr>
+          <p:cNvPr id="18" name="Textfeld 17">
+            <a:extLst>
+              <a:ext uri="{FF2B5EF4-FFF2-40B4-BE49-F238E27FC236}">
+                <a16:creationId xmlns:a16="http://schemas.microsoft.com/office/drawing/2014/main" id="{2F8A82BA-705C-DB48-A8F8-F4AC4468F964}"/>
+              </a:ext>
+            </a:extLst>
+          </p:cNvPr>
+          <p:cNvSpPr txBox="1"/>
+          <p:nvPr/>
+        </p:nvSpPr>
+        <p:spPr>
+          <a:xfrm>
+            <a:off x="3889073" y="2849594"/>
+            <a:ext cx="2359325" cy="830997"/>
+          </a:xfrm>
+          <a:prstGeom prst="rect">
+            <a:avLst/>
+          </a:prstGeom>
+          <a:noFill/>
+          <a:ln>
+            <a:solidFill>
+              <a:schemeClr val="accent1">
+                <a:shade val="50000"/>
+              </a:schemeClr>
+            </a:solidFill>
+          </a:ln>
+        </p:spPr>
+        <p:txBody>
+          <a:bodyPr wrap="square" rtlCol="0">
+            <a:spAutoFit/>
+          </a:bodyPr>
+          <a:lstStyle/>
+          <a:p>
+            <a:pPr algn="ctr"/>
+            <a:r>
+              <a:rPr lang="en-US" sz="1000" dirty="0"/>
+              <a:t>&lt; </a:t>
+            </a:r>
+            <a:r>
+              <a:rPr lang="en-US" sz="1000" dirty="0" err="1"/>
+              <a:t>labelDate</a:t>
+            </a:r>
+            <a:r>
+              <a:rPr lang="en-US" sz="1000" dirty="0"/>
+              <a:t> &gt;</a:t>
+            </a:r>
+          </a:p>
+          <a:p>
+            <a:pPr algn="ctr"/>
+            <a:endParaRPr lang="en-US" sz="400" dirty="0"/>
+          </a:p>
+          <a:p>
+            <a:pPr algn="r"/>
+            <a:r>
+              <a:rPr lang="en-US" sz="800" dirty="0"/>
+              <a:t>&lt; </a:t>
+            </a:r>
+            <a:r>
+              <a:rPr lang="en-US" sz="800" dirty="0" err="1"/>
+              <a:t>labelTotal</a:t>
+            </a:r>
+            <a:r>
+              <a:rPr lang="en-US" sz="800" dirty="0"/>
+              <a:t> &gt;      &lt; labelPer100k &gt;</a:t>
+            </a:r>
+          </a:p>
+          <a:p>
+            <a:r>
+              <a:rPr lang="en-US" sz="900" dirty="0"/>
+              <a:t>&lt; </a:t>
+            </a:r>
+            <a:r>
+              <a:rPr lang="en-US" sz="900" dirty="0" err="1"/>
+              <a:t>labelCases</a:t>
+            </a:r>
+            <a:r>
+              <a:rPr lang="en-US" sz="900" dirty="0"/>
+              <a:t> &gt;   &lt; </a:t>
+            </a:r>
+            <a:r>
+              <a:rPr lang="en-US" sz="900" dirty="0" err="1"/>
+              <a:t>casesTotal</a:t>
+            </a:r>
+            <a:r>
+              <a:rPr lang="en-US" sz="900" dirty="0"/>
+              <a:t> &gt;      &lt; cases100k &gt;</a:t>
+            </a:r>
+          </a:p>
+          <a:p>
+            <a:r>
+              <a:rPr lang="en-US" sz="900" dirty="0"/>
+              <a:t>&lt; </a:t>
+            </a:r>
+            <a:r>
+              <a:rPr lang="en-US" sz="900" dirty="0" err="1"/>
+              <a:t>labelDeaths</a:t>
+            </a:r>
+            <a:r>
+              <a:rPr lang="en-US" sz="900" dirty="0"/>
+              <a:t> &gt; &lt; </a:t>
+            </a:r>
+            <a:r>
+              <a:rPr lang="en-US" sz="900" dirty="0" err="1"/>
+              <a:t>deathsTotal</a:t>
+            </a:r>
+            <a:r>
+              <a:rPr lang="en-US" sz="900" dirty="0"/>
+              <a:t> &gt;&lt; deaths100k &gt;</a:t>
+            </a:r>
+          </a:p>
+          <a:p>
+            <a:r>
+              <a:rPr lang="en-US" sz="800" dirty="0"/>
+              <a:t>&lt;</a:t>
+            </a:r>
+            <a:r>
+              <a:rPr lang="en-US" sz="800" dirty="0" err="1"/>
+              <a:t>labelIncidents</a:t>
+            </a:r>
+            <a:r>
+              <a:rPr lang="en-US" sz="800" dirty="0"/>
+              <a:t> &gt;&lt; </a:t>
+            </a:r>
+            <a:r>
+              <a:rPr lang="en-US" sz="800" dirty="0" err="1"/>
+              <a:t>incidentsTotal</a:t>
+            </a:r>
+            <a:r>
+              <a:rPr lang="en-US" sz="800" dirty="0"/>
+              <a:t> &gt;&lt; incidents100k &gt;</a:t>
+            </a:r>
+          </a:p>
+        </p:txBody>
+      </p:sp>
+      <p:sp>
+        <p:nvSpPr>
+          <p:cNvPr id="21" name="Textfeld 20">
+            <a:extLst>
+              <a:ext uri="{FF2B5EF4-FFF2-40B4-BE49-F238E27FC236}">
+                <a16:creationId xmlns:a16="http://schemas.microsoft.com/office/drawing/2014/main" id="{035DE1BA-846F-2440-815C-92D7EE39EDEF}"/>
+              </a:ext>
+            </a:extLst>
+          </p:cNvPr>
+          <p:cNvSpPr txBox="1"/>
+          <p:nvPr/>
+        </p:nvSpPr>
+        <p:spPr>
+          <a:xfrm>
+            <a:off x="3889075" y="2480262"/>
+            <a:ext cx="2359325" cy="369332"/>
+          </a:xfrm>
+          <a:prstGeom prst="rect">
+            <a:avLst/>
+          </a:prstGeom>
+          <a:noFill/>
+          <a:ln>
+            <a:solidFill>
+              <a:schemeClr val="accent1">
+                <a:shade val="50000"/>
+              </a:schemeClr>
+            </a:solidFill>
+          </a:ln>
+        </p:spPr>
+        <p:txBody>
+          <a:bodyPr wrap="square" rtlCol="0">
+            <a:spAutoFit/>
+          </a:bodyPr>
+          <a:lstStyle/>
+          <a:p>
+            <a:pPr algn="ctr"/>
+            <a:r>
+              <a:rPr lang="en-US" sz="900" dirty="0"/>
+              <a:t>&lt; </a:t>
+            </a:r>
+            <a:r>
+              <a:rPr lang="en-US" sz="900" dirty="0" err="1"/>
+              <a:t>labelKindOf</a:t>
+            </a:r>
+            <a:r>
+              <a:rPr lang="en-US" sz="900" dirty="0"/>
+              <a:t> &gt;</a:t>
+            </a:r>
+          </a:p>
+          <a:p>
+            <a:pPr algn="ctr"/>
+            <a:r>
+              <a:rPr lang="en-US" sz="900" dirty="0"/>
+              <a:t>&lt; </a:t>
+            </a:r>
+            <a:r>
+              <a:rPr lang="en-US" sz="900" dirty="0" err="1"/>
+              <a:t>labelInhabitants</a:t>
+            </a:r>
+            <a:r>
+              <a:rPr lang="en-US" sz="900" dirty="0"/>
+              <a:t> &gt;              &lt; </a:t>
+            </a:r>
+            <a:r>
+              <a:rPr lang="en-US" sz="900" dirty="0" err="1"/>
+              <a:t>valueInhabitans</a:t>
+            </a:r>
+            <a:r>
+              <a:rPr lang="en-US" sz="900" dirty="0"/>
+              <a:t> &gt;</a:t>
+            </a:r>
+          </a:p>
+        </p:txBody>
+      </p:sp>
+      <p:sp>
+        <p:nvSpPr>
+          <p:cNvPr id="22" name="Textfeld 21">
+            <a:extLst>
+              <a:ext uri="{FF2B5EF4-FFF2-40B4-BE49-F238E27FC236}">
+                <a16:creationId xmlns:a16="http://schemas.microsoft.com/office/drawing/2014/main" id="{A647B424-CB71-564D-B6C8-DF826CED83CA}"/>
+              </a:ext>
+            </a:extLst>
+          </p:cNvPr>
+          <p:cNvSpPr txBox="1"/>
+          <p:nvPr/>
+        </p:nvSpPr>
+        <p:spPr>
+          <a:xfrm>
+            <a:off x="601589" y="758886"/>
+            <a:ext cx="3259675" cy="369332"/>
+          </a:xfrm>
+          <a:prstGeom prst="rect">
+            <a:avLst/>
+          </a:prstGeom>
+          <a:noFill/>
+        </p:spPr>
+        <p:txBody>
+          <a:bodyPr wrap="none" rtlCol="0">
+            <a:spAutoFit/>
+          </a:bodyPr>
+          <a:lstStyle/>
+          <a:p>
+            <a:r>
+              <a:rPr lang="en-US" dirty="0"/>
+              <a:t>Show Details of RKI Data item V2</a:t>
+            </a:r>
+          </a:p>
+        </p:txBody>
+      </p:sp>
+    </p:spTree>
+    <p:extLst>
+      <p:ext uri="{BB962C8B-B14F-4D97-AF65-F5344CB8AC3E}">
+        <p14:creationId xmlns:p14="http://schemas.microsoft.com/office/powerpoint/2010/main" val="838869849"/>
       </p:ext>
     </p:extLst>
   </p:cSld>

</xml_diff>

<commit_message>
V0.1 - updated powerpoints
</commit_message>
<xml_diff>
--- a/PowerPoints/ScreenLayouts.pptx
+++ b/PowerPoints/ScreenLayouts.pptx
@@ -5,8 +5,12 @@
     <p:sldMasterId id="2147483660" r:id="rId1"/>
   </p:sldMasterIdLst>
   <p:sldIdLst>
-    <p:sldId id="256" r:id="rId2"/>
-    <p:sldId id="257" r:id="rId3"/>
+    <p:sldId id="259" r:id="rId2"/>
+    <p:sldId id="260" r:id="rId3"/>
+    <p:sldId id="261" r:id="rId4"/>
+    <p:sldId id="256" r:id="rId5"/>
+    <p:sldId id="258" r:id="rId6"/>
+    <p:sldId id="257" r:id="rId7"/>
   </p:sldIdLst>
   <p:sldSz cx="6858000" cy="9906000" type="A4"/>
   <p:notesSz cx="6858000" cy="9144000"/>
@@ -2985,6 +2989,1100 @@
       </p:grpSpPr>
       <p:sp>
         <p:nvSpPr>
+          <p:cNvPr id="2" name="Textfeld 1">
+            <a:extLst>
+              <a:ext uri="{FF2B5EF4-FFF2-40B4-BE49-F238E27FC236}">
+                <a16:creationId xmlns:a16="http://schemas.microsoft.com/office/drawing/2014/main" id="{FB7A018A-00AE-BE43-9781-BA9718594090}"/>
+              </a:ext>
+            </a:extLst>
+          </p:cNvPr>
+          <p:cNvSpPr txBox="1"/>
+          <p:nvPr/>
+        </p:nvSpPr>
+        <p:spPr>
+          <a:xfrm>
+            <a:off x="495344" y="1005840"/>
+            <a:ext cx="2650084" cy="6093976"/>
+          </a:xfrm>
+          <a:prstGeom prst="rect">
+            <a:avLst/>
+          </a:prstGeom>
+          <a:noFill/>
+        </p:spPr>
+        <p:txBody>
+          <a:bodyPr wrap="none" rtlCol="0">
+            <a:spAutoFit/>
+          </a:bodyPr>
+          <a:lstStyle/>
+          <a:p>
+            <a:r>
+              <a:rPr lang="de-DE" sz="1000" b="1" dirty="0" err="1"/>
+              <a:t>CoBaT</a:t>
+            </a:r>
+            <a:endParaRPr lang="de-DE" sz="1000" dirty="0"/>
+          </a:p>
+          <a:p>
+            <a:br>
+              <a:rPr lang="de-DE" sz="1000" dirty="0"/>
+            </a:br>
+            <a:endParaRPr lang="de-DE" sz="1000" dirty="0"/>
+          </a:p>
+          <a:p>
+            <a:r>
+              <a:rPr lang="de-DE" sz="1000" dirty="0"/>
+              <a:t>Corona Bavaria Traffic light</a:t>
+            </a:r>
+          </a:p>
+          <a:p>
+            <a:br>
+              <a:rPr lang="de-DE" sz="1000" dirty="0"/>
+            </a:br>
+            <a:endParaRPr lang="de-DE" sz="1000" dirty="0"/>
+          </a:p>
+          <a:p>
+            <a:r>
+              <a:rPr lang="de-DE" sz="1000" dirty="0"/>
+              <a:t>Logo </a:t>
+            </a:r>
+            <a:r>
+              <a:rPr lang="de-DE" sz="1000" dirty="0" err="1"/>
+              <a:t>Pictogramme</a:t>
+            </a:r>
+            <a:r>
+              <a:rPr lang="de-DE" sz="1000" dirty="0"/>
+              <a:t> entwerfen (siehe RKI Grafik)</a:t>
+            </a:r>
+          </a:p>
+          <a:p>
+            <a:br>
+              <a:rPr lang="de-DE" sz="1000" dirty="0"/>
+            </a:br>
+            <a:endParaRPr lang="de-DE" sz="1000" dirty="0"/>
+          </a:p>
+          <a:p>
+            <a:r>
+              <a:rPr lang="de-DE" sz="1000" b="1" dirty="0"/>
+              <a:t>Global Storage</a:t>
+            </a:r>
+            <a:endParaRPr lang="de-DE" sz="1000" dirty="0"/>
+          </a:p>
+          <a:p>
+            <a:br>
+              <a:rPr lang="de-DE" sz="1000" dirty="0"/>
+            </a:br>
+            <a:endParaRPr lang="de-DE" sz="1000" dirty="0"/>
+          </a:p>
+          <a:p>
+            <a:r>
+              <a:rPr lang="de-DE" sz="1000" dirty="0"/>
+              <a:t>Werte</a:t>
+            </a:r>
+          </a:p>
+          <a:p>
+            <a:pPr lvl="1"/>
+            <a:r>
+              <a:rPr lang="de-DE" sz="1000" dirty="0"/>
+              <a:t>aktuelle 7 Tage Inzidenz </a:t>
+            </a:r>
+          </a:p>
+          <a:p>
+            <a:pPr lvl="2"/>
+            <a:r>
+              <a:rPr lang="de-DE" sz="1000" dirty="0"/>
+              <a:t>als Tabelle</a:t>
+            </a:r>
+          </a:p>
+          <a:p>
+            <a:pPr lvl="2"/>
+            <a:r>
+              <a:rPr lang="de-DE" sz="1000" dirty="0"/>
+              <a:t>Zeitpunkt der Aktualisierung</a:t>
+            </a:r>
+          </a:p>
+          <a:p>
+            <a:pPr lvl="1"/>
+            <a:r>
+              <a:rPr lang="de-DE" sz="1000" dirty="0"/>
+              <a:t>aktueller Ort</a:t>
+            </a:r>
+          </a:p>
+          <a:p>
+            <a:pPr lvl="2"/>
+            <a:r>
+              <a:rPr lang="de-DE" sz="1000" dirty="0"/>
+              <a:t>Stadt</a:t>
+            </a:r>
+          </a:p>
+          <a:p>
+            <a:pPr lvl="2"/>
+            <a:r>
+              <a:rPr lang="de-DE" sz="1000" dirty="0"/>
+              <a:t>Landkreis</a:t>
+            </a:r>
+          </a:p>
+          <a:p>
+            <a:pPr lvl="2"/>
+            <a:r>
+              <a:rPr lang="de-DE" sz="1000" dirty="0"/>
+              <a:t>Regierungsbezirk</a:t>
+            </a:r>
+          </a:p>
+          <a:p>
+            <a:pPr lvl="2"/>
+            <a:r>
+              <a:rPr lang="de-DE" sz="1000" dirty="0"/>
+              <a:t>Staat</a:t>
+            </a:r>
+          </a:p>
+          <a:p>
+            <a:pPr lvl="2"/>
+            <a:r>
+              <a:rPr lang="de-DE" sz="1000" dirty="0"/>
+              <a:t>Land</a:t>
+            </a:r>
+          </a:p>
+          <a:p>
+            <a:pPr lvl="2"/>
+            <a:r>
+              <a:rPr lang="de-DE" sz="1000" dirty="0"/>
+              <a:t>Zeitpunkt der Aktualisierung</a:t>
+            </a:r>
+          </a:p>
+          <a:p>
+            <a:pPr lvl="1"/>
+            <a:r>
+              <a:rPr lang="de-DE" sz="1000" dirty="0"/>
+              <a:t>Letzter Ort in Bayern</a:t>
+            </a:r>
+          </a:p>
+          <a:p>
+            <a:pPr lvl="2"/>
+            <a:r>
+              <a:rPr lang="de-DE" sz="1000" dirty="0"/>
+              <a:t>Datenfelder wie aktueller Ort</a:t>
+            </a:r>
+          </a:p>
+          <a:p>
+            <a:pPr lvl="1"/>
+            <a:r>
+              <a:rPr lang="de-DE" sz="1000" dirty="0"/>
+              <a:t>letzter manuell ausgewählter Ort</a:t>
+            </a:r>
+          </a:p>
+          <a:p>
+            <a:pPr lvl="2"/>
+            <a:r>
+              <a:rPr lang="de-DE" sz="1000" dirty="0"/>
+              <a:t>Datenfelder wie aktueller Ort</a:t>
+            </a:r>
+          </a:p>
+          <a:p>
+            <a:pPr lvl="1"/>
+            <a:r>
+              <a:rPr lang="de-DE" sz="1000" dirty="0"/>
+              <a:t>aktueller Status Lokationsservice</a:t>
+            </a:r>
+          </a:p>
+          <a:p>
+            <a:pPr lvl="2"/>
+            <a:r>
+              <a:rPr lang="de-DE" sz="1000" dirty="0"/>
+              <a:t>nicht autorisiert</a:t>
+            </a:r>
+          </a:p>
+          <a:p>
+            <a:pPr lvl="2"/>
+            <a:r>
+              <a:rPr lang="de-DE" sz="1000" dirty="0"/>
+              <a:t>keine Lokationsdaten</a:t>
+            </a:r>
+          </a:p>
+          <a:p>
+            <a:pPr lvl="2"/>
+            <a:r>
+              <a:rPr lang="de-DE" sz="1000" dirty="0"/>
+              <a:t>alles OK</a:t>
+            </a:r>
+          </a:p>
+          <a:p>
+            <a:pPr lvl="1"/>
+            <a:r>
+              <a:rPr lang="de-DE" sz="1000" dirty="0"/>
+              <a:t>aktueller Status Inzidenz</a:t>
+            </a:r>
+          </a:p>
+          <a:p>
+            <a:pPr lvl="2"/>
+            <a:r>
+              <a:rPr lang="de-DE" sz="1000" dirty="0"/>
+              <a:t>keine Verbindung</a:t>
+            </a:r>
+          </a:p>
+          <a:p>
+            <a:pPr lvl="2"/>
+            <a:r>
+              <a:rPr lang="de-DE" sz="1000" dirty="0"/>
+              <a:t>keine Daten</a:t>
+            </a:r>
+          </a:p>
+          <a:p>
+            <a:pPr lvl="2"/>
+            <a:r>
+              <a:rPr lang="de-DE" sz="1000" dirty="0"/>
+              <a:t>alles OK</a:t>
+            </a:r>
+          </a:p>
+          <a:p>
+            <a:r>
+              <a:rPr lang="de-DE" sz="1000" dirty="0"/>
+              <a:t>Permanent gespeichert</a:t>
+            </a:r>
+          </a:p>
+          <a:p>
+            <a:br>
+              <a:rPr lang="de-DE" sz="1000" dirty="0"/>
+            </a:br>
+            <a:endParaRPr lang="de-DE" sz="1000" dirty="0"/>
+          </a:p>
+          <a:p>
+            <a:endParaRPr lang="en-US" sz="1000" dirty="0"/>
+          </a:p>
+        </p:txBody>
+      </p:sp>
+      <p:sp>
+        <p:nvSpPr>
+          <p:cNvPr id="3" name="Textfeld 2">
+            <a:extLst>
+              <a:ext uri="{FF2B5EF4-FFF2-40B4-BE49-F238E27FC236}">
+                <a16:creationId xmlns:a16="http://schemas.microsoft.com/office/drawing/2014/main" id="{D4A3A4B1-BEFB-5642-A8D7-B18A95F0F10D}"/>
+              </a:ext>
+            </a:extLst>
+          </p:cNvPr>
+          <p:cNvSpPr txBox="1"/>
+          <p:nvPr/>
+        </p:nvSpPr>
+        <p:spPr>
+          <a:xfrm>
+            <a:off x="566928" y="493776"/>
+            <a:ext cx="1474443" cy="369332"/>
+          </a:xfrm>
+          <a:prstGeom prst="rect">
+            <a:avLst/>
+          </a:prstGeom>
+          <a:noFill/>
+        </p:spPr>
+        <p:txBody>
+          <a:bodyPr wrap="none" rtlCol="0">
+            <a:spAutoFit/>
+          </a:bodyPr>
+          <a:lstStyle/>
+          <a:p>
+            <a:r>
+              <a:rPr lang="en-US" dirty="0"/>
+              <a:t>First thoughts</a:t>
+            </a:r>
+          </a:p>
+        </p:txBody>
+      </p:sp>
+    </p:spTree>
+    <p:extLst>
+      <p:ext uri="{BB962C8B-B14F-4D97-AF65-F5344CB8AC3E}">
+        <p14:creationId xmlns:p14="http://schemas.microsoft.com/office/powerpoint/2010/main" val="970138690"/>
+      </p:ext>
+    </p:extLst>
+  </p:cSld>
+  <p:clrMapOvr>
+    <a:masterClrMapping/>
+  </p:clrMapOvr>
+</p:sld>
+</file>
+
+<file path=ppt/slides/slide2.xml><?xml version="1.0" encoding="utf-8"?>
+<p:sld xmlns:a="http://schemas.openxmlformats.org/drawingml/2006/main" xmlns:r="http://schemas.openxmlformats.org/officeDocument/2006/relationships" xmlns:p="http://schemas.openxmlformats.org/presentationml/2006/main">
+  <p:cSld>
+    <p:spTree>
+      <p:nvGrpSpPr>
+        <p:cNvPr id="1" name=""/>
+        <p:cNvGrpSpPr/>
+        <p:nvPr/>
+      </p:nvGrpSpPr>
+      <p:grpSpPr>
+        <a:xfrm>
+          <a:off x="0" y="0"/>
+          <a:ext cx="0" cy="0"/>
+          <a:chOff x="0" y="0"/>
+          <a:chExt cx="0" cy="0"/>
+        </a:xfrm>
+      </p:grpSpPr>
+      <p:sp>
+        <p:nvSpPr>
+          <p:cNvPr id="2" name="Textfeld 1">
+            <a:extLst>
+              <a:ext uri="{FF2B5EF4-FFF2-40B4-BE49-F238E27FC236}">
+                <a16:creationId xmlns:a16="http://schemas.microsoft.com/office/drawing/2014/main" id="{FB7A018A-00AE-BE43-9781-BA9718594090}"/>
+              </a:ext>
+            </a:extLst>
+          </p:cNvPr>
+          <p:cNvSpPr txBox="1"/>
+          <p:nvPr/>
+        </p:nvSpPr>
+        <p:spPr>
+          <a:xfrm>
+            <a:off x="495344" y="1005840"/>
+            <a:ext cx="3724096" cy="8710077"/>
+          </a:xfrm>
+          <a:prstGeom prst="rect">
+            <a:avLst/>
+          </a:prstGeom>
+          <a:noFill/>
+        </p:spPr>
+        <p:txBody>
+          <a:bodyPr wrap="none" rtlCol="0">
+            <a:spAutoFit/>
+          </a:bodyPr>
+          <a:lstStyle/>
+          <a:p>
+            <a:r>
+              <a:rPr lang="de-DE" sz="1000" b="1" dirty="0"/>
+              <a:t>UI</a:t>
+            </a:r>
+            <a:endParaRPr lang="de-DE" sz="1000" dirty="0"/>
+          </a:p>
+          <a:p>
+            <a:r>
+              <a:rPr lang="de-DE" sz="1000" dirty="0"/>
+              <a:t>Aktuelle Anzeige, </a:t>
+            </a:r>
+          </a:p>
+          <a:p>
+            <a:pPr lvl="1"/>
+            <a:r>
+              <a:rPr lang="de-DE" sz="1000" dirty="0"/>
+              <a:t>mit Zeitangabe, wann letzte Änderung </a:t>
+            </a:r>
+          </a:p>
+          <a:p>
+            <a:pPr lvl="2"/>
+            <a:r>
+              <a:rPr lang="de-DE" sz="1000" dirty="0"/>
+              <a:t>Tage / Stunden / Minuten / Sekunden, optimiert</a:t>
+            </a:r>
+          </a:p>
+          <a:p>
+            <a:pPr lvl="2"/>
+            <a:r>
+              <a:rPr lang="de-DE" sz="1000" dirty="0"/>
+              <a:t>Warnhinweis, wenn schon länger her</a:t>
+            </a:r>
+          </a:p>
+          <a:p>
+            <a:pPr lvl="1"/>
+            <a:r>
+              <a:rPr lang="de-DE" sz="1000" dirty="0"/>
+              <a:t>Aktuelle Werte</a:t>
+            </a:r>
+          </a:p>
+          <a:p>
+            <a:pPr lvl="2"/>
+            <a:r>
+              <a:rPr lang="de-DE" sz="1000" dirty="0"/>
+              <a:t>Lokation (Stadt und Landkreis)</a:t>
+            </a:r>
+          </a:p>
+          <a:p>
+            <a:pPr lvl="2"/>
+            <a:r>
+              <a:rPr lang="de-DE" sz="1000" dirty="0"/>
+              <a:t>Inzidenz</a:t>
+            </a:r>
+          </a:p>
+          <a:p>
+            <a:pPr lvl="1"/>
+            <a:r>
+              <a:rPr lang="de-DE" sz="1000" dirty="0"/>
+              <a:t>manuell oder </a:t>
+            </a:r>
+            <a:r>
+              <a:rPr lang="de-DE" sz="1000" dirty="0" err="1"/>
+              <a:t>automatik</a:t>
+            </a:r>
+            <a:endParaRPr lang="de-DE" sz="1000" dirty="0"/>
+          </a:p>
+          <a:p>
+            <a:pPr lvl="1"/>
+            <a:r>
+              <a:rPr lang="de-DE" sz="1000" dirty="0"/>
+              <a:t>mögliche Anzeigen</a:t>
+            </a:r>
+          </a:p>
+          <a:p>
+            <a:pPr lvl="2"/>
+            <a:r>
+              <a:rPr lang="de-DE" sz="1000" dirty="0"/>
+              <a:t>kein Status verfügbar (keine Daten, keine Historie)</a:t>
+            </a:r>
+          </a:p>
+          <a:p>
+            <a:pPr lvl="3"/>
+            <a:r>
+              <a:rPr lang="de-DE" sz="1000" dirty="0"/>
+              <a:t>weiß</a:t>
+            </a:r>
+          </a:p>
+          <a:p>
+            <a:pPr lvl="2"/>
+            <a:r>
+              <a:rPr lang="de-DE" sz="1000" dirty="0"/>
+              <a:t>nicht in Bayern, kein aktueller Ort</a:t>
+            </a:r>
+          </a:p>
+          <a:p>
+            <a:pPr lvl="3"/>
+            <a:r>
+              <a:rPr lang="de-DE" sz="1000" dirty="0"/>
+              <a:t>manuelle Auswahl Ort</a:t>
+            </a:r>
+          </a:p>
+          <a:p>
+            <a:pPr lvl="3"/>
+            <a:r>
+              <a:rPr lang="de-DE" sz="1000" dirty="0"/>
+              <a:t>letzter Ort wird angezeigt</a:t>
+            </a:r>
+          </a:p>
+          <a:p>
+            <a:pPr lvl="4"/>
+            <a:r>
+              <a:rPr lang="de-DE" sz="1000" dirty="0"/>
+              <a:t>Default: Regensburg</a:t>
+            </a:r>
+          </a:p>
+          <a:p>
+            <a:pPr lvl="2"/>
+            <a:r>
+              <a:rPr lang="de-DE" sz="1000" dirty="0"/>
+              <a:t>keine Fälle (Corona ist besiegt)</a:t>
+            </a:r>
+          </a:p>
+          <a:p>
+            <a:pPr lvl="3"/>
+            <a:r>
+              <a:rPr lang="de-DE" sz="1000" dirty="0"/>
+              <a:t>Bayrisch blau</a:t>
+            </a:r>
+          </a:p>
+          <a:p>
+            <a:pPr lvl="2"/>
+            <a:r>
+              <a:rPr lang="de-DE" sz="1000" dirty="0"/>
+              <a:t>grün</a:t>
+            </a:r>
+          </a:p>
+          <a:p>
+            <a:pPr lvl="2"/>
+            <a:r>
+              <a:rPr lang="de-DE" sz="1000" dirty="0"/>
+              <a:t>gelb</a:t>
+            </a:r>
+          </a:p>
+          <a:p>
+            <a:pPr lvl="2"/>
+            <a:r>
+              <a:rPr lang="de-DE" sz="1000" dirty="0"/>
+              <a:t>rot</a:t>
+            </a:r>
+          </a:p>
+          <a:p>
+            <a:pPr lvl="2"/>
+            <a:r>
+              <a:rPr lang="de-DE" sz="1000" dirty="0"/>
+              <a:t>schwarz</a:t>
+            </a:r>
+          </a:p>
+          <a:p>
+            <a:br>
+              <a:rPr lang="de-DE" sz="1000" dirty="0"/>
+            </a:br>
+            <a:endParaRPr lang="de-DE" sz="1000" dirty="0"/>
+          </a:p>
+          <a:p>
+            <a:r>
+              <a:rPr lang="de-DE" sz="1000" dirty="0"/>
+              <a:t>Fehlermeldungen als </a:t>
+            </a:r>
+            <a:r>
+              <a:rPr lang="de-DE" sz="1000" dirty="0" err="1"/>
+              <a:t>pop-up</a:t>
+            </a:r>
+            <a:endParaRPr lang="de-DE" sz="1000" dirty="0"/>
+          </a:p>
+          <a:p>
+            <a:br>
+              <a:rPr lang="de-DE" sz="1000" dirty="0"/>
+            </a:br>
+            <a:endParaRPr lang="de-DE" sz="1000" dirty="0"/>
+          </a:p>
+          <a:p>
+            <a:r>
+              <a:rPr lang="de-DE" sz="1000" dirty="0"/>
+              <a:t>Statusanzeige</a:t>
+            </a:r>
+          </a:p>
+          <a:p>
+            <a:pPr lvl="1"/>
+            <a:r>
+              <a:rPr lang="de-DE" sz="1000" dirty="0"/>
+              <a:t>als grün / rot Anzeige mit Pop-Up</a:t>
+            </a:r>
+          </a:p>
+          <a:p>
+            <a:pPr lvl="1"/>
+            <a:r>
+              <a:rPr lang="de-DE" sz="1000" dirty="0"/>
+              <a:t>Lokation</a:t>
+            </a:r>
+          </a:p>
+          <a:p>
+            <a:pPr lvl="2"/>
+            <a:r>
+              <a:rPr lang="de-DE" sz="1000" dirty="0"/>
+              <a:t>nicht autorisiert</a:t>
+            </a:r>
+          </a:p>
+          <a:p>
+            <a:pPr lvl="2"/>
+            <a:r>
+              <a:rPr lang="de-DE" sz="1000" dirty="0"/>
+              <a:t>Fehler Lokationsservice</a:t>
+            </a:r>
+          </a:p>
+          <a:p>
+            <a:pPr lvl="2"/>
+            <a:r>
+              <a:rPr lang="de-DE" sz="1000" dirty="0"/>
+              <a:t>alles OK</a:t>
+            </a:r>
+          </a:p>
+          <a:p>
+            <a:pPr lvl="1"/>
+            <a:r>
+              <a:rPr lang="de-DE" sz="1000" dirty="0"/>
+              <a:t>Inzidenz</a:t>
+            </a:r>
+          </a:p>
+          <a:p>
+            <a:pPr lvl="2"/>
+            <a:r>
+              <a:rPr lang="de-DE" sz="1000" dirty="0"/>
+              <a:t>keine Verbindung</a:t>
+            </a:r>
+          </a:p>
+          <a:p>
+            <a:pPr lvl="2"/>
+            <a:r>
+              <a:rPr lang="de-DE" sz="1000" dirty="0"/>
+              <a:t>keine Daten</a:t>
+            </a:r>
+          </a:p>
+          <a:p>
+            <a:pPr lvl="2"/>
+            <a:r>
+              <a:rPr lang="de-DE" sz="1000" dirty="0"/>
+              <a:t>alles OK</a:t>
+            </a:r>
+          </a:p>
+          <a:p>
+            <a:br>
+              <a:rPr lang="de-DE" sz="1000" dirty="0"/>
+            </a:br>
+            <a:endParaRPr lang="de-DE" sz="1000" dirty="0"/>
+          </a:p>
+          <a:p>
+            <a:r>
+              <a:rPr lang="de-DE" sz="1000" dirty="0"/>
+              <a:t>Refresh manuell, über Button</a:t>
+            </a:r>
+          </a:p>
+          <a:p>
+            <a:pPr lvl="1"/>
+            <a:r>
+              <a:rPr lang="de-DE" sz="1000" dirty="0"/>
+              <a:t>Signal: hole aktuelle Werte</a:t>
+            </a:r>
+          </a:p>
+          <a:p>
+            <a:br>
+              <a:rPr lang="de-DE" sz="1000" dirty="0"/>
+            </a:br>
+            <a:endParaRPr lang="de-DE" sz="1000" dirty="0"/>
+          </a:p>
+          <a:p>
+            <a:r>
+              <a:rPr lang="de-DE" sz="1000" dirty="0"/>
+              <a:t>Historie, über Button</a:t>
+            </a:r>
+          </a:p>
+          <a:p>
+            <a:pPr lvl="1"/>
+            <a:r>
+              <a:rPr lang="de-DE" sz="1000" dirty="0"/>
+              <a:t>ein Datensatz pro Zeitpunkt der Änderung</a:t>
+            </a:r>
+          </a:p>
+          <a:p>
+            <a:pPr lvl="2"/>
+            <a:r>
+              <a:rPr lang="de-DE" sz="1000" dirty="0"/>
+              <a:t>Zeitpunkt der </a:t>
+            </a:r>
+            <a:r>
+              <a:rPr lang="de-DE" sz="1000" dirty="0" err="1"/>
+              <a:t>aktualisierung</a:t>
+            </a:r>
+            <a:endParaRPr lang="de-DE" sz="1000" dirty="0"/>
+          </a:p>
+          <a:p>
+            <a:pPr lvl="2"/>
+            <a:r>
+              <a:rPr lang="de-DE" sz="1000" dirty="0"/>
+              <a:t>Aktueller Ort (Landkreis)</a:t>
+            </a:r>
+          </a:p>
+          <a:p>
+            <a:pPr lvl="2"/>
+            <a:r>
+              <a:rPr lang="de-DE" sz="1000" dirty="0"/>
+              <a:t>aktuelle 7 Tage Inzidenz</a:t>
+            </a:r>
+          </a:p>
+          <a:p>
+            <a:pPr lvl="1"/>
+            <a:r>
+              <a:rPr lang="de-DE" sz="1000" dirty="0"/>
+              <a:t>Eingefärbt nach Ampelstatus</a:t>
+            </a:r>
+          </a:p>
+          <a:p>
+            <a:br>
+              <a:rPr lang="de-DE" sz="1000" dirty="0"/>
+            </a:br>
+            <a:endParaRPr lang="de-DE" sz="1000" dirty="0"/>
+          </a:p>
+          <a:p>
+            <a:r>
+              <a:rPr lang="de-DE" sz="1000" dirty="0"/>
+              <a:t>Signal </a:t>
+            </a:r>
+            <a:r>
+              <a:rPr lang="de-DE" sz="1000" dirty="0" err="1"/>
+              <a:t>handler</a:t>
+            </a:r>
+            <a:endParaRPr lang="de-DE" sz="1000" dirty="0"/>
+          </a:p>
+          <a:p>
+            <a:pPr lvl="1"/>
+            <a:r>
+              <a:rPr lang="de-DE" sz="1000" dirty="0"/>
+              <a:t>neue Lokation</a:t>
+            </a:r>
+          </a:p>
+          <a:p>
+            <a:pPr lvl="1"/>
+            <a:r>
+              <a:rPr lang="de-DE" sz="1000" dirty="0"/>
+              <a:t>neue Werte</a:t>
+            </a:r>
+          </a:p>
+          <a:p>
+            <a:br>
+              <a:rPr lang="de-DE" sz="1000" dirty="0"/>
+            </a:br>
+            <a:endParaRPr lang="en-US" sz="1000" dirty="0"/>
+          </a:p>
+        </p:txBody>
+      </p:sp>
+    </p:spTree>
+    <p:extLst>
+      <p:ext uri="{BB962C8B-B14F-4D97-AF65-F5344CB8AC3E}">
+        <p14:creationId xmlns:p14="http://schemas.microsoft.com/office/powerpoint/2010/main" val="1209392633"/>
+      </p:ext>
+    </p:extLst>
+  </p:cSld>
+  <p:clrMapOvr>
+    <a:masterClrMapping/>
+  </p:clrMapOvr>
+</p:sld>
+</file>
+
+<file path=ppt/slides/slide3.xml><?xml version="1.0" encoding="utf-8"?>
+<p:sld xmlns:a="http://schemas.openxmlformats.org/drawingml/2006/main" xmlns:r="http://schemas.openxmlformats.org/officeDocument/2006/relationships" xmlns:p="http://schemas.openxmlformats.org/presentationml/2006/main">
+  <p:cSld>
+    <p:spTree>
+      <p:nvGrpSpPr>
+        <p:cNvPr id="1" name=""/>
+        <p:cNvGrpSpPr/>
+        <p:nvPr/>
+      </p:nvGrpSpPr>
+      <p:grpSpPr>
+        <a:xfrm>
+          <a:off x="0" y="0"/>
+          <a:ext cx="0" cy="0"/>
+          <a:chOff x="0" y="0"/>
+          <a:chExt cx="0" cy="0"/>
+        </a:xfrm>
+      </p:grpSpPr>
+      <p:sp>
+        <p:nvSpPr>
+          <p:cNvPr id="2" name="Textfeld 1">
+            <a:extLst>
+              <a:ext uri="{FF2B5EF4-FFF2-40B4-BE49-F238E27FC236}">
+                <a16:creationId xmlns:a16="http://schemas.microsoft.com/office/drawing/2014/main" id="{FB7A018A-00AE-BE43-9781-BA9718594090}"/>
+              </a:ext>
+            </a:extLst>
+          </p:cNvPr>
+          <p:cNvSpPr txBox="1"/>
+          <p:nvPr/>
+        </p:nvSpPr>
+        <p:spPr>
+          <a:xfrm>
+            <a:off x="495344" y="1005840"/>
+            <a:ext cx="5867312" cy="6863417"/>
+          </a:xfrm>
+          <a:prstGeom prst="rect">
+            <a:avLst/>
+          </a:prstGeom>
+          <a:noFill/>
+        </p:spPr>
+        <p:txBody>
+          <a:bodyPr wrap="none" rtlCol="0">
+            <a:spAutoFit/>
+          </a:bodyPr>
+          <a:lstStyle/>
+          <a:p>
+            <a:r>
+              <a:rPr lang="de-DE" sz="1000" b="1" dirty="0"/>
+              <a:t>Background </a:t>
+            </a:r>
+            <a:r>
+              <a:rPr lang="de-DE" sz="1000" b="1" dirty="0" err="1"/>
+              <a:t>timer</a:t>
+            </a:r>
+            <a:endParaRPr lang="de-DE" sz="1000" dirty="0"/>
+          </a:p>
+          <a:p>
+            <a:br>
+              <a:rPr lang="de-DE" sz="1000" dirty="0"/>
+            </a:br>
+            <a:endParaRPr lang="de-DE" sz="1000" dirty="0"/>
+          </a:p>
+          <a:p>
+            <a:r>
+              <a:rPr lang="de-DE" sz="1000" dirty="0">
+                <a:hlinkClick r:id="rId2"/>
+              </a:rPr>
+              <a:t>https://stackoverflow.com/questions/25951980/do-something-every-x-minutes-in-swift</a:t>
+            </a:r>
+            <a:endParaRPr lang="de-DE" sz="1000" dirty="0"/>
+          </a:p>
+          <a:p>
+            <a:br>
+              <a:rPr lang="de-DE" sz="1000" dirty="0"/>
+            </a:br>
+            <a:endParaRPr lang="de-DE" sz="1000" dirty="0"/>
+          </a:p>
+          <a:p>
+            <a:r>
+              <a:rPr lang="de-DE" sz="1000" dirty="0" err="1"/>
+              <a:t>new</a:t>
+            </a:r>
+            <a:r>
+              <a:rPr lang="de-DE" sz="1000" dirty="0"/>
+              <a:t> </a:t>
+            </a:r>
+            <a:r>
+              <a:rPr lang="de-DE" sz="1000" dirty="0" err="1"/>
+              <a:t>framework</a:t>
+            </a:r>
+            <a:r>
+              <a:rPr lang="de-DE" sz="1000" dirty="0"/>
+              <a:t> „</a:t>
+            </a:r>
+            <a:r>
+              <a:rPr lang="de-DE" sz="1000" u="sng" dirty="0" err="1"/>
+              <a:t>BGAppRefreshTask</a:t>
+            </a:r>
+            <a:r>
+              <a:rPr lang="de-DE" sz="1000" u="sng" dirty="0"/>
+              <a:t>“</a:t>
+            </a:r>
+            <a:endParaRPr lang="de-DE" sz="1000" dirty="0"/>
+          </a:p>
+          <a:p>
+            <a:r>
+              <a:rPr lang="de-DE" sz="1000" u="sng" dirty="0"/>
+              <a:t>https://</a:t>
+            </a:r>
+            <a:r>
+              <a:rPr lang="de-DE" sz="1000" u="sng" dirty="0" err="1"/>
+              <a:t>itnext.io</a:t>
+            </a:r>
+            <a:r>
+              <a:rPr lang="de-DE" sz="1000" u="sng" dirty="0"/>
+              <a:t>/swift-ios-13-backgroundtasks-framework-background-app-refresh-in-4-steps-3da32e65bc3d</a:t>
+            </a:r>
+            <a:endParaRPr lang="de-DE" sz="1000" dirty="0"/>
+          </a:p>
+          <a:p>
+            <a:br>
+              <a:rPr lang="de-DE" sz="1000" dirty="0"/>
+            </a:br>
+            <a:endParaRPr lang="de-DE" sz="1000" dirty="0"/>
+          </a:p>
+          <a:p>
+            <a:r>
+              <a:rPr lang="de-DE" sz="1000" dirty="0"/>
+              <a:t>aktuelle Lokation</a:t>
+            </a:r>
+          </a:p>
+          <a:p>
+            <a:pPr lvl="1"/>
+            <a:r>
+              <a:rPr lang="de-DE" sz="1000" dirty="0"/>
+              <a:t>hole aktuelle Lokation</a:t>
+            </a:r>
+          </a:p>
+          <a:p>
+            <a:pPr lvl="1"/>
+            <a:r>
+              <a:rPr lang="de-DE" sz="1000" dirty="0"/>
+              <a:t>hole Adressdaten (immer deutsch!)</a:t>
+            </a:r>
+          </a:p>
+          <a:p>
+            <a:pPr lvl="1"/>
+            <a:r>
+              <a:rPr lang="de-DE" sz="1000" dirty="0" err="1"/>
+              <a:t>signal</a:t>
+            </a:r>
+            <a:r>
+              <a:rPr lang="de-DE" sz="1000" dirty="0"/>
+              <a:t>: neuer </a:t>
+            </a:r>
+            <a:r>
+              <a:rPr lang="de-DE" sz="1000" dirty="0" err="1"/>
+              <a:t>ort</a:t>
+            </a:r>
+            <a:endParaRPr lang="de-DE" sz="1000" dirty="0"/>
+          </a:p>
+          <a:p>
+            <a:pPr lvl="1"/>
+            <a:r>
+              <a:rPr lang="de-DE" sz="1000" dirty="0"/>
+              <a:t>speichere in globalen Storage</a:t>
+            </a:r>
+          </a:p>
+          <a:p>
+            <a:pPr lvl="1"/>
+            <a:r>
+              <a:rPr lang="de-DE" sz="1000" dirty="0"/>
+              <a:t>Default: Regensburg</a:t>
+            </a:r>
+          </a:p>
+          <a:p>
+            <a:br>
+              <a:rPr lang="de-DE" sz="1000" dirty="0"/>
+            </a:br>
+            <a:endParaRPr lang="de-DE" sz="1000" dirty="0"/>
+          </a:p>
+          <a:p>
+            <a:r>
+              <a:rPr lang="de-DE" sz="1000" dirty="0"/>
+              <a:t>Aktuelle Werte</a:t>
+            </a:r>
+          </a:p>
+          <a:p>
+            <a:pPr lvl="1"/>
+            <a:r>
+              <a:rPr lang="de-DE" sz="1000" dirty="0"/>
+              <a:t>hole aktuelle Werte</a:t>
+            </a:r>
+          </a:p>
+          <a:p>
+            <a:pPr lvl="1"/>
+            <a:r>
+              <a:rPr lang="de-DE" sz="1000" dirty="0"/>
+              <a:t>Signal: neue Werte</a:t>
+            </a:r>
+          </a:p>
+          <a:p>
+            <a:pPr lvl="1"/>
+            <a:r>
+              <a:rPr lang="de-DE" sz="1000" dirty="0"/>
+              <a:t>speichere in globalem Storage</a:t>
+            </a:r>
+          </a:p>
+          <a:p>
+            <a:br>
+              <a:rPr lang="de-DE" sz="1000" dirty="0"/>
+            </a:br>
+            <a:endParaRPr lang="de-DE" sz="1000" dirty="0"/>
+          </a:p>
+          <a:p>
+            <a:r>
+              <a:rPr lang="de-DE" sz="1000" dirty="0" err="1"/>
+              <a:t>Debug</a:t>
+            </a:r>
+            <a:endParaRPr lang="de-DE" sz="1000" dirty="0"/>
+          </a:p>
+          <a:p>
+            <a:pPr lvl="1"/>
+            <a:r>
+              <a:rPr lang="de-DE" sz="1000" dirty="0"/>
+              <a:t>über Parameter gesetzt</a:t>
+            </a:r>
+          </a:p>
+          <a:p>
+            <a:pPr lvl="2"/>
+            <a:r>
+              <a:rPr lang="de-DE" sz="1000" dirty="0"/>
+              <a:t>Intervall Zeit</a:t>
+            </a:r>
+          </a:p>
+          <a:p>
+            <a:pPr lvl="3"/>
+            <a:r>
+              <a:rPr lang="de-DE" sz="1000" dirty="0"/>
+              <a:t>DEBUG_5s</a:t>
+            </a:r>
+          </a:p>
+          <a:p>
+            <a:pPr lvl="3"/>
+            <a:r>
+              <a:rPr lang="de-DE" sz="1000" dirty="0"/>
+              <a:t>DEBUG_20s</a:t>
+            </a:r>
+          </a:p>
+          <a:p>
+            <a:pPr lvl="2"/>
+            <a:r>
+              <a:rPr lang="de-DE" sz="1000" dirty="0"/>
+              <a:t>Lokation</a:t>
+            </a:r>
+          </a:p>
+          <a:p>
+            <a:pPr lvl="3"/>
+            <a:r>
+              <a:rPr lang="de-DE" sz="1000" dirty="0" err="1"/>
+              <a:t>DEBUG_Loc</a:t>
+            </a:r>
+            <a:endParaRPr lang="de-DE" sz="1000" dirty="0"/>
+          </a:p>
+          <a:p>
+            <a:pPr lvl="2"/>
+            <a:r>
+              <a:rPr lang="de-DE" sz="1000" dirty="0"/>
+              <a:t>Inzidenz</a:t>
+            </a:r>
+          </a:p>
+          <a:p>
+            <a:pPr lvl="3"/>
+            <a:r>
+              <a:rPr lang="de-DE" sz="1000" dirty="0" err="1"/>
+              <a:t>DEBUG_Inz</a:t>
+            </a:r>
+            <a:endParaRPr lang="de-DE" sz="1000" dirty="0"/>
+          </a:p>
+          <a:p>
+            <a:pPr lvl="1"/>
+            <a:r>
+              <a:rPr lang="de-DE" sz="1000" dirty="0"/>
+              <a:t>Tabelle mit </a:t>
+            </a:r>
+            <a:r>
+              <a:rPr lang="de-DE" sz="1000" dirty="0" err="1"/>
+              <a:t>debug</a:t>
+            </a:r>
+            <a:r>
+              <a:rPr lang="de-DE" sz="1000" dirty="0"/>
+              <a:t> Werten</a:t>
+            </a:r>
+          </a:p>
+          <a:p>
+            <a:pPr lvl="2"/>
+            <a:r>
+              <a:rPr lang="de-DE" sz="1000" dirty="0"/>
+              <a:t>Auch Fehlerzustände</a:t>
+            </a:r>
+          </a:p>
+          <a:p>
+            <a:pPr lvl="3"/>
+            <a:r>
+              <a:rPr lang="de-DE" sz="1000" dirty="0"/>
+              <a:t>Unbekannter Ort</a:t>
+            </a:r>
+          </a:p>
+          <a:p>
+            <a:pPr lvl="3"/>
+            <a:r>
+              <a:rPr lang="de-DE" sz="1000" dirty="0"/>
+              <a:t>keine Verbindung zum Server</a:t>
+            </a:r>
+          </a:p>
+          <a:p>
+            <a:br>
+              <a:rPr lang="de-DE" sz="1000" dirty="0"/>
+            </a:br>
+            <a:endParaRPr lang="de-DE" sz="1000" dirty="0"/>
+          </a:p>
+          <a:p>
+            <a:br>
+              <a:rPr lang="de-DE" sz="1000" dirty="0"/>
+            </a:br>
+            <a:endParaRPr lang="de-DE" sz="1000" dirty="0"/>
+          </a:p>
+          <a:p>
+            <a:br>
+              <a:rPr lang="de-DE" sz="1000" dirty="0"/>
+            </a:br>
+            <a:endParaRPr lang="de-DE" sz="1000" dirty="0"/>
+          </a:p>
+          <a:p>
+            <a:endParaRPr lang="en-US" sz="1000" dirty="0"/>
+          </a:p>
+        </p:txBody>
+      </p:sp>
+    </p:spTree>
+    <p:extLst>
+      <p:ext uri="{BB962C8B-B14F-4D97-AF65-F5344CB8AC3E}">
+        <p14:creationId xmlns:p14="http://schemas.microsoft.com/office/powerpoint/2010/main" val="1445538275"/>
+      </p:ext>
+    </p:extLst>
+  </p:cSld>
+  <p:clrMapOvr>
+    <a:masterClrMapping/>
+  </p:clrMapOvr>
+</p:sld>
+</file>
+
+<file path=ppt/slides/slide4.xml><?xml version="1.0" encoding="utf-8"?>
+<p:sld xmlns:a="http://schemas.openxmlformats.org/drawingml/2006/main" xmlns:r="http://schemas.openxmlformats.org/officeDocument/2006/relationships" xmlns:p="http://schemas.openxmlformats.org/presentationml/2006/main">
+  <p:cSld>
+    <p:spTree>
+      <p:nvGrpSpPr>
+        <p:cNvPr id="1" name=""/>
+        <p:cNvGrpSpPr/>
+        <p:nvPr/>
+      </p:nvGrpSpPr>
+      <p:grpSpPr>
+        <a:xfrm>
+          <a:off x="0" y="0"/>
+          <a:ext cx="0" cy="0"/>
+          <a:chOff x="0" y="0"/>
+          <a:chExt cx="0" cy="0"/>
+        </a:xfrm>
+      </p:grpSpPr>
+      <p:sp>
+        <p:nvSpPr>
           <p:cNvPr id="4" name="Rechteck 3">
             <a:extLst>
               <a:ext uri="{FF2B5EF4-FFF2-40B4-BE49-F238E27FC236}">
@@ -2997,7 +4095,7 @@
         </p:nvSpPr>
         <p:spPr>
           <a:xfrm>
-            <a:off x="601591" y="1948304"/>
+            <a:off x="601591" y="1545968"/>
             <a:ext cx="2359325" cy="3986842"/>
           </a:xfrm>
           <a:prstGeom prst="rect">
@@ -3033,10 +4131,45 @@
       </p:sp>
       <p:sp>
         <p:nvSpPr>
-          <p:cNvPr id="6" name="Rechteck 5">
+          <p:cNvPr id="22" name="Textfeld 21">
             <a:extLst>
               <a:ext uri="{FF2B5EF4-FFF2-40B4-BE49-F238E27FC236}">
-                <a16:creationId xmlns:a16="http://schemas.microsoft.com/office/drawing/2014/main" id="{896B6C08-D9A0-FB4B-BA60-FC969E61AAD9}"/>
+                <a16:creationId xmlns:a16="http://schemas.microsoft.com/office/drawing/2014/main" id="{A647B424-CB71-564D-B6C8-DF826CED83CA}"/>
+              </a:ext>
+            </a:extLst>
+          </p:cNvPr>
+          <p:cNvSpPr txBox="1"/>
+          <p:nvPr/>
+        </p:nvSpPr>
+        <p:spPr>
+          <a:xfrm>
+            <a:off x="601589" y="758886"/>
+            <a:ext cx="1353447" cy="369332"/>
+          </a:xfrm>
+          <a:prstGeom prst="rect">
+            <a:avLst/>
+          </a:prstGeom>
+          <a:noFill/>
+        </p:spPr>
+        <p:txBody>
+          <a:bodyPr wrap="none" rtlCol="0">
+            <a:spAutoFit/>
+          </a:bodyPr>
+          <a:lstStyle/>
+          <a:p>
+            <a:r>
+              <a:rPr lang="en-US" dirty="0"/>
+              <a:t>Main Screen</a:t>
+            </a:r>
+          </a:p>
+        </p:txBody>
+      </p:sp>
+      <p:sp>
+        <p:nvSpPr>
+          <p:cNvPr id="19" name="Rechteck 18">
+            <a:extLst>
+              <a:ext uri="{FF2B5EF4-FFF2-40B4-BE49-F238E27FC236}">
+                <a16:creationId xmlns:a16="http://schemas.microsoft.com/office/drawing/2014/main" id="{4BD9249F-8871-F74B-8F37-5BA7F976564D}"/>
               </a:ext>
             </a:extLst>
           </p:cNvPr>
@@ -3045,8 +4178,8 @@
         </p:nvSpPr>
         <p:spPr>
           <a:xfrm>
-            <a:off x="601591" y="1948304"/>
-            <a:ext cx="2359325" cy="531962"/>
+            <a:off x="609599" y="5228444"/>
+            <a:ext cx="2359326" cy="311974"/>
           </a:xfrm>
           <a:prstGeom prst="rect">
             <a:avLst/>
@@ -3079,22 +4212,38 @@
           <a:p>
             <a:pPr algn="ctr"/>
             <a:r>
-              <a:rPr lang="en-US" dirty="0">
+              <a:rPr lang="en-US" sz="1000" dirty="0">
                 <a:solidFill>
                   <a:schemeClr val="tx1"/>
                 </a:solidFill>
               </a:rPr>
-              <a:t>Deutschland</a:t>
-            </a:r>
-          </a:p>
-        </p:txBody>
-      </p:sp>
-      <p:sp>
-        <p:nvSpPr>
-          <p:cNvPr id="7" name="Textfeld 6">
+              <a:t>Land          </a:t>
+            </a:r>
+            <a:r>
+              <a:rPr lang="en-US" sz="1000" dirty="0" err="1">
+                <a:solidFill>
+                  <a:schemeClr val="tx1"/>
+                </a:solidFill>
+              </a:rPr>
+              <a:t>Bundesland</a:t>
+            </a:r>
+            <a:r>
+              <a:rPr lang="en-US" sz="1000" dirty="0">
+                <a:solidFill>
+                  <a:schemeClr val="tx1"/>
+                </a:solidFill>
+              </a:rPr>
+              <a:t>         Landkreis</a:t>
+            </a:r>
+          </a:p>
+        </p:txBody>
+      </p:sp>
+      <p:sp>
+        <p:nvSpPr>
+          <p:cNvPr id="2" name="Textfeld 1">
             <a:extLst>
               <a:ext uri="{FF2B5EF4-FFF2-40B4-BE49-F238E27FC236}">
-                <a16:creationId xmlns:a16="http://schemas.microsoft.com/office/drawing/2014/main" id="{7638E573-EFE5-594D-B3E0-E4F71BFC06BD}"/>
+                <a16:creationId xmlns:a16="http://schemas.microsoft.com/office/drawing/2014/main" id="{42CA8A78-8096-7742-ACED-6C3581B4F59A}"/>
               </a:ext>
             </a:extLst>
           </p:cNvPr>
@@ -3103,8 +4252,8 @@
         </p:nvSpPr>
         <p:spPr>
           <a:xfrm>
-            <a:off x="601591" y="2029619"/>
-            <a:ext cx="173736" cy="369332"/>
+            <a:off x="556417" y="1554274"/>
+            <a:ext cx="1522640" cy="400110"/>
           </a:xfrm>
           <a:prstGeom prst="rect">
             <a:avLst/>
@@ -3118,316 +4267,24 @@
           <a:lstStyle/>
           <a:p>
             <a:r>
-              <a:rPr lang="en-US" dirty="0"/>
-              <a:t>&lt;</a:t>
-            </a:r>
-          </a:p>
-        </p:txBody>
-      </p:sp>
-      <p:sp>
-        <p:nvSpPr>
-          <p:cNvPr id="8" name="Textfeld 7">
+              <a:rPr lang="en-US" sz="1000" dirty="0"/>
+              <a:t>RKI Data as of:</a:t>
+            </a:r>
+          </a:p>
+          <a:p>
+            <a:r>
+              <a:rPr lang="en-US" sz="1000" dirty="0"/>
+              <a:t>11/29/20 (Sun) 12:00 AM</a:t>
+            </a:r>
+          </a:p>
+        </p:txBody>
+      </p:sp>
+      <p:sp>
+        <p:nvSpPr>
+          <p:cNvPr id="3" name="Abgerundetes Rechteck 2">
             <a:extLst>
               <a:ext uri="{FF2B5EF4-FFF2-40B4-BE49-F238E27FC236}">
-                <a16:creationId xmlns:a16="http://schemas.microsoft.com/office/drawing/2014/main" id="{4A8CA998-EF46-8845-A16C-0AB9F6B4A886}"/>
-              </a:ext>
-            </a:extLst>
-          </p:cNvPr>
-          <p:cNvSpPr txBox="1"/>
-          <p:nvPr/>
-        </p:nvSpPr>
-        <p:spPr>
-          <a:xfrm>
-            <a:off x="601590" y="2716241"/>
-            <a:ext cx="2359325" cy="1046440"/>
-          </a:xfrm>
-          <a:prstGeom prst="rect">
-            <a:avLst/>
-          </a:prstGeom>
-          <a:noFill/>
-          <a:ln>
-            <a:solidFill>
-              <a:schemeClr val="accent1">
-                <a:shade val="50000"/>
-              </a:schemeClr>
-            </a:solidFill>
-          </a:ln>
-        </p:spPr>
-        <p:txBody>
-          <a:bodyPr wrap="square" rtlCol="0">
-            <a:spAutoFit/>
-          </a:bodyPr>
-          <a:lstStyle/>
-          <a:p>
-            <a:pPr algn="ctr"/>
-            <a:r>
-              <a:rPr lang="en-US" sz="1000" dirty="0"/>
-              <a:t>Sunday, 29.11.2020 00:00</a:t>
-            </a:r>
-          </a:p>
-          <a:p>
-            <a:pPr algn="ctr"/>
-            <a:endParaRPr lang="en-US" sz="400" dirty="0"/>
-          </a:p>
-          <a:p>
-            <a:r>
-              <a:rPr lang="en-US" sz="900" dirty="0"/>
-              <a:t>Inhabitants:                                           83,400,000</a:t>
-            </a:r>
-          </a:p>
-          <a:p>
-            <a:r>
-              <a:rPr lang="en-US" sz="1200" dirty="0"/>
-              <a:t> </a:t>
-            </a:r>
-            <a:r>
-              <a:rPr lang="en-US" sz="900" dirty="0"/>
-              <a:t>                                            </a:t>
-            </a:r>
-            <a:r>
-              <a:rPr lang="en-US" sz="800" dirty="0"/>
-              <a:t>total               per 100,000</a:t>
-            </a:r>
-          </a:p>
-          <a:p>
-            <a:r>
-              <a:rPr lang="en-US" sz="900" dirty="0"/>
-              <a:t>Cases                         1,042,700                  1,250.2</a:t>
-            </a:r>
-          </a:p>
-          <a:p>
-            <a:r>
-              <a:rPr lang="en-US" sz="900" dirty="0"/>
-              <a:t>Deaths		     20,000                     160.6</a:t>
-            </a:r>
-          </a:p>
-          <a:p>
-            <a:r>
-              <a:rPr lang="en-US" sz="900" dirty="0"/>
-              <a:t>Cases last 7 days             1,500                     150.0</a:t>
-            </a:r>
-          </a:p>
-        </p:txBody>
-      </p:sp>
-      <p:sp>
-        <p:nvSpPr>
-          <p:cNvPr id="9" name="Textfeld 8">
-            <a:extLst>
-              <a:ext uri="{FF2B5EF4-FFF2-40B4-BE49-F238E27FC236}">
-                <a16:creationId xmlns:a16="http://schemas.microsoft.com/office/drawing/2014/main" id="{952B5622-69F6-2145-86BA-249A46B12932}"/>
-              </a:ext>
-            </a:extLst>
-          </p:cNvPr>
-          <p:cNvSpPr txBox="1"/>
-          <p:nvPr/>
-        </p:nvSpPr>
-        <p:spPr>
-          <a:xfrm>
-            <a:off x="601589" y="3762681"/>
-            <a:ext cx="2359325" cy="1046440"/>
-          </a:xfrm>
-          <a:prstGeom prst="rect">
-            <a:avLst/>
-          </a:prstGeom>
-          <a:noFill/>
-          <a:ln>
-            <a:solidFill>
-              <a:schemeClr val="accent1">
-                <a:shade val="50000"/>
-              </a:schemeClr>
-            </a:solidFill>
-          </a:ln>
-        </p:spPr>
-        <p:txBody>
-          <a:bodyPr wrap="square" rtlCol="0">
-            <a:spAutoFit/>
-          </a:bodyPr>
-          <a:lstStyle/>
-          <a:p>
-            <a:pPr algn="ctr"/>
-            <a:r>
-              <a:rPr lang="en-US" sz="1000" dirty="0"/>
-              <a:t>Changes: Sa 28.11.20 -&gt; So 29.11.20</a:t>
-            </a:r>
-          </a:p>
-          <a:p>
-            <a:pPr algn="ctr"/>
-            <a:endParaRPr lang="en-US" sz="400" dirty="0"/>
-          </a:p>
-          <a:p>
-            <a:r>
-              <a:rPr lang="en-US" sz="900" dirty="0"/>
-              <a:t>Inhabitants:                                                           ±0</a:t>
-            </a:r>
-          </a:p>
-          <a:p>
-            <a:r>
-              <a:rPr lang="en-US" sz="1200" dirty="0"/>
-              <a:t> </a:t>
-            </a:r>
-            <a:r>
-              <a:rPr lang="en-US" sz="900" dirty="0"/>
-              <a:t>                                            </a:t>
-            </a:r>
-            <a:r>
-              <a:rPr lang="en-US" sz="800" dirty="0"/>
-              <a:t>total               per 100,000</a:t>
-            </a:r>
-          </a:p>
-          <a:p>
-            <a:r>
-              <a:rPr lang="en-US" sz="900" dirty="0"/>
-              <a:t>Cases                         +14,611                       +176.9</a:t>
-            </a:r>
-          </a:p>
-          <a:p>
-            <a:r>
-              <a:rPr lang="en-US" sz="900" dirty="0"/>
-              <a:t>Deaths		     +500                           +0.5</a:t>
-            </a:r>
-          </a:p>
-          <a:p>
-            <a:r>
-              <a:rPr lang="en-US" sz="900" dirty="0"/>
-              <a:t>Cases last 7 days             +50                            -0.3</a:t>
-            </a:r>
-          </a:p>
-        </p:txBody>
-      </p:sp>
-      <p:sp>
-        <p:nvSpPr>
-          <p:cNvPr id="10" name="Textfeld 9">
-            <a:extLst>
-              <a:ext uri="{FF2B5EF4-FFF2-40B4-BE49-F238E27FC236}">
-                <a16:creationId xmlns:a16="http://schemas.microsoft.com/office/drawing/2014/main" id="{00978CA3-4C87-D945-A71A-36BC4E12F06A}"/>
-              </a:ext>
-            </a:extLst>
-          </p:cNvPr>
-          <p:cNvSpPr txBox="1"/>
-          <p:nvPr/>
-        </p:nvSpPr>
-        <p:spPr>
-          <a:xfrm>
-            <a:off x="601591" y="4809121"/>
-            <a:ext cx="2359325" cy="1046440"/>
-          </a:xfrm>
-          <a:prstGeom prst="rect">
-            <a:avLst/>
-          </a:prstGeom>
-          <a:noFill/>
-          <a:ln>
-            <a:solidFill>
-              <a:schemeClr val="accent1">
-                <a:shade val="50000"/>
-              </a:schemeClr>
-            </a:solidFill>
-          </a:ln>
-        </p:spPr>
-        <p:txBody>
-          <a:bodyPr wrap="square" rtlCol="0">
-            <a:spAutoFit/>
-          </a:bodyPr>
-          <a:lstStyle/>
-          <a:p>
-            <a:pPr algn="ctr"/>
-            <a:r>
-              <a:rPr lang="en-US" sz="1000" dirty="0"/>
-              <a:t>Saturday, 28.11.2020 00:00</a:t>
-            </a:r>
-          </a:p>
-          <a:p>
-            <a:pPr algn="ctr"/>
-            <a:endParaRPr lang="en-US" sz="400" dirty="0"/>
-          </a:p>
-          <a:p>
-            <a:r>
-              <a:rPr lang="en-US" sz="900" dirty="0"/>
-              <a:t>Inhabitants:                                           83,400,000</a:t>
-            </a:r>
-          </a:p>
-          <a:p>
-            <a:r>
-              <a:rPr lang="en-US" sz="1200" dirty="0"/>
-              <a:t> </a:t>
-            </a:r>
-            <a:r>
-              <a:rPr lang="en-US" sz="900" dirty="0"/>
-              <a:t>                                            </a:t>
-            </a:r>
-            <a:r>
-              <a:rPr lang="en-US" sz="800" dirty="0"/>
-              <a:t>total               per 100,000</a:t>
-            </a:r>
-          </a:p>
-          <a:p>
-            <a:r>
-              <a:rPr lang="en-US" sz="900" dirty="0"/>
-              <a:t>Cases                         1,020,700                  1,250.2</a:t>
-            </a:r>
-          </a:p>
-          <a:p>
-            <a:r>
-              <a:rPr lang="en-US" sz="900" dirty="0"/>
-              <a:t>Deaths		     19,000                     160.6</a:t>
-            </a:r>
-          </a:p>
-          <a:p>
-            <a:r>
-              <a:rPr lang="en-US" sz="900" dirty="0"/>
-              <a:t>Cases last 7 days             1,500                     150.0</a:t>
-            </a:r>
-          </a:p>
-        </p:txBody>
-      </p:sp>
-      <p:sp>
-        <p:nvSpPr>
-          <p:cNvPr id="11" name="Textfeld 10">
-            <a:extLst>
-              <a:ext uri="{FF2B5EF4-FFF2-40B4-BE49-F238E27FC236}">
-                <a16:creationId xmlns:a16="http://schemas.microsoft.com/office/drawing/2014/main" id="{B5168B12-2105-D544-9FBC-61E535A43081}"/>
-              </a:ext>
-            </a:extLst>
-          </p:cNvPr>
-          <p:cNvSpPr txBox="1"/>
-          <p:nvPr/>
-        </p:nvSpPr>
-        <p:spPr>
-          <a:xfrm>
-            <a:off x="601589" y="2480266"/>
-            <a:ext cx="2359325" cy="230832"/>
-          </a:xfrm>
-          <a:prstGeom prst="rect">
-            <a:avLst/>
-          </a:prstGeom>
-          <a:noFill/>
-          <a:ln>
-            <a:solidFill>
-              <a:schemeClr val="accent1">
-                <a:shade val="50000"/>
-              </a:schemeClr>
-            </a:solidFill>
-          </a:ln>
-        </p:spPr>
-        <p:txBody>
-          <a:bodyPr wrap="square" rtlCol="0">
-            <a:spAutoFit/>
-          </a:bodyPr>
-          <a:lstStyle/>
-          <a:p>
-            <a:pPr algn="ctr"/>
-            <a:r>
-              <a:rPr lang="en-US" sz="900" dirty="0"/>
-              <a:t>Country</a:t>
-            </a:r>
-          </a:p>
-        </p:txBody>
-      </p:sp>
-      <p:sp>
-        <p:nvSpPr>
-          <p:cNvPr id="15" name="Rechteck 14">
-            <a:extLst>
-              <a:ext uri="{FF2B5EF4-FFF2-40B4-BE49-F238E27FC236}">
-                <a16:creationId xmlns:a16="http://schemas.microsoft.com/office/drawing/2014/main" id="{B164EDD3-E9CE-A446-9066-7C4BF3B56A17}"/>
+                <a16:creationId xmlns:a16="http://schemas.microsoft.com/office/drawing/2014/main" id="{DD81E0FF-ABBF-ED4A-979E-91439A167710}"/>
               </a:ext>
             </a:extLst>
           </p:cNvPr>
@@ -3436,14 +4293,15 @@
         </p:nvSpPr>
         <p:spPr>
           <a:xfrm>
-            <a:off x="3889077" y="1948300"/>
-            <a:ext cx="2359325" cy="3986842"/>
-          </a:xfrm>
-          <a:prstGeom prst="rect">
+            <a:off x="2181981" y="1627279"/>
+            <a:ext cx="720000" cy="232322"/>
+          </a:xfrm>
+          <a:prstGeom prst="roundRect">
             <a:avLst/>
           </a:prstGeom>
-          <a:noFill/>
-          <a:ln w="12700"/>
+          <a:solidFill>
+            <a:schemeClr val="accent1"/>
+          </a:solidFill>
         </p:spPr>
         <p:style>
           <a:lnRef idx="2">
@@ -3466,16 +4324,60 @@
           <a:lstStyle/>
           <a:p>
             <a:pPr algn="ctr"/>
-            <a:endParaRPr lang="en-US"/>
-          </a:p>
-        </p:txBody>
-      </p:sp>
-      <p:sp>
-        <p:nvSpPr>
-          <p:cNvPr id="16" name="Rechteck 15">
+            <a:r>
+              <a:rPr lang="en-US" sz="1000" dirty="0"/>
+              <a:t>Help</a:t>
+            </a:r>
+          </a:p>
+        </p:txBody>
+      </p:sp>
+      <p:sp>
+        <p:nvSpPr>
+          <p:cNvPr id="20" name="Textfeld 19">
             <a:extLst>
               <a:ext uri="{FF2B5EF4-FFF2-40B4-BE49-F238E27FC236}">
-                <a16:creationId xmlns:a16="http://schemas.microsoft.com/office/drawing/2014/main" id="{D84EF9BC-3A58-BD45-8532-FF147965FE42}"/>
+                <a16:creationId xmlns:a16="http://schemas.microsoft.com/office/drawing/2014/main" id="{9A24CF6F-7C45-5E44-870D-97BBE6347248}"/>
+              </a:ext>
+            </a:extLst>
+          </p:cNvPr>
+          <p:cNvSpPr txBox="1"/>
+          <p:nvPr/>
+        </p:nvSpPr>
+        <p:spPr>
+          <a:xfrm>
+            <a:off x="555491" y="1955461"/>
+            <a:ext cx="1581317" cy="338554"/>
+          </a:xfrm>
+          <a:prstGeom prst="rect">
+            <a:avLst/>
+          </a:prstGeom>
+          <a:noFill/>
+        </p:spPr>
+        <p:txBody>
+          <a:bodyPr wrap="square" rtlCol="0">
+            <a:spAutoFit/>
+          </a:bodyPr>
+          <a:lstStyle/>
+          <a:p>
+            <a:r>
+              <a:rPr lang="en-US" sz="800" dirty="0"/>
+              <a:t>RKI Data last data retrieval </a:t>
+            </a:r>
+          </a:p>
+          <a:p>
+            <a:r>
+              <a:rPr lang="en-US" sz="800" dirty="0"/>
+              <a:t>11/29/20 (Sun) 12:00 AM</a:t>
+            </a:r>
+          </a:p>
+        </p:txBody>
+      </p:sp>
+      <p:sp>
+        <p:nvSpPr>
+          <p:cNvPr id="5" name="Rechteck 4">
+            <a:extLst>
+              <a:ext uri="{FF2B5EF4-FFF2-40B4-BE49-F238E27FC236}">
+                <a16:creationId xmlns:a16="http://schemas.microsoft.com/office/drawing/2014/main" id="{8D8B27B9-5975-F14F-AA55-C401E9DF59D2}"/>
               </a:ext>
             </a:extLst>
           </p:cNvPr>
@@ -3484,15 +4386,15 @@
         </p:nvSpPr>
         <p:spPr>
           <a:xfrm>
-            <a:off x="3889077" y="1948300"/>
-            <a:ext cx="2359325" cy="531962"/>
+            <a:off x="2136808" y="5236057"/>
+            <a:ext cx="824109" cy="304362"/>
           </a:xfrm>
           <a:prstGeom prst="rect">
             <a:avLst/>
           </a:prstGeom>
           <a:solidFill>
-            <a:schemeClr val="bg1">
-              <a:lumMod val="85000"/>
+            <a:schemeClr val="accent1">
+              <a:alpha val="32000"/>
             </a:schemeClr>
           </a:solidFill>
         </p:spPr>
@@ -3517,23 +4419,52 @@
           <a:lstStyle/>
           <a:p>
             <a:pPr algn="ctr"/>
-            <a:r>
-              <a:rPr lang="en-US" dirty="0">
-                <a:solidFill>
-                  <a:schemeClr val="tx1"/>
-                </a:solidFill>
-              </a:rPr>
-              <a:t>&lt; title &gt;</a:t>
-            </a:r>
-          </a:p>
-        </p:txBody>
-      </p:sp>
-      <p:sp>
-        <p:nvSpPr>
-          <p:cNvPr id="17" name="Textfeld 16">
+            <a:endParaRPr lang="en-US"/>
+          </a:p>
+        </p:txBody>
+      </p:sp>
+      <p:cxnSp>
+        <p:nvCxnSpPr>
+          <p:cNvPr id="13" name="Gerade Verbindung 12">
             <a:extLst>
               <a:ext uri="{FF2B5EF4-FFF2-40B4-BE49-F238E27FC236}">
-                <a16:creationId xmlns:a16="http://schemas.microsoft.com/office/drawing/2014/main" id="{9E478D9E-1CE0-4E41-99E5-DE24F3A76FDA}"/>
+                <a16:creationId xmlns:a16="http://schemas.microsoft.com/office/drawing/2014/main" id="{3653CEF2-C72C-B74F-B330-E2C83FAD44E7}"/>
+              </a:ext>
+            </a:extLst>
+          </p:cNvPr>
+          <p:cNvCxnSpPr/>
+          <p:nvPr/>
+        </p:nvCxnSpPr>
+        <p:spPr>
+          <a:xfrm>
+            <a:off x="609598" y="2292741"/>
+            <a:ext cx="2303193" cy="0"/>
+          </a:xfrm>
+          <a:prstGeom prst="line">
+            <a:avLst/>
+          </a:prstGeom>
+        </p:spPr>
+        <p:style>
+          <a:lnRef idx="1">
+            <a:schemeClr val="accent1"/>
+          </a:lnRef>
+          <a:fillRef idx="0">
+            <a:schemeClr val="accent1"/>
+          </a:fillRef>
+          <a:effectRef idx="0">
+            <a:schemeClr val="accent1"/>
+          </a:effectRef>
+          <a:fontRef idx="minor">
+            <a:schemeClr val="tx1"/>
+          </a:fontRef>
+        </p:style>
+      </p:cxnSp>
+      <p:sp>
+        <p:nvSpPr>
+          <p:cNvPr id="14" name="Textfeld 13">
+            <a:extLst>
+              <a:ext uri="{FF2B5EF4-FFF2-40B4-BE49-F238E27FC236}">
+                <a16:creationId xmlns:a16="http://schemas.microsoft.com/office/drawing/2014/main" id="{6D89B2A8-33C0-2148-A387-27239F5863E9}"/>
               </a:ext>
             </a:extLst>
           </p:cNvPr>
@@ -3542,8 +4473,8 @@
         </p:nvSpPr>
         <p:spPr>
           <a:xfrm>
-            <a:off x="3889077" y="2029615"/>
-            <a:ext cx="173736" cy="369332"/>
+            <a:off x="606403" y="2288344"/>
+            <a:ext cx="2359325" cy="569387"/>
           </a:xfrm>
           <a:prstGeom prst="rect">
             <a:avLst/>
@@ -3557,18 +4488,194 @@
           <a:lstStyle/>
           <a:p>
             <a:r>
-              <a:rPr lang="en-US" dirty="0"/>
-              <a:t>&lt;</a:t>
-            </a:r>
-          </a:p>
-        </p:txBody>
-      </p:sp>
-      <p:sp>
-        <p:nvSpPr>
-          <p:cNvPr id="18" name="Textfeld 17">
+              <a:rPr lang="en-US" sz="1100" dirty="0"/>
+              <a:t>Regensburg</a:t>
+            </a:r>
+          </a:p>
+          <a:p>
+            <a:r>
+              <a:rPr lang="en-US" sz="800" dirty="0"/>
+              <a:t>Cases:                                    </a:t>
+            </a:r>
+            <a:r>
+              <a:rPr lang="en-US" sz="1000" dirty="0"/>
+              <a:t>2,646       ± 0        + 67</a:t>
+            </a:r>
+          </a:p>
+          <a:p>
+            <a:r>
+              <a:rPr lang="en-US" sz="800" dirty="0"/>
+              <a:t>Cases in last 7 days</a:t>
+            </a:r>
+            <a:r>
+              <a:rPr lang="en-US" sz="1000" dirty="0"/>
+              <a:t>:         158.7      -15       + 7.8  </a:t>
+            </a:r>
+          </a:p>
+        </p:txBody>
+      </p:sp>
+      <p:sp>
+        <p:nvSpPr>
+          <p:cNvPr id="23" name="Abgerundetes Rechteck 22">
             <a:extLst>
               <a:ext uri="{FF2B5EF4-FFF2-40B4-BE49-F238E27FC236}">
-                <a16:creationId xmlns:a16="http://schemas.microsoft.com/office/drawing/2014/main" id="{2F8A82BA-705C-DB48-A8F8-F4AC4468F964}"/>
+                <a16:creationId xmlns:a16="http://schemas.microsoft.com/office/drawing/2014/main" id="{EF5B6FD4-1383-AB4D-B086-58172688E73B}"/>
+              </a:ext>
+            </a:extLst>
+          </p:cNvPr>
+          <p:cNvSpPr/>
+          <p:nvPr/>
+        </p:nvSpPr>
+        <p:spPr>
+          <a:xfrm>
+            <a:off x="2181981" y="2021921"/>
+            <a:ext cx="720000" cy="232322"/>
+          </a:xfrm>
+          <a:prstGeom prst="roundRect">
+            <a:avLst/>
+          </a:prstGeom>
+          <a:solidFill>
+            <a:schemeClr val="accent1"/>
+          </a:solidFill>
+        </p:spPr>
+        <p:style>
+          <a:lnRef idx="2">
+            <a:schemeClr val="accent1">
+              <a:shade val="50000"/>
+            </a:schemeClr>
+          </a:lnRef>
+          <a:fillRef idx="1">
+            <a:schemeClr val="accent1"/>
+          </a:fillRef>
+          <a:effectRef idx="0">
+            <a:schemeClr val="accent1"/>
+          </a:effectRef>
+          <a:fontRef idx="minor">
+            <a:schemeClr val="lt1"/>
+          </a:fontRef>
+        </p:style>
+        <p:txBody>
+          <a:bodyPr rtlCol="0" anchor="ctr"/>
+          <a:lstStyle/>
+          <a:p>
+            <a:pPr algn="ctr"/>
+            <a:r>
+              <a:rPr lang="en-US" sz="1000" dirty="0"/>
+              <a:t>Refresh</a:t>
+            </a:r>
+          </a:p>
+        </p:txBody>
+      </p:sp>
+      <p:sp>
+        <p:nvSpPr>
+          <p:cNvPr id="24" name="Abgerundetes Rechteck 23">
+            <a:extLst>
+              <a:ext uri="{FF2B5EF4-FFF2-40B4-BE49-F238E27FC236}">
+                <a16:creationId xmlns:a16="http://schemas.microsoft.com/office/drawing/2014/main" id="{EAF4D078-5981-CE49-A217-EE086E82C4E0}"/>
+              </a:ext>
+            </a:extLst>
+          </p:cNvPr>
+          <p:cNvSpPr/>
+          <p:nvPr/>
+        </p:nvSpPr>
+        <p:spPr>
+          <a:xfrm>
+            <a:off x="701043" y="2857731"/>
+            <a:ext cx="720000" cy="232322"/>
+          </a:xfrm>
+          <a:prstGeom prst="roundRect">
+            <a:avLst/>
+          </a:prstGeom>
+          <a:solidFill>
+            <a:schemeClr val="accent1"/>
+          </a:solidFill>
+        </p:spPr>
+        <p:style>
+          <a:lnRef idx="2">
+            <a:schemeClr val="accent1">
+              <a:shade val="50000"/>
+            </a:schemeClr>
+          </a:lnRef>
+          <a:fillRef idx="1">
+            <a:schemeClr val="accent1"/>
+          </a:fillRef>
+          <a:effectRef idx="0">
+            <a:schemeClr val="accent1"/>
+          </a:effectRef>
+          <a:fontRef idx="minor">
+            <a:schemeClr val="lt1"/>
+          </a:fontRef>
+        </p:style>
+        <p:txBody>
+          <a:bodyPr rtlCol="0" anchor="ctr"/>
+          <a:lstStyle/>
+          <a:p>
+            <a:pPr algn="ctr"/>
+            <a:r>
+              <a:rPr lang="en-US" sz="1000" dirty="0"/>
+              <a:t>select</a:t>
+            </a:r>
+          </a:p>
+        </p:txBody>
+      </p:sp>
+      <p:sp>
+        <p:nvSpPr>
+          <p:cNvPr id="26" name="Abgerundetes Rechteck 25">
+            <a:extLst>
+              <a:ext uri="{FF2B5EF4-FFF2-40B4-BE49-F238E27FC236}">
+                <a16:creationId xmlns:a16="http://schemas.microsoft.com/office/drawing/2014/main" id="{FC6F6CDF-323F-8144-9C4E-81C29FEB9739}"/>
+              </a:ext>
+            </a:extLst>
+          </p:cNvPr>
+          <p:cNvSpPr/>
+          <p:nvPr/>
+        </p:nvSpPr>
+        <p:spPr>
+          <a:xfrm>
+            <a:off x="2181981" y="2857731"/>
+            <a:ext cx="720000" cy="232322"/>
+          </a:xfrm>
+          <a:prstGeom prst="roundRect">
+            <a:avLst/>
+          </a:prstGeom>
+          <a:solidFill>
+            <a:schemeClr val="accent1"/>
+          </a:solidFill>
+        </p:spPr>
+        <p:style>
+          <a:lnRef idx="2">
+            <a:schemeClr val="accent1">
+              <a:shade val="50000"/>
+            </a:schemeClr>
+          </a:lnRef>
+          <a:fillRef idx="1">
+            <a:schemeClr val="accent1"/>
+          </a:fillRef>
+          <a:effectRef idx="0">
+            <a:schemeClr val="accent1"/>
+          </a:effectRef>
+          <a:fontRef idx="minor">
+            <a:schemeClr val="lt1"/>
+          </a:fontRef>
+        </p:style>
+        <p:txBody>
+          <a:bodyPr rtlCol="0" anchor="ctr"/>
+          <a:lstStyle/>
+          <a:p>
+            <a:pPr algn="ctr"/>
+            <a:r>
+              <a:rPr lang="en-US" sz="1000" dirty="0"/>
+              <a:t>Details</a:t>
+            </a:r>
+          </a:p>
+        </p:txBody>
+      </p:sp>
+      <p:sp>
+        <p:nvSpPr>
+          <p:cNvPr id="27" name="Textfeld 26">
+            <a:extLst>
+              <a:ext uri="{FF2B5EF4-FFF2-40B4-BE49-F238E27FC236}">
+                <a16:creationId xmlns:a16="http://schemas.microsoft.com/office/drawing/2014/main" id="{DD560F71-019C-E447-8B62-23E07F747845}"/>
               </a:ext>
             </a:extLst>
           </p:cNvPr>
@@ -3577,20 +4684,13 @@
         </p:nvSpPr>
         <p:spPr>
           <a:xfrm>
-            <a:off x="3889076" y="2716237"/>
-            <a:ext cx="2359325" cy="1031051"/>
+            <a:off x="593582" y="3178262"/>
+            <a:ext cx="2375343" cy="507831"/>
           </a:xfrm>
           <a:prstGeom prst="rect">
             <a:avLst/>
           </a:prstGeom>
           <a:noFill/>
-          <a:ln>
-            <a:solidFill>
-              <a:schemeClr val="accent1">
-                <a:shade val="50000"/>
-              </a:schemeClr>
-            </a:solidFill>
-          </a:ln>
         </p:spPr>
         <p:txBody>
           <a:bodyPr wrap="square" rtlCol="0">
@@ -3598,142 +4698,65 @@
           </a:bodyPr>
           <a:lstStyle/>
           <a:p>
-            <a:pPr algn="ctr"/>
-            <a:r>
-              <a:rPr lang="en-US" sz="1000" dirty="0"/>
-              <a:t>&lt; </a:t>
-            </a:r>
-            <a:r>
-              <a:rPr lang="en-US" sz="1000" dirty="0" err="1"/>
-              <a:t>labelDate</a:t>
-            </a:r>
-            <a:r>
-              <a:rPr lang="en-US" sz="1000" dirty="0"/>
-              <a:t> &gt;</a:t>
-            </a:r>
-          </a:p>
-          <a:p>
-            <a:pPr algn="ctr"/>
-            <a:endParaRPr lang="en-US" sz="400" dirty="0"/>
-          </a:p>
-          <a:p>
-            <a:r>
-              <a:rPr lang="en-US" sz="900" dirty="0"/>
-              <a:t>&lt; </a:t>
-            </a:r>
-            <a:r>
-              <a:rPr lang="en-US" sz="900" dirty="0" err="1"/>
-              <a:t>labelInhabitants</a:t>
-            </a:r>
-            <a:r>
-              <a:rPr lang="en-US" sz="900" dirty="0"/>
-              <a:t> &gt;              &lt; </a:t>
-            </a:r>
-            <a:r>
-              <a:rPr lang="en-US" sz="900" dirty="0" err="1"/>
-              <a:t>valueInhabitans</a:t>
-            </a:r>
-            <a:r>
-              <a:rPr lang="en-US" sz="900" dirty="0"/>
-              <a:t> &gt;</a:t>
-            </a:r>
-          </a:p>
-          <a:p>
-            <a:r>
-              <a:rPr lang="en-US" sz="1200" dirty="0"/>
-              <a:t> </a:t>
-            </a:r>
-            <a:r>
-              <a:rPr lang="en-US" sz="900" dirty="0"/>
-              <a:t>                              </a:t>
-            </a:r>
-            <a:r>
-              <a:rPr lang="en-US" sz="800" dirty="0"/>
-              <a:t>&lt; </a:t>
-            </a:r>
-            <a:r>
-              <a:rPr lang="en-US" sz="800" dirty="0" err="1"/>
-              <a:t>labelTotal</a:t>
-            </a:r>
-            <a:r>
-              <a:rPr lang="en-US" sz="800" dirty="0"/>
-              <a:t> &gt;      &lt; labelPer100k &gt;</a:t>
-            </a:r>
-          </a:p>
-          <a:p>
-            <a:r>
-              <a:rPr lang="en-US" sz="900" dirty="0"/>
-              <a:t>&lt; </a:t>
-            </a:r>
-            <a:r>
-              <a:rPr lang="en-US" sz="900" dirty="0" err="1"/>
-              <a:t>labelCases</a:t>
-            </a:r>
-            <a:r>
-              <a:rPr lang="en-US" sz="900" dirty="0"/>
-              <a:t> &gt;   &lt; </a:t>
-            </a:r>
-            <a:r>
-              <a:rPr lang="en-US" sz="900" dirty="0" err="1"/>
-              <a:t>casesTotal</a:t>
-            </a:r>
-            <a:r>
-              <a:rPr lang="en-US" sz="900" dirty="0"/>
-              <a:t> &gt;      &lt; cases100k &gt;</a:t>
-            </a:r>
-          </a:p>
-          <a:p>
-            <a:r>
-              <a:rPr lang="en-US" sz="900" dirty="0"/>
-              <a:t>&lt; </a:t>
-            </a:r>
-            <a:r>
-              <a:rPr lang="en-US" sz="900" dirty="0" err="1"/>
-              <a:t>labelDeaths</a:t>
-            </a:r>
-            <a:r>
-              <a:rPr lang="en-US" sz="900" dirty="0"/>
-              <a:t> &gt; &lt; </a:t>
-            </a:r>
-            <a:r>
-              <a:rPr lang="en-US" sz="900" dirty="0" err="1"/>
-              <a:t>deathsTotal</a:t>
-            </a:r>
-            <a:r>
-              <a:rPr lang="en-US" sz="900" dirty="0"/>
-              <a:t> &gt;&lt; deaths100k &gt;</a:t>
-            </a:r>
-          </a:p>
-          <a:p>
-            <a:r>
-              <a:rPr lang="en-US" sz="800" dirty="0"/>
-              <a:t>&lt;</a:t>
-            </a:r>
-            <a:r>
-              <a:rPr lang="en-US" sz="800" dirty="0" err="1"/>
-              <a:t>labelIncidents</a:t>
-            </a:r>
-            <a:r>
-              <a:rPr lang="en-US" sz="800" dirty="0"/>
-              <a:t> &gt;&lt; </a:t>
-            </a:r>
-            <a:r>
-              <a:rPr lang="en-US" sz="800" dirty="0" err="1"/>
-              <a:t>incidentsTotal</a:t>
-            </a:r>
-            <a:r>
-              <a:rPr lang="en-US" sz="800" dirty="0"/>
-              <a:t> &gt;&lt; incidents100k &gt;</a:t>
-            </a:r>
-          </a:p>
-        </p:txBody>
-      </p:sp>
-      <p:sp>
-        <p:nvSpPr>
-          <p:cNvPr id="21" name="Textfeld 20">
+            <a:r>
+              <a:rPr lang="en-US" sz="900"/>
+              <a:t>With an incidence of 158 cases within 7 days per 100 thousand inhabitants, the following regulations must be followed</a:t>
+            </a:r>
+          </a:p>
+        </p:txBody>
+      </p:sp>
+      <p:sp>
+        <p:nvSpPr>
+          <p:cNvPr id="28" name="Rechteck 27">
             <a:extLst>
               <a:ext uri="{FF2B5EF4-FFF2-40B4-BE49-F238E27FC236}">
-                <a16:creationId xmlns:a16="http://schemas.microsoft.com/office/drawing/2014/main" id="{035DE1BA-846F-2440-815C-92D7EE39EDEF}"/>
+                <a16:creationId xmlns:a16="http://schemas.microsoft.com/office/drawing/2014/main" id="{9F8EB9A2-06F6-AF4B-8700-A50AB8604FE4}"/>
+              </a:ext>
+            </a:extLst>
+          </p:cNvPr>
+          <p:cNvSpPr/>
+          <p:nvPr/>
+        </p:nvSpPr>
+        <p:spPr>
+          <a:xfrm>
+            <a:off x="701043" y="3686093"/>
+            <a:ext cx="242233" cy="165937"/>
+          </a:xfrm>
+          <a:prstGeom prst="rect">
+            <a:avLst/>
+          </a:prstGeom>
+        </p:spPr>
+        <p:style>
+          <a:lnRef idx="2">
+            <a:schemeClr val="accent1">
+              <a:shade val="50000"/>
+            </a:schemeClr>
+          </a:lnRef>
+          <a:fillRef idx="1">
+            <a:schemeClr val="accent1"/>
+          </a:fillRef>
+          <a:effectRef idx="0">
+            <a:schemeClr val="accent1"/>
+          </a:effectRef>
+          <a:fontRef idx="minor">
+            <a:schemeClr val="lt1"/>
+          </a:fontRef>
+        </p:style>
+        <p:txBody>
+          <a:bodyPr rtlCol="0" anchor="ctr"/>
+          <a:lstStyle/>
+          <a:p>
+            <a:pPr algn="ctr"/>
+            <a:endParaRPr lang="en-US"/>
+          </a:p>
+        </p:txBody>
+      </p:sp>
+      <p:sp>
+        <p:nvSpPr>
+          <p:cNvPr id="29" name="Textfeld 28">
+            <a:extLst>
+              <a:ext uri="{FF2B5EF4-FFF2-40B4-BE49-F238E27FC236}">
+                <a16:creationId xmlns:a16="http://schemas.microsoft.com/office/drawing/2014/main" id="{67B1779E-8DA3-6041-936A-06B082B841F4}"/>
               </a:ext>
             </a:extLst>
           </p:cNvPr>
@@ -3742,20 +4765,13 @@
         </p:nvSpPr>
         <p:spPr>
           <a:xfrm>
-            <a:off x="3889075" y="2480262"/>
-            <a:ext cx="2359325" cy="230832"/>
+            <a:off x="995177" y="3653769"/>
+            <a:ext cx="1588169" cy="246221"/>
           </a:xfrm>
           <a:prstGeom prst="rect">
             <a:avLst/>
           </a:prstGeom>
           <a:noFill/>
-          <a:ln>
-            <a:solidFill>
-              <a:schemeClr val="accent1">
-                <a:shade val="50000"/>
-              </a:schemeClr>
-            </a:solidFill>
-          </a:ln>
         </p:spPr>
         <p:txBody>
           <a:bodyPr wrap="square" rtlCol="0">
@@ -3763,28 +4779,146 @@
           </a:bodyPr>
           <a:lstStyle/>
           <a:p>
-            <a:pPr algn="ctr"/>
-            <a:r>
-              <a:rPr lang="en-US" sz="900" dirty="0"/>
-              <a:t>&lt; </a:t>
-            </a:r>
-            <a:r>
-              <a:rPr lang="en-US" sz="900" dirty="0" err="1"/>
-              <a:t>labelKindOf</a:t>
-            </a:r>
-            <a:r>
-              <a:rPr lang="en-US" sz="900" dirty="0"/>
-              <a:t> &gt;</a:t>
-            </a:r>
-          </a:p>
-        </p:txBody>
-      </p:sp>
-      <p:sp>
-        <p:nvSpPr>
-          <p:cNvPr id="22" name="Textfeld 21">
+            <a:r>
+              <a:rPr lang="en-US" sz="1000" dirty="0"/>
+              <a:t>Text </a:t>
+            </a:r>
+            <a:r>
+              <a:rPr lang="en-US" sz="1000" dirty="0" err="1"/>
+              <a:t>feld</a:t>
+            </a:r>
+            <a:endParaRPr lang="en-US" sz="1000" dirty="0"/>
+          </a:p>
+        </p:txBody>
+      </p:sp>
+      <p:sp>
+        <p:nvSpPr>
+          <p:cNvPr id="30" name="Rechteck 29">
             <a:extLst>
               <a:ext uri="{FF2B5EF4-FFF2-40B4-BE49-F238E27FC236}">
-                <a16:creationId xmlns:a16="http://schemas.microsoft.com/office/drawing/2014/main" id="{A647B424-CB71-564D-B6C8-DF826CED83CA}"/>
+                <a16:creationId xmlns:a16="http://schemas.microsoft.com/office/drawing/2014/main" id="{70A0B8C7-E5DC-E746-9511-4FCCB1F56D10}"/>
+              </a:ext>
+            </a:extLst>
+          </p:cNvPr>
+          <p:cNvSpPr/>
+          <p:nvPr/>
+        </p:nvSpPr>
+        <p:spPr>
+          <a:xfrm>
+            <a:off x="4016955" y="1554274"/>
+            <a:ext cx="2359325" cy="3986842"/>
+          </a:xfrm>
+          <a:prstGeom prst="rect">
+            <a:avLst/>
+          </a:prstGeom>
+          <a:noFill/>
+          <a:ln w="12700"/>
+        </p:spPr>
+        <p:style>
+          <a:lnRef idx="2">
+            <a:schemeClr val="accent1">
+              <a:shade val="50000"/>
+            </a:schemeClr>
+          </a:lnRef>
+          <a:fillRef idx="1">
+            <a:schemeClr val="accent1"/>
+          </a:fillRef>
+          <a:effectRef idx="0">
+            <a:schemeClr val="accent1"/>
+          </a:effectRef>
+          <a:fontRef idx="minor">
+            <a:schemeClr val="lt1"/>
+          </a:fontRef>
+        </p:style>
+        <p:txBody>
+          <a:bodyPr rtlCol="0" anchor="ctr"/>
+          <a:lstStyle/>
+          <a:p>
+            <a:pPr algn="ctr"/>
+            <a:endParaRPr lang="en-US"/>
+          </a:p>
+        </p:txBody>
+      </p:sp>
+      <p:sp>
+        <p:nvSpPr>
+          <p:cNvPr id="31" name="Rechteck 30">
+            <a:extLst>
+              <a:ext uri="{FF2B5EF4-FFF2-40B4-BE49-F238E27FC236}">
+                <a16:creationId xmlns:a16="http://schemas.microsoft.com/office/drawing/2014/main" id="{6EA40FAE-0C19-0641-8322-ACBFC0E51966}"/>
+              </a:ext>
+            </a:extLst>
+          </p:cNvPr>
+          <p:cNvSpPr/>
+          <p:nvPr/>
+        </p:nvSpPr>
+        <p:spPr>
+          <a:xfrm>
+            <a:off x="4044203" y="9038737"/>
+            <a:ext cx="2359326" cy="311974"/>
+          </a:xfrm>
+          <a:prstGeom prst="rect">
+            <a:avLst/>
+          </a:prstGeom>
+          <a:solidFill>
+            <a:schemeClr val="bg1">
+              <a:lumMod val="85000"/>
+            </a:schemeClr>
+          </a:solidFill>
+        </p:spPr>
+        <p:style>
+          <a:lnRef idx="2">
+            <a:schemeClr val="accent1">
+              <a:shade val="50000"/>
+            </a:schemeClr>
+          </a:lnRef>
+          <a:fillRef idx="1">
+            <a:schemeClr val="accent1"/>
+          </a:fillRef>
+          <a:effectRef idx="0">
+            <a:schemeClr val="accent1"/>
+          </a:effectRef>
+          <a:fontRef idx="minor">
+            <a:schemeClr val="lt1"/>
+          </a:fontRef>
+        </p:style>
+        <p:txBody>
+          <a:bodyPr rtlCol="0" anchor="ctr"/>
+          <a:lstStyle/>
+          <a:p>
+            <a:pPr algn="ctr"/>
+            <a:r>
+              <a:rPr lang="en-US" sz="1000" dirty="0">
+                <a:solidFill>
+                  <a:schemeClr val="tx1"/>
+                </a:solidFill>
+              </a:rPr>
+              <a:t>Land          </a:t>
+            </a:r>
+            <a:r>
+              <a:rPr lang="en-US" sz="1000" dirty="0" err="1">
+                <a:solidFill>
+                  <a:schemeClr val="tx1"/>
+                </a:solidFill>
+              </a:rPr>
+              <a:t>Bundesland</a:t>
+            </a:r>
+            <a:r>
+              <a:rPr lang="en-US" sz="1000" dirty="0">
+                <a:solidFill>
+                  <a:schemeClr val="tx1"/>
+                </a:solidFill>
+              </a:rPr>
+              <a:t>         Landkreis</a:t>
+            </a:r>
+          </a:p>
+        </p:txBody>
+      </p:sp>
+      <p:sp>
+        <p:nvSpPr>
+          <p:cNvPr id="32" name="Textfeld 31">
+            <a:extLst>
+              <a:ext uri="{FF2B5EF4-FFF2-40B4-BE49-F238E27FC236}">
+                <a16:creationId xmlns:a16="http://schemas.microsoft.com/office/drawing/2014/main" id="{0A296350-BC34-5C46-A762-A07BF39F00E9}"/>
               </a:ext>
             </a:extLst>
           </p:cNvPr>
@@ -3793,8 +4927,8 @@
         </p:nvSpPr>
         <p:spPr>
           <a:xfrm>
-            <a:off x="601589" y="758886"/>
-            <a:ext cx="2958310" cy="369332"/>
+            <a:off x="3971781" y="1562580"/>
+            <a:ext cx="1522640" cy="400110"/>
           </a:xfrm>
           <a:prstGeom prst="rect">
             <a:avLst/>
@@ -3802,15 +4936,1394 @@
           <a:noFill/>
         </p:spPr>
         <p:txBody>
+          <a:bodyPr wrap="square" rtlCol="0">
+            <a:spAutoFit/>
+          </a:bodyPr>
+          <a:lstStyle/>
+          <a:p>
+            <a:r>
+              <a:rPr lang="en-US" sz="1000" dirty="0"/>
+              <a:t>&lt;</a:t>
+            </a:r>
+            <a:r>
+              <a:rPr lang="en-US" sz="1000" dirty="0" err="1"/>
+              <a:t>LabelRKIAsOf</a:t>
+            </a:r>
+            <a:r>
+              <a:rPr lang="en-US" sz="1000" dirty="0"/>
+              <a:t>&gt;</a:t>
+            </a:r>
+          </a:p>
+          <a:p>
+            <a:r>
+              <a:rPr lang="en-US" sz="1000" dirty="0"/>
+              <a:t>&lt;</a:t>
+            </a:r>
+            <a:r>
+              <a:rPr lang="en-US" sz="1000" dirty="0" err="1"/>
+              <a:t>ValueRKIAsOf</a:t>
+            </a:r>
+            <a:r>
+              <a:rPr lang="en-US" sz="1000" dirty="0"/>
+              <a:t>&gt;</a:t>
+            </a:r>
+          </a:p>
+        </p:txBody>
+      </p:sp>
+      <p:sp>
+        <p:nvSpPr>
+          <p:cNvPr id="33" name="Abgerundetes Rechteck 32">
+            <a:extLst>
+              <a:ext uri="{FF2B5EF4-FFF2-40B4-BE49-F238E27FC236}">
+                <a16:creationId xmlns:a16="http://schemas.microsoft.com/office/drawing/2014/main" id="{7130842C-191C-4D4C-A0EE-F2F29AC41AA4}"/>
+              </a:ext>
+            </a:extLst>
+          </p:cNvPr>
+          <p:cNvSpPr/>
+          <p:nvPr/>
+        </p:nvSpPr>
+        <p:spPr>
+          <a:xfrm>
+            <a:off x="5539595" y="1635585"/>
+            <a:ext cx="777750" cy="232322"/>
+          </a:xfrm>
+          <a:prstGeom prst="roundRect">
+            <a:avLst/>
+          </a:prstGeom>
+          <a:solidFill>
+            <a:schemeClr val="accent1"/>
+          </a:solidFill>
+        </p:spPr>
+        <p:style>
+          <a:lnRef idx="2">
+            <a:schemeClr val="accent1">
+              <a:shade val="50000"/>
+            </a:schemeClr>
+          </a:lnRef>
+          <a:fillRef idx="1">
+            <a:schemeClr val="accent1"/>
+          </a:fillRef>
+          <a:effectRef idx="0">
+            <a:schemeClr val="accent1"/>
+          </a:effectRef>
+          <a:fontRef idx="minor">
+            <a:schemeClr val="lt1"/>
+          </a:fontRef>
+        </p:style>
+        <p:txBody>
+          <a:bodyPr lIns="0" rIns="0" rtlCol="0" anchor="ctr"/>
+          <a:lstStyle/>
+          <a:p>
+            <a:pPr algn="ctr"/>
+            <a:r>
+              <a:rPr lang="en-US" sz="800" dirty="0"/>
+              <a:t>&lt;</a:t>
+            </a:r>
+            <a:r>
+              <a:rPr lang="en-US" sz="800" dirty="0" err="1"/>
+              <a:t>HelpButton</a:t>
+            </a:r>
+            <a:r>
+              <a:rPr lang="en-US" sz="800" dirty="0"/>
+              <a:t>&gt;</a:t>
+            </a:r>
+          </a:p>
+        </p:txBody>
+      </p:sp>
+      <p:sp>
+        <p:nvSpPr>
+          <p:cNvPr id="34" name="Textfeld 33">
+            <a:extLst>
+              <a:ext uri="{FF2B5EF4-FFF2-40B4-BE49-F238E27FC236}">
+                <a16:creationId xmlns:a16="http://schemas.microsoft.com/office/drawing/2014/main" id="{BE329DA9-AF1D-4F47-8955-B33911FE70FA}"/>
+              </a:ext>
+            </a:extLst>
+          </p:cNvPr>
+          <p:cNvSpPr txBox="1"/>
+          <p:nvPr/>
+        </p:nvSpPr>
+        <p:spPr>
+          <a:xfrm>
+            <a:off x="3970855" y="1963767"/>
+            <a:ext cx="1581317" cy="338554"/>
+          </a:xfrm>
+          <a:prstGeom prst="rect">
+            <a:avLst/>
+          </a:prstGeom>
+          <a:noFill/>
+        </p:spPr>
+        <p:txBody>
+          <a:bodyPr wrap="square" rtlCol="0">
+            <a:spAutoFit/>
+          </a:bodyPr>
+          <a:lstStyle/>
+          <a:p>
+            <a:r>
+              <a:rPr lang="en-US" sz="800" dirty="0"/>
+              <a:t>&lt;</a:t>
+            </a:r>
+            <a:r>
+              <a:rPr lang="en-US" sz="800" dirty="0" err="1"/>
+              <a:t>LabelRKILastRetrieved</a:t>
+            </a:r>
+            <a:r>
+              <a:rPr lang="en-US" sz="800" dirty="0"/>
+              <a:t>&gt;</a:t>
+            </a:r>
+          </a:p>
+          <a:p>
+            <a:r>
+              <a:rPr lang="en-US" sz="800" dirty="0"/>
+              <a:t>&lt;</a:t>
+            </a:r>
+            <a:r>
+              <a:rPr lang="en-US" sz="800" dirty="0" err="1"/>
+              <a:t>ValueRKILastRetrieved</a:t>
+            </a:r>
+            <a:r>
+              <a:rPr lang="en-US" sz="800" dirty="0"/>
+              <a:t>&gt;</a:t>
+            </a:r>
+          </a:p>
+        </p:txBody>
+      </p:sp>
+      <p:sp>
+        <p:nvSpPr>
+          <p:cNvPr id="35" name="Rechteck 34">
+            <a:extLst>
+              <a:ext uri="{FF2B5EF4-FFF2-40B4-BE49-F238E27FC236}">
+                <a16:creationId xmlns:a16="http://schemas.microsoft.com/office/drawing/2014/main" id="{8584B014-3ECD-A743-A9F9-27E334C06CBA}"/>
+              </a:ext>
+            </a:extLst>
+          </p:cNvPr>
+          <p:cNvSpPr/>
+          <p:nvPr/>
+        </p:nvSpPr>
+        <p:spPr>
+          <a:xfrm>
+            <a:off x="5571412" y="9046350"/>
+            <a:ext cx="824109" cy="304362"/>
+          </a:xfrm>
+          <a:prstGeom prst="rect">
+            <a:avLst/>
+          </a:prstGeom>
+          <a:solidFill>
+            <a:schemeClr val="accent1">
+              <a:alpha val="32000"/>
+            </a:schemeClr>
+          </a:solidFill>
+        </p:spPr>
+        <p:style>
+          <a:lnRef idx="2">
+            <a:schemeClr val="accent1">
+              <a:shade val="50000"/>
+            </a:schemeClr>
+          </a:lnRef>
+          <a:fillRef idx="1">
+            <a:schemeClr val="accent1"/>
+          </a:fillRef>
+          <a:effectRef idx="0">
+            <a:schemeClr val="accent1"/>
+          </a:effectRef>
+          <a:fontRef idx="minor">
+            <a:schemeClr val="lt1"/>
+          </a:fontRef>
+        </p:style>
+        <p:txBody>
+          <a:bodyPr rtlCol="0" anchor="ctr"/>
+          <a:lstStyle/>
+          <a:p>
+            <a:pPr algn="ctr"/>
+            <a:endParaRPr lang="en-US"/>
+          </a:p>
+        </p:txBody>
+      </p:sp>
+      <p:cxnSp>
+        <p:nvCxnSpPr>
+          <p:cNvPr id="36" name="Gerade Verbindung 35">
+            <a:extLst>
+              <a:ext uri="{FF2B5EF4-FFF2-40B4-BE49-F238E27FC236}">
+                <a16:creationId xmlns:a16="http://schemas.microsoft.com/office/drawing/2014/main" id="{B7D0D816-25FE-2743-97B3-EC708717F8BF}"/>
+              </a:ext>
+            </a:extLst>
+          </p:cNvPr>
+          <p:cNvCxnSpPr/>
+          <p:nvPr/>
+        </p:nvCxnSpPr>
+        <p:spPr>
+          <a:xfrm>
+            <a:off x="4044202" y="6103034"/>
+            <a:ext cx="2303193" cy="0"/>
+          </a:xfrm>
+          <a:prstGeom prst="line">
+            <a:avLst/>
+          </a:prstGeom>
+        </p:spPr>
+        <p:style>
+          <a:lnRef idx="1">
+            <a:schemeClr val="accent1"/>
+          </a:lnRef>
+          <a:fillRef idx="0">
+            <a:schemeClr val="accent1"/>
+          </a:fillRef>
+          <a:effectRef idx="0">
+            <a:schemeClr val="accent1"/>
+          </a:effectRef>
+          <a:fontRef idx="minor">
+            <a:schemeClr val="tx1"/>
+          </a:fontRef>
+        </p:style>
+      </p:cxnSp>
+      <p:sp>
+        <p:nvSpPr>
+          <p:cNvPr id="37" name="Textfeld 36">
+            <a:extLst>
+              <a:ext uri="{FF2B5EF4-FFF2-40B4-BE49-F238E27FC236}">
+                <a16:creationId xmlns:a16="http://schemas.microsoft.com/office/drawing/2014/main" id="{5E4A1141-1B6B-F94A-B9D2-DBAB01433192}"/>
+              </a:ext>
+            </a:extLst>
+          </p:cNvPr>
+          <p:cNvSpPr txBox="1"/>
+          <p:nvPr/>
+        </p:nvSpPr>
+        <p:spPr>
+          <a:xfrm>
+            <a:off x="4041007" y="6098637"/>
+            <a:ext cx="2359325" cy="538609"/>
+          </a:xfrm>
+          <a:prstGeom prst="rect">
+            <a:avLst/>
+          </a:prstGeom>
+          <a:noFill/>
+        </p:spPr>
+        <p:txBody>
+          <a:bodyPr wrap="square" rtlCol="0">
+            <a:spAutoFit/>
+          </a:bodyPr>
+          <a:lstStyle/>
+          <a:p>
+            <a:r>
+              <a:rPr lang="en-US" sz="1100" dirty="0"/>
+              <a:t>&lt;</a:t>
+            </a:r>
+            <a:r>
+              <a:rPr lang="en-US" sz="1100" dirty="0" err="1"/>
+              <a:t>LabelSelectedName</a:t>
+            </a:r>
+            <a:r>
+              <a:rPr lang="en-US" sz="1100" dirty="0"/>
+              <a:t>&gt;</a:t>
+            </a:r>
+          </a:p>
+          <a:p>
+            <a:r>
+              <a:rPr lang="en-US" sz="800" dirty="0"/>
+              <a:t>&lt;</a:t>
+            </a:r>
+            <a:r>
+              <a:rPr lang="en-US" sz="800" dirty="0" err="1"/>
+              <a:t>LabelCases</a:t>
+            </a:r>
+            <a:r>
+              <a:rPr lang="en-US" sz="800" dirty="0"/>
+              <a:t>&gt;  </a:t>
+            </a:r>
+          </a:p>
+          <a:p>
+            <a:r>
+              <a:rPr lang="en-US" sz="800" dirty="0"/>
+              <a:t> &lt;LabelCases7 days</a:t>
+            </a:r>
+            <a:r>
+              <a:rPr lang="en-US" sz="1000" dirty="0"/>
+              <a:t>&gt;</a:t>
+            </a:r>
+          </a:p>
+        </p:txBody>
+      </p:sp>
+      <p:sp>
+        <p:nvSpPr>
+          <p:cNvPr id="38" name="Abgerundetes Rechteck 37">
+            <a:extLst>
+              <a:ext uri="{FF2B5EF4-FFF2-40B4-BE49-F238E27FC236}">
+                <a16:creationId xmlns:a16="http://schemas.microsoft.com/office/drawing/2014/main" id="{976E81FF-D9B0-854B-B989-19E065461ED6}"/>
+              </a:ext>
+            </a:extLst>
+          </p:cNvPr>
+          <p:cNvSpPr/>
+          <p:nvPr/>
+        </p:nvSpPr>
+        <p:spPr>
+          <a:xfrm>
+            <a:off x="5539595" y="2030227"/>
+            <a:ext cx="777750" cy="232322"/>
+          </a:xfrm>
+          <a:prstGeom prst="roundRect">
+            <a:avLst/>
+          </a:prstGeom>
+          <a:solidFill>
+            <a:schemeClr val="accent1"/>
+          </a:solidFill>
+        </p:spPr>
+        <p:style>
+          <a:lnRef idx="2">
+            <a:schemeClr val="accent1">
+              <a:shade val="50000"/>
+            </a:schemeClr>
+          </a:lnRef>
+          <a:fillRef idx="1">
+            <a:schemeClr val="accent1"/>
+          </a:fillRef>
+          <a:effectRef idx="0">
+            <a:schemeClr val="accent1"/>
+          </a:effectRef>
+          <a:fontRef idx="minor">
+            <a:schemeClr val="lt1"/>
+          </a:fontRef>
+        </p:style>
+        <p:txBody>
+          <a:bodyPr lIns="0" rIns="0" rtlCol="0" anchor="ctr"/>
+          <a:lstStyle/>
+          <a:p>
+            <a:pPr algn="ctr"/>
+            <a:r>
+              <a:rPr lang="en-US" sz="800" dirty="0"/>
+              <a:t>&lt;</a:t>
+            </a:r>
+            <a:r>
+              <a:rPr lang="en-US" sz="800" dirty="0" err="1"/>
+              <a:t>RefreshButton</a:t>
+            </a:r>
+            <a:r>
+              <a:rPr lang="en-US" sz="800" dirty="0"/>
+              <a:t>&gt;</a:t>
+            </a:r>
+          </a:p>
+        </p:txBody>
+      </p:sp>
+      <p:sp>
+        <p:nvSpPr>
+          <p:cNvPr id="39" name="Abgerundetes Rechteck 38">
+            <a:extLst>
+              <a:ext uri="{FF2B5EF4-FFF2-40B4-BE49-F238E27FC236}">
+                <a16:creationId xmlns:a16="http://schemas.microsoft.com/office/drawing/2014/main" id="{4D5F4FBF-EA17-A14E-8467-4E4322C42776}"/>
+              </a:ext>
+            </a:extLst>
+          </p:cNvPr>
+          <p:cNvSpPr/>
+          <p:nvPr/>
+        </p:nvSpPr>
+        <p:spPr>
+          <a:xfrm>
+            <a:off x="4135647" y="6668024"/>
+            <a:ext cx="720000" cy="232322"/>
+          </a:xfrm>
+          <a:prstGeom prst="roundRect">
+            <a:avLst/>
+          </a:prstGeom>
+          <a:solidFill>
+            <a:schemeClr val="accent1"/>
+          </a:solidFill>
+        </p:spPr>
+        <p:style>
+          <a:lnRef idx="2">
+            <a:schemeClr val="accent1">
+              <a:shade val="50000"/>
+            </a:schemeClr>
+          </a:lnRef>
+          <a:fillRef idx="1">
+            <a:schemeClr val="accent1"/>
+          </a:fillRef>
+          <a:effectRef idx="0">
+            <a:schemeClr val="accent1"/>
+          </a:effectRef>
+          <a:fontRef idx="minor">
+            <a:schemeClr val="lt1"/>
+          </a:fontRef>
+        </p:style>
+        <p:txBody>
+          <a:bodyPr lIns="0" rIns="0" rtlCol="0" anchor="ctr"/>
+          <a:lstStyle/>
+          <a:p>
+            <a:pPr algn="ctr"/>
+            <a:r>
+              <a:rPr lang="en-US" sz="800" dirty="0"/>
+              <a:t>&lt;</a:t>
+            </a:r>
+            <a:r>
+              <a:rPr lang="en-US" sz="800" dirty="0" err="1"/>
+              <a:t>SelectButton</a:t>
+            </a:r>
+            <a:r>
+              <a:rPr lang="en-US" sz="800" dirty="0"/>
+              <a:t>&gt;</a:t>
+            </a:r>
+          </a:p>
+        </p:txBody>
+      </p:sp>
+      <p:sp>
+        <p:nvSpPr>
+          <p:cNvPr id="40" name="Abgerundetes Rechteck 39">
+            <a:extLst>
+              <a:ext uri="{FF2B5EF4-FFF2-40B4-BE49-F238E27FC236}">
+                <a16:creationId xmlns:a16="http://schemas.microsoft.com/office/drawing/2014/main" id="{A0AFD3A1-3563-604A-8D92-1E76693A6A21}"/>
+              </a:ext>
+            </a:extLst>
+          </p:cNvPr>
+          <p:cNvSpPr/>
+          <p:nvPr/>
+        </p:nvSpPr>
+        <p:spPr>
+          <a:xfrm>
+            <a:off x="5616585" y="6668024"/>
+            <a:ext cx="720000" cy="232322"/>
+          </a:xfrm>
+          <a:prstGeom prst="roundRect">
+            <a:avLst/>
+          </a:prstGeom>
+          <a:solidFill>
+            <a:schemeClr val="accent1"/>
+          </a:solidFill>
+        </p:spPr>
+        <p:style>
+          <a:lnRef idx="2">
+            <a:schemeClr val="accent1">
+              <a:shade val="50000"/>
+            </a:schemeClr>
+          </a:lnRef>
+          <a:fillRef idx="1">
+            <a:schemeClr val="accent1"/>
+          </a:fillRef>
+          <a:effectRef idx="0">
+            <a:schemeClr val="accent1"/>
+          </a:effectRef>
+          <a:fontRef idx="minor">
+            <a:schemeClr val="lt1"/>
+          </a:fontRef>
+        </p:style>
+        <p:txBody>
+          <a:bodyPr lIns="0" rIns="0" rtlCol="0" anchor="ctr"/>
+          <a:lstStyle/>
+          <a:p>
+            <a:pPr algn="ctr"/>
+            <a:r>
+              <a:rPr lang="en-US" sz="800" dirty="0"/>
+              <a:t>&lt;</a:t>
+            </a:r>
+            <a:r>
+              <a:rPr lang="en-US" sz="800" dirty="0" err="1"/>
+              <a:t>DetailsButton</a:t>
+            </a:r>
+            <a:r>
+              <a:rPr lang="en-US" sz="800" dirty="0"/>
+              <a:t>&gt;</a:t>
+            </a:r>
+          </a:p>
+        </p:txBody>
+      </p:sp>
+      <p:sp>
+        <p:nvSpPr>
+          <p:cNvPr id="41" name="Textfeld 40">
+            <a:extLst>
+              <a:ext uri="{FF2B5EF4-FFF2-40B4-BE49-F238E27FC236}">
+                <a16:creationId xmlns:a16="http://schemas.microsoft.com/office/drawing/2014/main" id="{E939BBE9-9C41-0648-AA03-63094B149FE2}"/>
+              </a:ext>
+            </a:extLst>
+          </p:cNvPr>
+          <p:cNvSpPr txBox="1"/>
+          <p:nvPr/>
+        </p:nvSpPr>
+        <p:spPr>
+          <a:xfrm>
+            <a:off x="4028186" y="6988554"/>
+            <a:ext cx="2375343" cy="558499"/>
+          </a:xfrm>
+          <a:prstGeom prst="rect">
+            <a:avLst/>
+          </a:prstGeom>
+          <a:noFill/>
+        </p:spPr>
+        <p:txBody>
+          <a:bodyPr wrap="square" rtlCol="0" anchor="ctr" anchorCtr="1">
+            <a:noAutofit/>
+          </a:bodyPr>
+          <a:lstStyle/>
+          <a:p>
+            <a:r>
+              <a:rPr lang="en-US" sz="900" dirty="0"/>
+              <a:t>&lt;</a:t>
+            </a:r>
+            <a:r>
+              <a:rPr lang="en-US" sz="900" dirty="0" err="1"/>
+              <a:t>LabelRegulations</a:t>
+            </a:r>
+            <a:r>
+              <a:rPr lang="en-US" sz="900" dirty="0"/>
+              <a:t>&gt;</a:t>
+            </a:r>
+          </a:p>
+        </p:txBody>
+      </p:sp>
+      <p:sp>
+        <p:nvSpPr>
+          <p:cNvPr id="42" name="Rechteck 41">
+            <a:extLst>
+              <a:ext uri="{FF2B5EF4-FFF2-40B4-BE49-F238E27FC236}">
+                <a16:creationId xmlns:a16="http://schemas.microsoft.com/office/drawing/2014/main" id="{387784C1-B92A-CC4A-9B7A-B8056F548FD9}"/>
+              </a:ext>
+            </a:extLst>
+          </p:cNvPr>
+          <p:cNvSpPr/>
+          <p:nvPr/>
+        </p:nvSpPr>
+        <p:spPr>
+          <a:xfrm>
+            <a:off x="701043" y="7705404"/>
+            <a:ext cx="242233" cy="165937"/>
+          </a:xfrm>
+          <a:prstGeom prst="rect">
+            <a:avLst/>
+          </a:prstGeom>
+        </p:spPr>
+        <p:style>
+          <a:lnRef idx="2">
+            <a:schemeClr val="accent1">
+              <a:shade val="50000"/>
+            </a:schemeClr>
+          </a:lnRef>
+          <a:fillRef idx="1">
+            <a:schemeClr val="accent1"/>
+          </a:fillRef>
+          <a:effectRef idx="0">
+            <a:schemeClr val="accent1"/>
+          </a:effectRef>
+          <a:fontRef idx="minor">
+            <a:schemeClr val="lt1"/>
+          </a:fontRef>
+        </p:style>
+        <p:txBody>
+          <a:bodyPr rtlCol="0" anchor="ctr"/>
+          <a:lstStyle/>
+          <a:p>
+            <a:pPr algn="ctr"/>
+            <a:endParaRPr lang="en-US"/>
+          </a:p>
+        </p:txBody>
+      </p:sp>
+      <p:sp>
+        <p:nvSpPr>
+          <p:cNvPr id="43" name="Textfeld 42">
+            <a:extLst>
+              <a:ext uri="{FF2B5EF4-FFF2-40B4-BE49-F238E27FC236}">
+                <a16:creationId xmlns:a16="http://schemas.microsoft.com/office/drawing/2014/main" id="{99F00303-CBD9-594D-A188-30FF299B8770}"/>
+              </a:ext>
+            </a:extLst>
+          </p:cNvPr>
+          <p:cNvSpPr txBox="1"/>
+          <p:nvPr/>
+        </p:nvSpPr>
+        <p:spPr>
+          <a:xfrm>
+            <a:off x="995177" y="7673080"/>
+            <a:ext cx="1588169" cy="246221"/>
+          </a:xfrm>
+          <a:prstGeom prst="rect">
+            <a:avLst/>
+          </a:prstGeom>
+          <a:noFill/>
+        </p:spPr>
+        <p:txBody>
+          <a:bodyPr wrap="square" rtlCol="0">
+            <a:spAutoFit/>
+          </a:bodyPr>
+          <a:lstStyle/>
+          <a:p>
+            <a:r>
+              <a:rPr lang="en-US" sz="1000" dirty="0"/>
+              <a:t>&lt;</a:t>
+            </a:r>
+            <a:r>
+              <a:rPr lang="en-US" sz="1000" dirty="0" err="1"/>
+              <a:t>CellLabel</a:t>
+            </a:r>
+            <a:r>
+              <a:rPr lang="en-US" sz="1000" dirty="0"/>
+              <a:t>&gt;</a:t>
+            </a:r>
+          </a:p>
+        </p:txBody>
+      </p:sp>
+      <p:sp>
+        <p:nvSpPr>
+          <p:cNvPr id="44" name="Rechteck 43">
+            <a:extLst>
+              <a:ext uri="{FF2B5EF4-FFF2-40B4-BE49-F238E27FC236}">
+                <a16:creationId xmlns:a16="http://schemas.microsoft.com/office/drawing/2014/main" id="{04721E26-1251-8342-9862-4DADA497D0B3}"/>
+              </a:ext>
+            </a:extLst>
+          </p:cNvPr>
+          <p:cNvSpPr/>
+          <p:nvPr/>
+        </p:nvSpPr>
+        <p:spPr>
+          <a:xfrm>
+            <a:off x="4024980" y="6105422"/>
+            <a:ext cx="2359325" cy="3245285"/>
+          </a:xfrm>
+          <a:prstGeom prst="rect">
+            <a:avLst/>
+          </a:prstGeom>
+          <a:noFill/>
+          <a:ln w="12700"/>
+        </p:spPr>
+        <p:style>
+          <a:lnRef idx="2">
+            <a:schemeClr val="accent1">
+              <a:shade val="50000"/>
+            </a:schemeClr>
+          </a:lnRef>
+          <a:fillRef idx="1">
+            <a:schemeClr val="accent1"/>
+          </a:fillRef>
+          <a:effectRef idx="0">
+            <a:schemeClr val="accent1"/>
+          </a:effectRef>
+          <a:fontRef idx="minor">
+            <a:schemeClr val="lt1"/>
+          </a:fontRef>
+        </p:style>
+        <p:txBody>
+          <a:bodyPr rtlCol="0" anchor="ctr"/>
+          <a:lstStyle/>
+          <a:p>
+            <a:pPr algn="ctr"/>
+            <a:endParaRPr lang="en-US"/>
+          </a:p>
+        </p:txBody>
+      </p:sp>
+      <p:sp>
+        <p:nvSpPr>
+          <p:cNvPr id="45" name="Rechteck 44">
+            <a:extLst>
+              <a:ext uri="{FF2B5EF4-FFF2-40B4-BE49-F238E27FC236}">
+                <a16:creationId xmlns:a16="http://schemas.microsoft.com/office/drawing/2014/main" id="{2FDF2CEB-2F21-5747-B18C-6BF3633E10B5}"/>
+              </a:ext>
+            </a:extLst>
+          </p:cNvPr>
+          <p:cNvSpPr/>
+          <p:nvPr/>
+        </p:nvSpPr>
+        <p:spPr>
+          <a:xfrm>
+            <a:off x="4024980" y="2358947"/>
+            <a:ext cx="2359325" cy="3190194"/>
+          </a:xfrm>
+          <a:prstGeom prst="rect">
+            <a:avLst/>
+          </a:prstGeom>
+          <a:solidFill>
+            <a:schemeClr val="accent1">
+              <a:lumMod val="20000"/>
+              <a:lumOff val="80000"/>
+            </a:schemeClr>
+          </a:solidFill>
+          <a:ln w="12700"/>
+        </p:spPr>
+        <p:style>
+          <a:lnRef idx="2">
+            <a:schemeClr val="accent1">
+              <a:shade val="50000"/>
+            </a:schemeClr>
+          </a:lnRef>
+          <a:fillRef idx="1">
+            <a:schemeClr val="accent1"/>
+          </a:fillRef>
+          <a:effectRef idx="0">
+            <a:schemeClr val="accent1"/>
+          </a:effectRef>
+          <a:fontRef idx="minor">
+            <a:schemeClr val="lt1"/>
+          </a:fontRef>
+        </p:style>
+        <p:txBody>
+          <a:bodyPr rtlCol="0" anchor="ctr"/>
+          <a:lstStyle/>
+          <a:p>
+            <a:pPr algn="ctr"/>
+            <a:r>
+              <a:rPr lang="en-US" dirty="0" err="1"/>
+              <a:t>ContainerView</a:t>
+            </a:r>
+            <a:endParaRPr lang="en-US" dirty="0"/>
+          </a:p>
+        </p:txBody>
+      </p:sp>
+      <p:sp>
+        <p:nvSpPr>
+          <p:cNvPr id="46" name="Textfeld 45">
+            <a:extLst>
+              <a:ext uri="{FF2B5EF4-FFF2-40B4-BE49-F238E27FC236}">
+                <a16:creationId xmlns:a16="http://schemas.microsoft.com/office/drawing/2014/main" id="{594F31FE-750C-6247-B76A-54A0736C256F}"/>
+              </a:ext>
+            </a:extLst>
+          </p:cNvPr>
+          <p:cNvSpPr txBox="1"/>
+          <p:nvPr/>
+        </p:nvSpPr>
+        <p:spPr>
+          <a:xfrm>
+            <a:off x="3952765" y="5855106"/>
+            <a:ext cx="2450764" cy="246221"/>
+          </a:xfrm>
+          <a:prstGeom prst="rect">
+            <a:avLst/>
+          </a:prstGeom>
+          <a:noFill/>
+        </p:spPr>
+        <p:txBody>
+          <a:bodyPr wrap="square" rtlCol="0">
+            <a:spAutoFit/>
+          </a:bodyPr>
+          <a:lstStyle/>
+          <a:p>
+            <a:r>
+              <a:rPr lang="en-US" sz="1000" dirty="0" err="1"/>
+              <a:t>UITabbar</a:t>
+            </a:r>
+            <a:r>
+              <a:rPr lang="en-US" sz="1000" dirty="0"/>
+              <a:t> with embedded </a:t>
+            </a:r>
+            <a:r>
+              <a:rPr lang="en-US" sz="1000" dirty="0" err="1"/>
+              <a:t>ViewController</a:t>
+            </a:r>
+            <a:endParaRPr lang="en-US" sz="1000" dirty="0"/>
+          </a:p>
+        </p:txBody>
+      </p:sp>
+      <p:sp>
+        <p:nvSpPr>
+          <p:cNvPr id="47" name="Pfeil nach unten 46">
+            <a:extLst>
+              <a:ext uri="{FF2B5EF4-FFF2-40B4-BE49-F238E27FC236}">
+                <a16:creationId xmlns:a16="http://schemas.microsoft.com/office/drawing/2014/main" id="{13B75E79-5658-8C43-BA46-47D435D98D36}"/>
+              </a:ext>
+            </a:extLst>
+          </p:cNvPr>
+          <p:cNvSpPr/>
+          <p:nvPr/>
+        </p:nvSpPr>
+        <p:spPr>
+          <a:xfrm>
+            <a:off x="6179419" y="5334321"/>
+            <a:ext cx="196861" cy="764316"/>
+          </a:xfrm>
+          <a:prstGeom prst="downArrow">
+            <a:avLst/>
+          </a:prstGeom>
+        </p:spPr>
+        <p:style>
+          <a:lnRef idx="2">
+            <a:schemeClr val="accent1">
+              <a:shade val="50000"/>
+            </a:schemeClr>
+          </a:lnRef>
+          <a:fillRef idx="1">
+            <a:schemeClr val="accent1"/>
+          </a:fillRef>
+          <a:effectRef idx="0">
+            <a:schemeClr val="accent1"/>
+          </a:effectRef>
+          <a:fontRef idx="minor">
+            <a:schemeClr val="lt1"/>
+          </a:fontRef>
+        </p:style>
+        <p:txBody>
+          <a:bodyPr rtlCol="0" anchor="ctr"/>
+          <a:lstStyle/>
+          <a:p>
+            <a:pPr algn="ctr"/>
+            <a:endParaRPr lang="en-US"/>
+          </a:p>
+        </p:txBody>
+      </p:sp>
+      <p:sp>
+        <p:nvSpPr>
+          <p:cNvPr id="48" name="Rechteck 47">
+            <a:extLst>
+              <a:ext uri="{FF2B5EF4-FFF2-40B4-BE49-F238E27FC236}">
+                <a16:creationId xmlns:a16="http://schemas.microsoft.com/office/drawing/2014/main" id="{1207412F-6829-CA45-BC21-5A0821E62C2C}"/>
+              </a:ext>
+            </a:extLst>
+          </p:cNvPr>
+          <p:cNvSpPr/>
+          <p:nvPr/>
+        </p:nvSpPr>
+        <p:spPr>
+          <a:xfrm>
+            <a:off x="4035617" y="7538293"/>
+            <a:ext cx="2359325" cy="1500440"/>
+          </a:xfrm>
+          <a:prstGeom prst="rect">
+            <a:avLst/>
+          </a:prstGeom>
+          <a:solidFill>
+            <a:schemeClr val="accent1">
+              <a:lumMod val="20000"/>
+              <a:lumOff val="80000"/>
+            </a:schemeClr>
+          </a:solidFill>
+          <a:ln w="12700"/>
+        </p:spPr>
+        <p:style>
+          <a:lnRef idx="2">
+            <a:schemeClr val="accent1">
+              <a:shade val="50000"/>
+            </a:schemeClr>
+          </a:lnRef>
+          <a:fillRef idx="1">
+            <a:schemeClr val="accent1"/>
+          </a:fillRef>
+          <a:effectRef idx="0">
+            <a:schemeClr val="accent1"/>
+          </a:effectRef>
+          <a:fontRef idx="minor">
+            <a:schemeClr val="lt1"/>
+          </a:fontRef>
+        </p:style>
+        <p:txBody>
+          <a:bodyPr rtlCol="0" anchor="ctr"/>
+          <a:lstStyle/>
+          <a:p>
+            <a:pPr algn="ctr"/>
+            <a:r>
+              <a:rPr lang="en-US" dirty="0" err="1"/>
+              <a:t>ContainerView</a:t>
+            </a:r>
+            <a:endParaRPr lang="en-US" dirty="0"/>
+          </a:p>
+        </p:txBody>
+      </p:sp>
+      <p:sp>
+        <p:nvSpPr>
+          <p:cNvPr id="49" name="Pfeil nach links 48">
+            <a:extLst>
+              <a:ext uri="{FF2B5EF4-FFF2-40B4-BE49-F238E27FC236}">
+                <a16:creationId xmlns:a16="http://schemas.microsoft.com/office/drawing/2014/main" id="{DBF29890-1830-FE4C-A8F0-A600D48B080F}"/>
+              </a:ext>
+            </a:extLst>
+          </p:cNvPr>
+          <p:cNvSpPr/>
+          <p:nvPr/>
+        </p:nvSpPr>
+        <p:spPr>
+          <a:xfrm>
+            <a:off x="3311091" y="8046124"/>
+            <a:ext cx="824556" cy="243153"/>
+          </a:xfrm>
+          <a:prstGeom prst="leftArrow">
+            <a:avLst/>
+          </a:prstGeom>
+        </p:spPr>
+        <p:style>
+          <a:lnRef idx="2">
+            <a:schemeClr val="accent1">
+              <a:shade val="50000"/>
+            </a:schemeClr>
+          </a:lnRef>
+          <a:fillRef idx="1">
+            <a:schemeClr val="accent1"/>
+          </a:fillRef>
+          <a:effectRef idx="0">
+            <a:schemeClr val="accent1"/>
+          </a:effectRef>
+          <a:fontRef idx="minor">
+            <a:schemeClr val="lt1"/>
+          </a:fontRef>
+        </p:style>
+        <p:txBody>
+          <a:bodyPr rtlCol="0" anchor="ctr"/>
+          <a:lstStyle/>
+          <a:p>
+            <a:pPr algn="ctr"/>
+            <a:endParaRPr lang="en-US"/>
+          </a:p>
+        </p:txBody>
+      </p:sp>
+      <p:sp>
+        <p:nvSpPr>
+          <p:cNvPr id="50" name="Rechteck 49">
+            <a:extLst>
+              <a:ext uri="{FF2B5EF4-FFF2-40B4-BE49-F238E27FC236}">
+                <a16:creationId xmlns:a16="http://schemas.microsoft.com/office/drawing/2014/main" id="{6B86F6FF-F5AA-9B4B-8DA2-7AD6FEA93B20}"/>
+              </a:ext>
+            </a:extLst>
+          </p:cNvPr>
+          <p:cNvSpPr/>
+          <p:nvPr/>
+        </p:nvSpPr>
+        <p:spPr>
+          <a:xfrm>
+            <a:off x="581531" y="7560494"/>
+            <a:ext cx="2359325" cy="1500440"/>
+          </a:xfrm>
+          <a:prstGeom prst="rect">
+            <a:avLst/>
+          </a:prstGeom>
+          <a:noFill/>
+          <a:ln w="12700"/>
+        </p:spPr>
+        <p:style>
+          <a:lnRef idx="2">
+            <a:schemeClr val="accent1">
+              <a:shade val="50000"/>
+            </a:schemeClr>
+          </a:lnRef>
+          <a:fillRef idx="1">
+            <a:schemeClr val="accent1"/>
+          </a:fillRef>
+          <a:effectRef idx="0">
+            <a:schemeClr val="accent1"/>
+          </a:effectRef>
+          <a:fontRef idx="minor">
+            <a:schemeClr val="lt1"/>
+          </a:fontRef>
+        </p:style>
+        <p:txBody>
+          <a:bodyPr rtlCol="0" anchor="ctr"/>
+          <a:lstStyle/>
+          <a:p>
+            <a:pPr algn="ctr"/>
+            <a:r>
+              <a:rPr lang="en-US" dirty="0" err="1"/>
+              <a:t>ContanerView</a:t>
+            </a:r>
+            <a:endParaRPr lang="en-US" dirty="0"/>
+          </a:p>
+        </p:txBody>
+      </p:sp>
+      <p:sp>
+        <p:nvSpPr>
+          <p:cNvPr id="51" name="Rechteck 50">
+            <a:extLst>
+              <a:ext uri="{FF2B5EF4-FFF2-40B4-BE49-F238E27FC236}">
+                <a16:creationId xmlns:a16="http://schemas.microsoft.com/office/drawing/2014/main" id="{EED391F3-DD40-E34B-AAC1-A6940028B8C4}"/>
+              </a:ext>
+            </a:extLst>
+          </p:cNvPr>
+          <p:cNvSpPr/>
+          <p:nvPr/>
+        </p:nvSpPr>
+        <p:spPr>
+          <a:xfrm>
+            <a:off x="699438" y="3953996"/>
+            <a:ext cx="242233" cy="165937"/>
+          </a:xfrm>
+          <a:prstGeom prst="rect">
+            <a:avLst/>
+          </a:prstGeom>
+        </p:spPr>
+        <p:style>
+          <a:lnRef idx="2">
+            <a:schemeClr val="accent1">
+              <a:shade val="50000"/>
+            </a:schemeClr>
+          </a:lnRef>
+          <a:fillRef idx="1">
+            <a:schemeClr val="accent1"/>
+          </a:fillRef>
+          <a:effectRef idx="0">
+            <a:schemeClr val="accent1"/>
+          </a:effectRef>
+          <a:fontRef idx="minor">
+            <a:schemeClr val="lt1"/>
+          </a:fontRef>
+        </p:style>
+        <p:txBody>
+          <a:bodyPr rtlCol="0" anchor="ctr"/>
+          <a:lstStyle/>
+          <a:p>
+            <a:pPr algn="ctr"/>
+            <a:endParaRPr lang="en-US"/>
+          </a:p>
+        </p:txBody>
+      </p:sp>
+      <p:sp>
+        <p:nvSpPr>
+          <p:cNvPr id="52" name="Textfeld 51">
+            <a:extLst>
+              <a:ext uri="{FF2B5EF4-FFF2-40B4-BE49-F238E27FC236}">
+                <a16:creationId xmlns:a16="http://schemas.microsoft.com/office/drawing/2014/main" id="{1688E013-E8DF-8C4B-8789-3F1813F38EED}"/>
+              </a:ext>
+            </a:extLst>
+          </p:cNvPr>
+          <p:cNvSpPr txBox="1"/>
+          <p:nvPr/>
+        </p:nvSpPr>
+        <p:spPr>
+          <a:xfrm>
+            <a:off x="993572" y="3921672"/>
+            <a:ext cx="1588169" cy="246221"/>
+          </a:xfrm>
+          <a:prstGeom prst="rect">
+            <a:avLst/>
+          </a:prstGeom>
+          <a:noFill/>
+        </p:spPr>
+        <p:txBody>
+          <a:bodyPr wrap="square" rtlCol="0">
+            <a:spAutoFit/>
+          </a:bodyPr>
+          <a:lstStyle/>
+          <a:p>
+            <a:r>
+              <a:rPr lang="en-US" sz="1000" dirty="0"/>
+              <a:t>Text </a:t>
+            </a:r>
+            <a:r>
+              <a:rPr lang="en-US" sz="1000" dirty="0" err="1"/>
+              <a:t>feld</a:t>
+            </a:r>
+            <a:endParaRPr lang="en-US" sz="1000" dirty="0"/>
+          </a:p>
+        </p:txBody>
+      </p:sp>
+      <p:sp>
+        <p:nvSpPr>
+          <p:cNvPr id="53" name="Rechteck 52">
+            <a:extLst>
+              <a:ext uri="{FF2B5EF4-FFF2-40B4-BE49-F238E27FC236}">
+                <a16:creationId xmlns:a16="http://schemas.microsoft.com/office/drawing/2014/main" id="{0C70848C-B7F7-8644-868B-AD8DB024EE19}"/>
+              </a:ext>
+            </a:extLst>
+          </p:cNvPr>
+          <p:cNvSpPr/>
+          <p:nvPr/>
+        </p:nvSpPr>
+        <p:spPr>
+          <a:xfrm>
+            <a:off x="707461" y="4212271"/>
+            <a:ext cx="242233" cy="165937"/>
+          </a:xfrm>
+          <a:prstGeom prst="rect">
+            <a:avLst/>
+          </a:prstGeom>
+        </p:spPr>
+        <p:style>
+          <a:lnRef idx="2">
+            <a:schemeClr val="accent1">
+              <a:shade val="50000"/>
+            </a:schemeClr>
+          </a:lnRef>
+          <a:fillRef idx="1">
+            <a:schemeClr val="accent1"/>
+          </a:fillRef>
+          <a:effectRef idx="0">
+            <a:schemeClr val="accent1"/>
+          </a:effectRef>
+          <a:fontRef idx="minor">
+            <a:schemeClr val="lt1"/>
+          </a:fontRef>
+        </p:style>
+        <p:txBody>
+          <a:bodyPr rtlCol="0" anchor="ctr"/>
+          <a:lstStyle/>
+          <a:p>
+            <a:pPr algn="ctr"/>
+            <a:endParaRPr lang="en-US"/>
+          </a:p>
+        </p:txBody>
+      </p:sp>
+      <p:sp>
+        <p:nvSpPr>
+          <p:cNvPr id="54" name="Textfeld 53">
+            <a:extLst>
+              <a:ext uri="{FF2B5EF4-FFF2-40B4-BE49-F238E27FC236}">
+                <a16:creationId xmlns:a16="http://schemas.microsoft.com/office/drawing/2014/main" id="{877F7D8B-B84D-BC4E-96DB-06C3133C2ABA}"/>
+              </a:ext>
+            </a:extLst>
+          </p:cNvPr>
+          <p:cNvSpPr txBox="1"/>
+          <p:nvPr/>
+        </p:nvSpPr>
+        <p:spPr>
+          <a:xfrm>
+            <a:off x="1001595" y="4179947"/>
+            <a:ext cx="1588169" cy="246221"/>
+          </a:xfrm>
+          <a:prstGeom prst="rect">
+            <a:avLst/>
+          </a:prstGeom>
+          <a:noFill/>
+        </p:spPr>
+        <p:txBody>
+          <a:bodyPr wrap="square" rtlCol="0">
+            <a:spAutoFit/>
+          </a:bodyPr>
+          <a:lstStyle/>
+          <a:p>
+            <a:r>
+              <a:rPr lang="en-US" sz="1000" dirty="0"/>
+              <a:t>Text </a:t>
+            </a:r>
+            <a:r>
+              <a:rPr lang="en-US" sz="1000" dirty="0" err="1"/>
+              <a:t>feld</a:t>
+            </a:r>
+            <a:endParaRPr lang="en-US" sz="1000" dirty="0"/>
+          </a:p>
+        </p:txBody>
+      </p:sp>
+      <p:sp>
+        <p:nvSpPr>
+          <p:cNvPr id="55" name="Textfeld 54">
+            <a:extLst>
+              <a:ext uri="{FF2B5EF4-FFF2-40B4-BE49-F238E27FC236}">
+                <a16:creationId xmlns:a16="http://schemas.microsoft.com/office/drawing/2014/main" id="{817ADFC2-9FA9-2B49-840B-48C281BC5A51}"/>
+              </a:ext>
+            </a:extLst>
+          </p:cNvPr>
+          <p:cNvSpPr txBox="1"/>
+          <p:nvPr/>
+        </p:nvSpPr>
+        <p:spPr>
+          <a:xfrm>
+            <a:off x="562274" y="7284520"/>
+            <a:ext cx="2450764" cy="246221"/>
+          </a:xfrm>
+          <a:prstGeom prst="rect">
+            <a:avLst/>
+          </a:prstGeom>
+          <a:noFill/>
+        </p:spPr>
+        <p:txBody>
+          <a:bodyPr wrap="square" rtlCol="0">
+            <a:spAutoFit/>
+          </a:bodyPr>
+          <a:lstStyle/>
+          <a:p>
+            <a:r>
+              <a:rPr lang="en-US" sz="1000" dirty="0" err="1"/>
+              <a:t>UITableView</a:t>
+            </a:r>
+            <a:endParaRPr lang="en-US" sz="1000" dirty="0"/>
+          </a:p>
+        </p:txBody>
+      </p:sp>
+      <p:sp>
+        <p:nvSpPr>
+          <p:cNvPr id="56" name="Textfeld 55">
+            <a:extLst>
+              <a:ext uri="{FF2B5EF4-FFF2-40B4-BE49-F238E27FC236}">
+                <a16:creationId xmlns:a16="http://schemas.microsoft.com/office/drawing/2014/main" id="{FC6781BA-5D14-5546-995C-A49ADFD6BEF6}"/>
+              </a:ext>
+            </a:extLst>
+          </p:cNvPr>
+          <p:cNvSpPr txBox="1"/>
+          <p:nvPr/>
+        </p:nvSpPr>
+        <p:spPr>
+          <a:xfrm>
+            <a:off x="567096" y="6035889"/>
+            <a:ext cx="3356784" cy="707886"/>
+          </a:xfrm>
+          <a:prstGeom prst="rect">
+            <a:avLst/>
+          </a:prstGeom>
+          <a:noFill/>
+        </p:spPr>
+        <p:txBody>
+          <a:bodyPr wrap="square" rtlCol="0">
+            <a:spAutoFit/>
+          </a:bodyPr>
+          <a:lstStyle/>
+          <a:p>
+            <a:r>
+              <a:rPr lang="en-US" sz="800" dirty="0"/>
+              <a:t>&lt;</a:t>
+            </a:r>
+            <a:r>
+              <a:rPr lang="en-US" sz="800" dirty="0" err="1"/>
+              <a:t>ValueCases</a:t>
+            </a:r>
+            <a:r>
+              <a:rPr lang="en-US" sz="800" dirty="0"/>
+              <a:t>&gt; &lt;</a:t>
+            </a:r>
+            <a:r>
+              <a:rPr lang="en-US" sz="800" dirty="0" err="1"/>
+              <a:t>ValueDiffCasesYesterday</a:t>
+            </a:r>
+            <a:r>
+              <a:rPr lang="en-US" sz="800" dirty="0"/>
+              <a:t>&gt; &lt;</a:t>
+            </a:r>
+            <a:r>
+              <a:rPr lang="en-US" sz="800" dirty="0" err="1"/>
+              <a:t>ValueDiffCasesLastWeek</a:t>
+            </a:r>
+            <a:r>
+              <a:rPr lang="en-US" sz="800" dirty="0"/>
+              <a:t>&gt;</a:t>
+            </a:r>
+          </a:p>
+          <a:p>
+            <a:endParaRPr lang="en-US" sz="800" dirty="0"/>
+          </a:p>
+          <a:p>
+            <a:r>
+              <a:rPr lang="en-US" sz="800" dirty="0"/>
+              <a:t>&lt;ValueCases7Days&gt; &lt;ValueDiffCasesYesterday7Days&gt; &lt;ValueDiffCasesLastWeek7Days&gt;</a:t>
+            </a:r>
+          </a:p>
+          <a:p>
+            <a:endParaRPr lang="en-US" sz="800" dirty="0"/>
+          </a:p>
+        </p:txBody>
+      </p:sp>
+      <p:sp>
+        <p:nvSpPr>
+          <p:cNvPr id="57" name="Abgerundete rechteckige Legende 56">
+            <a:extLst>
+              <a:ext uri="{FF2B5EF4-FFF2-40B4-BE49-F238E27FC236}">
+                <a16:creationId xmlns:a16="http://schemas.microsoft.com/office/drawing/2014/main" id="{CF4D1DCE-F1E9-C74F-AFA3-5F0AB8D912B7}"/>
+              </a:ext>
+            </a:extLst>
+          </p:cNvPr>
+          <p:cNvSpPr/>
+          <p:nvPr/>
+        </p:nvSpPr>
+        <p:spPr>
+          <a:xfrm>
+            <a:off x="521415" y="5911378"/>
+            <a:ext cx="3449440" cy="816625"/>
+          </a:xfrm>
+          <a:prstGeom prst="wedgeRoundRectCallout">
+            <a:avLst>
+              <a:gd name="adj1" fmla="val 54485"/>
+              <a:gd name="adj2" fmla="val -4244"/>
+              <a:gd name="adj3" fmla="val 16667"/>
+            </a:avLst>
+          </a:prstGeom>
+          <a:noFill/>
+        </p:spPr>
+        <p:style>
+          <a:lnRef idx="2">
+            <a:schemeClr val="accent1">
+              <a:shade val="50000"/>
+            </a:schemeClr>
+          </a:lnRef>
+          <a:fillRef idx="1">
+            <a:schemeClr val="accent1"/>
+          </a:fillRef>
+          <a:effectRef idx="0">
+            <a:schemeClr val="accent1"/>
+          </a:effectRef>
+          <a:fontRef idx="minor">
+            <a:schemeClr val="lt1"/>
+          </a:fontRef>
+        </p:style>
+        <p:txBody>
+          <a:bodyPr rtlCol="0" anchor="ctr"/>
+          <a:lstStyle/>
+          <a:p>
+            <a:pPr algn="ctr"/>
+            <a:endParaRPr lang="en-US"/>
+          </a:p>
+        </p:txBody>
+      </p:sp>
+      <p:sp>
+        <p:nvSpPr>
+          <p:cNvPr id="58" name="Textfeld 57">
+            <a:extLst>
+              <a:ext uri="{FF2B5EF4-FFF2-40B4-BE49-F238E27FC236}">
+                <a16:creationId xmlns:a16="http://schemas.microsoft.com/office/drawing/2014/main" id="{88D8827D-6C69-1D45-AE3A-77D060BFEDAF}"/>
+              </a:ext>
+            </a:extLst>
+          </p:cNvPr>
+          <p:cNvSpPr txBox="1"/>
+          <p:nvPr/>
+        </p:nvSpPr>
+        <p:spPr>
+          <a:xfrm>
+            <a:off x="798286" y="8087258"/>
+            <a:ext cx="824265" cy="246221"/>
+          </a:xfrm>
+          <a:prstGeom prst="rect">
+            <a:avLst/>
+          </a:prstGeom>
+          <a:noFill/>
+        </p:spPr>
+        <p:txBody>
           <a:bodyPr wrap="none" rtlCol="0">
             <a:spAutoFit/>
           </a:bodyPr>
           <a:lstStyle/>
           <a:p>
             <a:r>
-              <a:rPr lang="en-US" dirty="0"/>
-              <a:t>Show Details of RKI Data item</a:t>
-            </a:r>
+              <a:rPr lang="en-US" sz="1000" dirty="0"/>
+              <a:t>&lt;</a:t>
+            </a:r>
+            <a:r>
+              <a:rPr lang="en-US" sz="1000" dirty="0" err="1"/>
+              <a:t>CellImage</a:t>
+            </a:r>
+            <a:r>
+              <a:rPr lang="en-US" sz="1000" dirty="0"/>
+              <a:t>&gt;</a:t>
+            </a:r>
+          </a:p>
+        </p:txBody>
+      </p:sp>
+      <p:sp>
+        <p:nvSpPr>
+          <p:cNvPr id="59" name="Abgerundete rechteckige Legende 58">
+            <a:extLst>
+              <a:ext uri="{FF2B5EF4-FFF2-40B4-BE49-F238E27FC236}">
+                <a16:creationId xmlns:a16="http://schemas.microsoft.com/office/drawing/2014/main" id="{80094217-5698-4F45-8561-3837970AF1AD}"/>
+              </a:ext>
+            </a:extLst>
+          </p:cNvPr>
+          <p:cNvSpPr/>
+          <p:nvPr/>
+        </p:nvSpPr>
+        <p:spPr>
+          <a:xfrm>
+            <a:off x="798285" y="8031887"/>
+            <a:ext cx="824265" cy="351275"/>
+          </a:xfrm>
+          <a:prstGeom prst="wedgeRoundRectCallout">
+            <a:avLst>
+              <a:gd name="adj1" fmla="val -31798"/>
+              <a:gd name="adj2" fmla="val -80363"/>
+              <a:gd name="adj3" fmla="val 16667"/>
+            </a:avLst>
+          </a:prstGeom>
+          <a:noFill/>
+        </p:spPr>
+        <p:style>
+          <a:lnRef idx="2">
+            <a:schemeClr val="accent1">
+              <a:shade val="50000"/>
+            </a:schemeClr>
+          </a:lnRef>
+          <a:fillRef idx="1">
+            <a:schemeClr val="accent1"/>
+          </a:fillRef>
+          <a:effectRef idx="0">
+            <a:schemeClr val="accent1"/>
+          </a:effectRef>
+          <a:fontRef idx="minor">
+            <a:schemeClr val="lt1"/>
+          </a:fontRef>
+        </p:style>
+        <p:txBody>
+          <a:bodyPr rtlCol="0" anchor="ctr"/>
+          <a:lstStyle/>
+          <a:p>
+            <a:pPr algn="ctr"/>
+            <a:endParaRPr lang="en-US"/>
           </a:p>
         </p:txBody>
       </p:sp>
@@ -3827,7 +6340,868 @@
 </p:sld>
 </file>
 
-<file path=ppt/slides/slide2.xml><?xml version="1.0" encoding="utf-8"?>
+<file path=ppt/slides/slide5.xml><?xml version="1.0" encoding="utf-8"?>
+<p:sld xmlns:a="http://schemas.openxmlformats.org/drawingml/2006/main" xmlns:r="http://schemas.openxmlformats.org/officeDocument/2006/relationships" xmlns:p="http://schemas.openxmlformats.org/presentationml/2006/main">
+  <p:cSld>
+    <p:spTree>
+      <p:nvGrpSpPr>
+        <p:cNvPr id="1" name=""/>
+        <p:cNvGrpSpPr/>
+        <p:nvPr/>
+      </p:nvGrpSpPr>
+      <p:grpSpPr>
+        <a:xfrm>
+          <a:off x="0" y="0"/>
+          <a:ext cx="0" cy="0"/>
+          <a:chOff x="0" y="0"/>
+          <a:chExt cx="0" cy="0"/>
+        </a:xfrm>
+      </p:grpSpPr>
+      <p:sp>
+        <p:nvSpPr>
+          <p:cNvPr id="4" name="Rechteck 3">
+            <a:extLst>
+              <a:ext uri="{FF2B5EF4-FFF2-40B4-BE49-F238E27FC236}">
+                <a16:creationId xmlns:a16="http://schemas.microsoft.com/office/drawing/2014/main" id="{33CB71DC-6146-3348-8296-1672B3189093}"/>
+              </a:ext>
+            </a:extLst>
+          </p:cNvPr>
+          <p:cNvSpPr/>
+          <p:nvPr/>
+        </p:nvSpPr>
+        <p:spPr>
+          <a:xfrm>
+            <a:off x="601591" y="1948304"/>
+            <a:ext cx="2359325" cy="3986842"/>
+          </a:xfrm>
+          <a:prstGeom prst="rect">
+            <a:avLst/>
+          </a:prstGeom>
+          <a:noFill/>
+          <a:ln w="12700"/>
+        </p:spPr>
+        <p:style>
+          <a:lnRef idx="2">
+            <a:schemeClr val="accent1">
+              <a:shade val="50000"/>
+            </a:schemeClr>
+          </a:lnRef>
+          <a:fillRef idx="1">
+            <a:schemeClr val="accent1"/>
+          </a:fillRef>
+          <a:effectRef idx="0">
+            <a:schemeClr val="accent1"/>
+          </a:effectRef>
+          <a:fontRef idx="minor">
+            <a:schemeClr val="lt1"/>
+          </a:fontRef>
+        </p:style>
+        <p:txBody>
+          <a:bodyPr rtlCol="0" anchor="ctr"/>
+          <a:lstStyle/>
+          <a:p>
+            <a:pPr algn="ctr"/>
+            <a:endParaRPr lang="en-US"/>
+          </a:p>
+        </p:txBody>
+      </p:sp>
+      <p:sp>
+        <p:nvSpPr>
+          <p:cNvPr id="6" name="Rechteck 5">
+            <a:extLst>
+              <a:ext uri="{FF2B5EF4-FFF2-40B4-BE49-F238E27FC236}">
+                <a16:creationId xmlns:a16="http://schemas.microsoft.com/office/drawing/2014/main" id="{896B6C08-D9A0-FB4B-BA60-FC969E61AAD9}"/>
+              </a:ext>
+            </a:extLst>
+          </p:cNvPr>
+          <p:cNvSpPr/>
+          <p:nvPr/>
+        </p:nvSpPr>
+        <p:spPr>
+          <a:xfrm>
+            <a:off x="601591" y="1948304"/>
+            <a:ext cx="2359325" cy="531962"/>
+          </a:xfrm>
+          <a:prstGeom prst="rect">
+            <a:avLst/>
+          </a:prstGeom>
+          <a:solidFill>
+            <a:schemeClr val="bg1">
+              <a:lumMod val="85000"/>
+            </a:schemeClr>
+          </a:solidFill>
+        </p:spPr>
+        <p:style>
+          <a:lnRef idx="2">
+            <a:schemeClr val="accent1">
+              <a:shade val="50000"/>
+            </a:schemeClr>
+          </a:lnRef>
+          <a:fillRef idx="1">
+            <a:schemeClr val="accent1"/>
+          </a:fillRef>
+          <a:effectRef idx="0">
+            <a:schemeClr val="accent1"/>
+          </a:effectRef>
+          <a:fontRef idx="minor">
+            <a:schemeClr val="lt1"/>
+          </a:fontRef>
+        </p:style>
+        <p:txBody>
+          <a:bodyPr rtlCol="0" anchor="ctr"/>
+          <a:lstStyle/>
+          <a:p>
+            <a:pPr algn="ctr"/>
+            <a:r>
+              <a:rPr lang="en-US" dirty="0">
+                <a:solidFill>
+                  <a:schemeClr val="tx1"/>
+                </a:solidFill>
+              </a:rPr>
+              <a:t>Deutschland</a:t>
+            </a:r>
+          </a:p>
+        </p:txBody>
+      </p:sp>
+      <p:sp>
+        <p:nvSpPr>
+          <p:cNvPr id="7" name="Textfeld 6">
+            <a:extLst>
+              <a:ext uri="{FF2B5EF4-FFF2-40B4-BE49-F238E27FC236}">
+                <a16:creationId xmlns:a16="http://schemas.microsoft.com/office/drawing/2014/main" id="{7638E573-EFE5-594D-B3E0-E4F71BFC06BD}"/>
+              </a:ext>
+            </a:extLst>
+          </p:cNvPr>
+          <p:cNvSpPr txBox="1"/>
+          <p:nvPr/>
+        </p:nvSpPr>
+        <p:spPr>
+          <a:xfrm>
+            <a:off x="601591" y="2029619"/>
+            <a:ext cx="173736" cy="369332"/>
+          </a:xfrm>
+          <a:prstGeom prst="rect">
+            <a:avLst/>
+          </a:prstGeom>
+          <a:noFill/>
+        </p:spPr>
+        <p:txBody>
+          <a:bodyPr wrap="square" rtlCol="0">
+            <a:spAutoFit/>
+          </a:bodyPr>
+          <a:lstStyle/>
+          <a:p>
+            <a:r>
+              <a:rPr lang="en-US" dirty="0"/>
+              <a:t>&lt;</a:t>
+            </a:r>
+          </a:p>
+        </p:txBody>
+      </p:sp>
+      <p:sp>
+        <p:nvSpPr>
+          <p:cNvPr id="8" name="Textfeld 7">
+            <a:extLst>
+              <a:ext uri="{FF2B5EF4-FFF2-40B4-BE49-F238E27FC236}">
+                <a16:creationId xmlns:a16="http://schemas.microsoft.com/office/drawing/2014/main" id="{4A8CA998-EF46-8845-A16C-0AB9F6B4A886}"/>
+              </a:ext>
+            </a:extLst>
+          </p:cNvPr>
+          <p:cNvSpPr txBox="1"/>
+          <p:nvPr/>
+        </p:nvSpPr>
+        <p:spPr>
+          <a:xfrm>
+            <a:off x="601590" y="2716241"/>
+            <a:ext cx="2359325" cy="1046440"/>
+          </a:xfrm>
+          <a:prstGeom prst="rect">
+            <a:avLst/>
+          </a:prstGeom>
+          <a:noFill/>
+          <a:ln>
+            <a:solidFill>
+              <a:schemeClr val="accent1">
+                <a:shade val="50000"/>
+              </a:schemeClr>
+            </a:solidFill>
+          </a:ln>
+        </p:spPr>
+        <p:txBody>
+          <a:bodyPr wrap="square" rtlCol="0">
+            <a:spAutoFit/>
+          </a:bodyPr>
+          <a:lstStyle/>
+          <a:p>
+            <a:pPr algn="ctr"/>
+            <a:r>
+              <a:rPr lang="en-US" sz="1000" dirty="0"/>
+              <a:t>Sunday, 29.11.2020 00:00</a:t>
+            </a:r>
+          </a:p>
+          <a:p>
+            <a:pPr algn="ctr"/>
+            <a:endParaRPr lang="en-US" sz="400" dirty="0"/>
+          </a:p>
+          <a:p>
+            <a:r>
+              <a:rPr lang="en-US" sz="900" dirty="0"/>
+              <a:t>Inhabitants:                                           83,400,000</a:t>
+            </a:r>
+          </a:p>
+          <a:p>
+            <a:r>
+              <a:rPr lang="en-US" sz="1200" dirty="0"/>
+              <a:t> </a:t>
+            </a:r>
+            <a:r>
+              <a:rPr lang="en-US" sz="900" dirty="0"/>
+              <a:t>                                            </a:t>
+            </a:r>
+            <a:r>
+              <a:rPr lang="en-US" sz="800" dirty="0"/>
+              <a:t>total               per 100,000</a:t>
+            </a:r>
+          </a:p>
+          <a:p>
+            <a:r>
+              <a:rPr lang="en-US" sz="900" dirty="0"/>
+              <a:t>Cases                         1,042,700                  1,250.2</a:t>
+            </a:r>
+          </a:p>
+          <a:p>
+            <a:r>
+              <a:rPr lang="en-US" sz="900" dirty="0"/>
+              <a:t>Deaths		     20,000                     160.6</a:t>
+            </a:r>
+          </a:p>
+          <a:p>
+            <a:r>
+              <a:rPr lang="en-US" sz="900" dirty="0"/>
+              <a:t>Cases last 7 days             1,500                     150.0</a:t>
+            </a:r>
+          </a:p>
+        </p:txBody>
+      </p:sp>
+      <p:sp>
+        <p:nvSpPr>
+          <p:cNvPr id="9" name="Textfeld 8">
+            <a:extLst>
+              <a:ext uri="{FF2B5EF4-FFF2-40B4-BE49-F238E27FC236}">
+                <a16:creationId xmlns:a16="http://schemas.microsoft.com/office/drawing/2014/main" id="{952B5622-69F6-2145-86BA-249A46B12932}"/>
+              </a:ext>
+            </a:extLst>
+          </p:cNvPr>
+          <p:cNvSpPr txBox="1"/>
+          <p:nvPr/>
+        </p:nvSpPr>
+        <p:spPr>
+          <a:xfrm>
+            <a:off x="601589" y="3762681"/>
+            <a:ext cx="2359325" cy="1046440"/>
+          </a:xfrm>
+          <a:prstGeom prst="rect">
+            <a:avLst/>
+          </a:prstGeom>
+          <a:noFill/>
+          <a:ln>
+            <a:solidFill>
+              <a:schemeClr val="accent1">
+                <a:shade val="50000"/>
+              </a:schemeClr>
+            </a:solidFill>
+          </a:ln>
+        </p:spPr>
+        <p:txBody>
+          <a:bodyPr wrap="square" rtlCol="0">
+            <a:spAutoFit/>
+          </a:bodyPr>
+          <a:lstStyle/>
+          <a:p>
+            <a:pPr algn="ctr"/>
+            <a:r>
+              <a:rPr lang="en-US" sz="1000" dirty="0"/>
+              <a:t>Changes: Sa 28.11.20 -&gt; So 29.11.20</a:t>
+            </a:r>
+          </a:p>
+          <a:p>
+            <a:pPr algn="ctr"/>
+            <a:endParaRPr lang="en-US" sz="400" dirty="0"/>
+          </a:p>
+          <a:p>
+            <a:r>
+              <a:rPr lang="en-US" sz="900" dirty="0"/>
+              <a:t>Inhabitants:                                                           ±0</a:t>
+            </a:r>
+          </a:p>
+          <a:p>
+            <a:r>
+              <a:rPr lang="en-US" sz="1200" dirty="0"/>
+              <a:t> </a:t>
+            </a:r>
+            <a:r>
+              <a:rPr lang="en-US" sz="900" dirty="0"/>
+              <a:t>                                            </a:t>
+            </a:r>
+            <a:r>
+              <a:rPr lang="en-US" sz="800" dirty="0"/>
+              <a:t>total               per 100,000</a:t>
+            </a:r>
+          </a:p>
+          <a:p>
+            <a:r>
+              <a:rPr lang="en-US" sz="900" dirty="0"/>
+              <a:t>Cases                         +14,611                       +176.9</a:t>
+            </a:r>
+          </a:p>
+          <a:p>
+            <a:r>
+              <a:rPr lang="en-US" sz="900" dirty="0"/>
+              <a:t>Deaths		     +500                           +0.5</a:t>
+            </a:r>
+          </a:p>
+          <a:p>
+            <a:r>
+              <a:rPr lang="en-US" sz="900" dirty="0"/>
+              <a:t>Cases last 7 days             +50                            -0.3</a:t>
+            </a:r>
+          </a:p>
+        </p:txBody>
+      </p:sp>
+      <p:sp>
+        <p:nvSpPr>
+          <p:cNvPr id="10" name="Textfeld 9">
+            <a:extLst>
+              <a:ext uri="{FF2B5EF4-FFF2-40B4-BE49-F238E27FC236}">
+                <a16:creationId xmlns:a16="http://schemas.microsoft.com/office/drawing/2014/main" id="{00978CA3-4C87-D945-A71A-36BC4E12F06A}"/>
+              </a:ext>
+            </a:extLst>
+          </p:cNvPr>
+          <p:cNvSpPr txBox="1"/>
+          <p:nvPr/>
+        </p:nvSpPr>
+        <p:spPr>
+          <a:xfrm>
+            <a:off x="601591" y="4809121"/>
+            <a:ext cx="2359325" cy="1046440"/>
+          </a:xfrm>
+          <a:prstGeom prst="rect">
+            <a:avLst/>
+          </a:prstGeom>
+          <a:noFill/>
+          <a:ln>
+            <a:solidFill>
+              <a:schemeClr val="accent1">
+                <a:shade val="50000"/>
+              </a:schemeClr>
+            </a:solidFill>
+          </a:ln>
+        </p:spPr>
+        <p:txBody>
+          <a:bodyPr wrap="square" rtlCol="0">
+            <a:spAutoFit/>
+          </a:bodyPr>
+          <a:lstStyle/>
+          <a:p>
+            <a:pPr algn="ctr"/>
+            <a:r>
+              <a:rPr lang="en-US" sz="1000" dirty="0"/>
+              <a:t>Saturday, 28.11.2020 00:00</a:t>
+            </a:r>
+          </a:p>
+          <a:p>
+            <a:pPr algn="ctr"/>
+            <a:endParaRPr lang="en-US" sz="400" dirty="0"/>
+          </a:p>
+          <a:p>
+            <a:r>
+              <a:rPr lang="en-US" sz="900" dirty="0"/>
+              <a:t>Inhabitants:                                           83,400,000</a:t>
+            </a:r>
+          </a:p>
+          <a:p>
+            <a:r>
+              <a:rPr lang="en-US" sz="1200" dirty="0"/>
+              <a:t> </a:t>
+            </a:r>
+            <a:r>
+              <a:rPr lang="en-US" sz="900" dirty="0"/>
+              <a:t>                                            </a:t>
+            </a:r>
+            <a:r>
+              <a:rPr lang="en-US" sz="800" dirty="0"/>
+              <a:t>total               per 100,000</a:t>
+            </a:r>
+          </a:p>
+          <a:p>
+            <a:r>
+              <a:rPr lang="en-US" sz="900" dirty="0"/>
+              <a:t>Cases                         1,020,700                  1,250.2</a:t>
+            </a:r>
+          </a:p>
+          <a:p>
+            <a:r>
+              <a:rPr lang="en-US" sz="900" dirty="0"/>
+              <a:t>Deaths		     19,000                     160.6</a:t>
+            </a:r>
+          </a:p>
+          <a:p>
+            <a:r>
+              <a:rPr lang="en-US" sz="900" dirty="0"/>
+              <a:t>Cases last 7 days             1,500                     150.0</a:t>
+            </a:r>
+          </a:p>
+        </p:txBody>
+      </p:sp>
+      <p:sp>
+        <p:nvSpPr>
+          <p:cNvPr id="11" name="Textfeld 10">
+            <a:extLst>
+              <a:ext uri="{FF2B5EF4-FFF2-40B4-BE49-F238E27FC236}">
+                <a16:creationId xmlns:a16="http://schemas.microsoft.com/office/drawing/2014/main" id="{B5168B12-2105-D544-9FBC-61E535A43081}"/>
+              </a:ext>
+            </a:extLst>
+          </p:cNvPr>
+          <p:cNvSpPr txBox="1"/>
+          <p:nvPr/>
+        </p:nvSpPr>
+        <p:spPr>
+          <a:xfrm>
+            <a:off x="601589" y="2480266"/>
+            <a:ext cx="2359325" cy="230832"/>
+          </a:xfrm>
+          <a:prstGeom prst="rect">
+            <a:avLst/>
+          </a:prstGeom>
+          <a:noFill/>
+          <a:ln>
+            <a:solidFill>
+              <a:schemeClr val="accent1">
+                <a:shade val="50000"/>
+              </a:schemeClr>
+            </a:solidFill>
+          </a:ln>
+        </p:spPr>
+        <p:txBody>
+          <a:bodyPr wrap="square" rtlCol="0">
+            <a:spAutoFit/>
+          </a:bodyPr>
+          <a:lstStyle/>
+          <a:p>
+            <a:pPr algn="ctr"/>
+            <a:r>
+              <a:rPr lang="en-US" sz="900" dirty="0"/>
+              <a:t>Country</a:t>
+            </a:r>
+          </a:p>
+        </p:txBody>
+      </p:sp>
+      <p:sp>
+        <p:nvSpPr>
+          <p:cNvPr id="15" name="Rechteck 14">
+            <a:extLst>
+              <a:ext uri="{FF2B5EF4-FFF2-40B4-BE49-F238E27FC236}">
+                <a16:creationId xmlns:a16="http://schemas.microsoft.com/office/drawing/2014/main" id="{B164EDD3-E9CE-A446-9066-7C4BF3B56A17}"/>
+              </a:ext>
+            </a:extLst>
+          </p:cNvPr>
+          <p:cNvSpPr/>
+          <p:nvPr/>
+        </p:nvSpPr>
+        <p:spPr>
+          <a:xfrm>
+            <a:off x="3889077" y="1948300"/>
+            <a:ext cx="2359325" cy="3986842"/>
+          </a:xfrm>
+          <a:prstGeom prst="rect">
+            <a:avLst/>
+          </a:prstGeom>
+          <a:noFill/>
+          <a:ln w="12700"/>
+        </p:spPr>
+        <p:style>
+          <a:lnRef idx="2">
+            <a:schemeClr val="accent1">
+              <a:shade val="50000"/>
+            </a:schemeClr>
+          </a:lnRef>
+          <a:fillRef idx="1">
+            <a:schemeClr val="accent1"/>
+          </a:fillRef>
+          <a:effectRef idx="0">
+            <a:schemeClr val="accent1"/>
+          </a:effectRef>
+          <a:fontRef idx="minor">
+            <a:schemeClr val="lt1"/>
+          </a:fontRef>
+        </p:style>
+        <p:txBody>
+          <a:bodyPr rtlCol="0" anchor="ctr"/>
+          <a:lstStyle/>
+          <a:p>
+            <a:pPr algn="ctr"/>
+            <a:endParaRPr lang="en-US"/>
+          </a:p>
+        </p:txBody>
+      </p:sp>
+      <p:sp>
+        <p:nvSpPr>
+          <p:cNvPr id="16" name="Rechteck 15">
+            <a:extLst>
+              <a:ext uri="{FF2B5EF4-FFF2-40B4-BE49-F238E27FC236}">
+                <a16:creationId xmlns:a16="http://schemas.microsoft.com/office/drawing/2014/main" id="{D84EF9BC-3A58-BD45-8532-FF147965FE42}"/>
+              </a:ext>
+            </a:extLst>
+          </p:cNvPr>
+          <p:cNvSpPr/>
+          <p:nvPr/>
+        </p:nvSpPr>
+        <p:spPr>
+          <a:xfrm>
+            <a:off x="3889077" y="1948300"/>
+            <a:ext cx="2359325" cy="531962"/>
+          </a:xfrm>
+          <a:prstGeom prst="rect">
+            <a:avLst/>
+          </a:prstGeom>
+          <a:solidFill>
+            <a:schemeClr val="bg1">
+              <a:lumMod val="85000"/>
+            </a:schemeClr>
+          </a:solidFill>
+        </p:spPr>
+        <p:style>
+          <a:lnRef idx="2">
+            <a:schemeClr val="accent1">
+              <a:shade val="50000"/>
+            </a:schemeClr>
+          </a:lnRef>
+          <a:fillRef idx="1">
+            <a:schemeClr val="accent1"/>
+          </a:fillRef>
+          <a:effectRef idx="0">
+            <a:schemeClr val="accent1"/>
+          </a:effectRef>
+          <a:fontRef idx="minor">
+            <a:schemeClr val="lt1"/>
+          </a:fontRef>
+        </p:style>
+        <p:txBody>
+          <a:bodyPr rtlCol="0" anchor="ctr"/>
+          <a:lstStyle/>
+          <a:p>
+            <a:pPr algn="ctr"/>
+            <a:r>
+              <a:rPr lang="en-US" dirty="0">
+                <a:solidFill>
+                  <a:schemeClr val="tx1"/>
+                </a:solidFill>
+              </a:rPr>
+              <a:t>&lt; title &gt;</a:t>
+            </a:r>
+          </a:p>
+        </p:txBody>
+      </p:sp>
+      <p:sp>
+        <p:nvSpPr>
+          <p:cNvPr id="17" name="Textfeld 16">
+            <a:extLst>
+              <a:ext uri="{FF2B5EF4-FFF2-40B4-BE49-F238E27FC236}">
+                <a16:creationId xmlns:a16="http://schemas.microsoft.com/office/drawing/2014/main" id="{9E478D9E-1CE0-4E41-99E5-DE24F3A76FDA}"/>
+              </a:ext>
+            </a:extLst>
+          </p:cNvPr>
+          <p:cNvSpPr txBox="1"/>
+          <p:nvPr/>
+        </p:nvSpPr>
+        <p:spPr>
+          <a:xfrm>
+            <a:off x="3889077" y="2029615"/>
+            <a:ext cx="173736" cy="369332"/>
+          </a:xfrm>
+          <a:prstGeom prst="rect">
+            <a:avLst/>
+          </a:prstGeom>
+          <a:noFill/>
+        </p:spPr>
+        <p:txBody>
+          <a:bodyPr wrap="square" rtlCol="0">
+            <a:spAutoFit/>
+          </a:bodyPr>
+          <a:lstStyle/>
+          <a:p>
+            <a:r>
+              <a:rPr lang="en-US" dirty="0"/>
+              <a:t>&lt;</a:t>
+            </a:r>
+          </a:p>
+        </p:txBody>
+      </p:sp>
+      <p:sp>
+        <p:nvSpPr>
+          <p:cNvPr id="18" name="Textfeld 17">
+            <a:extLst>
+              <a:ext uri="{FF2B5EF4-FFF2-40B4-BE49-F238E27FC236}">
+                <a16:creationId xmlns:a16="http://schemas.microsoft.com/office/drawing/2014/main" id="{2F8A82BA-705C-DB48-A8F8-F4AC4468F964}"/>
+              </a:ext>
+            </a:extLst>
+          </p:cNvPr>
+          <p:cNvSpPr txBox="1"/>
+          <p:nvPr/>
+        </p:nvSpPr>
+        <p:spPr>
+          <a:xfrm>
+            <a:off x="3889076" y="2716237"/>
+            <a:ext cx="2359325" cy="1031051"/>
+          </a:xfrm>
+          <a:prstGeom prst="rect">
+            <a:avLst/>
+          </a:prstGeom>
+          <a:noFill/>
+          <a:ln>
+            <a:solidFill>
+              <a:schemeClr val="accent1">
+                <a:shade val="50000"/>
+              </a:schemeClr>
+            </a:solidFill>
+          </a:ln>
+        </p:spPr>
+        <p:txBody>
+          <a:bodyPr wrap="square" rtlCol="0">
+            <a:spAutoFit/>
+          </a:bodyPr>
+          <a:lstStyle/>
+          <a:p>
+            <a:pPr algn="ctr"/>
+            <a:r>
+              <a:rPr lang="en-US" sz="1000" dirty="0"/>
+              <a:t>&lt; </a:t>
+            </a:r>
+            <a:r>
+              <a:rPr lang="en-US" sz="1000" dirty="0" err="1"/>
+              <a:t>labelDate</a:t>
+            </a:r>
+            <a:r>
+              <a:rPr lang="en-US" sz="1000" dirty="0"/>
+              <a:t> &gt;</a:t>
+            </a:r>
+          </a:p>
+          <a:p>
+            <a:pPr algn="ctr"/>
+            <a:endParaRPr lang="en-US" sz="400" dirty="0"/>
+          </a:p>
+          <a:p>
+            <a:r>
+              <a:rPr lang="en-US" sz="900" dirty="0"/>
+              <a:t>&lt; </a:t>
+            </a:r>
+            <a:r>
+              <a:rPr lang="en-US" sz="900" dirty="0" err="1"/>
+              <a:t>labelInhabitants</a:t>
+            </a:r>
+            <a:r>
+              <a:rPr lang="en-US" sz="900" dirty="0"/>
+              <a:t> &gt;              &lt; </a:t>
+            </a:r>
+            <a:r>
+              <a:rPr lang="en-US" sz="900" dirty="0" err="1"/>
+              <a:t>valueInhabitans</a:t>
+            </a:r>
+            <a:r>
+              <a:rPr lang="en-US" sz="900" dirty="0"/>
+              <a:t> &gt;</a:t>
+            </a:r>
+          </a:p>
+          <a:p>
+            <a:r>
+              <a:rPr lang="en-US" sz="1200" dirty="0"/>
+              <a:t> </a:t>
+            </a:r>
+            <a:r>
+              <a:rPr lang="en-US" sz="900" dirty="0"/>
+              <a:t>                              </a:t>
+            </a:r>
+            <a:r>
+              <a:rPr lang="en-US" sz="800" dirty="0"/>
+              <a:t>&lt; </a:t>
+            </a:r>
+            <a:r>
+              <a:rPr lang="en-US" sz="800" dirty="0" err="1"/>
+              <a:t>labelTotal</a:t>
+            </a:r>
+            <a:r>
+              <a:rPr lang="en-US" sz="800" dirty="0"/>
+              <a:t> &gt;      &lt; labelPer100k &gt;</a:t>
+            </a:r>
+          </a:p>
+          <a:p>
+            <a:r>
+              <a:rPr lang="en-US" sz="900" dirty="0"/>
+              <a:t>&lt; </a:t>
+            </a:r>
+            <a:r>
+              <a:rPr lang="en-US" sz="900" dirty="0" err="1"/>
+              <a:t>labelCases</a:t>
+            </a:r>
+            <a:r>
+              <a:rPr lang="en-US" sz="900" dirty="0"/>
+              <a:t> &gt;   &lt; </a:t>
+            </a:r>
+            <a:r>
+              <a:rPr lang="en-US" sz="900" dirty="0" err="1"/>
+              <a:t>casesTotal</a:t>
+            </a:r>
+            <a:r>
+              <a:rPr lang="en-US" sz="900" dirty="0"/>
+              <a:t> &gt;      &lt; cases100k &gt;</a:t>
+            </a:r>
+          </a:p>
+          <a:p>
+            <a:r>
+              <a:rPr lang="en-US" sz="900" dirty="0"/>
+              <a:t>&lt; </a:t>
+            </a:r>
+            <a:r>
+              <a:rPr lang="en-US" sz="900" dirty="0" err="1"/>
+              <a:t>labelDeaths</a:t>
+            </a:r>
+            <a:r>
+              <a:rPr lang="en-US" sz="900" dirty="0"/>
+              <a:t> &gt; &lt; </a:t>
+            </a:r>
+            <a:r>
+              <a:rPr lang="en-US" sz="900" dirty="0" err="1"/>
+              <a:t>deathsTotal</a:t>
+            </a:r>
+            <a:r>
+              <a:rPr lang="en-US" sz="900" dirty="0"/>
+              <a:t> &gt;&lt; deaths100k &gt;</a:t>
+            </a:r>
+          </a:p>
+          <a:p>
+            <a:r>
+              <a:rPr lang="en-US" sz="800" dirty="0"/>
+              <a:t>&lt;</a:t>
+            </a:r>
+            <a:r>
+              <a:rPr lang="en-US" sz="800" dirty="0" err="1"/>
+              <a:t>labelIncidents</a:t>
+            </a:r>
+            <a:r>
+              <a:rPr lang="en-US" sz="800" dirty="0"/>
+              <a:t> &gt;&lt; </a:t>
+            </a:r>
+            <a:r>
+              <a:rPr lang="en-US" sz="800" dirty="0" err="1"/>
+              <a:t>incidentsTotal</a:t>
+            </a:r>
+            <a:r>
+              <a:rPr lang="en-US" sz="800" dirty="0"/>
+              <a:t> &gt;&lt; incidents100k &gt;</a:t>
+            </a:r>
+          </a:p>
+        </p:txBody>
+      </p:sp>
+      <p:sp>
+        <p:nvSpPr>
+          <p:cNvPr id="21" name="Textfeld 20">
+            <a:extLst>
+              <a:ext uri="{FF2B5EF4-FFF2-40B4-BE49-F238E27FC236}">
+                <a16:creationId xmlns:a16="http://schemas.microsoft.com/office/drawing/2014/main" id="{035DE1BA-846F-2440-815C-92D7EE39EDEF}"/>
+              </a:ext>
+            </a:extLst>
+          </p:cNvPr>
+          <p:cNvSpPr txBox="1"/>
+          <p:nvPr/>
+        </p:nvSpPr>
+        <p:spPr>
+          <a:xfrm>
+            <a:off x="3889075" y="2480262"/>
+            <a:ext cx="2359325" cy="230832"/>
+          </a:xfrm>
+          <a:prstGeom prst="rect">
+            <a:avLst/>
+          </a:prstGeom>
+          <a:noFill/>
+          <a:ln>
+            <a:solidFill>
+              <a:schemeClr val="accent1">
+                <a:shade val="50000"/>
+              </a:schemeClr>
+            </a:solidFill>
+          </a:ln>
+        </p:spPr>
+        <p:txBody>
+          <a:bodyPr wrap="square" rtlCol="0">
+            <a:spAutoFit/>
+          </a:bodyPr>
+          <a:lstStyle/>
+          <a:p>
+            <a:pPr algn="ctr"/>
+            <a:r>
+              <a:rPr lang="en-US" sz="900" dirty="0"/>
+              <a:t>&lt; </a:t>
+            </a:r>
+            <a:r>
+              <a:rPr lang="en-US" sz="900" dirty="0" err="1"/>
+              <a:t>labelKindOf</a:t>
+            </a:r>
+            <a:r>
+              <a:rPr lang="en-US" sz="900" dirty="0"/>
+              <a:t> &gt;</a:t>
+            </a:r>
+          </a:p>
+        </p:txBody>
+      </p:sp>
+      <p:sp>
+        <p:nvSpPr>
+          <p:cNvPr id="22" name="Textfeld 21">
+            <a:extLst>
+              <a:ext uri="{FF2B5EF4-FFF2-40B4-BE49-F238E27FC236}">
+                <a16:creationId xmlns:a16="http://schemas.microsoft.com/office/drawing/2014/main" id="{A647B424-CB71-564D-B6C8-DF826CED83CA}"/>
+              </a:ext>
+            </a:extLst>
+          </p:cNvPr>
+          <p:cNvSpPr txBox="1"/>
+          <p:nvPr/>
+        </p:nvSpPr>
+        <p:spPr>
+          <a:xfrm>
+            <a:off x="601589" y="758886"/>
+            <a:ext cx="2958310" cy="369332"/>
+          </a:xfrm>
+          <a:prstGeom prst="rect">
+            <a:avLst/>
+          </a:prstGeom>
+          <a:noFill/>
+        </p:spPr>
+        <p:txBody>
+          <a:bodyPr wrap="none" rtlCol="0">
+            <a:spAutoFit/>
+          </a:bodyPr>
+          <a:lstStyle/>
+          <a:p>
+            <a:r>
+              <a:rPr lang="en-US" dirty="0"/>
+              <a:t>Show Details of RKI Data item</a:t>
+            </a:r>
+          </a:p>
+        </p:txBody>
+      </p:sp>
+    </p:spTree>
+    <p:extLst>
+      <p:ext uri="{BB962C8B-B14F-4D97-AF65-F5344CB8AC3E}">
+        <p14:creationId xmlns:p14="http://schemas.microsoft.com/office/powerpoint/2010/main" val="2373772007"/>
+      </p:ext>
+    </p:extLst>
+  </p:cSld>
+  <p:clrMapOvr>
+    <a:masterClrMapping/>
+  </p:clrMapOvr>
+</p:sld>
+</file>
+
+<file path=ppt/slides/slide6.xml><?xml version="1.0" encoding="utf-8"?>
 <p:sld xmlns:a="http://schemas.openxmlformats.org/drawingml/2006/main" xmlns:r="http://schemas.openxmlformats.org/officeDocument/2006/relationships" xmlns:p="http://schemas.openxmlformats.org/presentationml/2006/main">
   <p:cSld>
     <p:spTree>

</xml_diff>

<commit_message>
V2.0.1 - first workable version with the graphs on detail views
</commit_message>
<xml_diff>
--- a/PowerPoints/ScreenLayouts.pptx
+++ b/PowerPoints/ScreenLayouts.pptx
@@ -260,7 +260,7 @@
           <a:p>
             <a:fld id="{BD91CD0C-10B1-6E41-8640-8B762291B572}" type="datetimeFigureOut">
               <a:rPr lang="en-US" smtClean="0"/>
-              <a:t>12/9/20</a:t>
+              <a:t>12/14/20</a:t>
             </a:fld>
             <a:endParaRPr lang="en-US"/>
           </a:p>
@@ -430,7 +430,7 @@
           <a:p>
             <a:fld id="{BD91CD0C-10B1-6E41-8640-8B762291B572}" type="datetimeFigureOut">
               <a:rPr lang="en-US" smtClean="0"/>
-              <a:t>12/9/20</a:t>
+              <a:t>12/14/20</a:t>
             </a:fld>
             <a:endParaRPr lang="en-US"/>
           </a:p>
@@ -610,7 +610,7 @@
           <a:p>
             <a:fld id="{BD91CD0C-10B1-6E41-8640-8B762291B572}" type="datetimeFigureOut">
               <a:rPr lang="en-US" smtClean="0"/>
-              <a:t>12/9/20</a:t>
+              <a:t>12/14/20</a:t>
             </a:fld>
             <a:endParaRPr lang="en-US"/>
           </a:p>
@@ -780,7 +780,7 @@
           <a:p>
             <a:fld id="{BD91CD0C-10B1-6E41-8640-8B762291B572}" type="datetimeFigureOut">
               <a:rPr lang="en-US" smtClean="0"/>
-              <a:t>12/9/20</a:t>
+              <a:t>12/14/20</a:t>
             </a:fld>
             <a:endParaRPr lang="en-US"/>
           </a:p>
@@ -1024,7 +1024,7 @@
           <a:p>
             <a:fld id="{BD91CD0C-10B1-6E41-8640-8B762291B572}" type="datetimeFigureOut">
               <a:rPr lang="en-US" smtClean="0"/>
-              <a:t>12/9/20</a:t>
+              <a:t>12/14/20</a:t>
             </a:fld>
             <a:endParaRPr lang="en-US"/>
           </a:p>
@@ -1256,7 +1256,7 @@
           <a:p>
             <a:fld id="{BD91CD0C-10B1-6E41-8640-8B762291B572}" type="datetimeFigureOut">
               <a:rPr lang="en-US" smtClean="0"/>
-              <a:t>12/9/20</a:t>
+              <a:t>12/14/20</a:t>
             </a:fld>
             <a:endParaRPr lang="en-US"/>
           </a:p>
@@ -1623,7 +1623,7 @@
           <a:p>
             <a:fld id="{BD91CD0C-10B1-6E41-8640-8B762291B572}" type="datetimeFigureOut">
               <a:rPr lang="en-US" smtClean="0"/>
-              <a:t>12/9/20</a:t>
+              <a:t>12/14/20</a:t>
             </a:fld>
             <a:endParaRPr lang="en-US"/>
           </a:p>
@@ -1741,7 +1741,7 @@
           <a:p>
             <a:fld id="{BD91CD0C-10B1-6E41-8640-8B762291B572}" type="datetimeFigureOut">
               <a:rPr lang="en-US" smtClean="0"/>
-              <a:t>12/9/20</a:t>
+              <a:t>12/14/20</a:t>
             </a:fld>
             <a:endParaRPr lang="en-US"/>
           </a:p>
@@ -1836,7 +1836,7 @@
           <a:p>
             <a:fld id="{BD91CD0C-10B1-6E41-8640-8B762291B572}" type="datetimeFigureOut">
               <a:rPr lang="en-US" smtClean="0"/>
-              <a:t>12/9/20</a:t>
+              <a:t>12/14/20</a:t>
             </a:fld>
             <a:endParaRPr lang="en-US"/>
           </a:p>
@@ -2113,7 +2113,7 @@
           <a:p>
             <a:fld id="{BD91CD0C-10B1-6E41-8640-8B762291B572}" type="datetimeFigureOut">
               <a:rPr lang="en-US" smtClean="0"/>
-              <a:t>12/9/20</a:t>
+              <a:t>12/14/20</a:t>
             </a:fld>
             <a:endParaRPr lang="en-US"/>
           </a:p>
@@ -2370,7 +2370,7 @@
           <a:p>
             <a:fld id="{BD91CD0C-10B1-6E41-8640-8B762291B572}" type="datetimeFigureOut">
               <a:rPr lang="en-US" smtClean="0"/>
-              <a:t>12/9/20</a:t>
+              <a:t>12/14/20</a:t>
             </a:fld>
             <a:endParaRPr lang="en-US"/>
           </a:p>
@@ -2583,7 +2583,7 @@
           <a:p>
             <a:fld id="{BD91CD0C-10B1-6E41-8640-8B762291B572}" type="datetimeFigureOut">
               <a:rPr lang="en-US" smtClean="0"/>
-              <a:t>12/9/20</a:t>
+              <a:t>12/14/20</a:t>
             </a:fld>
             <a:endParaRPr lang="en-US"/>
           </a:p>
@@ -7223,7 +7223,7 @@
         <p:spPr>
           <a:xfrm>
             <a:off x="4041007" y="6098637"/>
-            <a:ext cx="2359325" cy="538609"/>
+            <a:ext cx="2359325" cy="384721"/>
           </a:xfrm>
           <a:prstGeom prst="rect">
             <a:avLst/>
@@ -7250,28 +7250,7 @@
             </a:r>
           </a:p>
           <a:p>
-            <a:r>
-              <a:rPr lang="en-US" sz="800" dirty="0"/>
-              <a:t>&lt;</a:t>
-            </a:r>
-            <a:r>
-              <a:rPr lang="en-US" sz="800" dirty="0" err="1"/>
-              <a:t>LabelCases</a:t>
-            </a:r>
-            <a:r>
-              <a:rPr lang="en-US" sz="800" dirty="0"/>
-              <a:t>&gt;  </a:t>
-            </a:r>
-          </a:p>
-          <a:p>
-            <a:r>
-              <a:rPr lang="en-US" sz="800" dirty="0"/>
-              <a:t> &lt;LabelCases7 days</a:t>
-            </a:r>
-            <a:r>
-              <a:rPr lang="en-US" sz="1000" dirty="0"/>
-              <a:t>&gt;</a:t>
-            </a:r>
+            <a:endParaRPr lang="en-US" sz="800" dirty="0"/>
           </a:p>
         </p:txBody>
       </p:sp>
@@ -7349,7 +7328,7 @@
         </p:nvSpPr>
         <p:spPr>
           <a:xfrm>
-            <a:off x="4135647" y="6668024"/>
+            <a:off x="5627395" y="6151673"/>
             <a:ext cx="720000" cy="232322"/>
           </a:xfrm>
           <a:prstGeom prst="roundRect">
@@ -7390,198 +7369,6 @@
             </a:r>
             <a:r>
               <a:rPr lang="en-US" sz="800" dirty="0"/>
-              <a:t>&gt;</a:t>
-            </a:r>
-          </a:p>
-        </p:txBody>
-      </p:sp>
-      <p:sp>
-        <p:nvSpPr>
-          <p:cNvPr id="40" name="Abgerundetes Rechteck 39">
-            <a:extLst>
-              <a:ext uri="{FF2B5EF4-FFF2-40B4-BE49-F238E27FC236}">
-                <a16:creationId xmlns:a16="http://schemas.microsoft.com/office/drawing/2014/main" id="{A0AFD3A1-3563-604A-8D92-1E76693A6A21}"/>
-              </a:ext>
-            </a:extLst>
-          </p:cNvPr>
-          <p:cNvSpPr/>
-          <p:nvPr/>
-        </p:nvSpPr>
-        <p:spPr>
-          <a:xfrm>
-            <a:off x="5616585" y="6668024"/>
-            <a:ext cx="720000" cy="232322"/>
-          </a:xfrm>
-          <a:prstGeom prst="roundRect">
-            <a:avLst/>
-          </a:prstGeom>
-          <a:solidFill>
-            <a:schemeClr val="accent1"/>
-          </a:solidFill>
-        </p:spPr>
-        <p:style>
-          <a:lnRef idx="2">
-            <a:schemeClr val="accent1">
-              <a:shade val="50000"/>
-            </a:schemeClr>
-          </a:lnRef>
-          <a:fillRef idx="1">
-            <a:schemeClr val="accent1"/>
-          </a:fillRef>
-          <a:effectRef idx="0">
-            <a:schemeClr val="accent1"/>
-          </a:effectRef>
-          <a:fontRef idx="minor">
-            <a:schemeClr val="lt1"/>
-          </a:fontRef>
-        </p:style>
-        <p:txBody>
-          <a:bodyPr lIns="0" rIns="0" rtlCol="0" anchor="ctr"/>
-          <a:lstStyle/>
-          <a:p>
-            <a:pPr algn="ctr"/>
-            <a:r>
-              <a:rPr lang="en-US" sz="800" dirty="0"/>
-              <a:t>&lt;</a:t>
-            </a:r>
-            <a:r>
-              <a:rPr lang="en-US" sz="800" dirty="0" err="1"/>
-              <a:t>DetailsButton</a:t>
-            </a:r>
-            <a:r>
-              <a:rPr lang="en-US" sz="800" dirty="0"/>
-              <a:t>&gt;</a:t>
-            </a:r>
-          </a:p>
-        </p:txBody>
-      </p:sp>
-      <p:sp>
-        <p:nvSpPr>
-          <p:cNvPr id="41" name="Textfeld 40">
-            <a:extLst>
-              <a:ext uri="{FF2B5EF4-FFF2-40B4-BE49-F238E27FC236}">
-                <a16:creationId xmlns:a16="http://schemas.microsoft.com/office/drawing/2014/main" id="{E939BBE9-9C41-0648-AA03-63094B149FE2}"/>
-              </a:ext>
-            </a:extLst>
-          </p:cNvPr>
-          <p:cNvSpPr txBox="1"/>
-          <p:nvPr/>
-        </p:nvSpPr>
-        <p:spPr>
-          <a:xfrm>
-            <a:off x="4028186" y="6988554"/>
-            <a:ext cx="2375343" cy="558499"/>
-          </a:xfrm>
-          <a:prstGeom prst="rect">
-            <a:avLst/>
-          </a:prstGeom>
-          <a:noFill/>
-        </p:spPr>
-        <p:txBody>
-          <a:bodyPr wrap="square" rtlCol="0" anchor="ctr" anchorCtr="1">
-            <a:noAutofit/>
-          </a:bodyPr>
-          <a:lstStyle/>
-          <a:p>
-            <a:r>
-              <a:rPr lang="en-US" sz="900" dirty="0"/>
-              <a:t>&lt;</a:t>
-            </a:r>
-            <a:r>
-              <a:rPr lang="en-US" sz="900" dirty="0" err="1"/>
-              <a:t>LabelRegulations</a:t>
-            </a:r>
-            <a:r>
-              <a:rPr lang="en-US" sz="900" dirty="0"/>
-              <a:t>&gt;</a:t>
-            </a:r>
-          </a:p>
-        </p:txBody>
-      </p:sp>
-      <p:sp>
-        <p:nvSpPr>
-          <p:cNvPr id="42" name="Rechteck 41">
-            <a:extLst>
-              <a:ext uri="{FF2B5EF4-FFF2-40B4-BE49-F238E27FC236}">
-                <a16:creationId xmlns:a16="http://schemas.microsoft.com/office/drawing/2014/main" id="{387784C1-B92A-CC4A-9B7A-B8056F548FD9}"/>
-              </a:ext>
-            </a:extLst>
-          </p:cNvPr>
-          <p:cNvSpPr/>
-          <p:nvPr/>
-        </p:nvSpPr>
-        <p:spPr>
-          <a:xfrm>
-            <a:off x="701043" y="7705404"/>
-            <a:ext cx="242233" cy="165937"/>
-          </a:xfrm>
-          <a:prstGeom prst="rect">
-            <a:avLst/>
-          </a:prstGeom>
-        </p:spPr>
-        <p:style>
-          <a:lnRef idx="2">
-            <a:schemeClr val="accent1">
-              <a:shade val="50000"/>
-            </a:schemeClr>
-          </a:lnRef>
-          <a:fillRef idx="1">
-            <a:schemeClr val="accent1"/>
-          </a:fillRef>
-          <a:effectRef idx="0">
-            <a:schemeClr val="accent1"/>
-          </a:effectRef>
-          <a:fontRef idx="minor">
-            <a:schemeClr val="lt1"/>
-          </a:fontRef>
-        </p:style>
-        <p:txBody>
-          <a:bodyPr rtlCol="0" anchor="ctr"/>
-          <a:lstStyle/>
-          <a:p>
-            <a:pPr algn="ctr"/>
-            <a:endParaRPr lang="en-US"/>
-          </a:p>
-        </p:txBody>
-      </p:sp>
-      <p:sp>
-        <p:nvSpPr>
-          <p:cNvPr id="43" name="Textfeld 42">
-            <a:extLst>
-              <a:ext uri="{FF2B5EF4-FFF2-40B4-BE49-F238E27FC236}">
-                <a16:creationId xmlns:a16="http://schemas.microsoft.com/office/drawing/2014/main" id="{99F00303-CBD9-594D-A188-30FF299B8770}"/>
-              </a:ext>
-            </a:extLst>
-          </p:cNvPr>
-          <p:cNvSpPr txBox="1"/>
-          <p:nvPr/>
-        </p:nvSpPr>
-        <p:spPr>
-          <a:xfrm>
-            <a:off x="995177" y="7673080"/>
-            <a:ext cx="1588169" cy="246221"/>
-          </a:xfrm>
-          <a:prstGeom prst="rect">
-            <a:avLst/>
-          </a:prstGeom>
-          <a:noFill/>
-        </p:spPr>
-        <p:txBody>
-          <a:bodyPr wrap="square" rtlCol="0">
-            <a:spAutoFit/>
-          </a:bodyPr>
-          <a:lstStyle/>
-          <a:p>
-            <a:r>
-              <a:rPr lang="en-US" sz="1000" dirty="0"/>
-              <a:t>&lt;</a:t>
-            </a:r>
-            <a:r>
-              <a:rPr lang="en-US" sz="1000" dirty="0" err="1"/>
-              <a:t>CellLabel</a:t>
-            </a:r>
-            <a:r>
-              <a:rPr lang="en-US" sz="1000" dirty="0"/>
               <a:t>&gt;</a:t>
             </a:r>
           </a:p>
@@ -7796,8 +7583,8 @@
         </p:nvSpPr>
         <p:spPr>
           <a:xfrm>
-            <a:off x="4035617" y="7538293"/>
-            <a:ext cx="2359325" cy="1500440"/>
+            <a:off x="4035617" y="6430246"/>
+            <a:ext cx="2359325" cy="2608487"/>
           </a:xfrm>
           <a:prstGeom prst="rect">
             <a:avLst/>
@@ -7899,8 +7686,8 @@
         </p:nvSpPr>
         <p:spPr>
           <a:xfrm>
-            <a:off x="581531" y="7560494"/>
-            <a:ext cx="2359325" cy="1500440"/>
+            <a:off x="604598" y="6495305"/>
+            <a:ext cx="2359325" cy="2551045"/>
           </a:xfrm>
           <a:prstGeom prst="rect">
             <a:avLst/>
@@ -7929,10 +7716,6 @@
           <a:lstStyle/>
           <a:p>
             <a:pPr algn="ctr"/>
-            <a:r>
-              <a:rPr lang="en-US" dirty="0" err="1"/>
-              <a:t>ContanerView</a:t>
-            </a:r>
             <a:endParaRPr lang="en-US" dirty="0"/>
           </a:p>
         </p:txBody>
@@ -7951,7 +7734,7 @@
         </p:nvSpPr>
         <p:spPr>
           <a:xfrm>
-            <a:off x="562274" y="7284520"/>
+            <a:off x="555491" y="5632687"/>
             <a:ext cx="2450764" cy="246221"/>
           </a:xfrm>
           <a:prstGeom prst="rect">
@@ -7970,222 +7753,6 @@
               <a:t>UITableView</a:t>
             </a:r>
             <a:endParaRPr lang="en-US" sz="1000" dirty="0"/>
-          </a:p>
-        </p:txBody>
-      </p:sp>
-      <p:sp>
-        <p:nvSpPr>
-          <p:cNvPr id="56" name="Textfeld 55">
-            <a:extLst>
-              <a:ext uri="{FF2B5EF4-FFF2-40B4-BE49-F238E27FC236}">
-                <a16:creationId xmlns:a16="http://schemas.microsoft.com/office/drawing/2014/main" id="{FC6781BA-5D14-5546-995C-A49ADFD6BEF6}"/>
-              </a:ext>
-            </a:extLst>
-          </p:cNvPr>
-          <p:cNvSpPr txBox="1"/>
-          <p:nvPr/>
-        </p:nvSpPr>
-        <p:spPr>
-          <a:xfrm>
-            <a:off x="567096" y="6035889"/>
-            <a:ext cx="3356784" cy="707886"/>
-          </a:xfrm>
-          <a:prstGeom prst="rect">
-            <a:avLst/>
-          </a:prstGeom>
-          <a:noFill/>
-        </p:spPr>
-        <p:txBody>
-          <a:bodyPr wrap="square" rtlCol="0">
-            <a:spAutoFit/>
-          </a:bodyPr>
-          <a:lstStyle/>
-          <a:p>
-            <a:r>
-              <a:rPr lang="en-US" sz="800" dirty="0"/>
-              <a:t>&lt;</a:t>
-            </a:r>
-            <a:r>
-              <a:rPr lang="en-US" sz="800" dirty="0" err="1"/>
-              <a:t>ValueCases</a:t>
-            </a:r>
-            <a:r>
-              <a:rPr lang="en-US" sz="800" dirty="0"/>
-              <a:t>&gt; &lt;</a:t>
-            </a:r>
-            <a:r>
-              <a:rPr lang="en-US" sz="800" dirty="0" err="1"/>
-              <a:t>ValueDiffCasesYesterday</a:t>
-            </a:r>
-            <a:r>
-              <a:rPr lang="en-US" sz="800" dirty="0"/>
-              <a:t>&gt; &lt;</a:t>
-            </a:r>
-            <a:r>
-              <a:rPr lang="en-US" sz="800" dirty="0" err="1"/>
-              <a:t>ValueDiffCasesLastWeek</a:t>
-            </a:r>
-            <a:r>
-              <a:rPr lang="en-US" sz="800" dirty="0"/>
-              <a:t>&gt;</a:t>
-            </a:r>
-          </a:p>
-          <a:p>
-            <a:endParaRPr lang="en-US" sz="800" dirty="0"/>
-          </a:p>
-          <a:p>
-            <a:r>
-              <a:rPr lang="en-US" sz="800" dirty="0"/>
-              <a:t>&lt;ValueCases7Days&gt; &lt;ValueDiffCasesYesterday7Days&gt; &lt;ValueDiffCasesLastWeek7Days&gt;</a:t>
-            </a:r>
-          </a:p>
-          <a:p>
-            <a:endParaRPr lang="en-US" sz="800" dirty="0"/>
-          </a:p>
-        </p:txBody>
-      </p:sp>
-      <p:sp>
-        <p:nvSpPr>
-          <p:cNvPr id="57" name="Abgerundete rechteckige Legende 56">
-            <a:extLst>
-              <a:ext uri="{FF2B5EF4-FFF2-40B4-BE49-F238E27FC236}">
-                <a16:creationId xmlns:a16="http://schemas.microsoft.com/office/drawing/2014/main" id="{CF4D1DCE-F1E9-C74F-AFA3-5F0AB8D912B7}"/>
-              </a:ext>
-            </a:extLst>
-          </p:cNvPr>
-          <p:cNvSpPr/>
-          <p:nvPr/>
-        </p:nvSpPr>
-        <p:spPr>
-          <a:xfrm>
-            <a:off x="521415" y="5911378"/>
-            <a:ext cx="3449440" cy="816625"/>
-          </a:xfrm>
-          <a:prstGeom prst="wedgeRoundRectCallout">
-            <a:avLst>
-              <a:gd name="adj1" fmla="val 54485"/>
-              <a:gd name="adj2" fmla="val -4244"/>
-              <a:gd name="adj3" fmla="val 16667"/>
-            </a:avLst>
-          </a:prstGeom>
-          <a:noFill/>
-        </p:spPr>
-        <p:style>
-          <a:lnRef idx="2">
-            <a:schemeClr val="accent1">
-              <a:shade val="50000"/>
-            </a:schemeClr>
-          </a:lnRef>
-          <a:fillRef idx="1">
-            <a:schemeClr val="accent1"/>
-          </a:fillRef>
-          <a:effectRef idx="0">
-            <a:schemeClr val="accent1"/>
-          </a:effectRef>
-          <a:fontRef idx="minor">
-            <a:schemeClr val="lt1"/>
-          </a:fontRef>
-        </p:style>
-        <p:txBody>
-          <a:bodyPr rtlCol="0" anchor="ctr"/>
-          <a:lstStyle/>
-          <a:p>
-            <a:pPr algn="ctr"/>
-            <a:endParaRPr lang="en-US"/>
-          </a:p>
-        </p:txBody>
-      </p:sp>
-      <p:sp>
-        <p:nvSpPr>
-          <p:cNvPr id="58" name="Textfeld 57">
-            <a:extLst>
-              <a:ext uri="{FF2B5EF4-FFF2-40B4-BE49-F238E27FC236}">
-                <a16:creationId xmlns:a16="http://schemas.microsoft.com/office/drawing/2014/main" id="{88D8827D-6C69-1D45-AE3A-77D060BFEDAF}"/>
-              </a:ext>
-            </a:extLst>
-          </p:cNvPr>
-          <p:cNvSpPr txBox="1"/>
-          <p:nvPr/>
-        </p:nvSpPr>
-        <p:spPr>
-          <a:xfrm>
-            <a:off x="798286" y="8087258"/>
-            <a:ext cx="824265" cy="246221"/>
-          </a:xfrm>
-          <a:prstGeom prst="rect">
-            <a:avLst/>
-          </a:prstGeom>
-          <a:noFill/>
-        </p:spPr>
-        <p:txBody>
-          <a:bodyPr wrap="none" rtlCol="0">
-            <a:spAutoFit/>
-          </a:bodyPr>
-          <a:lstStyle/>
-          <a:p>
-            <a:r>
-              <a:rPr lang="en-US" sz="1000" dirty="0"/>
-              <a:t>&lt;</a:t>
-            </a:r>
-            <a:r>
-              <a:rPr lang="en-US" sz="1000" dirty="0" err="1"/>
-              <a:t>CellImage</a:t>
-            </a:r>
-            <a:r>
-              <a:rPr lang="en-US" sz="1000" dirty="0"/>
-              <a:t>&gt;</a:t>
-            </a:r>
-          </a:p>
-        </p:txBody>
-      </p:sp>
-      <p:sp>
-        <p:nvSpPr>
-          <p:cNvPr id="59" name="Abgerundete rechteckige Legende 58">
-            <a:extLst>
-              <a:ext uri="{FF2B5EF4-FFF2-40B4-BE49-F238E27FC236}">
-                <a16:creationId xmlns:a16="http://schemas.microsoft.com/office/drawing/2014/main" id="{80094217-5698-4F45-8561-3837970AF1AD}"/>
-              </a:ext>
-            </a:extLst>
-          </p:cNvPr>
-          <p:cNvSpPr/>
-          <p:nvPr/>
-        </p:nvSpPr>
-        <p:spPr>
-          <a:xfrm>
-            <a:off x="798285" y="8031887"/>
-            <a:ext cx="824265" cy="351275"/>
-          </a:xfrm>
-          <a:prstGeom prst="wedgeRoundRectCallout">
-            <a:avLst>
-              <a:gd name="adj1" fmla="val -31798"/>
-              <a:gd name="adj2" fmla="val -80363"/>
-              <a:gd name="adj3" fmla="val 16667"/>
-            </a:avLst>
-          </a:prstGeom>
-          <a:noFill/>
-        </p:spPr>
-        <p:style>
-          <a:lnRef idx="2">
-            <a:schemeClr val="accent1">
-              <a:shade val="50000"/>
-            </a:schemeClr>
-          </a:lnRef>
-          <a:fillRef idx="1">
-            <a:schemeClr val="accent1"/>
-          </a:fillRef>
-          <a:effectRef idx="0">
-            <a:schemeClr val="accent1"/>
-          </a:effectRef>
-          <a:fontRef idx="minor">
-            <a:schemeClr val="lt1"/>
-          </a:fontRef>
-        </p:style>
-        <p:txBody>
-          <a:bodyPr rtlCol="0" anchor="ctr"/>
-          <a:lstStyle/>
-          <a:p>
-            <a:pPr algn="ctr"/>
-            <a:endParaRPr lang="en-US"/>
           </a:p>
         </p:txBody>
       </p:sp>
@@ -8649,6 +8216,206 @@
           </a:fontRef>
         </p:style>
       </p:cxnSp>
+      <p:sp>
+        <p:nvSpPr>
+          <p:cNvPr id="51" name="Textfeld 50">
+            <a:extLst>
+              <a:ext uri="{FF2B5EF4-FFF2-40B4-BE49-F238E27FC236}">
+                <a16:creationId xmlns:a16="http://schemas.microsoft.com/office/drawing/2014/main" id="{52B379B7-72EE-E844-8335-4D757D7FE4F3}"/>
+              </a:ext>
+            </a:extLst>
+          </p:cNvPr>
+          <p:cNvSpPr txBox="1"/>
+          <p:nvPr/>
+        </p:nvSpPr>
+        <p:spPr>
+          <a:xfrm>
+            <a:off x="605557" y="6872601"/>
+            <a:ext cx="2359325" cy="830997"/>
+          </a:xfrm>
+          <a:prstGeom prst="rect">
+            <a:avLst/>
+          </a:prstGeom>
+          <a:noFill/>
+          <a:ln>
+            <a:solidFill>
+              <a:schemeClr val="accent1">
+                <a:shade val="50000"/>
+              </a:schemeClr>
+            </a:solidFill>
+          </a:ln>
+        </p:spPr>
+        <p:txBody>
+          <a:bodyPr wrap="square" rtlCol="0">
+            <a:spAutoFit/>
+          </a:bodyPr>
+          <a:lstStyle/>
+          <a:p>
+            <a:r>
+              <a:rPr lang="en-US" sz="1000" dirty="0"/>
+              <a:t>&lt; </a:t>
+            </a:r>
+            <a:r>
+              <a:rPr lang="en-US" sz="1000" dirty="0" err="1"/>
+              <a:t>labelDate</a:t>
+            </a:r>
+            <a:r>
+              <a:rPr lang="en-US" sz="1000" dirty="0"/>
+              <a:t> &gt;</a:t>
+            </a:r>
+          </a:p>
+          <a:p>
+            <a:pPr algn="ctr"/>
+            <a:endParaRPr lang="en-US" sz="400" dirty="0"/>
+          </a:p>
+          <a:p>
+            <a:r>
+              <a:rPr lang="en-US" sz="800" dirty="0"/>
+              <a:t>                                    &lt; </a:t>
+            </a:r>
+            <a:r>
+              <a:rPr lang="en-US" sz="800" dirty="0" err="1"/>
+              <a:t>labelTotal</a:t>
+            </a:r>
+            <a:r>
+              <a:rPr lang="en-US" sz="800" dirty="0"/>
+              <a:t> &gt;      &lt; labelPer100k &gt;</a:t>
+            </a:r>
+          </a:p>
+          <a:p>
+            <a:r>
+              <a:rPr lang="en-US" sz="900" dirty="0"/>
+              <a:t>&lt; </a:t>
+            </a:r>
+            <a:r>
+              <a:rPr lang="en-US" sz="900" dirty="0" err="1"/>
+              <a:t>labelCases</a:t>
+            </a:r>
+            <a:r>
+              <a:rPr lang="en-US" sz="900" dirty="0"/>
+              <a:t> &gt;   &lt; </a:t>
+            </a:r>
+            <a:r>
+              <a:rPr lang="en-US" sz="900" dirty="0" err="1"/>
+              <a:t>casesTotal</a:t>
+            </a:r>
+            <a:r>
+              <a:rPr lang="en-US" sz="900" dirty="0"/>
+              <a:t> &gt;      &lt; cases100k &gt;</a:t>
+            </a:r>
+          </a:p>
+          <a:p>
+            <a:r>
+              <a:rPr lang="en-US" sz="900" dirty="0"/>
+              <a:t>&lt; </a:t>
+            </a:r>
+            <a:r>
+              <a:rPr lang="en-US" sz="900" dirty="0" err="1"/>
+              <a:t>labelDeaths</a:t>
+            </a:r>
+            <a:r>
+              <a:rPr lang="en-US" sz="900" dirty="0"/>
+              <a:t> &gt; &lt; </a:t>
+            </a:r>
+            <a:r>
+              <a:rPr lang="en-US" sz="900" dirty="0" err="1"/>
+              <a:t>deathsTotal</a:t>
+            </a:r>
+            <a:r>
+              <a:rPr lang="en-US" sz="900" dirty="0"/>
+              <a:t> &gt;&lt; deaths100k &gt;</a:t>
+            </a:r>
+          </a:p>
+          <a:p>
+            <a:r>
+              <a:rPr lang="en-US" sz="800" dirty="0"/>
+              <a:t>&lt;</a:t>
+            </a:r>
+            <a:r>
+              <a:rPr lang="en-US" sz="800" dirty="0" err="1"/>
+              <a:t>labelIncidents</a:t>
+            </a:r>
+            <a:r>
+              <a:rPr lang="en-US" sz="800" dirty="0"/>
+              <a:t> &gt;&lt; </a:t>
+            </a:r>
+            <a:r>
+              <a:rPr lang="en-US" sz="800" dirty="0" err="1"/>
+              <a:t>incidentsTotal</a:t>
+            </a:r>
+            <a:r>
+              <a:rPr lang="en-US" sz="800" dirty="0"/>
+              <a:t> &gt;&lt; incidents100k &gt;</a:t>
+            </a:r>
+          </a:p>
+        </p:txBody>
+      </p:sp>
+      <p:sp>
+        <p:nvSpPr>
+          <p:cNvPr id="52" name="Textfeld 51">
+            <a:extLst>
+              <a:ext uri="{FF2B5EF4-FFF2-40B4-BE49-F238E27FC236}">
+                <a16:creationId xmlns:a16="http://schemas.microsoft.com/office/drawing/2014/main" id="{0EA9DAE0-0218-8849-8BCB-4C15AD58403A}"/>
+              </a:ext>
+            </a:extLst>
+          </p:cNvPr>
+          <p:cNvSpPr txBox="1"/>
+          <p:nvPr/>
+        </p:nvSpPr>
+        <p:spPr>
+          <a:xfrm>
+            <a:off x="605556" y="6495305"/>
+            <a:ext cx="2359325" cy="369332"/>
+          </a:xfrm>
+          <a:prstGeom prst="rect">
+            <a:avLst/>
+          </a:prstGeom>
+          <a:noFill/>
+          <a:ln>
+            <a:solidFill>
+              <a:schemeClr val="accent1">
+                <a:shade val="50000"/>
+              </a:schemeClr>
+            </a:solidFill>
+          </a:ln>
+        </p:spPr>
+        <p:txBody>
+          <a:bodyPr wrap="square" rtlCol="0">
+            <a:spAutoFit/>
+          </a:bodyPr>
+          <a:lstStyle/>
+          <a:p>
+            <a:r>
+              <a:rPr lang="en-US" sz="900" dirty="0"/>
+              <a:t>&lt;</a:t>
+            </a:r>
+            <a:r>
+              <a:rPr lang="en-US" sz="900" dirty="0" err="1"/>
+              <a:t>valueKindOf</a:t>
+            </a:r>
+            <a:r>
+              <a:rPr lang="en-US" sz="900" dirty="0"/>
+              <a:t>&gt;&lt;</a:t>
+            </a:r>
+            <a:r>
+              <a:rPr lang="en-US" sz="900" dirty="0" err="1"/>
+              <a:t>valueInhabitans</a:t>
+            </a:r>
+            <a:r>
+              <a:rPr lang="en-US" sz="900" dirty="0"/>
+              <a:t>&gt; &lt; </a:t>
+            </a:r>
+            <a:r>
+              <a:rPr lang="en-US" sz="900" dirty="0" err="1"/>
+              <a:t>labelInhabitants</a:t>
+            </a:r>
+            <a:r>
+              <a:rPr lang="en-US" sz="900" dirty="0"/>
+              <a:t> &gt; </a:t>
+            </a:r>
+          </a:p>
+        </p:txBody>
+      </p:sp>
     </p:spTree>
     <p:extLst>
       <p:ext uri="{BB962C8B-B14F-4D97-AF65-F5344CB8AC3E}">
@@ -10333,6 +10100,3837 @@
           </a:p>
         </p:txBody>
       </p:sp>
+      <p:pic>
+        <p:nvPicPr>
+          <p:cNvPr id="2" name="Grafik 1">
+            <a:extLst>
+              <a:ext uri="{FF2B5EF4-FFF2-40B4-BE49-F238E27FC236}">
+                <a16:creationId xmlns:a16="http://schemas.microsoft.com/office/drawing/2014/main" id="{D9E7C95B-378B-AA4B-B2AE-C1D11022D97F}"/>
+              </a:ext>
+            </a:extLst>
+          </p:cNvPr>
+          <p:cNvPicPr>
+            <a:picLocks noChangeAspect="1"/>
+          </p:cNvPicPr>
+          <p:nvPr/>
+        </p:nvPicPr>
+        <p:blipFill rotWithShape="1">
+          <a:blip r:embed="rId2"/>
+          <a:srcRect l="2080" r="150"/>
+          <a:stretch/>
+        </p:blipFill>
+        <p:spPr>
+          <a:xfrm>
+            <a:off x="601589" y="6404299"/>
+            <a:ext cx="2359325" cy="909196"/>
+          </a:xfrm>
+          <a:prstGeom prst="rect">
+            <a:avLst/>
+          </a:prstGeom>
+        </p:spPr>
+      </p:pic>
+      <p:sp>
+        <p:nvSpPr>
+          <p:cNvPr id="3" name="Textfeld 2">
+            <a:extLst>
+              <a:ext uri="{FF2B5EF4-FFF2-40B4-BE49-F238E27FC236}">
+                <a16:creationId xmlns:a16="http://schemas.microsoft.com/office/drawing/2014/main" id="{5AE5CFC6-367C-3B47-A5C1-719343AFE4DD}"/>
+              </a:ext>
+            </a:extLst>
+          </p:cNvPr>
+          <p:cNvSpPr txBox="1"/>
+          <p:nvPr/>
+        </p:nvSpPr>
+        <p:spPr>
+          <a:xfrm>
+            <a:off x="2266877" y="7078779"/>
+            <a:ext cx="513282" cy="184666"/>
+          </a:xfrm>
+          <a:prstGeom prst="rect">
+            <a:avLst/>
+          </a:prstGeom>
+          <a:noFill/>
+        </p:spPr>
+        <p:txBody>
+          <a:bodyPr wrap="none" rtlCol="0">
+            <a:spAutoFit/>
+          </a:bodyPr>
+          <a:lstStyle/>
+          <a:p>
+            <a:r>
+              <a:rPr lang="de-DE" sz="600" dirty="0" err="1"/>
+              <a:t>Incidences</a:t>
+            </a:r>
+            <a:endParaRPr lang="de-DE" sz="600" dirty="0"/>
+          </a:p>
+        </p:txBody>
+      </p:sp>
+      <p:sp>
+        <p:nvSpPr>
+          <p:cNvPr id="19" name="Textfeld 18">
+            <a:extLst>
+              <a:ext uri="{FF2B5EF4-FFF2-40B4-BE49-F238E27FC236}">
+                <a16:creationId xmlns:a16="http://schemas.microsoft.com/office/drawing/2014/main" id="{A1CA726D-B127-CF4E-820B-8F998A17EFFF}"/>
+              </a:ext>
+            </a:extLst>
+          </p:cNvPr>
+          <p:cNvSpPr txBox="1"/>
+          <p:nvPr/>
+        </p:nvSpPr>
+        <p:spPr>
+          <a:xfrm>
+            <a:off x="1507225" y="7075302"/>
+            <a:ext cx="564578" cy="184666"/>
+          </a:xfrm>
+          <a:prstGeom prst="rect">
+            <a:avLst/>
+          </a:prstGeom>
+          <a:noFill/>
+        </p:spPr>
+        <p:txBody>
+          <a:bodyPr wrap="none" rtlCol="0">
+            <a:spAutoFit/>
+          </a:bodyPr>
+          <a:lstStyle/>
+          <a:p>
+            <a:r>
+              <a:rPr lang="de-DE" sz="600" dirty="0"/>
+              <a:t>New </a:t>
+            </a:r>
+            <a:r>
+              <a:rPr lang="de-DE" sz="600" dirty="0" err="1"/>
+              <a:t>Deaths</a:t>
+            </a:r>
+            <a:endParaRPr lang="de-DE" sz="600" dirty="0"/>
+          </a:p>
+        </p:txBody>
+      </p:sp>
+      <p:sp>
+        <p:nvSpPr>
+          <p:cNvPr id="20" name="Textfeld 19">
+            <a:extLst>
+              <a:ext uri="{FF2B5EF4-FFF2-40B4-BE49-F238E27FC236}">
+                <a16:creationId xmlns:a16="http://schemas.microsoft.com/office/drawing/2014/main" id="{7BD96723-14FB-F044-931B-E6BF0BC1B4BC}"/>
+              </a:ext>
+            </a:extLst>
+          </p:cNvPr>
+          <p:cNvSpPr txBox="1"/>
+          <p:nvPr/>
+        </p:nvSpPr>
+        <p:spPr>
+          <a:xfrm>
+            <a:off x="751045" y="7071825"/>
+            <a:ext cx="522900" cy="184666"/>
+          </a:xfrm>
+          <a:prstGeom prst="rect">
+            <a:avLst/>
+          </a:prstGeom>
+          <a:noFill/>
+        </p:spPr>
+        <p:txBody>
+          <a:bodyPr wrap="none" rtlCol="0">
+            <a:spAutoFit/>
+          </a:bodyPr>
+          <a:lstStyle/>
+          <a:p>
+            <a:r>
+              <a:rPr lang="de-DE" sz="600" dirty="0"/>
+              <a:t>New Cases</a:t>
+            </a:r>
+          </a:p>
+        </p:txBody>
+      </p:sp>
+      <p:cxnSp>
+        <p:nvCxnSpPr>
+          <p:cNvPr id="12" name="Gerade Verbindung 11">
+            <a:extLst>
+              <a:ext uri="{FF2B5EF4-FFF2-40B4-BE49-F238E27FC236}">
+                <a16:creationId xmlns:a16="http://schemas.microsoft.com/office/drawing/2014/main" id="{085C8C00-E42C-704C-8B0B-ECC0E011E411}"/>
+              </a:ext>
+            </a:extLst>
+          </p:cNvPr>
+          <p:cNvCxnSpPr>
+            <a:cxnSpLocks/>
+          </p:cNvCxnSpPr>
+          <p:nvPr/>
+        </p:nvCxnSpPr>
+        <p:spPr>
+          <a:xfrm>
+            <a:off x="675759" y="6664651"/>
+            <a:ext cx="0" cy="445031"/>
+          </a:xfrm>
+          <a:prstGeom prst="line">
+            <a:avLst/>
+          </a:prstGeom>
+        </p:spPr>
+        <p:style>
+          <a:lnRef idx="1">
+            <a:schemeClr val="accent1"/>
+          </a:lnRef>
+          <a:fillRef idx="0">
+            <a:schemeClr val="accent1"/>
+          </a:fillRef>
+          <a:effectRef idx="0">
+            <a:schemeClr val="accent1"/>
+          </a:effectRef>
+          <a:fontRef idx="minor">
+            <a:schemeClr val="tx1"/>
+          </a:fontRef>
+        </p:style>
+      </p:cxnSp>
+      <p:cxnSp>
+        <p:nvCxnSpPr>
+          <p:cNvPr id="23" name="Gerade Verbindung 22">
+            <a:extLst>
+              <a:ext uri="{FF2B5EF4-FFF2-40B4-BE49-F238E27FC236}">
+                <a16:creationId xmlns:a16="http://schemas.microsoft.com/office/drawing/2014/main" id="{A3154C01-838F-374A-A100-F8091F72F3B0}"/>
+              </a:ext>
+            </a:extLst>
+          </p:cNvPr>
+          <p:cNvCxnSpPr>
+            <a:cxnSpLocks/>
+          </p:cNvCxnSpPr>
+          <p:nvPr/>
+        </p:nvCxnSpPr>
+        <p:spPr>
+          <a:xfrm>
+            <a:off x="697984" y="7109682"/>
+            <a:ext cx="645029" cy="0"/>
+          </a:xfrm>
+          <a:prstGeom prst="line">
+            <a:avLst/>
+          </a:prstGeom>
+        </p:spPr>
+        <p:style>
+          <a:lnRef idx="1">
+            <a:schemeClr val="accent1"/>
+          </a:lnRef>
+          <a:fillRef idx="0">
+            <a:schemeClr val="accent1"/>
+          </a:fillRef>
+          <a:effectRef idx="0">
+            <a:schemeClr val="accent1"/>
+          </a:effectRef>
+          <a:fontRef idx="minor">
+            <a:schemeClr val="tx1"/>
+          </a:fontRef>
+        </p:style>
+      </p:cxnSp>
+      <p:sp>
+        <p:nvSpPr>
+          <p:cNvPr id="24" name="Rechteck 23">
+            <a:extLst>
+              <a:ext uri="{FF2B5EF4-FFF2-40B4-BE49-F238E27FC236}">
+                <a16:creationId xmlns:a16="http://schemas.microsoft.com/office/drawing/2014/main" id="{8437C139-46EF-E74C-8B12-FDF27C0C891D}"/>
+              </a:ext>
+            </a:extLst>
+          </p:cNvPr>
+          <p:cNvSpPr/>
+          <p:nvPr/>
+        </p:nvSpPr>
+        <p:spPr>
+          <a:xfrm>
+            <a:off x="776445" y="6677682"/>
+            <a:ext cx="36000" cy="432000"/>
+          </a:xfrm>
+          <a:prstGeom prst="rect">
+            <a:avLst/>
+          </a:prstGeom>
+          <a:ln>
+            <a:noFill/>
+          </a:ln>
+        </p:spPr>
+        <p:style>
+          <a:lnRef idx="2">
+            <a:schemeClr val="accent1">
+              <a:shade val="50000"/>
+            </a:schemeClr>
+          </a:lnRef>
+          <a:fillRef idx="1">
+            <a:schemeClr val="accent1"/>
+          </a:fillRef>
+          <a:effectRef idx="0">
+            <a:schemeClr val="accent1"/>
+          </a:effectRef>
+          <a:fontRef idx="minor">
+            <a:schemeClr val="lt1"/>
+          </a:fontRef>
+        </p:style>
+        <p:txBody>
+          <a:bodyPr rtlCol="0" anchor="ctr"/>
+          <a:lstStyle/>
+          <a:p>
+            <a:pPr algn="ctr"/>
+            <a:endParaRPr lang="de-DE"/>
+          </a:p>
+        </p:txBody>
+      </p:sp>
+      <p:sp>
+        <p:nvSpPr>
+          <p:cNvPr id="25" name="Rechteck 24">
+            <a:extLst>
+              <a:ext uri="{FF2B5EF4-FFF2-40B4-BE49-F238E27FC236}">
+                <a16:creationId xmlns:a16="http://schemas.microsoft.com/office/drawing/2014/main" id="{7A6E420B-2974-D048-A37A-8DEFADE6ECC0}"/>
+              </a:ext>
+            </a:extLst>
+          </p:cNvPr>
+          <p:cNvSpPr/>
+          <p:nvPr/>
+        </p:nvSpPr>
+        <p:spPr>
+          <a:xfrm>
+            <a:off x="824070" y="6677682"/>
+            <a:ext cx="36000" cy="432000"/>
+          </a:xfrm>
+          <a:prstGeom prst="rect">
+            <a:avLst/>
+          </a:prstGeom>
+          <a:ln>
+            <a:noFill/>
+          </a:ln>
+        </p:spPr>
+        <p:style>
+          <a:lnRef idx="2">
+            <a:schemeClr val="accent1">
+              <a:shade val="50000"/>
+            </a:schemeClr>
+          </a:lnRef>
+          <a:fillRef idx="1">
+            <a:schemeClr val="accent1"/>
+          </a:fillRef>
+          <a:effectRef idx="0">
+            <a:schemeClr val="accent1"/>
+          </a:effectRef>
+          <a:fontRef idx="minor">
+            <a:schemeClr val="lt1"/>
+          </a:fontRef>
+        </p:style>
+        <p:txBody>
+          <a:bodyPr rtlCol="0" anchor="ctr"/>
+          <a:lstStyle/>
+          <a:p>
+            <a:pPr algn="ctr"/>
+            <a:endParaRPr lang="de-DE"/>
+          </a:p>
+        </p:txBody>
+      </p:sp>
+      <p:sp>
+        <p:nvSpPr>
+          <p:cNvPr id="26" name="Rechteck 25">
+            <a:extLst>
+              <a:ext uri="{FF2B5EF4-FFF2-40B4-BE49-F238E27FC236}">
+                <a16:creationId xmlns:a16="http://schemas.microsoft.com/office/drawing/2014/main" id="{21F7397E-C584-584C-B6DF-5CAE413B97FC}"/>
+              </a:ext>
+            </a:extLst>
+          </p:cNvPr>
+          <p:cNvSpPr/>
+          <p:nvPr/>
+        </p:nvSpPr>
+        <p:spPr>
+          <a:xfrm>
+            <a:off x="871855" y="6677682"/>
+            <a:ext cx="36000" cy="432000"/>
+          </a:xfrm>
+          <a:prstGeom prst="rect">
+            <a:avLst/>
+          </a:prstGeom>
+          <a:ln>
+            <a:noFill/>
+          </a:ln>
+        </p:spPr>
+        <p:style>
+          <a:lnRef idx="2">
+            <a:schemeClr val="accent1">
+              <a:shade val="50000"/>
+            </a:schemeClr>
+          </a:lnRef>
+          <a:fillRef idx="1">
+            <a:schemeClr val="accent1"/>
+          </a:fillRef>
+          <a:effectRef idx="0">
+            <a:schemeClr val="accent1"/>
+          </a:effectRef>
+          <a:fontRef idx="minor">
+            <a:schemeClr val="lt1"/>
+          </a:fontRef>
+        </p:style>
+        <p:txBody>
+          <a:bodyPr rtlCol="0" anchor="ctr"/>
+          <a:lstStyle/>
+          <a:p>
+            <a:pPr algn="ctr"/>
+            <a:endParaRPr lang="de-DE"/>
+          </a:p>
+        </p:txBody>
+      </p:sp>
+      <p:sp>
+        <p:nvSpPr>
+          <p:cNvPr id="27" name="Rechteck 26">
+            <a:extLst>
+              <a:ext uri="{FF2B5EF4-FFF2-40B4-BE49-F238E27FC236}">
+                <a16:creationId xmlns:a16="http://schemas.microsoft.com/office/drawing/2014/main" id="{B7C21361-4A9A-5A4B-916A-A48229F0C465}"/>
+              </a:ext>
+            </a:extLst>
+          </p:cNvPr>
+          <p:cNvSpPr/>
+          <p:nvPr/>
+        </p:nvSpPr>
+        <p:spPr>
+          <a:xfrm>
+            <a:off x="919551" y="6677682"/>
+            <a:ext cx="36000" cy="432000"/>
+          </a:xfrm>
+          <a:prstGeom prst="rect">
+            <a:avLst/>
+          </a:prstGeom>
+          <a:ln>
+            <a:noFill/>
+          </a:ln>
+        </p:spPr>
+        <p:style>
+          <a:lnRef idx="2">
+            <a:schemeClr val="accent1">
+              <a:shade val="50000"/>
+            </a:schemeClr>
+          </a:lnRef>
+          <a:fillRef idx="1">
+            <a:schemeClr val="accent1"/>
+          </a:fillRef>
+          <a:effectRef idx="0">
+            <a:schemeClr val="accent1"/>
+          </a:effectRef>
+          <a:fontRef idx="minor">
+            <a:schemeClr val="lt1"/>
+          </a:fontRef>
+        </p:style>
+        <p:txBody>
+          <a:bodyPr rtlCol="0" anchor="ctr"/>
+          <a:lstStyle/>
+          <a:p>
+            <a:pPr algn="ctr"/>
+            <a:endParaRPr lang="de-DE"/>
+          </a:p>
+        </p:txBody>
+      </p:sp>
+      <p:sp>
+        <p:nvSpPr>
+          <p:cNvPr id="28" name="Rechteck 27">
+            <a:extLst>
+              <a:ext uri="{FF2B5EF4-FFF2-40B4-BE49-F238E27FC236}">
+                <a16:creationId xmlns:a16="http://schemas.microsoft.com/office/drawing/2014/main" id="{80F6B79A-0407-9149-99EE-CFB5592DD672}"/>
+              </a:ext>
+            </a:extLst>
+          </p:cNvPr>
+          <p:cNvSpPr/>
+          <p:nvPr/>
+        </p:nvSpPr>
+        <p:spPr>
+          <a:xfrm>
+            <a:off x="965222" y="6677682"/>
+            <a:ext cx="36000" cy="432000"/>
+          </a:xfrm>
+          <a:prstGeom prst="rect">
+            <a:avLst/>
+          </a:prstGeom>
+          <a:ln>
+            <a:noFill/>
+          </a:ln>
+        </p:spPr>
+        <p:style>
+          <a:lnRef idx="2">
+            <a:schemeClr val="accent1">
+              <a:shade val="50000"/>
+            </a:schemeClr>
+          </a:lnRef>
+          <a:fillRef idx="1">
+            <a:schemeClr val="accent1"/>
+          </a:fillRef>
+          <a:effectRef idx="0">
+            <a:schemeClr val="accent1"/>
+          </a:effectRef>
+          <a:fontRef idx="minor">
+            <a:schemeClr val="lt1"/>
+          </a:fontRef>
+        </p:style>
+        <p:txBody>
+          <a:bodyPr rtlCol="0" anchor="ctr"/>
+          <a:lstStyle/>
+          <a:p>
+            <a:pPr algn="ctr"/>
+            <a:endParaRPr lang="de-DE"/>
+          </a:p>
+        </p:txBody>
+      </p:sp>
+      <p:sp>
+        <p:nvSpPr>
+          <p:cNvPr id="29" name="Rechteck 28">
+            <a:extLst>
+              <a:ext uri="{FF2B5EF4-FFF2-40B4-BE49-F238E27FC236}">
+                <a16:creationId xmlns:a16="http://schemas.microsoft.com/office/drawing/2014/main" id="{9C6099A0-8558-CE49-BDC7-65985E37829F}"/>
+              </a:ext>
+            </a:extLst>
+          </p:cNvPr>
+          <p:cNvSpPr/>
+          <p:nvPr/>
+        </p:nvSpPr>
+        <p:spPr>
+          <a:xfrm>
+            <a:off x="1009672" y="6677682"/>
+            <a:ext cx="36000" cy="432000"/>
+          </a:xfrm>
+          <a:prstGeom prst="rect">
+            <a:avLst/>
+          </a:prstGeom>
+          <a:solidFill>
+            <a:schemeClr val="accent1">
+              <a:lumMod val="75000"/>
+            </a:schemeClr>
+          </a:solidFill>
+          <a:ln>
+            <a:noFill/>
+          </a:ln>
+        </p:spPr>
+        <p:style>
+          <a:lnRef idx="2">
+            <a:schemeClr val="accent1">
+              <a:shade val="50000"/>
+            </a:schemeClr>
+          </a:lnRef>
+          <a:fillRef idx="1">
+            <a:schemeClr val="accent1"/>
+          </a:fillRef>
+          <a:effectRef idx="0">
+            <a:schemeClr val="accent1"/>
+          </a:effectRef>
+          <a:fontRef idx="minor">
+            <a:schemeClr val="lt1"/>
+          </a:fontRef>
+        </p:style>
+        <p:txBody>
+          <a:bodyPr rtlCol="0" anchor="ctr"/>
+          <a:lstStyle/>
+          <a:p>
+            <a:pPr algn="ctr"/>
+            <a:endParaRPr lang="de-DE"/>
+          </a:p>
+        </p:txBody>
+      </p:sp>
+      <p:sp>
+        <p:nvSpPr>
+          <p:cNvPr id="30" name="Rechteck 29">
+            <a:extLst>
+              <a:ext uri="{FF2B5EF4-FFF2-40B4-BE49-F238E27FC236}">
+                <a16:creationId xmlns:a16="http://schemas.microsoft.com/office/drawing/2014/main" id="{8D4930C1-BF14-6B48-AF04-F8758C3900C9}"/>
+              </a:ext>
+            </a:extLst>
+          </p:cNvPr>
+          <p:cNvSpPr/>
+          <p:nvPr/>
+        </p:nvSpPr>
+        <p:spPr>
+          <a:xfrm>
+            <a:off x="1054282" y="6677682"/>
+            <a:ext cx="36000" cy="432000"/>
+          </a:xfrm>
+          <a:prstGeom prst="rect">
+            <a:avLst/>
+          </a:prstGeom>
+          <a:solidFill>
+            <a:schemeClr val="accent1"/>
+          </a:solidFill>
+          <a:ln>
+            <a:noFill/>
+          </a:ln>
+        </p:spPr>
+        <p:style>
+          <a:lnRef idx="2">
+            <a:schemeClr val="accent1">
+              <a:shade val="50000"/>
+            </a:schemeClr>
+          </a:lnRef>
+          <a:fillRef idx="1">
+            <a:schemeClr val="accent1"/>
+          </a:fillRef>
+          <a:effectRef idx="0">
+            <a:schemeClr val="accent1"/>
+          </a:effectRef>
+          <a:fontRef idx="minor">
+            <a:schemeClr val="lt1"/>
+          </a:fontRef>
+        </p:style>
+        <p:txBody>
+          <a:bodyPr rtlCol="0" anchor="ctr"/>
+          <a:lstStyle/>
+          <a:p>
+            <a:pPr algn="ctr"/>
+            <a:endParaRPr lang="de-DE"/>
+          </a:p>
+        </p:txBody>
+      </p:sp>
+      <p:sp>
+        <p:nvSpPr>
+          <p:cNvPr id="31" name="Rechteck 30">
+            <a:extLst>
+              <a:ext uri="{FF2B5EF4-FFF2-40B4-BE49-F238E27FC236}">
+                <a16:creationId xmlns:a16="http://schemas.microsoft.com/office/drawing/2014/main" id="{FA2A7030-CB84-954F-B3F3-8196C60BFACD}"/>
+              </a:ext>
+            </a:extLst>
+          </p:cNvPr>
+          <p:cNvSpPr/>
+          <p:nvPr/>
+        </p:nvSpPr>
+        <p:spPr>
+          <a:xfrm>
+            <a:off x="1098803" y="6677682"/>
+            <a:ext cx="36000" cy="432000"/>
+          </a:xfrm>
+          <a:prstGeom prst="rect">
+            <a:avLst/>
+          </a:prstGeom>
+          <a:ln>
+            <a:noFill/>
+          </a:ln>
+        </p:spPr>
+        <p:style>
+          <a:lnRef idx="2">
+            <a:schemeClr val="accent1">
+              <a:shade val="50000"/>
+            </a:schemeClr>
+          </a:lnRef>
+          <a:fillRef idx="1">
+            <a:schemeClr val="accent1"/>
+          </a:fillRef>
+          <a:effectRef idx="0">
+            <a:schemeClr val="accent1"/>
+          </a:effectRef>
+          <a:fontRef idx="minor">
+            <a:schemeClr val="lt1"/>
+          </a:fontRef>
+        </p:style>
+        <p:txBody>
+          <a:bodyPr rtlCol="0" anchor="ctr"/>
+          <a:lstStyle/>
+          <a:p>
+            <a:pPr algn="ctr"/>
+            <a:endParaRPr lang="de-DE"/>
+          </a:p>
+        </p:txBody>
+      </p:sp>
+      <p:sp>
+        <p:nvSpPr>
+          <p:cNvPr id="32" name="Rechteck 31">
+            <a:extLst>
+              <a:ext uri="{FF2B5EF4-FFF2-40B4-BE49-F238E27FC236}">
+                <a16:creationId xmlns:a16="http://schemas.microsoft.com/office/drawing/2014/main" id="{C51D0314-C707-5744-AE38-1CCCA6E770A2}"/>
+              </a:ext>
+            </a:extLst>
+          </p:cNvPr>
+          <p:cNvSpPr/>
+          <p:nvPr/>
+        </p:nvSpPr>
+        <p:spPr>
+          <a:xfrm>
+            <a:off x="1143875" y="6677682"/>
+            <a:ext cx="36000" cy="432000"/>
+          </a:xfrm>
+          <a:prstGeom prst="rect">
+            <a:avLst/>
+          </a:prstGeom>
+          <a:ln>
+            <a:noFill/>
+          </a:ln>
+        </p:spPr>
+        <p:style>
+          <a:lnRef idx="2">
+            <a:schemeClr val="accent1">
+              <a:shade val="50000"/>
+            </a:schemeClr>
+          </a:lnRef>
+          <a:fillRef idx="1">
+            <a:schemeClr val="accent1"/>
+          </a:fillRef>
+          <a:effectRef idx="0">
+            <a:schemeClr val="accent1"/>
+          </a:effectRef>
+          <a:fontRef idx="minor">
+            <a:schemeClr val="lt1"/>
+          </a:fontRef>
+        </p:style>
+        <p:txBody>
+          <a:bodyPr rtlCol="0" anchor="ctr"/>
+          <a:lstStyle/>
+          <a:p>
+            <a:pPr algn="ctr"/>
+            <a:endParaRPr lang="de-DE"/>
+          </a:p>
+        </p:txBody>
+      </p:sp>
+      <p:sp>
+        <p:nvSpPr>
+          <p:cNvPr id="33" name="Rechteck 32">
+            <a:extLst>
+              <a:ext uri="{FF2B5EF4-FFF2-40B4-BE49-F238E27FC236}">
+                <a16:creationId xmlns:a16="http://schemas.microsoft.com/office/drawing/2014/main" id="{5C9A8E3F-DC01-4F47-B9F2-04A45DE8BCE9}"/>
+              </a:ext>
+            </a:extLst>
+          </p:cNvPr>
+          <p:cNvSpPr/>
+          <p:nvPr/>
+        </p:nvSpPr>
+        <p:spPr>
+          <a:xfrm>
+            <a:off x="1188325" y="6677682"/>
+            <a:ext cx="36000" cy="432000"/>
+          </a:xfrm>
+          <a:prstGeom prst="rect">
+            <a:avLst/>
+          </a:prstGeom>
+          <a:ln>
+            <a:noFill/>
+          </a:ln>
+        </p:spPr>
+        <p:style>
+          <a:lnRef idx="2">
+            <a:schemeClr val="accent1">
+              <a:shade val="50000"/>
+            </a:schemeClr>
+          </a:lnRef>
+          <a:fillRef idx="1">
+            <a:schemeClr val="accent1"/>
+          </a:fillRef>
+          <a:effectRef idx="0">
+            <a:schemeClr val="accent1"/>
+          </a:effectRef>
+          <a:fontRef idx="minor">
+            <a:schemeClr val="lt1"/>
+          </a:fontRef>
+        </p:style>
+        <p:txBody>
+          <a:bodyPr rtlCol="0" anchor="ctr"/>
+          <a:lstStyle/>
+          <a:p>
+            <a:pPr algn="ctr"/>
+            <a:endParaRPr lang="de-DE"/>
+          </a:p>
+        </p:txBody>
+      </p:sp>
+      <p:sp>
+        <p:nvSpPr>
+          <p:cNvPr id="34" name="Rechteck 33">
+            <a:extLst>
+              <a:ext uri="{FF2B5EF4-FFF2-40B4-BE49-F238E27FC236}">
+                <a16:creationId xmlns:a16="http://schemas.microsoft.com/office/drawing/2014/main" id="{2A25D79F-DDC5-4243-8712-4924A5F81D44}"/>
+              </a:ext>
+            </a:extLst>
+          </p:cNvPr>
+          <p:cNvSpPr/>
+          <p:nvPr/>
+        </p:nvSpPr>
+        <p:spPr>
+          <a:xfrm>
+            <a:off x="1232935" y="6677682"/>
+            <a:ext cx="36000" cy="432000"/>
+          </a:xfrm>
+          <a:prstGeom prst="rect">
+            <a:avLst/>
+          </a:prstGeom>
+          <a:ln>
+            <a:noFill/>
+          </a:ln>
+        </p:spPr>
+        <p:style>
+          <a:lnRef idx="2">
+            <a:schemeClr val="accent1">
+              <a:shade val="50000"/>
+            </a:schemeClr>
+          </a:lnRef>
+          <a:fillRef idx="1">
+            <a:schemeClr val="accent1"/>
+          </a:fillRef>
+          <a:effectRef idx="0">
+            <a:schemeClr val="accent1"/>
+          </a:effectRef>
+          <a:fontRef idx="minor">
+            <a:schemeClr val="lt1"/>
+          </a:fontRef>
+        </p:style>
+        <p:txBody>
+          <a:bodyPr rtlCol="0" anchor="ctr"/>
+          <a:lstStyle/>
+          <a:p>
+            <a:pPr algn="ctr"/>
+            <a:endParaRPr lang="de-DE"/>
+          </a:p>
+        </p:txBody>
+      </p:sp>
+      <p:sp>
+        <p:nvSpPr>
+          <p:cNvPr id="35" name="Rechteck 34">
+            <a:extLst>
+              <a:ext uri="{FF2B5EF4-FFF2-40B4-BE49-F238E27FC236}">
+                <a16:creationId xmlns:a16="http://schemas.microsoft.com/office/drawing/2014/main" id="{699EA7C7-A9AF-134C-8542-0A831F5C9817}"/>
+              </a:ext>
+            </a:extLst>
+          </p:cNvPr>
+          <p:cNvSpPr/>
+          <p:nvPr/>
+        </p:nvSpPr>
+        <p:spPr>
+          <a:xfrm>
+            <a:off x="1277456" y="6677682"/>
+            <a:ext cx="36000" cy="432000"/>
+          </a:xfrm>
+          <a:prstGeom prst="rect">
+            <a:avLst/>
+          </a:prstGeom>
+          <a:ln>
+            <a:noFill/>
+          </a:ln>
+        </p:spPr>
+        <p:style>
+          <a:lnRef idx="2">
+            <a:schemeClr val="accent1">
+              <a:shade val="50000"/>
+            </a:schemeClr>
+          </a:lnRef>
+          <a:fillRef idx="1">
+            <a:schemeClr val="accent1"/>
+          </a:fillRef>
+          <a:effectRef idx="0">
+            <a:schemeClr val="accent1"/>
+          </a:effectRef>
+          <a:fontRef idx="minor">
+            <a:schemeClr val="lt1"/>
+          </a:fontRef>
+        </p:style>
+        <p:txBody>
+          <a:bodyPr rtlCol="0" anchor="ctr"/>
+          <a:lstStyle/>
+          <a:p>
+            <a:pPr algn="ctr"/>
+            <a:endParaRPr lang="de-DE"/>
+          </a:p>
+        </p:txBody>
+      </p:sp>
+      <p:sp>
+        <p:nvSpPr>
+          <p:cNvPr id="36" name="Rechteck 35">
+            <a:extLst>
+              <a:ext uri="{FF2B5EF4-FFF2-40B4-BE49-F238E27FC236}">
+                <a16:creationId xmlns:a16="http://schemas.microsoft.com/office/drawing/2014/main" id="{A40680AF-4814-084F-950B-7D3F8CD3669C}"/>
+              </a:ext>
+            </a:extLst>
+          </p:cNvPr>
+          <p:cNvSpPr/>
+          <p:nvPr/>
+        </p:nvSpPr>
+        <p:spPr>
+          <a:xfrm>
+            <a:off x="1321508" y="6677682"/>
+            <a:ext cx="36000" cy="432000"/>
+          </a:xfrm>
+          <a:prstGeom prst="rect">
+            <a:avLst/>
+          </a:prstGeom>
+          <a:solidFill>
+            <a:schemeClr val="accent1">
+              <a:lumMod val="75000"/>
+            </a:schemeClr>
+          </a:solidFill>
+          <a:ln>
+            <a:noFill/>
+          </a:ln>
+        </p:spPr>
+        <p:style>
+          <a:lnRef idx="2">
+            <a:schemeClr val="accent1">
+              <a:shade val="50000"/>
+            </a:schemeClr>
+          </a:lnRef>
+          <a:fillRef idx="1">
+            <a:schemeClr val="accent1"/>
+          </a:fillRef>
+          <a:effectRef idx="0">
+            <a:schemeClr val="accent1"/>
+          </a:effectRef>
+          <a:fontRef idx="minor">
+            <a:schemeClr val="lt1"/>
+          </a:fontRef>
+        </p:style>
+        <p:txBody>
+          <a:bodyPr rtlCol="0" anchor="ctr"/>
+          <a:lstStyle/>
+          <a:p>
+            <a:pPr algn="ctr"/>
+            <a:endParaRPr lang="de-DE"/>
+          </a:p>
+        </p:txBody>
+      </p:sp>
+      <p:sp>
+        <p:nvSpPr>
+          <p:cNvPr id="37" name="Rechteck 36">
+            <a:extLst>
+              <a:ext uri="{FF2B5EF4-FFF2-40B4-BE49-F238E27FC236}">
+                <a16:creationId xmlns:a16="http://schemas.microsoft.com/office/drawing/2014/main" id="{F9826929-CDBE-AB4D-A9FA-84A444DA16D2}"/>
+              </a:ext>
+            </a:extLst>
+          </p:cNvPr>
+          <p:cNvSpPr/>
+          <p:nvPr/>
+        </p:nvSpPr>
+        <p:spPr>
+          <a:xfrm>
+            <a:off x="730774" y="6677682"/>
+            <a:ext cx="36000" cy="432000"/>
+          </a:xfrm>
+          <a:prstGeom prst="rect">
+            <a:avLst/>
+          </a:prstGeom>
+          <a:solidFill>
+            <a:schemeClr val="accent1"/>
+          </a:solidFill>
+          <a:ln>
+            <a:noFill/>
+          </a:ln>
+        </p:spPr>
+        <p:style>
+          <a:lnRef idx="2">
+            <a:schemeClr val="accent1">
+              <a:shade val="50000"/>
+            </a:schemeClr>
+          </a:lnRef>
+          <a:fillRef idx="1">
+            <a:schemeClr val="accent1"/>
+          </a:fillRef>
+          <a:effectRef idx="0">
+            <a:schemeClr val="accent1"/>
+          </a:effectRef>
+          <a:fontRef idx="minor">
+            <a:schemeClr val="lt1"/>
+          </a:fontRef>
+        </p:style>
+        <p:txBody>
+          <a:bodyPr rtlCol="0" anchor="ctr"/>
+          <a:lstStyle/>
+          <a:p>
+            <a:pPr algn="ctr"/>
+            <a:endParaRPr lang="de-DE"/>
+          </a:p>
+        </p:txBody>
+      </p:sp>
+      <p:sp>
+        <p:nvSpPr>
+          <p:cNvPr id="38" name="Rechteck 37">
+            <a:extLst>
+              <a:ext uri="{FF2B5EF4-FFF2-40B4-BE49-F238E27FC236}">
+                <a16:creationId xmlns:a16="http://schemas.microsoft.com/office/drawing/2014/main" id="{A9C9A1CF-09C9-A045-B32C-B06EEF79921D}"/>
+              </a:ext>
+            </a:extLst>
+          </p:cNvPr>
+          <p:cNvSpPr/>
+          <p:nvPr/>
+        </p:nvSpPr>
+        <p:spPr>
+          <a:xfrm>
+            <a:off x="689430" y="6677682"/>
+            <a:ext cx="36000" cy="432000"/>
+          </a:xfrm>
+          <a:prstGeom prst="rect">
+            <a:avLst/>
+          </a:prstGeom>
+          <a:solidFill>
+            <a:schemeClr val="accent1">
+              <a:lumMod val="75000"/>
+            </a:schemeClr>
+          </a:solidFill>
+          <a:ln>
+            <a:noFill/>
+          </a:ln>
+        </p:spPr>
+        <p:style>
+          <a:lnRef idx="2">
+            <a:schemeClr val="accent1">
+              <a:shade val="50000"/>
+            </a:schemeClr>
+          </a:lnRef>
+          <a:fillRef idx="1">
+            <a:schemeClr val="accent1"/>
+          </a:fillRef>
+          <a:effectRef idx="0">
+            <a:schemeClr val="accent1"/>
+          </a:effectRef>
+          <a:fontRef idx="minor">
+            <a:schemeClr val="lt1"/>
+          </a:fontRef>
+        </p:style>
+        <p:txBody>
+          <a:bodyPr rtlCol="0" anchor="ctr"/>
+          <a:lstStyle/>
+          <a:p>
+            <a:pPr algn="ctr"/>
+            <a:endParaRPr lang="de-DE"/>
+          </a:p>
+        </p:txBody>
+      </p:sp>
+      <p:sp>
+        <p:nvSpPr>
+          <p:cNvPr id="39" name="Textfeld 38">
+            <a:extLst>
+              <a:ext uri="{FF2B5EF4-FFF2-40B4-BE49-F238E27FC236}">
+                <a16:creationId xmlns:a16="http://schemas.microsoft.com/office/drawing/2014/main" id="{4A14802B-E705-9D4B-8B5B-502907AA7EE7}"/>
+              </a:ext>
+            </a:extLst>
+          </p:cNvPr>
+          <p:cNvSpPr txBox="1"/>
+          <p:nvPr/>
+        </p:nvSpPr>
+        <p:spPr>
+          <a:xfrm>
+            <a:off x="675759" y="7448550"/>
+            <a:ext cx="2101344" cy="461665"/>
+          </a:xfrm>
+          <a:prstGeom prst="rect">
+            <a:avLst/>
+          </a:prstGeom>
+          <a:noFill/>
+        </p:spPr>
+        <p:txBody>
+          <a:bodyPr wrap="none" rtlCol="0">
+            <a:spAutoFit/>
+          </a:bodyPr>
+          <a:lstStyle/>
+          <a:p>
+            <a:r>
+              <a:rPr lang="de-DE" sz="1200" dirty="0"/>
+              <a:t>iPhone SE: 96 </a:t>
+            </a:r>
+            <a:r>
+              <a:rPr lang="de-DE" sz="1200" dirty="0" err="1"/>
+              <a:t>points</a:t>
+            </a:r>
+            <a:r>
+              <a:rPr lang="de-DE" sz="1200" dirty="0"/>
+              <a:t> </a:t>
+            </a:r>
+          </a:p>
+          <a:p>
+            <a:r>
+              <a:rPr lang="de-DE" sz="1200" dirty="0"/>
+              <a:t>iPhone 12 Pro Max: 131 </a:t>
+            </a:r>
+            <a:r>
+              <a:rPr lang="de-DE" sz="1200" dirty="0" err="1"/>
+              <a:t>points</a:t>
+            </a:r>
+            <a:endParaRPr lang="de-DE" sz="1200" dirty="0"/>
+          </a:p>
+        </p:txBody>
+      </p:sp>
+      <p:graphicFrame>
+        <p:nvGraphicFramePr>
+          <p:cNvPr id="40" name="Tabelle 39">
+            <a:extLst>
+              <a:ext uri="{FF2B5EF4-FFF2-40B4-BE49-F238E27FC236}">
+                <a16:creationId xmlns:a16="http://schemas.microsoft.com/office/drawing/2014/main" id="{0B36E219-5D3C-F84E-BE95-571960BDC900}"/>
+              </a:ext>
+            </a:extLst>
+          </p:cNvPr>
+          <p:cNvGraphicFramePr>
+            <a:graphicFrameLocks noGrp="1"/>
+          </p:cNvGraphicFramePr>
+          <p:nvPr>
+            <p:extLst>
+              <p:ext uri="{D42A27DB-BD31-4B8C-83A1-F6EECF244321}">
+                <p14:modId xmlns:p14="http://schemas.microsoft.com/office/powerpoint/2010/main" val="4281377058"/>
+              </p:ext>
+            </p:extLst>
+          </p:nvPr>
+        </p:nvGraphicFramePr>
+        <p:xfrm>
+          <a:off x="3057309" y="6016456"/>
+          <a:ext cx="3800691" cy="3130657"/>
+        </p:xfrm>
+        <a:graphic>
+          <a:graphicData uri="http://schemas.openxmlformats.org/drawingml/2006/table">
+            <a:tbl>
+              <a:tblPr>
+                <a:tableStyleId>{5C22544A-7EE6-4342-B048-85BDC9FD1C3A}</a:tableStyleId>
+              </a:tblPr>
+              <a:tblGrid>
+                <a:gridCol w="412294">
+                  <a:extLst>
+                    <a:ext uri="{9D8B030D-6E8A-4147-A177-3AD203B41FA5}">
+                      <a16:colId xmlns:a16="http://schemas.microsoft.com/office/drawing/2014/main" val="1491390411"/>
+                    </a:ext>
+                  </a:extLst>
+                </a:gridCol>
+                <a:gridCol w="412294">
+                  <a:extLst>
+                    <a:ext uri="{9D8B030D-6E8A-4147-A177-3AD203B41FA5}">
+                      <a16:colId xmlns:a16="http://schemas.microsoft.com/office/drawing/2014/main" val="555334535"/>
+                    </a:ext>
+                  </a:extLst>
+                </a:gridCol>
+                <a:gridCol w="412294">
+                  <a:extLst>
+                    <a:ext uri="{9D8B030D-6E8A-4147-A177-3AD203B41FA5}">
+                      <a16:colId xmlns:a16="http://schemas.microsoft.com/office/drawing/2014/main" val="1521589675"/>
+                    </a:ext>
+                  </a:extLst>
+                </a:gridCol>
+                <a:gridCol w="412294">
+                  <a:extLst>
+                    <a:ext uri="{9D8B030D-6E8A-4147-A177-3AD203B41FA5}">
+                      <a16:colId xmlns:a16="http://schemas.microsoft.com/office/drawing/2014/main" val="3990898561"/>
+                    </a:ext>
+                  </a:extLst>
+                </a:gridCol>
+                <a:gridCol w="442309">
+                  <a:extLst>
+                    <a:ext uri="{9D8B030D-6E8A-4147-A177-3AD203B41FA5}">
+                      <a16:colId xmlns:a16="http://schemas.microsoft.com/office/drawing/2014/main" val="496601739"/>
+                    </a:ext>
+                  </a:extLst>
+                </a:gridCol>
+                <a:gridCol w="442309">
+                  <a:extLst>
+                    <a:ext uri="{9D8B030D-6E8A-4147-A177-3AD203B41FA5}">
+                      <a16:colId xmlns:a16="http://schemas.microsoft.com/office/drawing/2014/main" val="18946303"/>
+                    </a:ext>
+                  </a:extLst>
+                </a:gridCol>
+                <a:gridCol w="442309">
+                  <a:extLst>
+                    <a:ext uri="{9D8B030D-6E8A-4147-A177-3AD203B41FA5}">
+                      <a16:colId xmlns:a16="http://schemas.microsoft.com/office/drawing/2014/main" val="2779005630"/>
+                    </a:ext>
+                  </a:extLst>
+                </a:gridCol>
+                <a:gridCol w="412294">
+                  <a:extLst>
+                    <a:ext uri="{9D8B030D-6E8A-4147-A177-3AD203B41FA5}">
+                      <a16:colId xmlns:a16="http://schemas.microsoft.com/office/drawing/2014/main" val="1308795460"/>
+                    </a:ext>
+                  </a:extLst>
+                </a:gridCol>
+                <a:gridCol w="412294">
+                  <a:extLst>
+                    <a:ext uri="{9D8B030D-6E8A-4147-A177-3AD203B41FA5}">
+                      <a16:colId xmlns:a16="http://schemas.microsoft.com/office/drawing/2014/main" val="3635678995"/>
+                    </a:ext>
+                  </a:extLst>
+                </a:gridCol>
+              </a:tblGrid>
+              <a:tr h="151290">
+                <a:tc>
+                  <a:txBody>
+                    <a:bodyPr/>
+                    <a:lstStyle/>
+                    <a:p>
+                      <a:pPr algn="l" fontAlgn="b"/>
+                      <a:endParaRPr lang="de-DE" sz="900" b="0" i="0" u="none" strike="noStrike">
+                        <a:solidFill>
+                          <a:srgbClr val="000000"/>
+                        </a:solidFill>
+                        <a:effectLst/>
+                        <a:latin typeface="Calibri" panose="020F0502020204030204" pitchFamily="34" charset="0"/>
+                      </a:endParaRPr>
+                    </a:p>
+                  </a:txBody>
+                  <a:tcPr marL="7394" marR="7394" marT="7394" marB="0" anchor="b"/>
+                </a:tc>
+                <a:tc>
+                  <a:txBody>
+                    <a:bodyPr/>
+                    <a:lstStyle/>
+                    <a:p>
+                      <a:pPr algn="l" fontAlgn="b"/>
+                      <a:endParaRPr lang="de-DE" sz="900" b="0" i="0" u="none" strike="noStrike">
+                        <a:solidFill>
+                          <a:srgbClr val="000000"/>
+                        </a:solidFill>
+                        <a:effectLst/>
+                        <a:latin typeface="Calibri" panose="020F0502020204030204" pitchFamily="34" charset="0"/>
+                      </a:endParaRPr>
+                    </a:p>
+                  </a:txBody>
+                  <a:tcPr marL="7394" marR="7394" marT="7394" marB="0" anchor="b"/>
+                </a:tc>
+                <a:tc>
+                  <a:txBody>
+                    <a:bodyPr/>
+                    <a:lstStyle/>
+                    <a:p>
+                      <a:pPr algn="l" fontAlgn="b"/>
+                      <a:endParaRPr lang="de-DE" sz="900" b="0" i="0" u="none" strike="noStrike">
+                        <a:solidFill>
+                          <a:srgbClr val="000000"/>
+                        </a:solidFill>
+                        <a:effectLst/>
+                        <a:latin typeface="Calibri" panose="020F0502020204030204" pitchFamily="34" charset="0"/>
+                      </a:endParaRPr>
+                    </a:p>
+                  </a:txBody>
+                  <a:tcPr marL="7394" marR="7394" marT="7394" marB="0" anchor="b"/>
+                </a:tc>
+                <a:tc>
+                  <a:txBody>
+                    <a:bodyPr/>
+                    <a:lstStyle/>
+                    <a:p>
+                      <a:pPr algn="l" fontAlgn="b"/>
+                      <a:endParaRPr lang="de-DE" sz="900" b="0" i="0" u="none" strike="noStrike">
+                        <a:solidFill>
+                          <a:srgbClr val="000000"/>
+                        </a:solidFill>
+                        <a:effectLst/>
+                        <a:latin typeface="Calibri" panose="020F0502020204030204" pitchFamily="34" charset="0"/>
+                      </a:endParaRPr>
+                    </a:p>
+                  </a:txBody>
+                  <a:tcPr marL="7394" marR="7394" marT="7394" marB="0" anchor="b"/>
+                </a:tc>
+                <a:tc>
+                  <a:txBody>
+                    <a:bodyPr/>
+                    <a:lstStyle/>
+                    <a:p>
+                      <a:pPr algn="r" fontAlgn="b"/>
+                      <a:r>
+                        <a:rPr lang="de-DE" sz="900" u="none" strike="noStrike">
+                          <a:effectLst/>
+                        </a:rPr>
+                        <a:t>96</a:t>
+                      </a:r>
+                      <a:endParaRPr lang="de-DE" sz="900" b="0" i="0" u="none" strike="noStrike">
+                        <a:solidFill>
+                          <a:srgbClr val="000000"/>
+                        </a:solidFill>
+                        <a:effectLst/>
+                        <a:latin typeface="Calibri" panose="020F0502020204030204" pitchFamily="34" charset="0"/>
+                      </a:endParaRPr>
+                    </a:p>
+                  </a:txBody>
+                  <a:tcPr marL="7394" marR="7394" marT="7394" marB="0" anchor="b"/>
+                </a:tc>
+                <a:tc>
+                  <a:txBody>
+                    <a:bodyPr/>
+                    <a:lstStyle/>
+                    <a:p>
+                      <a:pPr algn="l" fontAlgn="b"/>
+                      <a:endParaRPr lang="de-DE" sz="900" b="0" i="0" u="none" strike="noStrike">
+                        <a:solidFill>
+                          <a:srgbClr val="000000"/>
+                        </a:solidFill>
+                        <a:effectLst/>
+                        <a:latin typeface="Calibri" panose="020F0502020204030204" pitchFamily="34" charset="0"/>
+                      </a:endParaRPr>
+                    </a:p>
+                  </a:txBody>
+                  <a:tcPr marL="7394" marR="7394" marT="7394" marB="0" anchor="b"/>
+                </a:tc>
+                <a:tc>
+                  <a:txBody>
+                    <a:bodyPr/>
+                    <a:lstStyle/>
+                    <a:p>
+                      <a:pPr algn="l" fontAlgn="b"/>
+                      <a:endParaRPr lang="de-DE" sz="900" b="0" i="0" u="none" strike="noStrike">
+                        <a:solidFill>
+                          <a:srgbClr val="000000"/>
+                        </a:solidFill>
+                        <a:effectLst/>
+                        <a:latin typeface="Calibri" panose="020F0502020204030204" pitchFamily="34" charset="0"/>
+                      </a:endParaRPr>
+                    </a:p>
+                  </a:txBody>
+                  <a:tcPr marL="7394" marR="7394" marT="7394" marB="0" anchor="b"/>
+                </a:tc>
+                <a:tc>
+                  <a:txBody>
+                    <a:bodyPr/>
+                    <a:lstStyle/>
+                    <a:p>
+                      <a:pPr algn="r" fontAlgn="b"/>
+                      <a:r>
+                        <a:rPr lang="de-DE" sz="900" u="none" strike="noStrike">
+                          <a:effectLst/>
+                        </a:rPr>
+                        <a:t>131</a:t>
+                      </a:r>
+                      <a:endParaRPr lang="de-DE" sz="900" b="0" i="0" u="none" strike="noStrike">
+                        <a:solidFill>
+                          <a:srgbClr val="000000"/>
+                        </a:solidFill>
+                        <a:effectLst/>
+                        <a:latin typeface="Calibri" panose="020F0502020204030204" pitchFamily="34" charset="0"/>
+                      </a:endParaRPr>
+                    </a:p>
+                  </a:txBody>
+                  <a:tcPr marL="7394" marR="7394" marT="7394" marB="0" anchor="b"/>
+                </a:tc>
+                <a:tc>
+                  <a:txBody>
+                    <a:bodyPr/>
+                    <a:lstStyle/>
+                    <a:p>
+                      <a:pPr algn="l" fontAlgn="b"/>
+                      <a:endParaRPr lang="de-DE" sz="900" b="0" i="0" u="none" strike="noStrike">
+                        <a:solidFill>
+                          <a:srgbClr val="000000"/>
+                        </a:solidFill>
+                        <a:effectLst/>
+                        <a:latin typeface="Calibri" panose="020F0502020204030204" pitchFamily="34" charset="0"/>
+                      </a:endParaRPr>
+                    </a:p>
+                  </a:txBody>
+                  <a:tcPr marL="7394" marR="7394" marT="7394" marB="0" anchor="b"/>
+                </a:tc>
+                <a:extLst>
+                  <a:ext uri="{0D108BD9-81ED-4DB2-BD59-A6C34878D82A}">
+                    <a16:rowId xmlns:a16="http://schemas.microsoft.com/office/drawing/2014/main" val="3218730936"/>
+                  </a:ext>
+                </a:extLst>
+              </a:tr>
+              <a:tr h="151290">
+                <a:tc>
+                  <a:txBody>
+                    <a:bodyPr/>
+                    <a:lstStyle/>
+                    <a:p>
+                      <a:pPr algn="l" fontAlgn="b"/>
+                      <a:endParaRPr lang="de-DE" sz="900" b="0" i="0" u="none" strike="noStrike">
+                        <a:solidFill>
+                          <a:srgbClr val="000000"/>
+                        </a:solidFill>
+                        <a:effectLst/>
+                        <a:latin typeface="Calibri" panose="020F0502020204030204" pitchFamily="34" charset="0"/>
+                      </a:endParaRPr>
+                    </a:p>
+                  </a:txBody>
+                  <a:tcPr marL="7394" marR="7394" marT="7394" marB="0" anchor="b"/>
+                </a:tc>
+                <a:tc>
+                  <a:txBody>
+                    <a:bodyPr/>
+                    <a:lstStyle/>
+                    <a:p>
+                      <a:pPr algn="l" fontAlgn="b"/>
+                      <a:endParaRPr lang="de-DE" sz="900" b="0" i="0" u="none" strike="noStrike">
+                        <a:solidFill>
+                          <a:srgbClr val="000000"/>
+                        </a:solidFill>
+                        <a:effectLst/>
+                        <a:latin typeface="Calibri" panose="020F0502020204030204" pitchFamily="34" charset="0"/>
+                      </a:endParaRPr>
+                    </a:p>
+                  </a:txBody>
+                  <a:tcPr marL="7394" marR="7394" marT="7394" marB="0" anchor="b"/>
+                </a:tc>
+                <a:tc>
+                  <a:txBody>
+                    <a:bodyPr/>
+                    <a:lstStyle/>
+                    <a:p>
+                      <a:pPr algn="l" fontAlgn="b"/>
+                      <a:endParaRPr lang="de-DE" sz="900" b="0" i="0" u="none" strike="noStrike">
+                        <a:solidFill>
+                          <a:srgbClr val="000000"/>
+                        </a:solidFill>
+                        <a:effectLst/>
+                        <a:latin typeface="Calibri" panose="020F0502020204030204" pitchFamily="34" charset="0"/>
+                      </a:endParaRPr>
+                    </a:p>
+                  </a:txBody>
+                  <a:tcPr marL="7394" marR="7394" marT="7394" marB="0" anchor="b"/>
+                </a:tc>
+                <a:tc>
+                  <a:txBody>
+                    <a:bodyPr/>
+                    <a:lstStyle/>
+                    <a:p>
+                      <a:pPr algn="l" fontAlgn="b"/>
+                      <a:endParaRPr lang="de-DE" sz="900" b="0" i="0" u="none" strike="noStrike">
+                        <a:solidFill>
+                          <a:srgbClr val="000000"/>
+                        </a:solidFill>
+                        <a:effectLst/>
+                        <a:latin typeface="Calibri" panose="020F0502020204030204" pitchFamily="34" charset="0"/>
+                      </a:endParaRPr>
+                    </a:p>
+                  </a:txBody>
+                  <a:tcPr marL="7394" marR="7394" marT="7394" marB="0" anchor="b"/>
+                </a:tc>
+                <a:tc>
+                  <a:txBody>
+                    <a:bodyPr/>
+                    <a:lstStyle/>
+                    <a:p>
+                      <a:pPr algn="r" fontAlgn="b"/>
+                      <a:r>
+                        <a:rPr lang="de-DE" sz="900" u="none" strike="noStrike">
+                          <a:effectLst/>
+                        </a:rPr>
+                        <a:t>0,5</a:t>
+                      </a:r>
+                      <a:endParaRPr lang="de-DE" sz="900" b="0" i="0" u="none" strike="noStrike">
+                        <a:solidFill>
+                          <a:srgbClr val="000000"/>
+                        </a:solidFill>
+                        <a:effectLst/>
+                        <a:latin typeface="Calibri" panose="020F0502020204030204" pitchFamily="34" charset="0"/>
+                      </a:endParaRPr>
+                    </a:p>
+                  </a:txBody>
+                  <a:tcPr marL="7394" marR="7394" marT="7394" marB="0" anchor="b"/>
+                </a:tc>
+                <a:tc>
+                  <a:txBody>
+                    <a:bodyPr/>
+                    <a:lstStyle/>
+                    <a:p>
+                      <a:pPr algn="l" fontAlgn="b"/>
+                      <a:endParaRPr lang="de-DE" sz="900" b="0" i="0" u="none" strike="noStrike">
+                        <a:solidFill>
+                          <a:srgbClr val="000000"/>
+                        </a:solidFill>
+                        <a:effectLst/>
+                        <a:latin typeface="Calibri" panose="020F0502020204030204" pitchFamily="34" charset="0"/>
+                      </a:endParaRPr>
+                    </a:p>
+                  </a:txBody>
+                  <a:tcPr marL="7394" marR="7394" marT="7394" marB="0" anchor="b"/>
+                </a:tc>
+                <a:tc>
+                  <a:txBody>
+                    <a:bodyPr/>
+                    <a:lstStyle/>
+                    <a:p>
+                      <a:pPr algn="l" fontAlgn="b"/>
+                      <a:endParaRPr lang="de-DE" sz="900" b="0" i="0" u="none" strike="noStrike">
+                        <a:solidFill>
+                          <a:srgbClr val="000000"/>
+                        </a:solidFill>
+                        <a:effectLst/>
+                        <a:latin typeface="Calibri" panose="020F0502020204030204" pitchFamily="34" charset="0"/>
+                      </a:endParaRPr>
+                    </a:p>
+                  </a:txBody>
+                  <a:tcPr marL="7394" marR="7394" marT="7394" marB="0" anchor="b"/>
+                </a:tc>
+                <a:tc>
+                  <a:txBody>
+                    <a:bodyPr/>
+                    <a:lstStyle/>
+                    <a:p>
+                      <a:pPr algn="r" fontAlgn="b"/>
+                      <a:r>
+                        <a:rPr lang="de-DE" sz="900" u="none" strike="noStrike">
+                          <a:effectLst/>
+                        </a:rPr>
+                        <a:t>0,7</a:t>
+                      </a:r>
+                      <a:endParaRPr lang="de-DE" sz="900" b="0" i="0" u="none" strike="noStrike">
+                        <a:solidFill>
+                          <a:srgbClr val="000000"/>
+                        </a:solidFill>
+                        <a:effectLst/>
+                        <a:latin typeface="Calibri" panose="020F0502020204030204" pitchFamily="34" charset="0"/>
+                      </a:endParaRPr>
+                    </a:p>
+                  </a:txBody>
+                  <a:tcPr marL="7394" marR="7394" marT="7394" marB="0" anchor="b"/>
+                </a:tc>
+                <a:tc>
+                  <a:txBody>
+                    <a:bodyPr/>
+                    <a:lstStyle/>
+                    <a:p>
+                      <a:pPr algn="l" fontAlgn="b"/>
+                      <a:endParaRPr lang="de-DE" sz="900" b="0" i="0" u="none" strike="noStrike">
+                        <a:solidFill>
+                          <a:srgbClr val="000000"/>
+                        </a:solidFill>
+                        <a:effectLst/>
+                        <a:latin typeface="Calibri" panose="020F0502020204030204" pitchFamily="34" charset="0"/>
+                      </a:endParaRPr>
+                    </a:p>
+                  </a:txBody>
+                  <a:tcPr marL="7394" marR="7394" marT="7394" marB="0" anchor="b"/>
+                </a:tc>
+                <a:extLst>
+                  <a:ext uri="{0D108BD9-81ED-4DB2-BD59-A6C34878D82A}">
+                    <a16:rowId xmlns:a16="http://schemas.microsoft.com/office/drawing/2014/main" val="3541357995"/>
+                  </a:ext>
+                </a:extLst>
+              </a:tr>
+              <a:tr h="151290">
+                <a:tc>
+                  <a:txBody>
+                    <a:bodyPr/>
+                    <a:lstStyle/>
+                    <a:p>
+                      <a:pPr algn="l" fontAlgn="b"/>
+                      <a:endParaRPr lang="de-DE" sz="900" b="0" i="0" u="none" strike="noStrike">
+                        <a:solidFill>
+                          <a:srgbClr val="000000"/>
+                        </a:solidFill>
+                        <a:effectLst/>
+                        <a:latin typeface="Calibri" panose="020F0502020204030204" pitchFamily="34" charset="0"/>
+                      </a:endParaRPr>
+                    </a:p>
+                  </a:txBody>
+                  <a:tcPr marL="7394" marR="7394" marT="7394" marB="0" anchor="b"/>
+                </a:tc>
+                <a:tc>
+                  <a:txBody>
+                    <a:bodyPr/>
+                    <a:lstStyle/>
+                    <a:p>
+                      <a:pPr algn="l" fontAlgn="b"/>
+                      <a:endParaRPr lang="de-DE" sz="900" b="0" i="0" u="none" strike="noStrike">
+                        <a:solidFill>
+                          <a:srgbClr val="000000"/>
+                        </a:solidFill>
+                        <a:effectLst/>
+                        <a:latin typeface="Calibri" panose="020F0502020204030204" pitchFamily="34" charset="0"/>
+                      </a:endParaRPr>
+                    </a:p>
+                  </a:txBody>
+                  <a:tcPr marL="7394" marR="7394" marT="7394" marB="0" anchor="b"/>
+                </a:tc>
+                <a:tc>
+                  <a:txBody>
+                    <a:bodyPr/>
+                    <a:lstStyle/>
+                    <a:p>
+                      <a:pPr algn="l" fontAlgn="b"/>
+                      <a:endParaRPr lang="de-DE" sz="900" b="0" i="0" u="none" strike="noStrike">
+                        <a:solidFill>
+                          <a:srgbClr val="000000"/>
+                        </a:solidFill>
+                        <a:effectLst/>
+                        <a:latin typeface="Calibri" panose="020F0502020204030204" pitchFamily="34" charset="0"/>
+                      </a:endParaRPr>
+                    </a:p>
+                  </a:txBody>
+                  <a:tcPr marL="7394" marR="7394" marT="7394" marB="0" anchor="b"/>
+                </a:tc>
+                <a:tc>
+                  <a:txBody>
+                    <a:bodyPr/>
+                    <a:lstStyle/>
+                    <a:p>
+                      <a:pPr algn="l" fontAlgn="b"/>
+                      <a:endParaRPr lang="de-DE" sz="900" b="0" i="0" u="none" strike="noStrike">
+                        <a:solidFill>
+                          <a:srgbClr val="000000"/>
+                        </a:solidFill>
+                        <a:effectLst/>
+                        <a:latin typeface="Calibri" panose="020F0502020204030204" pitchFamily="34" charset="0"/>
+                      </a:endParaRPr>
+                    </a:p>
+                  </a:txBody>
+                  <a:tcPr marL="7394" marR="7394" marT="7394" marB="0" anchor="b"/>
+                </a:tc>
+                <a:tc>
+                  <a:txBody>
+                    <a:bodyPr/>
+                    <a:lstStyle/>
+                    <a:p>
+                      <a:pPr algn="l" fontAlgn="b"/>
+                      <a:endParaRPr lang="de-DE" sz="900" b="0" i="0" u="none" strike="noStrike">
+                        <a:solidFill>
+                          <a:srgbClr val="000000"/>
+                        </a:solidFill>
+                        <a:effectLst/>
+                        <a:latin typeface="Calibri" panose="020F0502020204030204" pitchFamily="34" charset="0"/>
+                      </a:endParaRPr>
+                    </a:p>
+                  </a:txBody>
+                  <a:tcPr marL="7394" marR="7394" marT="7394" marB="0" anchor="b"/>
+                </a:tc>
+                <a:tc>
+                  <a:txBody>
+                    <a:bodyPr/>
+                    <a:lstStyle/>
+                    <a:p>
+                      <a:pPr algn="l" fontAlgn="b"/>
+                      <a:endParaRPr lang="de-DE" sz="900" b="0" i="0" u="none" strike="noStrike">
+                        <a:solidFill>
+                          <a:srgbClr val="000000"/>
+                        </a:solidFill>
+                        <a:effectLst/>
+                        <a:latin typeface="Calibri" panose="020F0502020204030204" pitchFamily="34" charset="0"/>
+                      </a:endParaRPr>
+                    </a:p>
+                  </a:txBody>
+                  <a:tcPr marL="7394" marR="7394" marT="7394" marB="0" anchor="b"/>
+                </a:tc>
+                <a:tc>
+                  <a:txBody>
+                    <a:bodyPr/>
+                    <a:lstStyle/>
+                    <a:p>
+                      <a:pPr algn="l" fontAlgn="b"/>
+                      <a:endParaRPr lang="de-DE" sz="900" b="0" i="0" u="none" strike="noStrike">
+                        <a:solidFill>
+                          <a:srgbClr val="000000"/>
+                        </a:solidFill>
+                        <a:effectLst/>
+                        <a:latin typeface="Calibri" panose="020F0502020204030204" pitchFamily="34" charset="0"/>
+                      </a:endParaRPr>
+                    </a:p>
+                  </a:txBody>
+                  <a:tcPr marL="7394" marR="7394" marT="7394" marB="0" anchor="b"/>
+                </a:tc>
+                <a:tc>
+                  <a:txBody>
+                    <a:bodyPr/>
+                    <a:lstStyle/>
+                    <a:p>
+                      <a:pPr algn="l" fontAlgn="b"/>
+                      <a:endParaRPr lang="de-DE" sz="900" b="0" i="0" u="none" strike="noStrike">
+                        <a:solidFill>
+                          <a:srgbClr val="000000"/>
+                        </a:solidFill>
+                        <a:effectLst/>
+                        <a:latin typeface="Calibri" panose="020F0502020204030204" pitchFamily="34" charset="0"/>
+                      </a:endParaRPr>
+                    </a:p>
+                  </a:txBody>
+                  <a:tcPr marL="7394" marR="7394" marT="7394" marB="0" anchor="b"/>
+                </a:tc>
+                <a:tc>
+                  <a:txBody>
+                    <a:bodyPr/>
+                    <a:lstStyle/>
+                    <a:p>
+                      <a:pPr algn="l" fontAlgn="b"/>
+                      <a:endParaRPr lang="de-DE" sz="900" b="0" i="0" u="none" strike="noStrike">
+                        <a:solidFill>
+                          <a:srgbClr val="000000"/>
+                        </a:solidFill>
+                        <a:effectLst/>
+                        <a:latin typeface="Calibri" panose="020F0502020204030204" pitchFamily="34" charset="0"/>
+                      </a:endParaRPr>
+                    </a:p>
+                  </a:txBody>
+                  <a:tcPr marL="7394" marR="7394" marT="7394" marB="0" anchor="b"/>
+                </a:tc>
+                <a:extLst>
+                  <a:ext uri="{0D108BD9-81ED-4DB2-BD59-A6C34878D82A}">
+                    <a16:rowId xmlns:a16="http://schemas.microsoft.com/office/drawing/2014/main" val="3444372715"/>
+                  </a:ext>
+                </a:extLst>
+              </a:tr>
+              <a:tr h="151290">
+                <a:tc gridSpan="2">
+                  <a:txBody>
+                    <a:bodyPr/>
+                    <a:lstStyle/>
+                    <a:p>
+                      <a:pPr algn="l" fontAlgn="b"/>
+                      <a:r>
+                        <a:rPr lang="de-DE" sz="900" u="none" strike="noStrike">
+                          <a:effectLst/>
+                        </a:rPr>
+                        <a:t>Balkenbreite</a:t>
+                      </a:r>
+                      <a:endParaRPr lang="de-DE" sz="900" b="0" i="0" u="none" strike="noStrike">
+                        <a:solidFill>
+                          <a:srgbClr val="000000"/>
+                        </a:solidFill>
+                        <a:effectLst/>
+                        <a:latin typeface="Calibri" panose="020F0502020204030204" pitchFamily="34" charset="0"/>
+                      </a:endParaRPr>
+                    </a:p>
+                  </a:txBody>
+                  <a:tcPr marL="7394" marR="7394" marT="7394" marB="0" anchor="b"/>
+                </a:tc>
+                <a:tc hMerge="1">
+                  <a:txBody>
+                    <a:bodyPr/>
+                    <a:lstStyle/>
+                    <a:p>
+                      <a:endParaRPr lang="de-DE"/>
+                    </a:p>
+                  </a:txBody>
+                  <a:tcPr/>
+                </a:tc>
+                <a:tc>
+                  <a:txBody>
+                    <a:bodyPr/>
+                    <a:lstStyle/>
+                    <a:p>
+                      <a:pPr algn="r" fontAlgn="b"/>
+                      <a:r>
+                        <a:rPr lang="de-DE" sz="900" u="none" strike="noStrike">
+                          <a:effectLst/>
+                        </a:rPr>
+                        <a:t>10</a:t>
+                      </a:r>
+                      <a:endParaRPr lang="de-DE" sz="900" b="0" i="0" u="none" strike="noStrike">
+                        <a:solidFill>
+                          <a:srgbClr val="000000"/>
+                        </a:solidFill>
+                        <a:effectLst/>
+                        <a:latin typeface="Calibri" panose="020F0502020204030204" pitchFamily="34" charset="0"/>
+                      </a:endParaRPr>
+                    </a:p>
+                  </a:txBody>
+                  <a:tcPr marL="7394" marR="7394" marT="7394" marB="0" anchor="b"/>
+                </a:tc>
+                <a:tc>
+                  <a:txBody>
+                    <a:bodyPr/>
+                    <a:lstStyle/>
+                    <a:p>
+                      <a:pPr algn="l" fontAlgn="b"/>
+                      <a:endParaRPr lang="de-DE" sz="900" b="0" i="0" u="none" strike="noStrike">
+                        <a:solidFill>
+                          <a:srgbClr val="000000"/>
+                        </a:solidFill>
+                        <a:effectLst/>
+                        <a:latin typeface="Calibri" panose="020F0502020204030204" pitchFamily="34" charset="0"/>
+                      </a:endParaRPr>
+                    </a:p>
+                  </a:txBody>
+                  <a:tcPr marL="7394" marR="7394" marT="7394" marB="0" anchor="b"/>
+                </a:tc>
+                <a:tc>
+                  <a:txBody>
+                    <a:bodyPr/>
+                    <a:lstStyle/>
+                    <a:p>
+                      <a:pPr algn="r" fontAlgn="b"/>
+                      <a:r>
+                        <a:rPr lang="de-DE" sz="900" u="none" strike="noStrike">
+                          <a:effectLst/>
+                        </a:rPr>
+                        <a:t>5,3</a:t>
+                      </a:r>
+                      <a:endParaRPr lang="de-DE" sz="900" b="0" i="0" u="none" strike="noStrike">
+                        <a:solidFill>
+                          <a:srgbClr val="000000"/>
+                        </a:solidFill>
+                        <a:effectLst/>
+                        <a:latin typeface="Calibri" panose="020F0502020204030204" pitchFamily="34" charset="0"/>
+                      </a:endParaRPr>
+                    </a:p>
+                  </a:txBody>
+                  <a:tcPr marL="7394" marR="7394" marT="7394" marB="0" anchor="b"/>
+                </a:tc>
+                <a:tc>
+                  <a:txBody>
+                    <a:bodyPr/>
+                    <a:lstStyle/>
+                    <a:p>
+                      <a:pPr algn="r" fontAlgn="b"/>
+                      <a:r>
+                        <a:rPr lang="de-DE" sz="900" u="none" strike="noStrike">
+                          <a:effectLst/>
+                        </a:rPr>
+                        <a:t>5,0</a:t>
+                      </a:r>
+                      <a:endParaRPr lang="de-DE" sz="900" b="0" i="0" u="none" strike="noStrike">
+                        <a:solidFill>
+                          <a:srgbClr val="000000"/>
+                        </a:solidFill>
+                        <a:effectLst/>
+                        <a:latin typeface="Calibri" panose="020F0502020204030204" pitchFamily="34" charset="0"/>
+                      </a:endParaRPr>
+                    </a:p>
+                  </a:txBody>
+                  <a:tcPr marL="7394" marR="7394" marT="7394" marB="0" anchor="b"/>
+                </a:tc>
+                <a:tc>
+                  <a:txBody>
+                    <a:bodyPr/>
+                    <a:lstStyle/>
+                    <a:p>
+                      <a:pPr algn="l" fontAlgn="b"/>
+                      <a:endParaRPr lang="de-DE" sz="900" b="0" i="0" u="none" strike="noStrike">
+                        <a:solidFill>
+                          <a:srgbClr val="000000"/>
+                        </a:solidFill>
+                        <a:effectLst/>
+                        <a:latin typeface="Calibri" panose="020F0502020204030204" pitchFamily="34" charset="0"/>
+                      </a:endParaRPr>
+                    </a:p>
+                  </a:txBody>
+                  <a:tcPr marL="7394" marR="7394" marT="7394" marB="0" anchor="b"/>
+                </a:tc>
+                <a:tc>
+                  <a:txBody>
+                    <a:bodyPr/>
+                    <a:lstStyle/>
+                    <a:p>
+                      <a:pPr algn="r" fontAlgn="b"/>
+                      <a:r>
+                        <a:rPr lang="de-DE" sz="900" u="none" strike="noStrike">
+                          <a:effectLst/>
+                        </a:rPr>
+                        <a:t>7,3</a:t>
+                      </a:r>
+                      <a:endParaRPr lang="de-DE" sz="900" b="0" i="0" u="none" strike="noStrike">
+                        <a:solidFill>
+                          <a:srgbClr val="000000"/>
+                        </a:solidFill>
+                        <a:effectLst/>
+                        <a:latin typeface="Calibri" panose="020F0502020204030204" pitchFamily="34" charset="0"/>
+                      </a:endParaRPr>
+                    </a:p>
+                  </a:txBody>
+                  <a:tcPr marL="7394" marR="7394" marT="7394" marB="0" anchor="b"/>
+                </a:tc>
+                <a:tc>
+                  <a:txBody>
+                    <a:bodyPr/>
+                    <a:lstStyle/>
+                    <a:p>
+                      <a:pPr algn="r" fontAlgn="b"/>
+                      <a:r>
+                        <a:rPr lang="de-DE" sz="900" u="none" strike="noStrike">
+                          <a:effectLst/>
+                        </a:rPr>
+                        <a:t>7</a:t>
+                      </a:r>
+                      <a:endParaRPr lang="de-DE" sz="900" b="0" i="0" u="none" strike="noStrike">
+                        <a:solidFill>
+                          <a:srgbClr val="000000"/>
+                        </a:solidFill>
+                        <a:effectLst/>
+                        <a:latin typeface="Calibri" panose="020F0502020204030204" pitchFamily="34" charset="0"/>
+                      </a:endParaRPr>
+                    </a:p>
+                  </a:txBody>
+                  <a:tcPr marL="7394" marR="7394" marT="7394" marB="0" anchor="b"/>
+                </a:tc>
+                <a:extLst>
+                  <a:ext uri="{0D108BD9-81ED-4DB2-BD59-A6C34878D82A}">
+                    <a16:rowId xmlns:a16="http://schemas.microsoft.com/office/drawing/2014/main" val="4181979626"/>
+                  </a:ext>
+                </a:extLst>
+              </a:tr>
+              <a:tr h="438393">
+                <a:tc gridSpan="2">
+                  <a:txBody>
+                    <a:bodyPr/>
+                    <a:lstStyle/>
+                    <a:p>
+                      <a:pPr algn="l" fontAlgn="b"/>
+                      <a:r>
+                        <a:rPr lang="de-DE" sz="900" u="none" strike="noStrike">
+                          <a:effectLst/>
+                        </a:rPr>
+                        <a:t>Lücke zwischen Balken</a:t>
+                      </a:r>
+                      <a:endParaRPr lang="de-DE" sz="900" b="0" i="0" u="none" strike="noStrike">
+                        <a:solidFill>
+                          <a:srgbClr val="000000"/>
+                        </a:solidFill>
+                        <a:effectLst/>
+                        <a:latin typeface="Calibri" panose="020F0502020204030204" pitchFamily="34" charset="0"/>
+                      </a:endParaRPr>
+                    </a:p>
+                  </a:txBody>
+                  <a:tcPr marL="7394" marR="7394" marT="7394" marB="0" anchor="b"/>
+                </a:tc>
+                <a:tc hMerge="1">
+                  <a:txBody>
+                    <a:bodyPr/>
+                    <a:lstStyle/>
+                    <a:p>
+                      <a:endParaRPr lang="de-DE"/>
+                    </a:p>
+                  </a:txBody>
+                  <a:tcPr/>
+                </a:tc>
+                <a:tc>
+                  <a:txBody>
+                    <a:bodyPr/>
+                    <a:lstStyle/>
+                    <a:p>
+                      <a:pPr algn="r" fontAlgn="b"/>
+                      <a:r>
+                        <a:rPr lang="de-DE" sz="900" u="none" strike="noStrike">
+                          <a:effectLst/>
+                        </a:rPr>
+                        <a:t>1</a:t>
+                      </a:r>
+                      <a:endParaRPr lang="de-DE" sz="900" b="0" i="0" u="none" strike="noStrike">
+                        <a:solidFill>
+                          <a:srgbClr val="000000"/>
+                        </a:solidFill>
+                        <a:effectLst/>
+                        <a:latin typeface="Calibri" panose="020F0502020204030204" pitchFamily="34" charset="0"/>
+                      </a:endParaRPr>
+                    </a:p>
+                  </a:txBody>
+                  <a:tcPr marL="7394" marR="7394" marT="7394" marB="0" anchor="b"/>
+                </a:tc>
+                <a:tc>
+                  <a:txBody>
+                    <a:bodyPr/>
+                    <a:lstStyle/>
+                    <a:p>
+                      <a:pPr algn="l" fontAlgn="b"/>
+                      <a:endParaRPr lang="de-DE" sz="900" b="0" i="0" u="none" strike="noStrike">
+                        <a:solidFill>
+                          <a:srgbClr val="000000"/>
+                        </a:solidFill>
+                        <a:effectLst/>
+                        <a:latin typeface="Calibri" panose="020F0502020204030204" pitchFamily="34" charset="0"/>
+                      </a:endParaRPr>
+                    </a:p>
+                  </a:txBody>
+                  <a:tcPr marL="7394" marR="7394" marT="7394" marB="0" anchor="b"/>
+                </a:tc>
+                <a:tc>
+                  <a:txBody>
+                    <a:bodyPr/>
+                    <a:lstStyle/>
+                    <a:p>
+                      <a:pPr algn="r" fontAlgn="b"/>
+                      <a:r>
+                        <a:rPr lang="de-DE" sz="900" u="none" strike="noStrike">
+                          <a:effectLst/>
+                        </a:rPr>
+                        <a:t>0,5</a:t>
+                      </a:r>
+                      <a:endParaRPr lang="de-DE" sz="900" b="0" i="0" u="none" strike="noStrike">
+                        <a:solidFill>
+                          <a:srgbClr val="000000"/>
+                        </a:solidFill>
+                        <a:effectLst/>
+                        <a:latin typeface="Calibri" panose="020F0502020204030204" pitchFamily="34" charset="0"/>
+                      </a:endParaRPr>
+                    </a:p>
+                  </a:txBody>
+                  <a:tcPr marL="7394" marR="7394" marT="7394" marB="0" anchor="b"/>
+                </a:tc>
+                <a:tc>
+                  <a:txBody>
+                    <a:bodyPr/>
+                    <a:lstStyle/>
+                    <a:p>
+                      <a:pPr algn="r" fontAlgn="b"/>
+                      <a:r>
+                        <a:rPr lang="de-DE" sz="900" u="none" strike="noStrike">
+                          <a:effectLst/>
+                        </a:rPr>
+                        <a:t>1,0</a:t>
+                      </a:r>
+                      <a:endParaRPr lang="de-DE" sz="900" b="0" i="0" u="none" strike="noStrike">
+                        <a:solidFill>
+                          <a:srgbClr val="000000"/>
+                        </a:solidFill>
+                        <a:effectLst/>
+                        <a:latin typeface="Calibri" panose="020F0502020204030204" pitchFamily="34" charset="0"/>
+                      </a:endParaRPr>
+                    </a:p>
+                  </a:txBody>
+                  <a:tcPr marL="7394" marR="7394" marT="7394" marB="0" anchor="b"/>
+                </a:tc>
+                <a:tc>
+                  <a:txBody>
+                    <a:bodyPr/>
+                    <a:lstStyle/>
+                    <a:p>
+                      <a:pPr algn="l" fontAlgn="b"/>
+                      <a:endParaRPr lang="de-DE" sz="900" b="0" i="0" u="none" strike="noStrike">
+                        <a:solidFill>
+                          <a:srgbClr val="000000"/>
+                        </a:solidFill>
+                        <a:effectLst/>
+                        <a:latin typeface="Calibri" panose="020F0502020204030204" pitchFamily="34" charset="0"/>
+                      </a:endParaRPr>
+                    </a:p>
+                  </a:txBody>
+                  <a:tcPr marL="7394" marR="7394" marT="7394" marB="0" anchor="b"/>
+                </a:tc>
+                <a:tc>
+                  <a:txBody>
+                    <a:bodyPr/>
+                    <a:lstStyle/>
+                    <a:p>
+                      <a:pPr algn="r" fontAlgn="b"/>
+                      <a:r>
+                        <a:rPr lang="de-DE" sz="900" u="none" strike="noStrike">
+                          <a:effectLst/>
+                        </a:rPr>
+                        <a:t>0,7</a:t>
+                      </a:r>
+                      <a:endParaRPr lang="de-DE" sz="900" b="0" i="0" u="none" strike="noStrike">
+                        <a:solidFill>
+                          <a:srgbClr val="000000"/>
+                        </a:solidFill>
+                        <a:effectLst/>
+                        <a:latin typeface="Calibri" panose="020F0502020204030204" pitchFamily="34" charset="0"/>
+                      </a:endParaRPr>
+                    </a:p>
+                  </a:txBody>
+                  <a:tcPr marL="7394" marR="7394" marT="7394" marB="0" anchor="b"/>
+                </a:tc>
+                <a:tc>
+                  <a:txBody>
+                    <a:bodyPr/>
+                    <a:lstStyle/>
+                    <a:p>
+                      <a:pPr algn="r" fontAlgn="b"/>
+                      <a:r>
+                        <a:rPr lang="de-DE" sz="900" u="none" strike="noStrike">
+                          <a:effectLst/>
+                        </a:rPr>
+                        <a:t>1</a:t>
+                      </a:r>
+                      <a:endParaRPr lang="de-DE" sz="900" b="0" i="0" u="none" strike="noStrike">
+                        <a:solidFill>
+                          <a:srgbClr val="000000"/>
+                        </a:solidFill>
+                        <a:effectLst/>
+                        <a:latin typeface="Calibri" panose="020F0502020204030204" pitchFamily="34" charset="0"/>
+                      </a:endParaRPr>
+                    </a:p>
+                  </a:txBody>
+                  <a:tcPr marL="7394" marR="7394" marT="7394" marB="0" anchor="b"/>
+                </a:tc>
+                <a:extLst>
+                  <a:ext uri="{0D108BD9-81ED-4DB2-BD59-A6C34878D82A}">
+                    <a16:rowId xmlns:a16="http://schemas.microsoft.com/office/drawing/2014/main" val="3339843829"/>
+                  </a:ext>
+                </a:extLst>
+              </a:tr>
+              <a:tr h="151290">
+                <a:tc gridSpan="2">
+                  <a:txBody>
+                    <a:bodyPr/>
+                    <a:lstStyle/>
+                    <a:p>
+                      <a:pPr algn="l" fontAlgn="b"/>
+                      <a:r>
+                        <a:rPr lang="de-DE" sz="900" u="none" strike="noStrike">
+                          <a:effectLst/>
+                        </a:rPr>
+                        <a:t>Anzahl Balken</a:t>
+                      </a:r>
+                      <a:endParaRPr lang="de-DE" sz="900" b="0" i="0" u="none" strike="noStrike">
+                        <a:solidFill>
+                          <a:srgbClr val="000000"/>
+                        </a:solidFill>
+                        <a:effectLst/>
+                        <a:latin typeface="Calibri" panose="020F0502020204030204" pitchFamily="34" charset="0"/>
+                      </a:endParaRPr>
+                    </a:p>
+                  </a:txBody>
+                  <a:tcPr marL="7394" marR="7394" marT="7394" marB="0" anchor="b"/>
+                </a:tc>
+                <a:tc hMerge="1">
+                  <a:txBody>
+                    <a:bodyPr/>
+                    <a:lstStyle/>
+                    <a:p>
+                      <a:endParaRPr lang="de-DE"/>
+                    </a:p>
+                  </a:txBody>
+                  <a:tcPr/>
+                </a:tc>
+                <a:tc>
+                  <a:txBody>
+                    <a:bodyPr/>
+                    <a:lstStyle/>
+                    <a:p>
+                      <a:pPr algn="r" fontAlgn="b"/>
+                      <a:r>
+                        <a:rPr lang="de-DE" sz="900" u="none" strike="noStrike">
+                          <a:effectLst/>
+                        </a:rPr>
+                        <a:t>15</a:t>
+                      </a:r>
+                      <a:endParaRPr lang="de-DE" sz="900" b="0" i="0" u="none" strike="noStrike">
+                        <a:solidFill>
+                          <a:srgbClr val="000000"/>
+                        </a:solidFill>
+                        <a:effectLst/>
+                        <a:latin typeface="Calibri" panose="020F0502020204030204" pitchFamily="34" charset="0"/>
+                      </a:endParaRPr>
+                    </a:p>
+                  </a:txBody>
+                  <a:tcPr marL="7394" marR="7394" marT="7394" marB="0" anchor="b"/>
+                </a:tc>
+                <a:tc>
+                  <a:txBody>
+                    <a:bodyPr/>
+                    <a:lstStyle/>
+                    <a:p>
+                      <a:pPr algn="l" fontAlgn="b"/>
+                      <a:endParaRPr lang="de-DE" sz="900" b="0" i="0" u="none" strike="noStrike">
+                        <a:solidFill>
+                          <a:srgbClr val="000000"/>
+                        </a:solidFill>
+                        <a:effectLst/>
+                        <a:latin typeface="Calibri" panose="020F0502020204030204" pitchFamily="34" charset="0"/>
+                      </a:endParaRPr>
+                    </a:p>
+                  </a:txBody>
+                  <a:tcPr marL="7394" marR="7394" marT="7394" marB="0" anchor="b"/>
+                </a:tc>
+                <a:tc>
+                  <a:txBody>
+                    <a:bodyPr/>
+                    <a:lstStyle/>
+                    <a:p>
+                      <a:pPr algn="r" fontAlgn="b"/>
+                      <a:r>
+                        <a:rPr lang="de-DE" sz="900" u="none" strike="noStrike">
+                          <a:effectLst/>
+                        </a:rPr>
+                        <a:t>15</a:t>
+                      </a:r>
+                      <a:endParaRPr lang="de-DE" sz="900" b="0" i="0" u="none" strike="noStrike">
+                        <a:solidFill>
+                          <a:srgbClr val="000000"/>
+                        </a:solidFill>
+                        <a:effectLst/>
+                        <a:latin typeface="Calibri" panose="020F0502020204030204" pitchFamily="34" charset="0"/>
+                      </a:endParaRPr>
+                    </a:p>
+                  </a:txBody>
+                  <a:tcPr marL="7394" marR="7394" marT="7394" marB="0" anchor="b"/>
+                </a:tc>
+                <a:tc>
+                  <a:txBody>
+                    <a:bodyPr/>
+                    <a:lstStyle/>
+                    <a:p>
+                      <a:pPr algn="r" fontAlgn="b"/>
+                      <a:r>
+                        <a:rPr lang="de-DE" sz="900" u="none" strike="noStrike">
+                          <a:effectLst/>
+                        </a:rPr>
+                        <a:t>15,0</a:t>
+                      </a:r>
+                      <a:endParaRPr lang="de-DE" sz="900" b="0" i="0" u="none" strike="noStrike">
+                        <a:solidFill>
+                          <a:srgbClr val="000000"/>
+                        </a:solidFill>
+                        <a:effectLst/>
+                        <a:latin typeface="Calibri" panose="020F0502020204030204" pitchFamily="34" charset="0"/>
+                      </a:endParaRPr>
+                    </a:p>
+                  </a:txBody>
+                  <a:tcPr marL="7394" marR="7394" marT="7394" marB="0" anchor="b"/>
+                </a:tc>
+                <a:tc>
+                  <a:txBody>
+                    <a:bodyPr/>
+                    <a:lstStyle/>
+                    <a:p>
+                      <a:pPr algn="l" fontAlgn="b"/>
+                      <a:endParaRPr lang="de-DE" sz="900" b="0" i="0" u="none" strike="noStrike">
+                        <a:solidFill>
+                          <a:srgbClr val="000000"/>
+                        </a:solidFill>
+                        <a:effectLst/>
+                        <a:latin typeface="Calibri" panose="020F0502020204030204" pitchFamily="34" charset="0"/>
+                      </a:endParaRPr>
+                    </a:p>
+                  </a:txBody>
+                  <a:tcPr marL="7394" marR="7394" marT="7394" marB="0" anchor="b"/>
+                </a:tc>
+                <a:tc>
+                  <a:txBody>
+                    <a:bodyPr/>
+                    <a:lstStyle/>
+                    <a:p>
+                      <a:pPr algn="r" fontAlgn="b"/>
+                      <a:r>
+                        <a:rPr lang="de-DE" sz="900" u="none" strike="noStrike">
+                          <a:effectLst/>
+                        </a:rPr>
+                        <a:t>15,0</a:t>
+                      </a:r>
+                      <a:endParaRPr lang="de-DE" sz="900" b="0" i="0" u="none" strike="noStrike">
+                        <a:solidFill>
+                          <a:srgbClr val="000000"/>
+                        </a:solidFill>
+                        <a:effectLst/>
+                        <a:latin typeface="Calibri" panose="020F0502020204030204" pitchFamily="34" charset="0"/>
+                      </a:endParaRPr>
+                    </a:p>
+                  </a:txBody>
+                  <a:tcPr marL="7394" marR="7394" marT="7394" marB="0" anchor="b"/>
+                </a:tc>
+                <a:tc>
+                  <a:txBody>
+                    <a:bodyPr/>
+                    <a:lstStyle/>
+                    <a:p>
+                      <a:pPr algn="r" fontAlgn="b"/>
+                      <a:r>
+                        <a:rPr lang="de-DE" sz="900" u="none" strike="noStrike">
+                          <a:effectLst/>
+                        </a:rPr>
+                        <a:t>15</a:t>
+                      </a:r>
+                      <a:endParaRPr lang="de-DE" sz="900" b="0" i="0" u="none" strike="noStrike">
+                        <a:solidFill>
+                          <a:srgbClr val="000000"/>
+                        </a:solidFill>
+                        <a:effectLst/>
+                        <a:latin typeface="Calibri" panose="020F0502020204030204" pitchFamily="34" charset="0"/>
+                      </a:endParaRPr>
+                    </a:p>
+                  </a:txBody>
+                  <a:tcPr marL="7394" marR="7394" marT="7394" marB="0" anchor="b"/>
+                </a:tc>
+                <a:extLst>
+                  <a:ext uri="{0D108BD9-81ED-4DB2-BD59-A6C34878D82A}">
+                    <a16:rowId xmlns:a16="http://schemas.microsoft.com/office/drawing/2014/main" val="3537837415"/>
+                  </a:ext>
+                </a:extLst>
+              </a:tr>
+              <a:tr h="294841">
+                <a:tc gridSpan="2">
+                  <a:txBody>
+                    <a:bodyPr/>
+                    <a:lstStyle/>
+                    <a:p>
+                      <a:pPr algn="l" fontAlgn="b"/>
+                      <a:r>
+                        <a:rPr lang="de-DE" sz="900" u="none" strike="noStrike">
+                          <a:effectLst/>
+                        </a:rPr>
+                        <a:t>Summe Balken</a:t>
+                      </a:r>
+                      <a:endParaRPr lang="de-DE" sz="900" b="0" i="0" u="none" strike="noStrike">
+                        <a:solidFill>
+                          <a:srgbClr val="000000"/>
+                        </a:solidFill>
+                        <a:effectLst/>
+                        <a:latin typeface="Calibri" panose="020F0502020204030204" pitchFamily="34" charset="0"/>
+                      </a:endParaRPr>
+                    </a:p>
+                  </a:txBody>
+                  <a:tcPr marL="7394" marR="7394" marT="7394" marB="0" anchor="b"/>
+                </a:tc>
+                <a:tc hMerge="1">
+                  <a:txBody>
+                    <a:bodyPr/>
+                    <a:lstStyle/>
+                    <a:p>
+                      <a:endParaRPr lang="de-DE"/>
+                    </a:p>
+                  </a:txBody>
+                  <a:tcPr/>
+                </a:tc>
+                <a:tc>
+                  <a:txBody>
+                    <a:bodyPr/>
+                    <a:lstStyle/>
+                    <a:p>
+                      <a:pPr algn="r" fontAlgn="b"/>
+                      <a:r>
+                        <a:rPr lang="de-DE" sz="900" u="none" strike="noStrike">
+                          <a:effectLst/>
+                        </a:rPr>
+                        <a:t>165</a:t>
+                      </a:r>
+                      <a:endParaRPr lang="de-DE" sz="900" b="0" i="0" u="none" strike="noStrike">
+                        <a:solidFill>
+                          <a:srgbClr val="000000"/>
+                        </a:solidFill>
+                        <a:effectLst/>
+                        <a:latin typeface="Calibri" panose="020F0502020204030204" pitchFamily="34" charset="0"/>
+                      </a:endParaRPr>
+                    </a:p>
+                  </a:txBody>
+                  <a:tcPr marL="7394" marR="7394" marT="7394" marB="0" anchor="b"/>
+                </a:tc>
+                <a:tc>
+                  <a:txBody>
+                    <a:bodyPr/>
+                    <a:lstStyle/>
+                    <a:p>
+                      <a:pPr algn="l" fontAlgn="b"/>
+                      <a:endParaRPr lang="de-DE" sz="900" b="0" i="0" u="none" strike="noStrike">
+                        <a:solidFill>
+                          <a:srgbClr val="000000"/>
+                        </a:solidFill>
+                        <a:effectLst/>
+                        <a:latin typeface="Calibri" panose="020F0502020204030204" pitchFamily="34" charset="0"/>
+                      </a:endParaRPr>
+                    </a:p>
+                  </a:txBody>
+                  <a:tcPr marL="7394" marR="7394" marT="7394" marB="0" anchor="b"/>
+                </a:tc>
+                <a:tc>
+                  <a:txBody>
+                    <a:bodyPr/>
+                    <a:lstStyle/>
+                    <a:p>
+                      <a:pPr algn="r" fontAlgn="b"/>
+                      <a:r>
+                        <a:rPr lang="de-DE" sz="900" u="none" strike="noStrike">
+                          <a:effectLst/>
+                        </a:rPr>
+                        <a:t>88</a:t>
+                      </a:r>
+                      <a:endParaRPr lang="de-DE" sz="900" b="0" i="0" u="none" strike="noStrike">
+                        <a:solidFill>
+                          <a:srgbClr val="000000"/>
+                        </a:solidFill>
+                        <a:effectLst/>
+                        <a:latin typeface="Calibri" panose="020F0502020204030204" pitchFamily="34" charset="0"/>
+                      </a:endParaRPr>
+                    </a:p>
+                  </a:txBody>
+                  <a:tcPr marL="7394" marR="7394" marT="7394" marB="0" anchor="b"/>
+                </a:tc>
+                <a:tc>
+                  <a:txBody>
+                    <a:bodyPr/>
+                    <a:lstStyle/>
+                    <a:p>
+                      <a:pPr algn="r" fontAlgn="b"/>
+                      <a:r>
+                        <a:rPr lang="de-DE" sz="900" u="none" strike="noStrike">
+                          <a:effectLst/>
+                        </a:rPr>
+                        <a:t>90</a:t>
+                      </a:r>
+                      <a:endParaRPr lang="de-DE" sz="900" b="0" i="0" u="none" strike="noStrike">
+                        <a:solidFill>
+                          <a:srgbClr val="000000"/>
+                        </a:solidFill>
+                        <a:effectLst/>
+                        <a:latin typeface="Calibri" panose="020F0502020204030204" pitchFamily="34" charset="0"/>
+                      </a:endParaRPr>
+                    </a:p>
+                  </a:txBody>
+                  <a:tcPr marL="7394" marR="7394" marT="7394" marB="0" anchor="b"/>
+                </a:tc>
+                <a:tc>
+                  <a:txBody>
+                    <a:bodyPr/>
+                    <a:lstStyle/>
+                    <a:p>
+                      <a:pPr algn="l" fontAlgn="b"/>
+                      <a:endParaRPr lang="de-DE" sz="900" b="0" i="0" u="none" strike="noStrike">
+                        <a:solidFill>
+                          <a:srgbClr val="000000"/>
+                        </a:solidFill>
+                        <a:effectLst/>
+                        <a:latin typeface="Calibri" panose="020F0502020204030204" pitchFamily="34" charset="0"/>
+                      </a:endParaRPr>
+                    </a:p>
+                  </a:txBody>
+                  <a:tcPr marL="7394" marR="7394" marT="7394" marB="0" anchor="b"/>
+                </a:tc>
+                <a:tc>
+                  <a:txBody>
+                    <a:bodyPr/>
+                    <a:lstStyle/>
+                    <a:p>
+                      <a:pPr algn="r" fontAlgn="b"/>
+                      <a:r>
+                        <a:rPr lang="de-DE" sz="900" u="none" strike="noStrike">
+                          <a:effectLst/>
+                        </a:rPr>
+                        <a:t>120,083333</a:t>
+                      </a:r>
+                      <a:endParaRPr lang="de-DE" sz="900" b="0" i="0" u="none" strike="noStrike">
+                        <a:solidFill>
+                          <a:srgbClr val="000000"/>
+                        </a:solidFill>
+                        <a:effectLst/>
+                        <a:latin typeface="Calibri" panose="020F0502020204030204" pitchFamily="34" charset="0"/>
+                      </a:endParaRPr>
+                    </a:p>
+                  </a:txBody>
+                  <a:tcPr marL="7394" marR="7394" marT="7394" marB="0" anchor="b"/>
+                </a:tc>
+                <a:tc>
+                  <a:txBody>
+                    <a:bodyPr/>
+                    <a:lstStyle/>
+                    <a:p>
+                      <a:pPr algn="r" fontAlgn="b"/>
+                      <a:r>
+                        <a:rPr lang="de-DE" sz="900" u="none" strike="noStrike">
+                          <a:effectLst/>
+                        </a:rPr>
+                        <a:t>120</a:t>
+                      </a:r>
+                      <a:endParaRPr lang="de-DE" sz="900" b="0" i="0" u="none" strike="noStrike">
+                        <a:solidFill>
+                          <a:srgbClr val="000000"/>
+                        </a:solidFill>
+                        <a:effectLst/>
+                        <a:latin typeface="Calibri" panose="020F0502020204030204" pitchFamily="34" charset="0"/>
+                      </a:endParaRPr>
+                    </a:p>
+                  </a:txBody>
+                  <a:tcPr marL="7394" marR="7394" marT="7394" marB="0" anchor="b"/>
+                </a:tc>
+                <a:extLst>
+                  <a:ext uri="{0D108BD9-81ED-4DB2-BD59-A6C34878D82A}">
+                    <a16:rowId xmlns:a16="http://schemas.microsoft.com/office/drawing/2014/main" val="1080796836"/>
+                  </a:ext>
+                </a:extLst>
+              </a:tr>
+              <a:tr h="151290">
+                <a:tc>
+                  <a:txBody>
+                    <a:bodyPr/>
+                    <a:lstStyle/>
+                    <a:p>
+                      <a:pPr algn="l" fontAlgn="b"/>
+                      <a:endParaRPr lang="de-DE" sz="900" b="0" i="0" u="none" strike="noStrike">
+                        <a:solidFill>
+                          <a:srgbClr val="000000"/>
+                        </a:solidFill>
+                        <a:effectLst/>
+                        <a:latin typeface="Calibri" panose="020F0502020204030204" pitchFamily="34" charset="0"/>
+                      </a:endParaRPr>
+                    </a:p>
+                  </a:txBody>
+                  <a:tcPr marL="7394" marR="7394" marT="7394" marB="0" anchor="b"/>
+                </a:tc>
+                <a:tc>
+                  <a:txBody>
+                    <a:bodyPr/>
+                    <a:lstStyle/>
+                    <a:p>
+                      <a:pPr algn="l" fontAlgn="b"/>
+                      <a:endParaRPr lang="de-DE" sz="900" b="0" i="0" u="none" strike="noStrike">
+                        <a:solidFill>
+                          <a:srgbClr val="000000"/>
+                        </a:solidFill>
+                        <a:effectLst/>
+                        <a:latin typeface="Calibri" panose="020F0502020204030204" pitchFamily="34" charset="0"/>
+                      </a:endParaRPr>
+                    </a:p>
+                  </a:txBody>
+                  <a:tcPr marL="7394" marR="7394" marT="7394" marB="0" anchor="b"/>
+                </a:tc>
+                <a:tc>
+                  <a:txBody>
+                    <a:bodyPr/>
+                    <a:lstStyle/>
+                    <a:p>
+                      <a:pPr algn="l" fontAlgn="b"/>
+                      <a:endParaRPr lang="de-DE" sz="900" b="0" i="0" u="none" strike="noStrike">
+                        <a:solidFill>
+                          <a:srgbClr val="000000"/>
+                        </a:solidFill>
+                        <a:effectLst/>
+                        <a:latin typeface="Calibri" panose="020F0502020204030204" pitchFamily="34" charset="0"/>
+                      </a:endParaRPr>
+                    </a:p>
+                  </a:txBody>
+                  <a:tcPr marL="7394" marR="7394" marT="7394" marB="0" anchor="b"/>
+                </a:tc>
+                <a:tc>
+                  <a:txBody>
+                    <a:bodyPr/>
+                    <a:lstStyle/>
+                    <a:p>
+                      <a:pPr algn="l" fontAlgn="b"/>
+                      <a:endParaRPr lang="de-DE" sz="900" b="0" i="0" u="none" strike="noStrike">
+                        <a:solidFill>
+                          <a:srgbClr val="000000"/>
+                        </a:solidFill>
+                        <a:effectLst/>
+                        <a:latin typeface="Calibri" panose="020F0502020204030204" pitchFamily="34" charset="0"/>
+                      </a:endParaRPr>
+                    </a:p>
+                  </a:txBody>
+                  <a:tcPr marL="7394" marR="7394" marT="7394" marB="0" anchor="b"/>
+                </a:tc>
+                <a:tc>
+                  <a:txBody>
+                    <a:bodyPr/>
+                    <a:lstStyle/>
+                    <a:p>
+                      <a:pPr algn="l" fontAlgn="b"/>
+                      <a:endParaRPr lang="de-DE" sz="900" b="0" i="0" u="none" strike="noStrike">
+                        <a:solidFill>
+                          <a:srgbClr val="000000"/>
+                        </a:solidFill>
+                        <a:effectLst/>
+                        <a:latin typeface="Calibri" panose="020F0502020204030204" pitchFamily="34" charset="0"/>
+                      </a:endParaRPr>
+                    </a:p>
+                  </a:txBody>
+                  <a:tcPr marL="7394" marR="7394" marT="7394" marB="0" anchor="b"/>
+                </a:tc>
+                <a:tc>
+                  <a:txBody>
+                    <a:bodyPr/>
+                    <a:lstStyle/>
+                    <a:p>
+                      <a:pPr algn="l" fontAlgn="b"/>
+                      <a:endParaRPr lang="de-DE" sz="900" b="0" i="0" u="none" strike="noStrike">
+                        <a:solidFill>
+                          <a:srgbClr val="000000"/>
+                        </a:solidFill>
+                        <a:effectLst/>
+                        <a:latin typeface="Calibri" panose="020F0502020204030204" pitchFamily="34" charset="0"/>
+                      </a:endParaRPr>
+                    </a:p>
+                  </a:txBody>
+                  <a:tcPr marL="7394" marR="7394" marT="7394" marB="0" anchor="b"/>
+                </a:tc>
+                <a:tc>
+                  <a:txBody>
+                    <a:bodyPr/>
+                    <a:lstStyle/>
+                    <a:p>
+                      <a:pPr algn="l" fontAlgn="b"/>
+                      <a:endParaRPr lang="de-DE" sz="900" b="0" i="0" u="none" strike="noStrike">
+                        <a:solidFill>
+                          <a:srgbClr val="000000"/>
+                        </a:solidFill>
+                        <a:effectLst/>
+                        <a:latin typeface="Calibri" panose="020F0502020204030204" pitchFamily="34" charset="0"/>
+                      </a:endParaRPr>
+                    </a:p>
+                  </a:txBody>
+                  <a:tcPr marL="7394" marR="7394" marT="7394" marB="0" anchor="b"/>
+                </a:tc>
+                <a:tc>
+                  <a:txBody>
+                    <a:bodyPr/>
+                    <a:lstStyle/>
+                    <a:p>
+                      <a:pPr algn="l" fontAlgn="b"/>
+                      <a:endParaRPr lang="de-DE" sz="900" b="0" i="0" u="none" strike="noStrike">
+                        <a:solidFill>
+                          <a:srgbClr val="000000"/>
+                        </a:solidFill>
+                        <a:effectLst/>
+                        <a:latin typeface="Calibri" panose="020F0502020204030204" pitchFamily="34" charset="0"/>
+                      </a:endParaRPr>
+                    </a:p>
+                  </a:txBody>
+                  <a:tcPr marL="7394" marR="7394" marT="7394" marB="0" anchor="b"/>
+                </a:tc>
+                <a:tc>
+                  <a:txBody>
+                    <a:bodyPr/>
+                    <a:lstStyle/>
+                    <a:p>
+                      <a:pPr algn="l" fontAlgn="b"/>
+                      <a:endParaRPr lang="de-DE" sz="900" b="0" i="0" u="none" strike="noStrike">
+                        <a:solidFill>
+                          <a:srgbClr val="000000"/>
+                        </a:solidFill>
+                        <a:effectLst/>
+                        <a:latin typeface="Calibri" panose="020F0502020204030204" pitchFamily="34" charset="0"/>
+                      </a:endParaRPr>
+                    </a:p>
+                  </a:txBody>
+                  <a:tcPr marL="7394" marR="7394" marT="7394" marB="0" anchor="b"/>
+                </a:tc>
+                <a:extLst>
+                  <a:ext uri="{0D108BD9-81ED-4DB2-BD59-A6C34878D82A}">
+                    <a16:rowId xmlns:a16="http://schemas.microsoft.com/office/drawing/2014/main" val="267442483"/>
+                  </a:ext>
+                </a:extLst>
+              </a:tr>
+              <a:tr h="294841">
+                <a:tc>
+                  <a:txBody>
+                    <a:bodyPr/>
+                    <a:lstStyle/>
+                    <a:p>
+                      <a:pPr algn="l" fontAlgn="b"/>
+                      <a:r>
+                        <a:rPr lang="de-DE" sz="900" u="none" strike="noStrike">
+                          <a:effectLst/>
+                        </a:rPr>
+                        <a:t>X-Achse</a:t>
+                      </a:r>
+                      <a:endParaRPr lang="de-DE" sz="900" b="0" i="0" u="none" strike="noStrike">
+                        <a:solidFill>
+                          <a:srgbClr val="000000"/>
+                        </a:solidFill>
+                        <a:effectLst/>
+                        <a:latin typeface="Calibri" panose="020F0502020204030204" pitchFamily="34" charset="0"/>
+                      </a:endParaRPr>
+                    </a:p>
+                  </a:txBody>
+                  <a:tcPr marL="7394" marR="7394" marT="7394" marB="0" anchor="b"/>
+                </a:tc>
+                <a:tc>
+                  <a:txBody>
+                    <a:bodyPr/>
+                    <a:lstStyle/>
+                    <a:p>
+                      <a:pPr algn="l" fontAlgn="b"/>
+                      <a:endParaRPr lang="de-DE" sz="900" b="0" i="0" u="none" strike="noStrike">
+                        <a:solidFill>
+                          <a:srgbClr val="000000"/>
+                        </a:solidFill>
+                        <a:effectLst/>
+                        <a:latin typeface="Calibri" panose="020F0502020204030204" pitchFamily="34" charset="0"/>
+                      </a:endParaRPr>
+                    </a:p>
+                  </a:txBody>
+                  <a:tcPr marL="7394" marR="7394" marT="7394" marB="0" anchor="b"/>
+                </a:tc>
+                <a:tc>
+                  <a:txBody>
+                    <a:bodyPr/>
+                    <a:lstStyle/>
+                    <a:p>
+                      <a:pPr algn="r" fontAlgn="b"/>
+                      <a:r>
+                        <a:rPr lang="de-DE" sz="900" u="none" strike="noStrike">
+                          <a:effectLst/>
+                        </a:rPr>
+                        <a:t>5</a:t>
+                      </a:r>
+                      <a:endParaRPr lang="de-DE" sz="900" b="0" i="0" u="none" strike="noStrike">
+                        <a:solidFill>
+                          <a:srgbClr val="000000"/>
+                        </a:solidFill>
+                        <a:effectLst/>
+                        <a:latin typeface="Calibri" panose="020F0502020204030204" pitchFamily="34" charset="0"/>
+                      </a:endParaRPr>
+                    </a:p>
+                  </a:txBody>
+                  <a:tcPr marL="7394" marR="7394" marT="7394" marB="0" anchor="b"/>
+                </a:tc>
+                <a:tc>
+                  <a:txBody>
+                    <a:bodyPr/>
+                    <a:lstStyle/>
+                    <a:p>
+                      <a:pPr algn="l" fontAlgn="b"/>
+                      <a:endParaRPr lang="de-DE" sz="900" b="0" i="0" u="none" strike="noStrike">
+                        <a:solidFill>
+                          <a:srgbClr val="000000"/>
+                        </a:solidFill>
+                        <a:effectLst/>
+                        <a:latin typeface="Calibri" panose="020F0502020204030204" pitchFamily="34" charset="0"/>
+                      </a:endParaRPr>
+                    </a:p>
+                  </a:txBody>
+                  <a:tcPr marL="7394" marR="7394" marT="7394" marB="0" anchor="b"/>
+                </a:tc>
+                <a:tc>
+                  <a:txBody>
+                    <a:bodyPr/>
+                    <a:lstStyle/>
+                    <a:p>
+                      <a:pPr algn="r" fontAlgn="b"/>
+                      <a:r>
+                        <a:rPr lang="de-DE" sz="900" u="none" strike="noStrike">
+                          <a:effectLst/>
+                        </a:rPr>
+                        <a:t>2,7</a:t>
+                      </a:r>
+                      <a:endParaRPr lang="de-DE" sz="900" b="0" i="0" u="none" strike="noStrike">
+                        <a:solidFill>
+                          <a:srgbClr val="000000"/>
+                        </a:solidFill>
+                        <a:effectLst/>
+                        <a:latin typeface="Calibri" panose="020F0502020204030204" pitchFamily="34" charset="0"/>
+                      </a:endParaRPr>
+                    </a:p>
+                  </a:txBody>
+                  <a:tcPr marL="7394" marR="7394" marT="7394" marB="0" anchor="b"/>
+                </a:tc>
+                <a:tc>
+                  <a:txBody>
+                    <a:bodyPr/>
+                    <a:lstStyle/>
+                    <a:p>
+                      <a:pPr algn="r" fontAlgn="b"/>
+                      <a:r>
+                        <a:rPr lang="de-DE" sz="900" u="none" strike="noStrike">
+                          <a:effectLst/>
+                        </a:rPr>
+                        <a:t>2,0</a:t>
+                      </a:r>
+                      <a:endParaRPr lang="de-DE" sz="900" b="0" i="0" u="none" strike="noStrike">
+                        <a:solidFill>
+                          <a:srgbClr val="000000"/>
+                        </a:solidFill>
+                        <a:effectLst/>
+                        <a:latin typeface="Calibri" panose="020F0502020204030204" pitchFamily="34" charset="0"/>
+                      </a:endParaRPr>
+                    </a:p>
+                  </a:txBody>
+                  <a:tcPr marL="7394" marR="7394" marT="7394" marB="0" anchor="b"/>
+                </a:tc>
+                <a:tc>
+                  <a:txBody>
+                    <a:bodyPr/>
+                    <a:lstStyle/>
+                    <a:p>
+                      <a:pPr algn="l" fontAlgn="b"/>
+                      <a:endParaRPr lang="de-DE" sz="900" b="0" i="0" u="none" strike="noStrike">
+                        <a:solidFill>
+                          <a:srgbClr val="000000"/>
+                        </a:solidFill>
+                        <a:effectLst/>
+                        <a:latin typeface="Calibri" panose="020F0502020204030204" pitchFamily="34" charset="0"/>
+                      </a:endParaRPr>
+                    </a:p>
+                  </a:txBody>
+                  <a:tcPr marL="7394" marR="7394" marT="7394" marB="0" anchor="b"/>
+                </a:tc>
+                <a:tc>
+                  <a:txBody>
+                    <a:bodyPr/>
+                    <a:lstStyle/>
+                    <a:p>
+                      <a:pPr algn="r" fontAlgn="b"/>
+                      <a:r>
+                        <a:rPr lang="de-DE" sz="900" u="none" strike="noStrike">
+                          <a:effectLst/>
+                        </a:rPr>
+                        <a:t>3,6</a:t>
+                      </a:r>
+                      <a:endParaRPr lang="de-DE" sz="900" b="0" i="0" u="none" strike="noStrike">
+                        <a:solidFill>
+                          <a:srgbClr val="000000"/>
+                        </a:solidFill>
+                        <a:effectLst/>
+                        <a:latin typeface="Calibri" panose="020F0502020204030204" pitchFamily="34" charset="0"/>
+                      </a:endParaRPr>
+                    </a:p>
+                  </a:txBody>
+                  <a:tcPr marL="7394" marR="7394" marT="7394" marB="0" anchor="b"/>
+                </a:tc>
+                <a:tc>
+                  <a:txBody>
+                    <a:bodyPr/>
+                    <a:lstStyle/>
+                    <a:p>
+                      <a:pPr algn="r" fontAlgn="b"/>
+                      <a:r>
+                        <a:rPr lang="de-DE" sz="900" u="none" strike="noStrike">
+                          <a:effectLst/>
+                        </a:rPr>
+                        <a:t>3,0</a:t>
+                      </a:r>
+                      <a:endParaRPr lang="de-DE" sz="900" b="0" i="0" u="none" strike="noStrike">
+                        <a:solidFill>
+                          <a:srgbClr val="000000"/>
+                        </a:solidFill>
+                        <a:effectLst/>
+                        <a:latin typeface="Calibri" panose="020F0502020204030204" pitchFamily="34" charset="0"/>
+                      </a:endParaRPr>
+                    </a:p>
+                  </a:txBody>
+                  <a:tcPr marL="7394" marR="7394" marT="7394" marB="0" anchor="b"/>
+                </a:tc>
+                <a:extLst>
+                  <a:ext uri="{0D108BD9-81ED-4DB2-BD59-A6C34878D82A}">
+                    <a16:rowId xmlns:a16="http://schemas.microsoft.com/office/drawing/2014/main" val="1084148054"/>
+                  </a:ext>
+                </a:extLst>
+              </a:tr>
+              <a:tr h="151290">
+                <a:tc gridSpan="2">
+                  <a:txBody>
+                    <a:bodyPr/>
+                    <a:lstStyle/>
+                    <a:p>
+                      <a:pPr algn="l" fontAlgn="b"/>
+                      <a:r>
+                        <a:rPr lang="de-DE" sz="900" u="none" strike="noStrike">
+                          <a:effectLst/>
+                        </a:rPr>
+                        <a:t>Breite x-Achse</a:t>
+                      </a:r>
+                      <a:endParaRPr lang="de-DE" sz="900" b="0" i="0" u="none" strike="noStrike">
+                        <a:solidFill>
+                          <a:srgbClr val="000000"/>
+                        </a:solidFill>
+                        <a:effectLst/>
+                        <a:latin typeface="Calibri" panose="020F0502020204030204" pitchFamily="34" charset="0"/>
+                      </a:endParaRPr>
+                    </a:p>
+                  </a:txBody>
+                  <a:tcPr marL="7394" marR="7394" marT="7394" marB="0" anchor="b"/>
+                </a:tc>
+                <a:tc hMerge="1">
+                  <a:txBody>
+                    <a:bodyPr/>
+                    <a:lstStyle/>
+                    <a:p>
+                      <a:endParaRPr lang="de-DE"/>
+                    </a:p>
+                  </a:txBody>
+                  <a:tcPr/>
+                </a:tc>
+                <a:tc>
+                  <a:txBody>
+                    <a:bodyPr/>
+                    <a:lstStyle/>
+                    <a:p>
+                      <a:pPr algn="r" fontAlgn="b"/>
+                      <a:r>
+                        <a:rPr lang="de-DE" sz="900" u="none" strike="noStrike">
+                          <a:effectLst/>
+                        </a:rPr>
+                        <a:t>2</a:t>
+                      </a:r>
+                      <a:endParaRPr lang="de-DE" sz="900" b="0" i="0" u="none" strike="noStrike">
+                        <a:solidFill>
+                          <a:srgbClr val="000000"/>
+                        </a:solidFill>
+                        <a:effectLst/>
+                        <a:latin typeface="Calibri" panose="020F0502020204030204" pitchFamily="34" charset="0"/>
+                      </a:endParaRPr>
+                    </a:p>
+                  </a:txBody>
+                  <a:tcPr marL="7394" marR="7394" marT="7394" marB="0" anchor="b"/>
+                </a:tc>
+                <a:tc>
+                  <a:txBody>
+                    <a:bodyPr/>
+                    <a:lstStyle/>
+                    <a:p>
+                      <a:pPr algn="l" fontAlgn="b"/>
+                      <a:endParaRPr lang="de-DE" sz="900" b="0" i="0" u="none" strike="noStrike">
+                        <a:solidFill>
+                          <a:srgbClr val="000000"/>
+                        </a:solidFill>
+                        <a:effectLst/>
+                        <a:latin typeface="Calibri" panose="020F0502020204030204" pitchFamily="34" charset="0"/>
+                      </a:endParaRPr>
+                    </a:p>
+                  </a:txBody>
+                  <a:tcPr marL="7394" marR="7394" marT="7394" marB="0" anchor="b"/>
+                </a:tc>
+                <a:tc>
+                  <a:txBody>
+                    <a:bodyPr/>
+                    <a:lstStyle/>
+                    <a:p>
+                      <a:pPr algn="r" fontAlgn="b"/>
+                      <a:r>
+                        <a:rPr lang="de-DE" sz="900" u="none" strike="noStrike">
+                          <a:effectLst/>
+                        </a:rPr>
+                        <a:t>2,0</a:t>
+                      </a:r>
+                      <a:endParaRPr lang="de-DE" sz="900" b="0" i="0" u="none" strike="noStrike">
+                        <a:solidFill>
+                          <a:srgbClr val="000000"/>
+                        </a:solidFill>
+                        <a:effectLst/>
+                        <a:latin typeface="Calibri" panose="020F0502020204030204" pitchFamily="34" charset="0"/>
+                      </a:endParaRPr>
+                    </a:p>
+                  </a:txBody>
+                  <a:tcPr marL="7394" marR="7394" marT="7394" marB="0" anchor="b"/>
+                </a:tc>
+                <a:tc>
+                  <a:txBody>
+                    <a:bodyPr/>
+                    <a:lstStyle/>
+                    <a:p>
+                      <a:pPr algn="r" fontAlgn="b"/>
+                      <a:r>
+                        <a:rPr lang="de-DE" sz="900" u="none" strike="noStrike">
+                          <a:effectLst/>
+                        </a:rPr>
+                        <a:t>2,0</a:t>
+                      </a:r>
+                      <a:endParaRPr lang="de-DE" sz="900" b="0" i="0" u="none" strike="noStrike">
+                        <a:solidFill>
+                          <a:srgbClr val="000000"/>
+                        </a:solidFill>
+                        <a:effectLst/>
+                        <a:latin typeface="Calibri" panose="020F0502020204030204" pitchFamily="34" charset="0"/>
+                      </a:endParaRPr>
+                    </a:p>
+                  </a:txBody>
+                  <a:tcPr marL="7394" marR="7394" marT="7394" marB="0" anchor="b"/>
+                </a:tc>
+                <a:tc>
+                  <a:txBody>
+                    <a:bodyPr/>
+                    <a:lstStyle/>
+                    <a:p>
+                      <a:pPr algn="l" fontAlgn="b"/>
+                      <a:endParaRPr lang="de-DE" sz="900" b="0" i="0" u="none" strike="noStrike">
+                        <a:solidFill>
+                          <a:srgbClr val="000000"/>
+                        </a:solidFill>
+                        <a:effectLst/>
+                        <a:latin typeface="Calibri" panose="020F0502020204030204" pitchFamily="34" charset="0"/>
+                      </a:endParaRPr>
+                    </a:p>
+                  </a:txBody>
+                  <a:tcPr marL="7394" marR="7394" marT="7394" marB="0" anchor="b"/>
+                </a:tc>
+                <a:tc>
+                  <a:txBody>
+                    <a:bodyPr/>
+                    <a:lstStyle/>
+                    <a:p>
+                      <a:pPr algn="r" fontAlgn="b"/>
+                      <a:r>
+                        <a:rPr lang="de-DE" sz="900" u="none" strike="noStrike">
+                          <a:effectLst/>
+                        </a:rPr>
+                        <a:t>2,0</a:t>
+                      </a:r>
+                      <a:endParaRPr lang="de-DE" sz="900" b="0" i="0" u="none" strike="noStrike">
+                        <a:solidFill>
+                          <a:srgbClr val="000000"/>
+                        </a:solidFill>
+                        <a:effectLst/>
+                        <a:latin typeface="Calibri" panose="020F0502020204030204" pitchFamily="34" charset="0"/>
+                      </a:endParaRPr>
+                    </a:p>
+                  </a:txBody>
+                  <a:tcPr marL="7394" marR="7394" marT="7394" marB="0" anchor="b"/>
+                </a:tc>
+                <a:tc>
+                  <a:txBody>
+                    <a:bodyPr/>
+                    <a:lstStyle/>
+                    <a:p>
+                      <a:pPr algn="r" fontAlgn="b"/>
+                      <a:r>
+                        <a:rPr lang="de-DE" sz="900" u="none" strike="noStrike">
+                          <a:effectLst/>
+                        </a:rPr>
+                        <a:t>2,0</a:t>
+                      </a:r>
+                      <a:endParaRPr lang="de-DE" sz="900" b="0" i="0" u="none" strike="noStrike">
+                        <a:solidFill>
+                          <a:srgbClr val="000000"/>
+                        </a:solidFill>
+                        <a:effectLst/>
+                        <a:latin typeface="Calibri" panose="020F0502020204030204" pitchFamily="34" charset="0"/>
+                      </a:endParaRPr>
+                    </a:p>
+                  </a:txBody>
+                  <a:tcPr marL="7394" marR="7394" marT="7394" marB="0" anchor="b"/>
+                </a:tc>
+                <a:extLst>
+                  <a:ext uri="{0D108BD9-81ED-4DB2-BD59-A6C34878D82A}">
+                    <a16:rowId xmlns:a16="http://schemas.microsoft.com/office/drawing/2014/main" val="1952158974"/>
+                  </a:ext>
+                </a:extLst>
+              </a:tr>
+              <a:tr h="294841">
+                <a:tc>
+                  <a:txBody>
+                    <a:bodyPr/>
+                    <a:lstStyle/>
+                    <a:p>
+                      <a:pPr algn="l" fontAlgn="b"/>
+                      <a:r>
+                        <a:rPr lang="de-DE" sz="900" u="none" strike="noStrike">
+                          <a:effectLst/>
+                        </a:rPr>
+                        <a:t>Linker Rand</a:t>
+                      </a:r>
+                      <a:endParaRPr lang="de-DE" sz="900" b="0" i="0" u="none" strike="noStrike">
+                        <a:solidFill>
+                          <a:srgbClr val="000000"/>
+                        </a:solidFill>
+                        <a:effectLst/>
+                        <a:latin typeface="Calibri" panose="020F0502020204030204" pitchFamily="34" charset="0"/>
+                      </a:endParaRPr>
+                    </a:p>
+                  </a:txBody>
+                  <a:tcPr marL="7394" marR="7394" marT="7394" marB="0" anchor="b"/>
+                </a:tc>
+                <a:tc>
+                  <a:txBody>
+                    <a:bodyPr/>
+                    <a:lstStyle/>
+                    <a:p>
+                      <a:pPr algn="l" fontAlgn="b"/>
+                      <a:endParaRPr lang="de-DE" sz="900" b="0" i="0" u="none" strike="noStrike">
+                        <a:solidFill>
+                          <a:srgbClr val="000000"/>
+                        </a:solidFill>
+                        <a:effectLst/>
+                        <a:latin typeface="Calibri" panose="020F0502020204030204" pitchFamily="34" charset="0"/>
+                      </a:endParaRPr>
+                    </a:p>
+                  </a:txBody>
+                  <a:tcPr marL="7394" marR="7394" marT="7394" marB="0" anchor="b"/>
+                </a:tc>
+                <a:tc>
+                  <a:txBody>
+                    <a:bodyPr/>
+                    <a:lstStyle/>
+                    <a:p>
+                      <a:pPr algn="r" fontAlgn="b"/>
+                      <a:r>
+                        <a:rPr lang="de-DE" sz="900" u="none" strike="noStrike">
+                          <a:effectLst/>
+                        </a:rPr>
+                        <a:t>3</a:t>
+                      </a:r>
+                      <a:endParaRPr lang="de-DE" sz="900" b="0" i="0" u="none" strike="noStrike">
+                        <a:solidFill>
+                          <a:srgbClr val="000000"/>
+                        </a:solidFill>
+                        <a:effectLst/>
+                        <a:latin typeface="Calibri" panose="020F0502020204030204" pitchFamily="34" charset="0"/>
+                      </a:endParaRPr>
+                    </a:p>
+                  </a:txBody>
+                  <a:tcPr marL="7394" marR="7394" marT="7394" marB="0" anchor="b"/>
+                </a:tc>
+                <a:tc>
+                  <a:txBody>
+                    <a:bodyPr/>
+                    <a:lstStyle/>
+                    <a:p>
+                      <a:pPr algn="l" fontAlgn="b"/>
+                      <a:endParaRPr lang="de-DE" sz="900" b="0" i="0" u="none" strike="noStrike">
+                        <a:solidFill>
+                          <a:srgbClr val="000000"/>
+                        </a:solidFill>
+                        <a:effectLst/>
+                        <a:latin typeface="Calibri" panose="020F0502020204030204" pitchFamily="34" charset="0"/>
+                      </a:endParaRPr>
+                    </a:p>
+                  </a:txBody>
+                  <a:tcPr marL="7394" marR="7394" marT="7394" marB="0" anchor="b"/>
+                </a:tc>
+                <a:tc>
+                  <a:txBody>
+                    <a:bodyPr/>
+                    <a:lstStyle/>
+                    <a:p>
+                      <a:pPr algn="r" fontAlgn="b"/>
+                      <a:r>
+                        <a:rPr lang="de-DE" sz="900" u="none" strike="noStrike">
+                          <a:effectLst/>
+                        </a:rPr>
+                        <a:t>1,7</a:t>
+                      </a:r>
+                      <a:endParaRPr lang="de-DE" sz="900" b="0" i="0" u="none" strike="noStrike">
+                        <a:solidFill>
+                          <a:srgbClr val="000000"/>
+                        </a:solidFill>
+                        <a:effectLst/>
+                        <a:latin typeface="Calibri" panose="020F0502020204030204" pitchFamily="34" charset="0"/>
+                      </a:endParaRPr>
+                    </a:p>
+                  </a:txBody>
+                  <a:tcPr marL="7394" marR="7394" marT="7394" marB="0" anchor="b"/>
+                </a:tc>
+                <a:tc>
+                  <a:txBody>
+                    <a:bodyPr/>
+                    <a:lstStyle/>
+                    <a:p>
+                      <a:pPr algn="r" fontAlgn="b"/>
+                      <a:r>
+                        <a:rPr lang="de-DE" sz="900" u="none" strike="noStrike">
+                          <a:effectLst/>
+                        </a:rPr>
+                        <a:t>1,0</a:t>
+                      </a:r>
+                      <a:endParaRPr lang="de-DE" sz="900" b="0" i="0" u="none" strike="noStrike">
+                        <a:solidFill>
+                          <a:srgbClr val="000000"/>
+                        </a:solidFill>
+                        <a:effectLst/>
+                        <a:latin typeface="Calibri" panose="020F0502020204030204" pitchFamily="34" charset="0"/>
+                      </a:endParaRPr>
+                    </a:p>
+                  </a:txBody>
+                  <a:tcPr marL="7394" marR="7394" marT="7394" marB="0" anchor="b"/>
+                </a:tc>
+                <a:tc>
+                  <a:txBody>
+                    <a:bodyPr/>
+                    <a:lstStyle/>
+                    <a:p>
+                      <a:pPr algn="l" fontAlgn="b"/>
+                      <a:endParaRPr lang="de-DE" sz="900" b="0" i="0" u="none" strike="noStrike">
+                        <a:solidFill>
+                          <a:srgbClr val="000000"/>
+                        </a:solidFill>
+                        <a:effectLst/>
+                        <a:latin typeface="Calibri" panose="020F0502020204030204" pitchFamily="34" charset="0"/>
+                      </a:endParaRPr>
+                    </a:p>
+                  </a:txBody>
+                  <a:tcPr marL="7394" marR="7394" marT="7394" marB="0" anchor="b"/>
+                </a:tc>
+                <a:tc>
+                  <a:txBody>
+                    <a:bodyPr/>
+                    <a:lstStyle/>
+                    <a:p>
+                      <a:pPr algn="r" fontAlgn="b"/>
+                      <a:r>
+                        <a:rPr lang="de-DE" sz="900" u="none" strike="noStrike" dirty="0">
+                          <a:effectLst/>
+                        </a:rPr>
+                        <a:t>2,6</a:t>
+                      </a:r>
+                      <a:endParaRPr lang="de-DE" sz="900" b="0" i="0" u="none" strike="noStrike" dirty="0">
+                        <a:solidFill>
+                          <a:srgbClr val="000000"/>
+                        </a:solidFill>
+                        <a:effectLst/>
+                        <a:latin typeface="Calibri" panose="020F0502020204030204" pitchFamily="34" charset="0"/>
+                      </a:endParaRPr>
+                    </a:p>
+                  </a:txBody>
+                  <a:tcPr marL="7394" marR="7394" marT="7394" marB="0" anchor="b"/>
+                </a:tc>
+                <a:tc>
+                  <a:txBody>
+                    <a:bodyPr/>
+                    <a:lstStyle/>
+                    <a:p>
+                      <a:pPr algn="r" fontAlgn="b"/>
+                      <a:r>
+                        <a:rPr lang="de-DE" sz="900" u="none" strike="noStrike">
+                          <a:effectLst/>
+                        </a:rPr>
+                        <a:t>3,0</a:t>
+                      </a:r>
+                      <a:endParaRPr lang="de-DE" sz="900" b="0" i="0" u="none" strike="noStrike">
+                        <a:solidFill>
+                          <a:srgbClr val="000000"/>
+                        </a:solidFill>
+                        <a:effectLst/>
+                        <a:latin typeface="Calibri" panose="020F0502020204030204" pitchFamily="34" charset="0"/>
+                      </a:endParaRPr>
+                    </a:p>
+                  </a:txBody>
+                  <a:tcPr marL="7394" marR="7394" marT="7394" marB="0" anchor="b"/>
+                </a:tc>
+                <a:extLst>
+                  <a:ext uri="{0D108BD9-81ED-4DB2-BD59-A6C34878D82A}">
+                    <a16:rowId xmlns:a16="http://schemas.microsoft.com/office/drawing/2014/main" val="2344855858"/>
+                  </a:ext>
+                </a:extLst>
+              </a:tr>
+              <a:tr h="151290">
+                <a:tc gridSpan="2">
+                  <a:txBody>
+                    <a:bodyPr/>
+                    <a:lstStyle/>
+                    <a:p>
+                      <a:pPr algn="l" fontAlgn="b"/>
+                      <a:r>
+                        <a:rPr lang="de-DE" sz="900" u="none" strike="noStrike">
+                          <a:effectLst/>
+                        </a:rPr>
+                        <a:t>rechter Rand</a:t>
+                      </a:r>
+                      <a:endParaRPr lang="de-DE" sz="900" b="0" i="0" u="none" strike="noStrike">
+                        <a:solidFill>
+                          <a:srgbClr val="000000"/>
+                        </a:solidFill>
+                        <a:effectLst/>
+                        <a:latin typeface="Calibri" panose="020F0502020204030204" pitchFamily="34" charset="0"/>
+                      </a:endParaRPr>
+                    </a:p>
+                  </a:txBody>
+                  <a:tcPr marL="7394" marR="7394" marT="7394" marB="0" anchor="b"/>
+                </a:tc>
+                <a:tc hMerge="1">
+                  <a:txBody>
+                    <a:bodyPr/>
+                    <a:lstStyle/>
+                    <a:p>
+                      <a:endParaRPr lang="de-DE"/>
+                    </a:p>
+                  </a:txBody>
+                  <a:tcPr/>
+                </a:tc>
+                <a:tc>
+                  <a:txBody>
+                    <a:bodyPr/>
+                    <a:lstStyle/>
+                    <a:p>
+                      <a:pPr algn="r" fontAlgn="b"/>
+                      <a:r>
+                        <a:rPr lang="de-DE" sz="900" u="none" strike="noStrike">
+                          <a:effectLst/>
+                        </a:rPr>
+                        <a:t>5</a:t>
+                      </a:r>
+                      <a:endParaRPr lang="de-DE" sz="900" b="0" i="0" u="none" strike="noStrike">
+                        <a:solidFill>
+                          <a:srgbClr val="000000"/>
+                        </a:solidFill>
+                        <a:effectLst/>
+                        <a:latin typeface="Calibri" panose="020F0502020204030204" pitchFamily="34" charset="0"/>
+                      </a:endParaRPr>
+                    </a:p>
+                  </a:txBody>
+                  <a:tcPr marL="7394" marR="7394" marT="7394" marB="0" anchor="b"/>
+                </a:tc>
+                <a:tc>
+                  <a:txBody>
+                    <a:bodyPr/>
+                    <a:lstStyle/>
+                    <a:p>
+                      <a:pPr algn="l" fontAlgn="b"/>
+                      <a:endParaRPr lang="de-DE" sz="900" b="0" i="0" u="none" strike="noStrike">
+                        <a:solidFill>
+                          <a:srgbClr val="000000"/>
+                        </a:solidFill>
+                        <a:effectLst/>
+                        <a:latin typeface="Calibri" panose="020F0502020204030204" pitchFamily="34" charset="0"/>
+                      </a:endParaRPr>
+                    </a:p>
+                  </a:txBody>
+                  <a:tcPr marL="7394" marR="7394" marT="7394" marB="0" anchor="b"/>
+                </a:tc>
+                <a:tc>
+                  <a:txBody>
+                    <a:bodyPr/>
+                    <a:lstStyle/>
+                    <a:p>
+                      <a:pPr algn="r" fontAlgn="b"/>
+                      <a:r>
+                        <a:rPr lang="de-DE" sz="900" u="none" strike="noStrike">
+                          <a:effectLst/>
+                        </a:rPr>
+                        <a:t>1,7</a:t>
+                      </a:r>
+                      <a:endParaRPr lang="de-DE" sz="900" b="0" i="0" u="none" strike="noStrike">
+                        <a:solidFill>
+                          <a:srgbClr val="000000"/>
+                        </a:solidFill>
+                        <a:effectLst/>
+                        <a:latin typeface="Calibri" panose="020F0502020204030204" pitchFamily="34" charset="0"/>
+                      </a:endParaRPr>
+                    </a:p>
+                  </a:txBody>
+                  <a:tcPr marL="7394" marR="7394" marT="7394" marB="0" anchor="b"/>
+                </a:tc>
+                <a:tc>
+                  <a:txBody>
+                    <a:bodyPr/>
+                    <a:lstStyle/>
+                    <a:p>
+                      <a:pPr algn="r" fontAlgn="b"/>
+                      <a:r>
+                        <a:rPr lang="de-DE" sz="900" u="none" strike="noStrike">
+                          <a:effectLst/>
+                        </a:rPr>
+                        <a:t>1,0</a:t>
+                      </a:r>
+                      <a:endParaRPr lang="de-DE" sz="900" b="0" i="0" u="none" strike="noStrike">
+                        <a:solidFill>
+                          <a:srgbClr val="000000"/>
+                        </a:solidFill>
+                        <a:effectLst/>
+                        <a:latin typeface="Calibri" panose="020F0502020204030204" pitchFamily="34" charset="0"/>
+                      </a:endParaRPr>
+                    </a:p>
+                  </a:txBody>
+                  <a:tcPr marL="7394" marR="7394" marT="7394" marB="0" anchor="b"/>
+                </a:tc>
+                <a:tc>
+                  <a:txBody>
+                    <a:bodyPr/>
+                    <a:lstStyle/>
+                    <a:p>
+                      <a:pPr algn="l" fontAlgn="b"/>
+                      <a:endParaRPr lang="de-DE" sz="900" b="0" i="0" u="none" strike="noStrike">
+                        <a:solidFill>
+                          <a:srgbClr val="000000"/>
+                        </a:solidFill>
+                        <a:effectLst/>
+                        <a:latin typeface="Calibri" panose="020F0502020204030204" pitchFamily="34" charset="0"/>
+                      </a:endParaRPr>
+                    </a:p>
+                  </a:txBody>
+                  <a:tcPr marL="7394" marR="7394" marT="7394" marB="0" anchor="b"/>
+                </a:tc>
+                <a:tc>
+                  <a:txBody>
+                    <a:bodyPr/>
+                    <a:lstStyle/>
+                    <a:p>
+                      <a:pPr algn="r" fontAlgn="b"/>
+                      <a:r>
+                        <a:rPr lang="de-DE" sz="900" u="none" strike="noStrike">
+                          <a:effectLst/>
+                        </a:rPr>
+                        <a:t>2,6</a:t>
+                      </a:r>
+                      <a:endParaRPr lang="de-DE" sz="900" b="0" i="0" u="none" strike="noStrike">
+                        <a:solidFill>
+                          <a:srgbClr val="000000"/>
+                        </a:solidFill>
+                        <a:effectLst/>
+                        <a:latin typeface="Calibri" panose="020F0502020204030204" pitchFamily="34" charset="0"/>
+                      </a:endParaRPr>
+                    </a:p>
+                  </a:txBody>
+                  <a:tcPr marL="7394" marR="7394" marT="7394" marB="0" anchor="b"/>
+                </a:tc>
+                <a:tc>
+                  <a:txBody>
+                    <a:bodyPr/>
+                    <a:lstStyle/>
+                    <a:p>
+                      <a:pPr algn="r" fontAlgn="b"/>
+                      <a:r>
+                        <a:rPr lang="de-DE" sz="900" u="none" strike="noStrike">
+                          <a:effectLst/>
+                        </a:rPr>
+                        <a:t>3,0</a:t>
+                      </a:r>
+                      <a:endParaRPr lang="de-DE" sz="900" b="0" i="0" u="none" strike="noStrike">
+                        <a:solidFill>
+                          <a:srgbClr val="000000"/>
+                        </a:solidFill>
+                        <a:effectLst/>
+                        <a:latin typeface="Calibri" panose="020F0502020204030204" pitchFamily="34" charset="0"/>
+                      </a:endParaRPr>
+                    </a:p>
+                  </a:txBody>
+                  <a:tcPr marL="7394" marR="7394" marT="7394" marB="0" anchor="b"/>
+                </a:tc>
+                <a:extLst>
+                  <a:ext uri="{0D108BD9-81ED-4DB2-BD59-A6C34878D82A}">
+                    <a16:rowId xmlns:a16="http://schemas.microsoft.com/office/drawing/2014/main" val="1417880102"/>
+                  </a:ext>
+                </a:extLst>
+              </a:tr>
+              <a:tr h="151290">
+                <a:tc>
+                  <a:txBody>
+                    <a:bodyPr/>
+                    <a:lstStyle/>
+                    <a:p>
+                      <a:pPr algn="l" fontAlgn="b"/>
+                      <a:endParaRPr lang="de-DE" sz="900" b="0" i="0" u="none" strike="noStrike">
+                        <a:solidFill>
+                          <a:srgbClr val="000000"/>
+                        </a:solidFill>
+                        <a:effectLst/>
+                        <a:latin typeface="Calibri" panose="020F0502020204030204" pitchFamily="34" charset="0"/>
+                      </a:endParaRPr>
+                    </a:p>
+                  </a:txBody>
+                  <a:tcPr marL="7394" marR="7394" marT="7394" marB="0" anchor="b"/>
+                </a:tc>
+                <a:tc>
+                  <a:txBody>
+                    <a:bodyPr/>
+                    <a:lstStyle/>
+                    <a:p>
+                      <a:pPr algn="l" fontAlgn="b"/>
+                      <a:endParaRPr lang="de-DE" sz="900" b="0" i="0" u="none" strike="noStrike">
+                        <a:solidFill>
+                          <a:srgbClr val="000000"/>
+                        </a:solidFill>
+                        <a:effectLst/>
+                        <a:latin typeface="Calibri" panose="020F0502020204030204" pitchFamily="34" charset="0"/>
+                      </a:endParaRPr>
+                    </a:p>
+                  </a:txBody>
+                  <a:tcPr marL="7394" marR="7394" marT="7394" marB="0" anchor="b"/>
+                </a:tc>
+                <a:tc>
+                  <a:txBody>
+                    <a:bodyPr/>
+                    <a:lstStyle/>
+                    <a:p>
+                      <a:pPr algn="l" fontAlgn="b"/>
+                      <a:endParaRPr lang="de-DE" sz="900" b="0" i="0" u="none" strike="noStrike">
+                        <a:solidFill>
+                          <a:srgbClr val="000000"/>
+                        </a:solidFill>
+                        <a:effectLst/>
+                        <a:latin typeface="Calibri" panose="020F0502020204030204" pitchFamily="34" charset="0"/>
+                      </a:endParaRPr>
+                    </a:p>
+                  </a:txBody>
+                  <a:tcPr marL="7394" marR="7394" marT="7394" marB="0" anchor="b"/>
+                </a:tc>
+                <a:tc>
+                  <a:txBody>
+                    <a:bodyPr/>
+                    <a:lstStyle/>
+                    <a:p>
+                      <a:pPr algn="l" fontAlgn="b"/>
+                      <a:endParaRPr lang="de-DE" sz="900" b="0" i="0" u="none" strike="noStrike">
+                        <a:solidFill>
+                          <a:srgbClr val="000000"/>
+                        </a:solidFill>
+                        <a:effectLst/>
+                        <a:latin typeface="Calibri" panose="020F0502020204030204" pitchFamily="34" charset="0"/>
+                      </a:endParaRPr>
+                    </a:p>
+                  </a:txBody>
+                  <a:tcPr marL="7394" marR="7394" marT="7394" marB="0" anchor="b"/>
+                </a:tc>
+                <a:tc>
+                  <a:txBody>
+                    <a:bodyPr/>
+                    <a:lstStyle/>
+                    <a:p>
+                      <a:pPr algn="l" fontAlgn="b"/>
+                      <a:endParaRPr lang="de-DE" sz="900" b="0" i="0" u="none" strike="noStrike">
+                        <a:solidFill>
+                          <a:srgbClr val="000000"/>
+                        </a:solidFill>
+                        <a:effectLst/>
+                        <a:latin typeface="Calibri" panose="020F0502020204030204" pitchFamily="34" charset="0"/>
+                      </a:endParaRPr>
+                    </a:p>
+                  </a:txBody>
+                  <a:tcPr marL="7394" marR="7394" marT="7394" marB="0" anchor="b"/>
+                </a:tc>
+                <a:tc>
+                  <a:txBody>
+                    <a:bodyPr/>
+                    <a:lstStyle/>
+                    <a:p>
+                      <a:pPr algn="l" fontAlgn="b"/>
+                      <a:endParaRPr lang="de-DE" sz="900" b="0" i="0" u="none" strike="noStrike">
+                        <a:solidFill>
+                          <a:srgbClr val="000000"/>
+                        </a:solidFill>
+                        <a:effectLst/>
+                        <a:latin typeface="Calibri" panose="020F0502020204030204" pitchFamily="34" charset="0"/>
+                      </a:endParaRPr>
+                    </a:p>
+                  </a:txBody>
+                  <a:tcPr marL="7394" marR="7394" marT="7394" marB="0" anchor="b"/>
+                </a:tc>
+                <a:tc>
+                  <a:txBody>
+                    <a:bodyPr/>
+                    <a:lstStyle/>
+                    <a:p>
+                      <a:pPr algn="l" fontAlgn="b"/>
+                      <a:endParaRPr lang="de-DE" sz="900" b="0" i="0" u="none" strike="noStrike">
+                        <a:solidFill>
+                          <a:srgbClr val="000000"/>
+                        </a:solidFill>
+                        <a:effectLst/>
+                        <a:latin typeface="Calibri" panose="020F0502020204030204" pitchFamily="34" charset="0"/>
+                      </a:endParaRPr>
+                    </a:p>
+                  </a:txBody>
+                  <a:tcPr marL="7394" marR="7394" marT="7394" marB="0" anchor="b"/>
+                </a:tc>
+                <a:tc>
+                  <a:txBody>
+                    <a:bodyPr/>
+                    <a:lstStyle/>
+                    <a:p>
+                      <a:pPr algn="l" fontAlgn="b"/>
+                      <a:endParaRPr lang="de-DE" sz="900" b="0" i="0" u="none" strike="noStrike">
+                        <a:solidFill>
+                          <a:srgbClr val="000000"/>
+                        </a:solidFill>
+                        <a:effectLst/>
+                        <a:latin typeface="Calibri" panose="020F0502020204030204" pitchFamily="34" charset="0"/>
+                      </a:endParaRPr>
+                    </a:p>
+                  </a:txBody>
+                  <a:tcPr marL="7394" marR="7394" marT="7394" marB="0" anchor="b"/>
+                </a:tc>
+                <a:tc>
+                  <a:txBody>
+                    <a:bodyPr/>
+                    <a:lstStyle/>
+                    <a:p>
+                      <a:pPr algn="l" fontAlgn="b"/>
+                      <a:endParaRPr lang="de-DE" sz="900" b="0" i="0" u="none" strike="noStrike">
+                        <a:solidFill>
+                          <a:srgbClr val="000000"/>
+                        </a:solidFill>
+                        <a:effectLst/>
+                        <a:latin typeface="Calibri" panose="020F0502020204030204" pitchFamily="34" charset="0"/>
+                      </a:endParaRPr>
+                    </a:p>
+                  </a:txBody>
+                  <a:tcPr marL="7394" marR="7394" marT="7394" marB="0" anchor="b"/>
+                </a:tc>
+                <a:extLst>
+                  <a:ext uri="{0D108BD9-81ED-4DB2-BD59-A6C34878D82A}">
+                    <a16:rowId xmlns:a16="http://schemas.microsoft.com/office/drawing/2014/main" val="3432231571"/>
+                  </a:ext>
+                </a:extLst>
+              </a:tr>
+              <a:tr h="294841">
+                <a:tc>
+                  <a:txBody>
+                    <a:bodyPr/>
+                    <a:lstStyle/>
+                    <a:p>
+                      <a:pPr algn="l" fontAlgn="b"/>
+                      <a:r>
+                        <a:rPr lang="de-DE" sz="900" u="none" strike="noStrike">
+                          <a:effectLst/>
+                        </a:rPr>
+                        <a:t>Summe</a:t>
+                      </a:r>
+                      <a:endParaRPr lang="de-DE" sz="900" b="0" i="0" u="none" strike="noStrike">
+                        <a:solidFill>
+                          <a:srgbClr val="000000"/>
+                        </a:solidFill>
+                        <a:effectLst/>
+                        <a:latin typeface="Calibri" panose="020F0502020204030204" pitchFamily="34" charset="0"/>
+                      </a:endParaRPr>
+                    </a:p>
+                  </a:txBody>
+                  <a:tcPr marL="7394" marR="7394" marT="7394" marB="0" anchor="b"/>
+                </a:tc>
+                <a:tc>
+                  <a:txBody>
+                    <a:bodyPr/>
+                    <a:lstStyle/>
+                    <a:p>
+                      <a:pPr algn="l" fontAlgn="b"/>
+                      <a:endParaRPr lang="de-DE" sz="900" b="0" i="0" u="none" strike="noStrike">
+                        <a:solidFill>
+                          <a:srgbClr val="000000"/>
+                        </a:solidFill>
+                        <a:effectLst/>
+                        <a:latin typeface="Calibri" panose="020F0502020204030204" pitchFamily="34" charset="0"/>
+                      </a:endParaRPr>
+                    </a:p>
+                  </a:txBody>
+                  <a:tcPr marL="7394" marR="7394" marT="7394" marB="0" anchor="b"/>
+                </a:tc>
+                <a:tc>
+                  <a:txBody>
+                    <a:bodyPr/>
+                    <a:lstStyle/>
+                    <a:p>
+                      <a:pPr algn="r" fontAlgn="b"/>
+                      <a:r>
+                        <a:rPr lang="de-DE" sz="900" u="none" strike="noStrike">
+                          <a:effectLst/>
+                        </a:rPr>
+                        <a:t>180</a:t>
+                      </a:r>
+                      <a:endParaRPr lang="de-DE" sz="900" b="0" i="0" u="none" strike="noStrike">
+                        <a:solidFill>
+                          <a:srgbClr val="000000"/>
+                        </a:solidFill>
+                        <a:effectLst/>
+                        <a:latin typeface="Calibri" panose="020F0502020204030204" pitchFamily="34" charset="0"/>
+                      </a:endParaRPr>
+                    </a:p>
+                  </a:txBody>
+                  <a:tcPr marL="7394" marR="7394" marT="7394" marB="0" anchor="b"/>
+                </a:tc>
+                <a:tc>
+                  <a:txBody>
+                    <a:bodyPr/>
+                    <a:lstStyle/>
+                    <a:p>
+                      <a:pPr algn="l" fontAlgn="b"/>
+                      <a:endParaRPr lang="de-DE" sz="900" b="0" i="0" u="none" strike="noStrike">
+                        <a:solidFill>
+                          <a:srgbClr val="000000"/>
+                        </a:solidFill>
+                        <a:effectLst/>
+                        <a:latin typeface="Calibri" panose="020F0502020204030204" pitchFamily="34" charset="0"/>
+                      </a:endParaRPr>
+                    </a:p>
+                  </a:txBody>
+                  <a:tcPr marL="7394" marR="7394" marT="7394" marB="0" anchor="b"/>
+                </a:tc>
+                <a:tc>
+                  <a:txBody>
+                    <a:bodyPr/>
+                    <a:lstStyle/>
+                    <a:p>
+                      <a:pPr algn="r" fontAlgn="b"/>
+                      <a:r>
+                        <a:rPr lang="de-DE" sz="900" u="none" strike="noStrike">
+                          <a:effectLst/>
+                        </a:rPr>
+                        <a:t>96</a:t>
+                      </a:r>
+                      <a:endParaRPr lang="de-DE" sz="900" b="0" i="0" u="none" strike="noStrike">
+                        <a:solidFill>
+                          <a:srgbClr val="000000"/>
+                        </a:solidFill>
+                        <a:effectLst/>
+                        <a:latin typeface="Calibri" panose="020F0502020204030204" pitchFamily="34" charset="0"/>
+                      </a:endParaRPr>
+                    </a:p>
+                  </a:txBody>
+                  <a:tcPr marL="7394" marR="7394" marT="7394" marB="0" anchor="b"/>
+                </a:tc>
+                <a:tc>
+                  <a:txBody>
+                    <a:bodyPr/>
+                    <a:lstStyle/>
+                    <a:p>
+                      <a:pPr algn="r" fontAlgn="b"/>
+                      <a:r>
+                        <a:rPr lang="de-DE" sz="900" u="none" strike="noStrike">
+                          <a:effectLst/>
+                        </a:rPr>
+                        <a:t>96</a:t>
+                      </a:r>
+                      <a:endParaRPr lang="de-DE" sz="900" b="0" i="0" u="none" strike="noStrike">
+                        <a:solidFill>
+                          <a:srgbClr val="000000"/>
+                        </a:solidFill>
+                        <a:effectLst/>
+                        <a:latin typeface="Calibri" panose="020F0502020204030204" pitchFamily="34" charset="0"/>
+                      </a:endParaRPr>
+                    </a:p>
+                  </a:txBody>
+                  <a:tcPr marL="7394" marR="7394" marT="7394" marB="0" anchor="b"/>
+                </a:tc>
+                <a:tc>
+                  <a:txBody>
+                    <a:bodyPr/>
+                    <a:lstStyle/>
+                    <a:p>
+                      <a:pPr algn="l" fontAlgn="b"/>
+                      <a:endParaRPr lang="de-DE" sz="900" b="0" i="0" u="none" strike="noStrike">
+                        <a:solidFill>
+                          <a:srgbClr val="000000"/>
+                        </a:solidFill>
+                        <a:effectLst/>
+                        <a:latin typeface="Calibri" panose="020F0502020204030204" pitchFamily="34" charset="0"/>
+                      </a:endParaRPr>
+                    </a:p>
+                  </a:txBody>
+                  <a:tcPr marL="7394" marR="7394" marT="7394" marB="0" anchor="b"/>
+                </a:tc>
+                <a:tc>
+                  <a:txBody>
+                    <a:bodyPr/>
+                    <a:lstStyle/>
+                    <a:p>
+                      <a:pPr algn="r" fontAlgn="b"/>
+                      <a:r>
+                        <a:rPr lang="de-DE" sz="900" u="none" strike="noStrike">
+                          <a:effectLst/>
+                        </a:rPr>
+                        <a:t>131</a:t>
+                      </a:r>
+                      <a:endParaRPr lang="de-DE" sz="900" b="0" i="0" u="none" strike="noStrike">
+                        <a:solidFill>
+                          <a:srgbClr val="000000"/>
+                        </a:solidFill>
+                        <a:effectLst/>
+                        <a:latin typeface="Calibri" panose="020F0502020204030204" pitchFamily="34" charset="0"/>
+                      </a:endParaRPr>
+                    </a:p>
+                  </a:txBody>
+                  <a:tcPr marL="7394" marR="7394" marT="7394" marB="0" anchor="b"/>
+                </a:tc>
+                <a:tc>
+                  <a:txBody>
+                    <a:bodyPr/>
+                    <a:lstStyle/>
+                    <a:p>
+                      <a:pPr algn="r" fontAlgn="b"/>
+                      <a:r>
+                        <a:rPr lang="de-DE" sz="900" u="none" strike="noStrike">
+                          <a:effectLst/>
+                        </a:rPr>
+                        <a:t>131</a:t>
+                      </a:r>
+                      <a:endParaRPr lang="de-DE" sz="900" b="0" i="0" u="none" strike="noStrike">
+                        <a:solidFill>
+                          <a:srgbClr val="000000"/>
+                        </a:solidFill>
+                        <a:effectLst/>
+                        <a:latin typeface="Calibri" panose="020F0502020204030204" pitchFamily="34" charset="0"/>
+                      </a:endParaRPr>
+                    </a:p>
+                  </a:txBody>
+                  <a:tcPr marL="7394" marR="7394" marT="7394" marB="0" anchor="b"/>
+                </a:tc>
+                <a:extLst>
+                  <a:ext uri="{0D108BD9-81ED-4DB2-BD59-A6C34878D82A}">
+                    <a16:rowId xmlns:a16="http://schemas.microsoft.com/office/drawing/2014/main" val="186987872"/>
+                  </a:ext>
+                </a:extLst>
+              </a:tr>
+              <a:tr h="151290">
+                <a:tc>
+                  <a:txBody>
+                    <a:bodyPr/>
+                    <a:lstStyle/>
+                    <a:p>
+                      <a:pPr algn="l" fontAlgn="b"/>
+                      <a:endParaRPr lang="de-DE" sz="900" b="0" i="0" u="none" strike="noStrike">
+                        <a:solidFill>
+                          <a:srgbClr val="000000"/>
+                        </a:solidFill>
+                        <a:effectLst/>
+                        <a:latin typeface="Calibri" panose="020F0502020204030204" pitchFamily="34" charset="0"/>
+                      </a:endParaRPr>
+                    </a:p>
+                  </a:txBody>
+                  <a:tcPr marL="7394" marR="7394" marT="7394" marB="0" anchor="b"/>
+                </a:tc>
+                <a:tc>
+                  <a:txBody>
+                    <a:bodyPr/>
+                    <a:lstStyle/>
+                    <a:p>
+                      <a:pPr algn="l" fontAlgn="b"/>
+                      <a:endParaRPr lang="de-DE" sz="900" b="0" i="0" u="none" strike="noStrike">
+                        <a:solidFill>
+                          <a:srgbClr val="000000"/>
+                        </a:solidFill>
+                        <a:effectLst/>
+                        <a:latin typeface="Calibri" panose="020F0502020204030204" pitchFamily="34" charset="0"/>
+                      </a:endParaRPr>
+                    </a:p>
+                  </a:txBody>
+                  <a:tcPr marL="7394" marR="7394" marT="7394" marB="0" anchor="b"/>
+                </a:tc>
+                <a:tc>
+                  <a:txBody>
+                    <a:bodyPr/>
+                    <a:lstStyle/>
+                    <a:p>
+                      <a:pPr algn="l" fontAlgn="b"/>
+                      <a:endParaRPr lang="de-DE" sz="900" b="0" i="0" u="none" strike="noStrike">
+                        <a:solidFill>
+                          <a:srgbClr val="000000"/>
+                        </a:solidFill>
+                        <a:effectLst/>
+                        <a:latin typeface="Calibri" panose="020F0502020204030204" pitchFamily="34" charset="0"/>
+                      </a:endParaRPr>
+                    </a:p>
+                  </a:txBody>
+                  <a:tcPr marL="7394" marR="7394" marT="7394" marB="0" anchor="b"/>
+                </a:tc>
+                <a:tc>
+                  <a:txBody>
+                    <a:bodyPr/>
+                    <a:lstStyle/>
+                    <a:p>
+                      <a:pPr algn="l" fontAlgn="b"/>
+                      <a:endParaRPr lang="de-DE" sz="900" b="0" i="0" u="none" strike="noStrike">
+                        <a:solidFill>
+                          <a:srgbClr val="000000"/>
+                        </a:solidFill>
+                        <a:effectLst/>
+                        <a:latin typeface="Calibri" panose="020F0502020204030204" pitchFamily="34" charset="0"/>
+                      </a:endParaRPr>
+                    </a:p>
+                  </a:txBody>
+                  <a:tcPr marL="7394" marR="7394" marT="7394" marB="0" anchor="b"/>
+                </a:tc>
+                <a:tc>
+                  <a:txBody>
+                    <a:bodyPr/>
+                    <a:lstStyle/>
+                    <a:p>
+                      <a:pPr algn="l" fontAlgn="b"/>
+                      <a:endParaRPr lang="de-DE" sz="900" b="0" i="0" u="none" strike="noStrike">
+                        <a:solidFill>
+                          <a:srgbClr val="000000"/>
+                        </a:solidFill>
+                        <a:effectLst/>
+                        <a:latin typeface="Calibri" panose="020F0502020204030204" pitchFamily="34" charset="0"/>
+                      </a:endParaRPr>
+                    </a:p>
+                  </a:txBody>
+                  <a:tcPr marL="7394" marR="7394" marT="7394" marB="0" anchor="b"/>
+                </a:tc>
+                <a:tc>
+                  <a:txBody>
+                    <a:bodyPr/>
+                    <a:lstStyle/>
+                    <a:p>
+                      <a:pPr algn="l" fontAlgn="b"/>
+                      <a:endParaRPr lang="de-DE" sz="900" b="0" i="0" u="none" strike="noStrike">
+                        <a:solidFill>
+                          <a:srgbClr val="000000"/>
+                        </a:solidFill>
+                        <a:effectLst/>
+                        <a:latin typeface="Calibri" panose="020F0502020204030204" pitchFamily="34" charset="0"/>
+                      </a:endParaRPr>
+                    </a:p>
+                  </a:txBody>
+                  <a:tcPr marL="7394" marR="7394" marT="7394" marB="0" anchor="b"/>
+                </a:tc>
+                <a:tc>
+                  <a:txBody>
+                    <a:bodyPr/>
+                    <a:lstStyle/>
+                    <a:p>
+                      <a:pPr algn="l" fontAlgn="b"/>
+                      <a:endParaRPr lang="de-DE" sz="900" b="0" i="0" u="none" strike="noStrike">
+                        <a:solidFill>
+                          <a:srgbClr val="000000"/>
+                        </a:solidFill>
+                        <a:effectLst/>
+                        <a:latin typeface="Calibri" panose="020F0502020204030204" pitchFamily="34" charset="0"/>
+                      </a:endParaRPr>
+                    </a:p>
+                  </a:txBody>
+                  <a:tcPr marL="7394" marR="7394" marT="7394" marB="0" anchor="b"/>
+                </a:tc>
+                <a:tc>
+                  <a:txBody>
+                    <a:bodyPr/>
+                    <a:lstStyle/>
+                    <a:p>
+                      <a:pPr algn="l" fontAlgn="b"/>
+                      <a:endParaRPr lang="de-DE" sz="900" b="0" i="0" u="none" strike="noStrike">
+                        <a:solidFill>
+                          <a:srgbClr val="000000"/>
+                        </a:solidFill>
+                        <a:effectLst/>
+                        <a:latin typeface="Calibri" panose="020F0502020204030204" pitchFamily="34" charset="0"/>
+                      </a:endParaRPr>
+                    </a:p>
+                  </a:txBody>
+                  <a:tcPr marL="7394" marR="7394" marT="7394" marB="0" anchor="b"/>
+                </a:tc>
+                <a:tc>
+                  <a:txBody>
+                    <a:bodyPr/>
+                    <a:lstStyle/>
+                    <a:p>
+                      <a:pPr algn="l" fontAlgn="b"/>
+                      <a:endParaRPr lang="de-DE" sz="900" b="0" i="0" u="none" strike="noStrike" dirty="0">
+                        <a:solidFill>
+                          <a:srgbClr val="000000"/>
+                        </a:solidFill>
+                        <a:effectLst/>
+                        <a:latin typeface="Calibri" panose="020F0502020204030204" pitchFamily="34" charset="0"/>
+                      </a:endParaRPr>
+                    </a:p>
+                  </a:txBody>
+                  <a:tcPr marL="7394" marR="7394" marT="7394" marB="0" anchor="b"/>
+                </a:tc>
+                <a:extLst>
+                  <a:ext uri="{0D108BD9-81ED-4DB2-BD59-A6C34878D82A}">
+                    <a16:rowId xmlns:a16="http://schemas.microsoft.com/office/drawing/2014/main" val="3468323816"/>
+                  </a:ext>
+                </a:extLst>
+              </a:tr>
+            </a:tbl>
+          </a:graphicData>
+        </a:graphic>
+      </p:graphicFrame>
     </p:spTree>
     <p:extLst>
       <p:ext uri="{BB962C8B-B14F-4D97-AF65-F5344CB8AC3E}">

</xml_diff>

<commit_message>
V1.0.7 - Published to testers
</commit_message>
<xml_diff>
--- a/PowerPoints/ScreenLayouts.pptx
+++ b/PowerPoints/ScreenLayouts.pptx
@@ -12,6 +12,8 @@
     <p:sldId id="262" r:id="rId6"/>
     <p:sldId id="258" r:id="rId7"/>
     <p:sldId id="257" r:id="rId8"/>
+    <p:sldId id="263" r:id="rId9"/>
+    <p:sldId id="264" r:id="rId10"/>
   </p:sldIdLst>
   <p:sldSz cx="6858000" cy="9906000" type="A4"/>
   <p:notesSz cx="6858000" cy="9144000"/>
@@ -260,7 +262,7 @@
           <a:p>
             <a:fld id="{BD91CD0C-10B1-6E41-8640-8B762291B572}" type="datetimeFigureOut">
               <a:rPr lang="en-US" smtClean="0"/>
-              <a:t>12/14/20</a:t>
+              <a:t>12/21/20</a:t>
             </a:fld>
             <a:endParaRPr lang="en-US"/>
           </a:p>
@@ -430,7 +432,7 @@
           <a:p>
             <a:fld id="{BD91CD0C-10B1-6E41-8640-8B762291B572}" type="datetimeFigureOut">
               <a:rPr lang="en-US" smtClean="0"/>
-              <a:t>12/14/20</a:t>
+              <a:t>12/21/20</a:t>
             </a:fld>
             <a:endParaRPr lang="en-US"/>
           </a:p>
@@ -610,7 +612,7 @@
           <a:p>
             <a:fld id="{BD91CD0C-10B1-6E41-8640-8B762291B572}" type="datetimeFigureOut">
               <a:rPr lang="en-US" smtClean="0"/>
-              <a:t>12/14/20</a:t>
+              <a:t>12/21/20</a:t>
             </a:fld>
             <a:endParaRPr lang="en-US"/>
           </a:p>
@@ -780,7 +782,7 @@
           <a:p>
             <a:fld id="{BD91CD0C-10B1-6E41-8640-8B762291B572}" type="datetimeFigureOut">
               <a:rPr lang="en-US" smtClean="0"/>
-              <a:t>12/14/20</a:t>
+              <a:t>12/21/20</a:t>
             </a:fld>
             <a:endParaRPr lang="en-US"/>
           </a:p>
@@ -1024,7 +1026,7 @@
           <a:p>
             <a:fld id="{BD91CD0C-10B1-6E41-8640-8B762291B572}" type="datetimeFigureOut">
               <a:rPr lang="en-US" smtClean="0"/>
-              <a:t>12/14/20</a:t>
+              <a:t>12/21/20</a:t>
             </a:fld>
             <a:endParaRPr lang="en-US"/>
           </a:p>
@@ -1256,7 +1258,7 @@
           <a:p>
             <a:fld id="{BD91CD0C-10B1-6E41-8640-8B762291B572}" type="datetimeFigureOut">
               <a:rPr lang="en-US" smtClean="0"/>
-              <a:t>12/14/20</a:t>
+              <a:t>12/21/20</a:t>
             </a:fld>
             <a:endParaRPr lang="en-US"/>
           </a:p>
@@ -1623,7 +1625,7 @@
           <a:p>
             <a:fld id="{BD91CD0C-10B1-6E41-8640-8B762291B572}" type="datetimeFigureOut">
               <a:rPr lang="en-US" smtClean="0"/>
-              <a:t>12/14/20</a:t>
+              <a:t>12/21/20</a:t>
             </a:fld>
             <a:endParaRPr lang="en-US"/>
           </a:p>
@@ -1741,7 +1743,7 @@
           <a:p>
             <a:fld id="{BD91CD0C-10B1-6E41-8640-8B762291B572}" type="datetimeFigureOut">
               <a:rPr lang="en-US" smtClean="0"/>
-              <a:t>12/14/20</a:t>
+              <a:t>12/21/20</a:t>
             </a:fld>
             <a:endParaRPr lang="en-US"/>
           </a:p>
@@ -1836,7 +1838,7 @@
           <a:p>
             <a:fld id="{BD91CD0C-10B1-6E41-8640-8B762291B572}" type="datetimeFigureOut">
               <a:rPr lang="en-US" smtClean="0"/>
-              <a:t>12/14/20</a:t>
+              <a:t>12/21/20</a:t>
             </a:fld>
             <a:endParaRPr lang="en-US"/>
           </a:p>
@@ -2113,7 +2115,7 @@
           <a:p>
             <a:fld id="{BD91CD0C-10B1-6E41-8640-8B762291B572}" type="datetimeFigureOut">
               <a:rPr lang="en-US" smtClean="0"/>
-              <a:t>12/14/20</a:t>
+              <a:t>12/21/20</a:t>
             </a:fld>
             <a:endParaRPr lang="en-US"/>
           </a:p>
@@ -2370,7 +2372,7 @@
           <a:p>
             <a:fld id="{BD91CD0C-10B1-6E41-8640-8B762291B572}" type="datetimeFigureOut">
               <a:rPr lang="en-US" smtClean="0"/>
-              <a:t>12/14/20</a:t>
+              <a:t>12/21/20</a:t>
             </a:fld>
             <a:endParaRPr lang="en-US"/>
           </a:p>
@@ -2583,7 +2585,7 @@
           <a:p>
             <a:fld id="{BD91CD0C-10B1-6E41-8640-8B762291B572}" type="datetimeFigureOut">
               <a:rPr lang="en-US" smtClean="0"/>
-              <a:t>12/14/20</a:t>
+              <a:t>12/21/20</a:t>
             </a:fld>
             <a:endParaRPr lang="en-US"/>
           </a:p>
@@ -13944,6 +13946,246 @@
 </p:sld>
 </file>
 
+<file path=ppt/slides/slide8.xml><?xml version="1.0" encoding="utf-8"?>
+<p:sld xmlns:a="http://schemas.openxmlformats.org/drawingml/2006/main" xmlns:r="http://schemas.openxmlformats.org/officeDocument/2006/relationships" xmlns:p="http://schemas.openxmlformats.org/presentationml/2006/main">
+  <p:cSld>
+    <p:spTree>
+      <p:nvGrpSpPr>
+        <p:cNvPr id="1" name=""/>
+        <p:cNvGrpSpPr/>
+        <p:nvPr/>
+      </p:nvGrpSpPr>
+      <p:grpSpPr>
+        <a:xfrm>
+          <a:off x="0" y="0"/>
+          <a:ext cx="0" cy="0"/>
+          <a:chOff x="0" y="0"/>
+          <a:chExt cx="0" cy="0"/>
+        </a:xfrm>
+      </p:grpSpPr>
+      <p:pic>
+        <p:nvPicPr>
+          <p:cNvPr id="2" name="Grafik 1">
+            <a:extLst>
+              <a:ext uri="{FF2B5EF4-FFF2-40B4-BE49-F238E27FC236}">
+                <a16:creationId xmlns:a16="http://schemas.microsoft.com/office/drawing/2014/main" id="{37851E4F-01A3-B048-B02E-79D61E02307E}"/>
+              </a:ext>
+            </a:extLst>
+          </p:cNvPr>
+          <p:cNvPicPr>
+            <a:picLocks noChangeAspect="1"/>
+          </p:cNvPicPr>
+          <p:nvPr/>
+        </p:nvPicPr>
+        <p:blipFill>
+          <a:blip r:embed="rId2"/>
+          <a:stretch>
+            <a:fillRect/>
+          </a:stretch>
+        </p:blipFill>
+        <p:spPr>
+          <a:xfrm>
+            <a:off x="0" y="0"/>
+            <a:ext cx="5348377" cy="3313086"/>
+          </a:xfrm>
+          <a:prstGeom prst="rect">
+            <a:avLst/>
+          </a:prstGeom>
+        </p:spPr>
+      </p:pic>
+      <p:pic>
+        <p:nvPicPr>
+          <p:cNvPr id="3" name="Grafik 2">
+            <a:extLst>
+              <a:ext uri="{FF2B5EF4-FFF2-40B4-BE49-F238E27FC236}">
+                <a16:creationId xmlns:a16="http://schemas.microsoft.com/office/drawing/2014/main" id="{98B8B0CB-A0A0-424E-9E90-FFF73F61A41C}"/>
+              </a:ext>
+            </a:extLst>
+          </p:cNvPr>
+          <p:cNvPicPr>
+            <a:picLocks noChangeAspect="1"/>
+          </p:cNvPicPr>
+          <p:nvPr/>
+        </p:nvPicPr>
+        <p:blipFill>
+          <a:blip r:embed="rId3"/>
+          <a:stretch>
+            <a:fillRect/>
+          </a:stretch>
+        </p:blipFill>
+        <p:spPr>
+          <a:xfrm>
+            <a:off x="0" y="2920220"/>
+            <a:ext cx="5348377" cy="3358995"/>
+          </a:xfrm>
+          <a:prstGeom prst="rect">
+            <a:avLst/>
+          </a:prstGeom>
+        </p:spPr>
+      </p:pic>
+      <p:pic>
+        <p:nvPicPr>
+          <p:cNvPr id="4" name="Grafik 3">
+            <a:extLst>
+              <a:ext uri="{FF2B5EF4-FFF2-40B4-BE49-F238E27FC236}">
+                <a16:creationId xmlns:a16="http://schemas.microsoft.com/office/drawing/2014/main" id="{D215C67A-7E51-3F4E-9435-0A0D8C2DECB9}"/>
+              </a:ext>
+            </a:extLst>
+          </p:cNvPr>
+          <p:cNvPicPr>
+            <a:picLocks noChangeAspect="1"/>
+          </p:cNvPicPr>
+          <p:nvPr/>
+        </p:nvPicPr>
+        <p:blipFill>
+          <a:blip r:embed="rId4"/>
+          <a:stretch>
+            <a:fillRect/>
+          </a:stretch>
+        </p:blipFill>
+        <p:spPr>
+          <a:xfrm>
+            <a:off x="-1" y="5991224"/>
+            <a:ext cx="5348378" cy="3358996"/>
+          </a:xfrm>
+          <a:prstGeom prst="rect">
+            <a:avLst/>
+          </a:prstGeom>
+        </p:spPr>
+      </p:pic>
+    </p:spTree>
+    <p:extLst>
+      <p:ext uri="{BB962C8B-B14F-4D97-AF65-F5344CB8AC3E}">
+        <p14:creationId xmlns:p14="http://schemas.microsoft.com/office/powerpoint/2010/main" val="3943840844"/>
+      </p:ext>
+    </p:extLst>
+  </p:cSld>
+  <p:clrMapOvr>
+    <a:masterClrMapping/>
+  </p:clrMapOvr>
+</p:sld>
+</file>
+
+<file path=ppt/slides/slide9.xml><?xml version="1.0" encoding="utf-8"?>
+<p:sld xmlns:a="http://schemas.openxmlformats.org/drawingml/2006/main" xmlns:r="http://schemas.openxmlformats.org/officeDocument/2006/relationships" xmlns:p="http://schemas.openxmlformats.org/presentationml/2006/main">
+  <p:cSld>
+    <p:spTree>
+      <p:nvGrpSpPr>
+        <p:cNvPr id="1" name=""/>
+        <p:cNvGrpSpPr/>
+        <p:nvPr/>
+      </p:nvGrpSpPr>
+      <p:grpSpPr>
+        <a:xfrm>
+          <a:off x="0" y="0"/>
+          <a:ext cx="0" cy="0"/>
+          <a:chOff x="0" y="0"/>
+          <a:chExt cx="0" cy="0"/>
+        </a:xfrm>
+      </p:grpSpPr>
+      <p:pic>
+        <p:nvPicPr>
+          <p:cNvPr id="2" name="Grafik 1">
+            <a:extLst>
+              <a:ext uri="{FF2B5EF4-FFF2-40B4-BE49-F238E27FC236}">
+                <a16:creationId xmlns:a16="http://schemas.microsoft.com/office/drawing/2014/main" id="{F86092CB-FF56-D14F-9DCB-81BFB4504B36}"/>
+              </a:ext>
+            </a:extLst>
+          </p:cNvPr>
+          <p:cNvPicPr>
+            <a:picLocks noChangeAspect="1"/>
+          </p:cNvPicPr>
+          <p:nvPr/>
+        </p:nvPicPr>
+        <p:blipFill>
+          <a:blip r:embed="rId2"/>
+          <a:stretch>
+            <a:fillRect/>
+          </a:stretch>
+        </p:blipFill>
+        <p:spPr>
+          <a:xfrm>
+            <a:off x="0" y="159767"/>
+            <a:ext cx="5294734" cy="3325305"/>
+          </a:xfrm>
+          <a:prstGeom prst="rect">
+            <a:avLst/>
+          </a:prstGeom>
+        </p:spPr>
+      </p:pic>
+      <p:pic>
+        <p:nvPicPr>
+          <p:cNvPr id="3" name="Grafik 2">
+            <a:extLst>
+              <a:ext uri="{FF2B5EF4-FFF2-40B4-BE49-F238E27FC236}">
+                <a16:creationId xmlns:a16="http://schemas.microsoft.com/office/drawing/2014/main" id="{B1CBF11B-FD55-B14E-B299-CA6802944D81}"/>
+              </a:ext>
+            </a:extLst>
+          </p:cNvPr>
+          <p:cNvPicPr>
+            <a:picLocks noChangeAspect="1"/>
+          </p:cNvPicPr>
+          <p:nvPr/>
+        </p:nvPicPr>
+        <p:blipFill>
+          <a:blip r:embed="rId3"/>
+          <a:stretch>
+            <a:fillRect/>
+          </a:stretch>
+        </p:blipFill>
+        <p:spPr>
+          <a:xfrm>
+            <a:off x="0" y="3290347"/>
+            <a:ext cx="5294734" cy="3325305"/>
+          </a:xfrm>
+          <a:prstGeom prst="rect">
+            <a:avLst/>
+          </a:prstGeom>
+        </p:spPr>
+      </p:pic>
+      <p:pic>
+        <p:nvPicPr>
+          <p:cNvPr id="4" name="Grafik 3">
+            <a:extLst>
+              <a:ext uri="{FF2B5EF4-FFF2-40B4-BE49-F238E27FC236}">
+                <a16:creationId xmlns:a16="http://schemas.microsoft.com/office/drawing/2014/main" id="{DAD2648E-2A7D-384C-A495-BFA0FE5C7139}"/>
+              </a:ext>
+            </a:extLst>
+          </p:cNvPr>
+          <p:cNvPicPr>
+            <a:picLocks noChangeAspect="1"/>
+          </p:cNvPicPr>
+          <p:nvPr/>
+        </p:nvPicPr>
+        <p:blipFill>
+          <a:blip r:embed="rId4"/>
+          <a:stretch>
+            <a:fillRect/>
+          </a:stretch>
+        </p:blipFill>
+        <p:spPr>
+          <a:xfrm>
+            <a:off x="0" y="4317699"/>
+            <a:ext cx="5294734" cy="3325305"/>
+          </a:xfrm>
+          <a:prstGeom prst="rect">
+            <a:avLst/>
+          </a:prstGeom>
+        </p:spPr>
+      </p:pic>
+    </p:spTree>
+    <p:extLst>
+      <p:ext uri="{BB962C8B-B14F-4D97-AF65-F5344CB8AC3E}">
+        <p14:creationId xmlns:p14="http://schemas.microsoft.com/office/powerpoint/2010/main" val="3124524561"/>
+      </p:ext>
+    </p:extLst>
+  </p:cSld>
+  <p:clrMapOvr>
+    <a:masterClrMapping/>
+  </p:clrMapOvr>
+</p:sld>
+</file>
+
 <file path=ppt/theme/theme1.xml><?xml version="1.0" encoding="utf-8"?>
 <a:theme xmlns:a="http://schemas.openxmlformats.org/drawingml/2006/main" name="Office">
   <a:themeElements>

</xml_diff>